<commit_message>
[Graphics] Added Vulkan API markers;
</commit_message>
<xml_diff>
--- a/Docs/Features overview.pptx
+++ b/Docs/Features overview.pptx
@@ -6,6 +6,9 @@
   </p:sldMasterIdLst>
   <p:sldIdLst>
     <p:sldId id="257" r:id="rId2"/>
+    <p:sldId id="258" r:id="rId3"/>
+    <p:sldId id="259" r:id="rId4"/>
+    <p:sldId id="260" r:id="rId5"/>
   </p:sldIdLst>
   <p:sldSz cx="12192000" cy="6858000"/>
   <p:notesSz cx="6858000" cy="9144000"/>
@@ -104,12 +107,47 @@
       </a:defRPr>
     </a:lvl9pPr>
   </p:defaultTextStyle>
+  <p:extLst>
+    <p:ext uri="{521415D9-36F7-43E2-AB2F-B90AF26B5E84}">
+      <p14:sectionLst xmlns:p14="http://schemas.microsoft.com/office/powerpoint/2010/main">
+        <p14:section name="Intro" id="{9CF1F011-95CA-48D0-BD53-61024DBCDCD3}">
+          <p14:sldIdLst>
+            <p14:sldId id="257"/>
+            <p14:sldId id="258"/>
+          </p14:sldIdLst>
+        </p14:section>
+        <p14:section name="Frame Graph" id="{453CCC5D-6E2D-4CE0-8E14-CECF0EC6CED3}">
+          <p14:sldIdLst>
+            <p14:sldId id="259"/>
+            <p14:sldId id="260"/>
+          </p14:sldIdLst>
+        </p14:section>
+      </p14:sectionLst>
+    </p:ext>
+    <p:ext uri="{EFAFB233-063F-42B5-8137-9DF3F51BA10A}">
+      <p15:sldGuideLst xmlns:p15="http://schemas.microsoft.com/office/powerpoint/2012/main"/>
+    </p:ext>
+  </p:extLst>
 </p:presentation>
 </file>
 
 <file path=ppt/slideLayouts/slideLayout1.xml><?xml version="1.0" encoding="utf-8"?>
 <p:sldLayout xmlns:a="http://schemas.openxmlformats.org/drawingml/2006/main" xmlns:r="http://schemas.openxmlformats.org/officeDocument/2006/relationships" xmlns:p="http://schemas.openxmlformats.org/presentationml/2006/main" type="title" preserve="1">
   <p:cSld name="Title Slide">
+    <p:bg>
+      <p:bgPr>
+        <a:blipFill dpi="0" rotWithShape="1">
+          <a:blip r:embed="rId2">
+            <a:lum/>
+          </a:blip>
+          <a:srcRect/>
+          <a:stretch>
+            <a:fillRect/>
+          </a:stretch>
+        </a:blipFill>
+        <a:effectLst/>
+      </p:bgPr>
+    </p:bg>
     <p:spTree>
       <p:nvGrpSpPr>
         <p:cNvPr id="1" name=""/>
@@ -256,7 +294,7 @@
           <a:p>
             <a:fld id="{84B6F61C-9FA5-4C35-A1D3-00EE2C15A6C0}" type="datetimeFigureOut">
               <a:rPr lang="en-IN" smtClean="0"/>
-              <a:t>Thu : 14-07-2022</a:t>
+              <a:t>16-12-2022</a:t>
             </a:fld>
             <a:endParaRPr lang="en-IN"/>
           </a:p>
@@ -332,6 +370,20 @@
 <file path=ppt/slideLayouts/slideLayout10.xml><?xml version="1.0" encoding="utf-8"?>
 <p:sldLayout xmlns:a="http://schemas.openxmlformats.org/drawingml/2006/main" xmlns:r="http://schemas.openxmlformats.org/officeDocument/2006/relationships" xmlns:p="http://schemas.openxmlformats.org/presentationml/2006/main" type="vertTx" preserve="1">
   <p:cSld name="Title and Vertical Text">
+    <p:bg>
+      <p:bgPr>
+        <a:blipFill dpi="0" rotWithShape="1">
+          <a:blip r:embed="rId2">
+            <a:lum/>
+          </a:blip>
+          <a:srcRect/>
+          <a:stretch>
+            <a:fillRect/>
+          </a:stretch>
+        </a:blipFill>
+        <a:effectLst/>
+      </p:bgPr>
+    </p:bg>
     <p:spTree>
       <p:nvGrpSpPr>
         <p:cNvPr id="1" name=""/>
@@ -365,13 +417,23 @@
         <p:spPr/>
         <p:txBody>
           <a:bodyPr/>
-          <a:lstStyle/>
-          <a:p>
-            <a:r>
-              <a:rPr lang="en-US"/>
+          <a:lstStyle>
+            <a:lvl1pPr>
+              <a:defRPr>
+                <a:solidFill>
+                  <a:schemeClr val="bg1">
+                    <a:lumMod val="95000"/>
+                  </a:schemeClr>
+                </a:solidFill>
+              </a:defRPr>
+            </a:lvl1pPr>
+          </a:lstStyle>
+          <a:p>
+            <a:r>
+              <a:rPr lang="en-US" dirty="0"/>
               <a:t>Click to edit Master title style</a:t>
             </a:r>
-            <a:endParaRPr lang="en-IN"/>
+            <a:endParaRPr lang="en-IN" dirty="0"/>
           </a:p>
         </p:txBody>
       </p:sp>
@@ -456,7 +518,7 @@
           <a:p>
             <a:fld id="{84B6F61C-9FA5-4C35-A1D3-00EE2C15A6C0}" type="datetimeFigureOut">
               <a:rPr lang="en-IN" smtClean="0"/>
-              <a:t>Thu : 14-07-2022</a:t>
+              <a:t>16-12-2022</a:t>
             </a:fld>
             <a:endParaRPr lang="en-IN"/>
           </a:p>
@@ -532,6 +594,20 @@
 <file path=ppt/slideLayouts/slideLayout11.xml><?xml version="1.0" encoding="utf-8"?>
 <p:sldLayout xmlns:a="http://schemas.openxmlformats.org/drawingml/2006/main" xmlns:r="http://schemas.openxmlformats.org/officeDocument/2006/relationships" xmlns:p="http://schemas.openxmlformats.org/presentationml/2006/main" type="vertTitleAndTx" preserve="1">
   <p:cSld name="Vertical Title and Text">
+    <p:bg>
+      <p:bgPr>
+        <a:blipFill dpi="0" rotWithShape="1">
+          <a:blip r:embed="rId2">
+            <a:lum/>
+          </a:blip>
+          <a:srcRect/>
+          <a:stretch>
+            <a:fillRect/>
+          </a:stretch>
+        </a:blipFill>
+        <a:effectLst/>
+      </p:bgPr>
+    </p:bg>
     <p:spTree>
       <p:nvGrpSpPr>
         <p:cNvPr id="1" name=""/>
@@ -666,7 +742,7 @@
           <a:p>
             <a:fld id="{84B6F61C-9FA5-4C35-A1D3-00EE2C15A6C0}" type="datetimeFigureOut">
               <a:rPr lang="en-IN" smtClean="0"/>
-              <a:t>Thu : 14-07-2022</a:t>
+              <a:t>16-12-2022</a:t>
             </a:fld>
             <a:endParaRPr lang="en-IN"/>
           </a:p>
@@ -742,6 +818,20 @@
 <file path=ppt/slideLayouts/slideLayout2.xml><?xml version="1.0" encoding="utf-8"?>
 <p:sldLayout xmlns:a="http://schemas.openxmlformats.org/drawingml/2006/main" xmlns:r="http://schemas.openxmlformats.org/officeDocument/2006/relationships" xmlns:p="http://schemas.openxmlformats.org/presentationml/2006/main" type="obj" preserve="1">
   <p:cSld name="Title and Content">
+    <p:bg>
+      <p:bgPr>
+        <a:blipFill dpi="0" rotWithShape="1">
+          <a:blip r:embed="rId2">
+            <a:lum/>
+          </a:blip>
+          <a:srcRect/>
+          <a:stretch>
+            <a:fillRect/>
+          </a:stretch>
+        </a:blipFill>
+        <a:effectLst/>
+      </p:bgPr>
+    </p:bg>
     <p:spTree>
       <p:nvGrpSpPr>
         <p:cNvPr id="1" name=""/>
@@ -772,41 +862,19 @@
             <p:ph type="title"/>
           </p:nvPr>
         </p:nvSpPr>
-        <p:spPr/>
-        <p:txBody>
-          <a:bodyPr/>
-          <a:lstStyle/>
-          <a:p>
-            <a:r>
-              <a:rPr lang="en-US"/>
-              <a:t>Click to edit Master title style</a:t>
-            </a:r>
-            <a:endParaRPr lang="en-IN"/>
-          </a:p>
-        </p:txBody>
-      </p:sp>
-      <p:sp>
-        <p:nvSpPr>
-          <p:cNvPr id="3" name="Content Placeholder 2">
-            <a:extLst>
-              <a:ext uri="{FF2B5EF4-FFF2-40B4-BE49-F238E27FC236}">
-                <a16:creationId xmlns:a16="http://schemas.microsoft.com/office/drawing/2014/main" id="{3EFCCBBD-9419-C90A-8E8C-66E6ECF5F46D}"/>
-              </a:ext>
-            </a:extLst>
-          </p:cNvPr>
-          <p:cNvSpPr>
-            <a:spLocks noGrp="1"/>
-          </p:cNvSpPr>
-          <p:nvPr>
-            <p:ph idx="1"/>
-          </p:nvPr>
-        </p:nvSpPr>
-        <p:spPr/>
-        <p:txBody>
-          <a:bodyPr/>
+        <p:spPr>
+          <a:xfrm>
+            <a:off x="474306" y="198393"/>
+            <a:ext cx="10515600" cy="728194"/>
+          </a:xfrm>
+        </p:spPr>
+        <p:txBody>
+          <a:bodyPr>
+            <a:normAutofit/>
+          </a:bodyPr>
           <a:lstStyle>
             <a:lvl1pPr>
-              <a:defRPr>
+              <a:defRPr sz="2400">
                 <a:solidFill>
                   <a:schemeClr val="bg1"/>
                 </a:solidFill>
@@ -814,6 +882,60 @@
             </a:lvl1pPr>
           </a:lstStyle>
           <a:p>
+            <a:r>
+              <a:rPr lang="en-US" dirty="0"/>
+              <a:t>Click to edit Master title style</a:t>
+            </a:r>
+            <a:endParaRPr lang="en-IN" dirty="0"/>
+          </a:p>
+        </p:txBody>
+      </p:sp>
+      <p:sp>
+        <p:nvSpPr>
+          <p:cNvPr id="3" name="Content Placeholder 2">
+            <a:extLst>
+              <a:ext uri="{FF2B5EF4-FFF2-40B4-BE49-F238E27FC236}">
+                <a16:creationId xmlns:a16="http://schemas.microsoft.com/office/drawing/2014/main" id="{3EFCCBBD-9419-C90A-8E8C-66E6ECF5F46D}"/>
+              </a:ext>
+            </a:extLst>
+          </p:cNvPr>
+          <p:cNvSpPr>
+            <a:spLocks noGrp="1"/>
+          </p:cNvSpPr>
+          <p:nvPr>
+            <p:ph idx="1"/>
+          </p:nvPr>
+        </p:nvSpPr>
+        <p:spPr>
+          <a:xfrm>
+            <a:off x="541176" y="1219454"/>
+            <a:ext cx="10812624" cy="4957509"/>
+          </a:xfrm>
+        </p:spPr>
+        <p:txBody>
+          <a:bodyPr/>
+          <a:lstStyle>
+            <a:lvl1pPr>
+              <a:defRPr sz="1600">
+                <a:solidFill>
+                  <a:schemeClr val="bg1"/>
+                </a:solidFill>
+              </a:defRPr>
+            </a:lvl1pPr>
+            <a:lvl2pPr>
+              <a:defRPr sz="1200"/>
+            </a:lvl2pPr>
+            <a:lvl3pPr>
+              <a:defRPr sz="1000"/>
+            </a:lvl3pPr>
+            <a:lvl4pPr>
+              <a:defRPr sz="800"/>
+            </a:lvl4pPr>
+            <a:lvl5pPr>
+              <a:defRPr sz="600"/>
+            </a:lvl5pPr>
+          </a:lstStyle>
+          <a:p>
             <a:pPr lvl="0"/>
             <a:r>
               <a:rPr lang="en-US" dirty="0"/>
@@ -874,9 +996,9 @@
           <a:p>
             <a:fld id="{84B6F61C-9FA5-4C35-A1D3-00EE2C15A6C0}" type="datetimeFigureOut">
               <a:rPr lang="en-IN" smtClean="0"/>
-              <a:t>Thu : 14-07-2022</a:t>
+              <a:t>16-12-2022</a:t>
             </a:fld>
-            <a:endParaRPr lang="en-IN"/>
+            <a:endParaRPr lang="en-IN" dirty="0"/>
           </a:p>
         </p:txBody>
       </p:sp>
@@ -901,7 +1023,7 @@
           <a:bodyPr/>
           <a:lstStyle/>
           <a:p>
-            <a:endParaRPr lang="en-IN"/>
+            <a:endParaRPr lang="en-IN" dirty="0"/>
           </a:p>
         </p:txBody>
       </p:sp>
@@ -930,6 +1052,97 @@
               <a:rPr lang="en-IN" smtClean="0"/>
               <a:t>‹#›</a:t>
             </a:fld>
+            <a:endParaRPr lang="en-IN"/>
+          </a:p>
+        </p:txBody>
+      </p:sp>
+      <p:cxnSp>
+        <p:nvCxnSpPr>
+          <p:cNvPr id="8" name="Straight Connector 7">
+            <a:extLst>
+              <a:ext uri="{FF2B5EF4-FFF2-40B4-BE49-F238E27FC236}">
+                <a16:creationId xmlns:a16="http://schemas.microsoft.com/office/drawing/2014/main" id="{F345B548-3337-F008-3958-B40C80D5D3D7}"/>
+              </a:ext>
+            </a:extLst>
+          </p:cNvPr>
+          <p:cNvCxnSpPr>
+            <a:cxnSpLocks/>
+          </p:cNvCxnSpPr>
+          <p:nvPr userDrawn="1"/>
+        </p:nvCxnSpPr>
+        <p:spPr>
+          <a:xfrm>
+            <a:off x="335902" y="1073020"/>
+            <a:ext cx="11140751" cy="0"/>
+          </a:xfrm>
+          <a:prstGeom prst="line">
+            <a:avLst/>
+          </a:prstGeom>
+          <a:ln w="19050">
+            <a:solidFill>
+              <a:schemeClr val="accent2">
+                <a:lumMod val="85000"/>
+              </a:schemeClr>
+            </a:solidFill>
+          </a:ln>
+        </p:spPr>
+        <p:style>
+          <a:lnRef idx="1">
+            <a:schemeClr val="accent1"/>
+          </a:lnRef>
+          <a:fillRef idx="0">
+            <a:schemeClr val="accent1"/>
+          </a:fillRef>
+          <a:effectRef idx="0">
+            <a:schemeClr val="accent1"/>
+          </a:effectRef>
+          <a:fontRef idx="minor">
+            <a:schemeClr val="tx1"/>
+          </a:fontRef>
+        </p:style>
+      </p:cxnSp>
+      <p:sp>
+        <p:nvSpPr>
+          <p:cNvPr id="11" name="Rectangle 10">
+            <a:extLst>
+              <a:ext uri="{FF2B5EF4-FFF2-40B4-BE49-F238E27FC236}">
+                <a16:creationId xmlns:a16="http://schemas.microsoft.com/office/drawing/2014/main" id="{C7A37710-45F1-1A8E-E8D6-46471D4E7528}"/>
+              </a:ext>
+            </a:extLst>
+          </p:cNvPr>
+          <p:cNvSpPr/>
+          <p:nvPr userDrawn="1"/>
+        </p:nvSpPr>
+        <p:spPr>
+          <a:xfrm>
+            <a:off x="335902" y="198393"/>
+            <a:ext cx="45719" cy="728193"/>
+          </a:xfrm>
+          <a:prstGeom prst="rect">
+            <a:avLst/>
+          </a:prstGeom>
+        </p:spPr>
+        <p:style>
+          <a:lnRef idx="2">
+            <a:schemeClr val="accent1">
+              <a:shade val="50000"/>
+            </a:schemeClr>
+          </a:lnRef>
+          <a:fillRef idx="1">
+            <a:schemeClr val="accent1"/>
+          </a:fillRef>
+          <a:effectRef idx="0">
+            <a:schemeClr val="accent1"/>
+          </a:effectRef>
+          <a:fontRef idx="minor">
+            <a:schemeClr val="lt1"/>
+          </a:fontRef>
+        </p:style>
+        <p:txBody>
+          <a:bodyPr rtlCol="0" anchor="ctr"/>
+          <a:lstStyle/>
+          <a:p>
+            <a:pPr algn="ctr"/>
             <a:endParaRPr lang="en-IN"/>
           </a:p>
         </p:txBody>
@@ -950,6 +1163,20 @@
 <file path=ppt/slideLayouts/slideLayout3.xml><?xml version="1.0" encoding="utf-8"?>
 <p:sldLayout xmlns:a="http://schemas.openxmlformats.org/drawingml/2006/main" xmlns:r="http://schemas.openxmlformats.org/officeDocument/2006/relationships" xmlns:p="http://schemas.openxmlformats.org/presentationml/2006/main" type="secHead" preserve="1">
   <p:cSld name="Section Header">
+    <p:bg>
+      <p:bgPr>
+        <a:blipFill dpi="0" rotWithShape="1">
+          <a:blip r:embed="rId2">
+            <a:lum/>
+          </a:blip>
+          <a:srcRect/>
+          <a:stretch>
+            <a:fillRect/>
+          </a:stretch>
+        </a:blipFill>
+        <a:effectLst/>
+      </p:bgPr>
+    </p:bg>
     <p:spTree>
       <p:nvGrpSpPr>
         <p:cNvPr id="1" name=""/>
@@ -1150,7 +1377,7 @@
           <a:p>
             <a:fld id="{84B6F61C-9FA5-4C35-A1D3-00EE2C15A6C0}" type="datetimeFigureOut">
               <a:rPr lang="en-IN" smtClean="0"/>
-              <a:t>Thu : 14-07-2022</a:t>
+              <a:t>16-12-2022</a:t>
             </a:fld>
             <a:endParaRPr lang="en-IN"/>
           </a:p>
@@ -1226,6 +1453,20 @@
 <file path=ppt/slideLayouts/slideLayout4.xml><?xml version="1.0" encoding="utf-8"?>
 <p:sldLayout xmlns:a="http://schemas.openxmlformats.org/drawingml/2006/main" xmlns:r="http://schemas.openxmlformats.org/officeDocument/2006/relationships" xmlns:p="http://schemas.openxmlformats.org/presentationml/2006/main" type="twoObj" preserve="1">
   <p:cSld name="Two Content">
+    <p:bg>
+      <p:bgPr>
+        <a:blipFill dpi="0" rotWithShape="1">
+          <a:blip r:embed="rId2">
+            <a:lum/>
+          </a:blip>
+          <a:srcRect/>
+          <a:stretch>
+            <a:fillRect/>
+          </a:stretch>
+        </a:blipFill>
+        <a:effectLst/>
+      </p:bgPr>
+    </p:bg>
     <p:spTree>
       <p:nvGrpSpPr>
         <p:cNvPr id="1" name=""/>
@@ -1418,7 +1659,7 @@
           <a:p>
             <a:fld id="{84B6F61C-9FA5-4C35-A1D3-00EE2C15A6C0}" type="datetimeFigureOut">
               <a:rPr lang="en-IN" smtClean="0"/>
-              <a:t>Thu : 14-07-2022</a:t>
+              <a:t>16-12-2022</a:t>
             </a:fld>
             <a:endParaRPr lang="en-IN"/>
           </a:p>
@@ -1494,6 +1735,20 @@
 <file path=ppt/slideLayouts/slideLayout5.xml><?xml version="1.0" encoding="utf-8"?>
 <p:sldLayout xmlns:a="http://schemas.openxmlformats.org/drawingml/2006/main" xmlns:r="http://schemas.openxmlformats.org/officeDocument/2006/relationships" xmlns:p="http://schemas.openxmlformats.org/presentationml/2006/main" type="twoTxTwoObj" preserve="1">
   <p:cSld name="Comparison">
+    <p:bg>
+      <p:bgPr>
+        <a:blipFill dpi="0" rotWithShape="1">
+          <a:blip r:embed="rId2">
+            <a:lum/>
+          </a:blip>
+          <a:srcRect/>
+          <a:stretch>
+            <a:fillRect/>
+          </a:stretch>
+        </a:blipFill>
+        <a:effectLst/>
+      </p:bgPr>
+    </p:bg>
     <p:spTree>
       <p:nvGrpSpPr>
         <p:cNvPr id="1" name=""/>
@@ -1833,7 +2088,7 @@
           <a:p>
             <a:fld id="{84B6F61C-9FA5-4C35-A1D3-00EE2C15A6C0}" type="datetimeFigureOut">
               <a:rPr lang="en-IN" smtClean="0"/>
-              <a:t>Thu : 14-07-2022</a:t>
+              <a:t>16-12-2022</a:t>
             </a:fld>
             <a:endParaRPr lang="en-IN" dirty="0"/>
           </a:p>
@@ -1909,6 +2164,20 @@
 <file path=ppt/slideLayouts/slideLayout6.xml><?xml version="1.0" encoding="utf-8"?>
 <p:sldLayout xmlns:a="http://schemas.openxmlformats.org/drawingml/2006/main" xmlns:r="http://schemas.openxmlformats.org/officeDocument/2006/relationships" xmlns:p="http://schemas.openxmlformats.org/presentationml/2006/main" type="titleOnly" preserve="1">
   <p:cSld name="Title Only">
+    <p:bg>
+      <p:bgPr>
+        <a:blipFill dpi="0" rotWithShape="1">
+          <a:blip r:embed="rId2">
+            <a:lum/>
+          </a:blip>
+          <a:srcRect/>
+          <a:stretch>
+            <a:fillRect/>
+          </a:stretch>
+        </a:blipFill>
+        <a:effectLst/>
+      </p:bgPr>
+    </p:bg>
     <p:spTree>
       <p:nvGrpSpPr>
         <p:cNvPr id="1" name=""/>
@@ -1983,7 +2252,7 @@
           <a:p>
             <a:fld id="{84B6F61C-9FA5-4C35-A1D3-00EE2C15A6C0}" type="datetimeFigureOut">
               <a:rPr lang="en-IN" smtClean="0"/>
-              <a:t>Thu : 14-07-2022</a:t>
+              <a:t>16-12-2022</a:t>
             </a:fld>
             <a:endParaRPr lang="en-IN"/>
           </a:p>
@@ -2059,6 +2328,20 @@
 <file path=ppt/slideLayouts/slideLayout7.xml><?xml version="1.0" encoding="utf-8"?>
 <p:sldLayout xmlns:a="http://schemas.openxmlformats.org/drawingml/2006/main" xmlns:r="http://schemas.openxmlformats.org/officeDocument/2006/relationships" xmlns:p="http://schemas.openxmlformats.org/presentationml/2006/main" type="blank" preserve="1">
   <p:cSld name="Blank">
+    <p:bg>
+      <p:bgPr>
+        <a:blipFill dpi="0" rotWithShape="1">
+          <a:blip r:embed="rId2">
+            <a:lum/>
+          </a:blip>
+          <a:srcRect/>
+          <a:stretch>
+            <a:fillRect/>
+          </a:stretch>
+        </a:blipFill>
+        <a:effectLst/>
+      </p:bgPr>
+    </p:bg>
     <p:spTree>
       <p:nvGrpSpPr>
         <p:cNvPr id="1" name=""/>
@@ -2096,7 +2379,7 @@
           <a:p>
             <a:fld id="{84B6F61C-9FA5-4C35-A1D3-00EE2C15A6C0}" type="datetimeFigureOut">
               <a:rPr lang="en-IN" smtClean="0"/>
-              <a:t>Thu : 14-07-2022</a:t>
+              <a:t>16-12-2022</a:t>
             </a:fld>
             <a:endParaRPr lang="en-IN"/>
           </a:p>
@@ -2172,6 +2455,20 @@
 <file path=ppt/slideLayouts/slideLayout8.xml><?xml version="1.0" encoding="utf-8"?>
 <p:sldLayout xmlns:a="http://schemas.openxmlformats.org/drawingml/2006/main" xmlns:r="http://schemas.openxmlformats.org/officeDocument/2006/relationships" xmlns:p="http://schemas.openxmlformats.org/presentationml/2006/main" type="objTx" preserve="1">
   <p:cSld name="Content with Caption">
+    <p:bg>
+      <p:bgPr>
+        <a:blipFill dpi="0" rotWithShape="1">
+          <a:blip r:embed="rId2">
+            <a:lum/>
+          </a:blip>
+          <a:srcRect/>
+          <a:stretch>
+            <a:fillRect/>
+          </a:stretch>
+        </a:blipFill>
+        <a:effectLst/>
+      </p:bgPr>
+    </p:bg>
     <p:spTree>
       <p:nvGrpSpPr>
         <p:cNvPr id="1" name=""/>
@@ -2409,7 +2706,7 @@
           <a:p>
             <a:fld id="{84B6F61C-9FA5-4C35-A1D3-00EE2C15A6C0}" type="datetimeFigureOut">
               <a:rPr lang="en-IN" smtClean="0"/>
-              <a:t>Thu : 14-07-2022</a:t>
+              <a:t>16-12-2022</a:t>
             </a:fld>
             <a:endParaRPr lang="en-IN"/>
           </a:p>
@@ -2485,6 +2782,20 @@
 <file path=ppt/slideLayouts/slideLayout9.xml><?xml version="1.0" encoding="utf-8"?>
 <p:sldLayout xmlns:a="http://schemas.openxmlformats.org/drawingml/2006/main" xmlns:r="http://schemas.openxmlformats.org/officeDocument/2006/relationships" xmlns:p="http://schemas.openxmlformats.org/presentationml/2006/main" type="picTx" preserve="1">
   <p:cSld name="Picture with Caption">
+    <p:bg>
+      <p:bgPr>
+        <a:blipFill dpi="0" rotWithShape="1">
+          <a:blip r:embed="rId2">
+            <a:lum/>
+          </a:blip>
+          <a:srcRect/>
+          <a:stretch>
+            <a:fillRect/>
+          </a:stretch>
+        </a:blipFill>
+        <a:effectLst/>
+      </p:bgPr>
+    </p:bg>
     <p:spTree>
       <p:nvGrpSpPr>
         <p:cNvPr id="1" name=""/>
@@ -2698,7 +3009,7 @@
           <a:p>
             <a:fld id="{84B6F61C-9FA5-4C35-A1D3-00EE2C15A6C0}" type="datetimeFigureOut">
               <a:rPr lang="en-IN" smtClean="0"/>
-              <a:t>Thu : 14-07-2022</a:t>
+              <a:t>16-12-2022</a:t>
             </a:fld>
             <a:endParaRPr lang="en-IN"/>
           </a:p>
@@ -2950,7 +3261,7 @@
           <a:p>
             <a:fld id="{84B6F61C-9FA5-4C35-A1D3-00EE2C15A6C0}" type="datetimeFigureOut">
               <a:rPr lang="en-IN" smtClean="0"/>
-              <a:t>Thu : 14-07-2022</a:t>
+              <a:t>16-12-2022</a:t>
             </a:fld>
             <a:endParaRPr lang="en-IN"/>
           </a:p>
@@ -3436,7 +3747,7 @@
         <p:spPr>
           <a:xfrm>
             <a:off x="8017939" y="2455334"/>
-            <a:ext cx="2658535" cy="523220"/>
+            <a:ext cx="2658535" cy="707886"/>
           </a:xfrm>
           <a:prstGeom prst="rect">
             <a:avLst/>
@@ -3451,7 +3762,7 @@
           <a:p>
             <a:pPr algn="ctr"/>
             <a:r>
-              <a:rPr lang="en-US" sz="1400" dirty="0">
+              <a:rPr lang="en-US" sz="1400" b="1" dirty="0">
                 <a:solidFill>
                   <a:schemeClr val="bg2">
                     <a:lumMod val="20000"/>
@@ -3466,8 +3777,21 @@
           </a:p>
           <a:p>
             <a:pPr algn="ctr"/>
-            <a:r>
-              <a:rPr lang="en-US" sz="1400" dirty="0">
+            <a:endParaRPr lang="en-US" sz="1400" b="1" dirty="0">
+              <a:solidFill>
+                <a:schemeClr val="bg2">
+                  <a:lumMod val="20000"/>
+                  <a:lumOff val="80000"/>
+                </a:schemeClr>
+              </a:solidFill>
+              <a:latin typeface="Fira Code" panose="020B0809050000020004" pitchFamily="49" charset="0"/>
+              <a:ea typeface="Fira Code" panose="020B0809050000020004" pitchFamily="49" charset="0"/>
+            </a:endParaRPr>
+          </a:p>
+          <a:p>
+            <a:pPr algn="ctr"/>
+            <a:r>
+              <a:rPr lang="en-US" sz="1200" dirty="0">
                 <a:solidFill>
                   <a:schemeClr val="bg2">
                     <a:lumMod val="20000"/>
@@ -3479,7 +3803,7 @@
               </a:rPr>
               <a:t>Lead Engine Programmer</a:t>
             </a:r>
-            <a:endParaRPr lang="en-IN" sz="1400" dirty="0">
+            <a:endParaRPr lang="en-IN" sz="1200" dirty="0">
               <a:solidFill>
                 <a:schemeClr val="bg2">
                   <a:lumMod val="20000"/>
@@ -3532,6 +3856,430 @@
     <p:extLst>
       <p:ext uri="{BB962C8B-B14F-4D97-AF65-F5344CB8AC3E}">
         <p14:creationId xmlns:p14="http://schemas.microsoft.com/office/powerpoint/2010/main" val="1331003455"/>
+      </p:ext>
+    </p:extLst>
+  </p:cSld>
+  <p:clrMapOvr>
+    <a:masterClrMapping/>
+  </p:clrMapOvr>
+</p:sld>
+</file>
+
+<file path=ppt/slides/slide2.xml><?xml version="1.0" encoding="utf-8"?>
+<p:sld xmlns:a="http://schemas.openxmlformats.org/drawingml/2006/main" xmlns:r="http://schemas.openxmlformats.org/officeDocument/2006/relationships" xmlns:p="http://schemas.openxmlformats.org/presentationml/2006/main">
+  <p:cSld>
+    <p:spTree>
+      <p:nvGrpSpPr>
+        <p:cNvPr id="1" name=""/>
+        <p:cNvGrpSpPr/>
+        <p:nvPr/>
+      </p:nvGrpSpPr>
+      <p:grpSpPr>
+        <a:xfrm>
+          <a:off x="0" y="0"/>
+          <a:ext cx="0" cy="0"/>
+          <a:chOff x="0" y="0"/>
+          <a:chExt cx="0" cy="0"/>
+        </a:xfrm>
+      </p:grpSpPr>
+      <p:sp>
+        <p:nvSpPr>
+          <p:cNvPr id="2" name="Title 1">
+            <a:extLst>
+              <a:ext uri="{FF2B5EF4-FFF2-40B4-BE49-F238E27FC236}">
+                <a16:creationId xmlns:a16="http://schemas.microsoft.com/office/drawing/2014/main" id="{E88BE6E6-7362-2D97-0941-1E70A5FAEEAF}"/>
+              </a:ext>
+            </a:extLst>
+          </p:cNvPr>
+          <p:cNvSpPr>
+            <a:spLocks noGrp="1"/>
+          </p:cNvSpPr>
+          <p:nvPr>
+            <p:ph type="title"/>
+          </p:nvPr>
+        </p:nvSpPr>
+        <p:spPr/>
+        <p:txBody>
+          <a:bodyPr/>
+          <a:lstStyle/>
+          <a:p>
+            <a:r>
+              <a:rPr lang="en-US" dirty="0">
+                <a:solidFill>
+                  <a:schemeClr val="bg1">
+                    <a:lumMod val="95000"/>
+                  </a:schemeClr>
+                </a:solidFill>
+              </a:rPr>
+              <a:t>Intro to Razix</a:t>
+            </a:r>
+            <a:endParaRPr lang="en-IN" dirty="0">
+              <a:solidFill>
+                <a:schemeClr val="bg1">
+                  <a:lumMod val="95000"/>
+                </a:schemeClr>
+              </a:solidFill>
+            </a:endParaRPr>
+          </a:p>
+        </p:txBody>
+      </p:sp>
+      <p:sp>
+        <p:nvSpPr>
+          <p:cNvPr id="3" name="Content Placeholder 2">
+            <a:extLst>
+              <a:ext uri="{FF2B5EF4-FFF2-40B4-BE49-F238E27FC236}">
+                <a16:creationId xmlns:a16="http://schemas.microsoft.com/office/drawing/2014/main" id="{7F51FC1C-4432-5092-1258-30ABCADD8ADF}"/>
+              </a:ext>
+            </a:extLst>
+          </p:cNvPr>
+          <p:cNvSpPr>
+            <a:spLocks noGrp="1"/>
+          </p:cNvSpPr>
+          <p:nvPr>
+            <p:ph idx="1"/>
+          </p:nvPr>
+        </p:nvSpPr>
+        <p:spPr>
+          <a:xfrm>
+            <a:off x="474306" y="1405747"/>
+            <a:ext cx="10515600" cy="4351338"/>
+          </a:xfrm>
+        </p:spPr>
+        <p:txBody>
+          <a:bodyPr>
+            <a:normAutofit/>
+          </a:bodyPr>
+          <a:lstStyle/>
+          <a:p>
+            <a:r>
+              <a:rPr lang="en-US" sz="1600" dirty="0"/>
+              <a:t>Razix is the Next Gen open-source engine for testing and researching AAA practices</a:t>
+            </a:r>
+          </a:p>
+          <a:p>
+            <a:r>
+              <a:rPr lang="en-US" sz="1600" dirty="0"/>
+              <a:t>Features include Frame Graph, Graphics API agnostic API for rendering</a:t>
+            </a:r>
+          </a:p>
+          <a:p>
+            <a:r>
+              <a:rPr lang="en-US" sz="1600" dirty="0"/>
+              <a:t>Mesh shaders and ReSTIR based DI+GI</a:t>
+            </a:r>
+          </a:p>
+          <a:p>
+            <a:r>
+              <a:rPr lang="en-US" sz="1600" dirty="0"/>
+              <a:t>Visibility buffer based bindless shading model</a:t>
+            </a:r>
+          </a:p>
+          <a:p>
+            <a:endParaRPr lang="en-IN" sz="1600" dirty="0"/>
+          </a:p>
+        </p:txBody>
+      </p:sp>
+    </p:spTree>
+    <p:extLst>
+      <p:ext uri="{BB962C8B-B14F-4D97-AF65-F5344CB8AC3E}">
+        <p14:creationId xmlns:p14="http://schemas.microsoft.com/office/powerpoint/2010/main" val="3839432192"/>
+      </p:ext>
+    </p:extLst>
+  </p:cSld>
+  <p:clrMapOvr>
+    <a:masterClrMapping/>
+  </p:clrMapOvr>
+</p:sld>
+</file>
+
+<file path=ppt/slides/slide3.xml><?xml version="1.0" encoding="utf-8"?>
+<p:sld xmlns:a="http://schemas.openxmlformats.org/drawingml/2006/main" xmlns:r="http://schemas.openxmlformats.org/officeDocument/2006/relationships" xmlns:p="http://schemas.openxmlformats.org/presentationml/2006/main">
+  <p:cSld>
+    <p:spTree>
+      <p:nvGrpSpPr>
+        <p:cNvPr id="1" name=""/>
+        <p:cNvGrpSpPr/>
+        <p:nvPr/>
+      </p:nvGrpSpPr>
+      <p:grpSpPr>
+        <a:xfrm>
+          <a:off x="0" y="0"/>
+          <a:ext cx="0" cy="0"/>
+          <a:chOff x="0" y="0"/>
+          <a:chExt cx="0" cy="0"/>
+        </a:xfrm>
+      </p:grpSpPr>
+      <p:sp>
+        <p:nvSpPr>
+          <p:cNvPr id="2" name="Title 1">
+            <a:extLst>
+              <a:ext uri="{FF2B5EF4-FFF2-40B4-BE49-F238E27FC236}">
+                <a16:creationId xmlns:a16="http://schemas.microsoft.com/office/drawing/2014/main" id="{55123FF9-197F-B892-F0C2-50A65C1820E4}"/>
+              </a:ext>
+            </a:extLst>
+          </p:cNvPr>
+          <p:cNvSpPr>
+            <a:spLocks noGrp="1"/>
+          </p:cNvSpPr>
+          <p:nvPr>
+            <p:ph type="title"/>
+          </p:nvPr>
+        </p:nvSpPr>
+        <p:spPr/>
+        <p:txBody>
+          <a:bodyPr>
+            <a:normAutofit/>
+          </a:bodyPr>
+          <a:lstStyle/>
+          <a:p>
+            <a:r>
+              <a:rPr lang="en-US" sz="2600" dirty="0"/>
+              <a:t>FrameGraph in Razix</a:t>
+            </a:r>
+            <a:endParaRPr lang="en-IN" sz="2600" dirty="0"/>
+          </a:p>
+        </p:txBody>
+      </p:sp>
+      <p:sp>
+        <p:nvSpPr>
+          <p:cNvPr id="3" name="Content Placeholder 2">
+            <a:extLst>
+              <a:ext uri="{FF2B5EF4-FFF2-40B4-BE49-F238E27FC236}">
+                <a16:creationId xmlns:a16="http://schemas.microsoft.com/office/drawing/2014/main" id="{9B076F58-2063-C27C-92EA-F0D2D3016F14}"/>
+              </a:ext>
+            </a:extLst>
+          </p:cNvPr>
+          <p:cNvSpPr>
+            <a:spLocks noGrp="1"/>
+          </p:cNvSpPr>
+          <p:nvPr>
+            <p:ph idx="1"/>
+          </p:nvPr>
+        </p:nvSpPr>
+        <p:spPr>
+          <a:xfrm>
+            <a:off x="474305" y="1212980"/>
+            <a:ext cx="11151637" cy="4963983"/>
+          </a:xfrm>
+        </p:spPr>
+        <p:txBody>
+          <a:bodyPr/>
+          <a:lstStyle/>
+          <a:p>
+            <a:r>
+              <a:rPr lang="en-US" dirty="0"/>
+              <a:t>Inspired from EA’s FrameGraph design</a:t>
+            </a:r>
+          </a:p>
+          <a:p>
+            <a:pPr lvl="1"/>
+            <a:r>
+              <a:rPr lang="en-IN" sz="1000" dirty="0">
+                <a:solidFill>
+                  <a:schemeClr val="accent5">
+                    <a:lumMod val="75000"/>
+                  </a:schemeClr>
+                </a:solidFill>
+                <a:hlinkClick r:id="rId2"/>
+              </a:rPr>
+              <a:t>https://www.gdcvault.com/play/1024612/FrameGraph-Extensible-Rendering-Architecture-in</a:t>
+            </a:r>
+            <a:endParaRPr lang="en-IN" sz="1000" dirty="0">
+              <a:solidFill>
+                <a:schemeClr val="accent5">
+                  <a:lumMod val="75000"/>
+                </a:schemeClr>
+              </a:solidFill>
+            </a:endParaRPr>
+          </a:p>
+          <a:p>
+            <a:r>
+              <a:rPr lang="en-IN" dirty="0">
+                <a:solidFill>
+                  <a:schemeClr val="bg1">
+                    <a:lumMod val="95000"/>
+                  </a:schemeClr>
+                </a:solidFill>
+              </a:rPr>
+              <a:t>Use a WorldRenderer to build the passes in a single file</a:t>
+            </a:r>
+          </a:p>
+          <a:p>
+            <a:pPr lvl="1"/>
+            <a:r>
+              <a:rPr lang="en-IN" sz="1200" dirty="0">
+                <a:solidFill>
+                  <a:schemeClr val="bg1">
+                    <a:lumMod val="95000"/>
+                  </a:schemeClr>
+                </a:solidFill>
+              </a:rPr>
+              <a:t>Easy visualization using Graphviz tools</a:t>
+            </a:r>
+          </a:p>
+          <a:p>
+            <a:r>
+              <a:rPr lang="en-IN" dirty="0">
+                <a:solidFill>
+                  <a:schemeClr val="bg1">
+                    <a:lumMod val="95000"/>
+                  </a:schemeClr>
+                </a:solidFill>
+              </a:rPr>
+              <a:t>Passes are built using C++ lambdas instead of classes (more in coming slides)</a:t>
+            </a:r>
+          </a:p>
+          <a:p>
+            <a:r>
+              <a:rPr lang="en-IN" dirty="0">
+                <a:solidFill>
+                  <a:schemeClr val="bg1">
+                    <a:lumMod val="95000"/>
+                  </a:schemeClr>
+                </a:solidFill>
+              </a:rPr>
+              <a:t>Culling of unreferenced passes/resources</a:t>
+            </a:r>
+          </a:p>
+          <a:p>
+            <a:r>
+              <a:rPr lang="en-IN" dirty="0">
+                <a:solidFill>
+                  <a:schemeClr val="bg1">
+                    <a:lumMod val="95000"/>
+                  </a:schemeClr>
+                </a:solidFill>
+              </a:rPr>
+              <a:t>External resources can be imported via Import and Materials</a:t>
+            </a:r>
+          </a:p>
+          <a:p>
+            <a:r>
+              <a:rPr lang="en-IN" dirty="0">
+                <a:solidFill>
+                  <a:schemeClr val="bg1">
+                    <a:lumMod val="95000"/>
+                  </a:schemeClr>
+                </a:solidFill>
+              </a:rPr>
+              <a:t>Doesn’t interfere with Engine Rendering API</a:t>
+            </a:r>
+          </a:p>
+          <a:p>
+            <a:pPr lvl="1"/>
+            <a:r>
+              <a:rPr lang="en-IN" sz="1200" dirty="0">
+                <a:solidFill>
+                  <a:schemeClr val="bg1">
+                    <a:lumMod val="95000"/>
+                  </a:schemeClr>
+                </a:solidFill>
+              </a:rPr>
+              <a:t>Descriptor binding vs command buffer recording is still the same</a:t>
+            </a:r>
+          </a:p>
+          <a:p>
+            <a:r>
+              <a:rPr lang="en-IN" dirty="0">
+                <a:solidFill>
+                  <a:schemeClr val="bg1">
+                    <a:lumMod val="95000"/>
+                  </a:schemeClr>
+                </a:solidFill>
+              </a:rPr>
+              <a:t>Single threaded</a:t>
+            </a:r>
+          </a:p>
+        </p:txBody>
+      </p:sp>
+    </p:spTree>
+    <p:extLst>
+      <p:ext uri="{BB962C8B-B14F-4D97-AF65-F5344CB8AC3E}">
+        <p14:creationId xmlns:p14="http://schemas.microsoft.com/office/powerpoint/2010/main" val="980261169"/>
+      </p:ext>
+    </p:extLst>
+  </p:cSld>
+  <p:clrMapOvr>
+    <a:masterClrMapping/>
+  </p:clrMapOvr>
+</p:sld>
+</file>
+
+<file path=ppt/slides/slide4.xml><?xml version="1.0" encoding="utf-8"?>
+<p:sld xmlns:a="http://schemas.openxmlformats.org/drawingml/2006/main" xmlns:r="http://schemas.openxmlformats.org/officeDocument/2006/relationships" xmlns:p="http://schemas.openxmlformats.org/presentationml/2006/main">
+  <p:cSld>
+    <p:spTree>
+      <p:nvGrpSpPr>
+        <p:cNvPr id="1" name=""/>
+        <p:cNvGrpSpPr/>
+        <p:nvPr/>
+      </p:nvGrpSpPr>
+      <p:grpSpPr>
+        <a:xfrm>
+          <a:off x="0" y="0"/>
+          <a:ext cx="0" cy="0"/>
+          <a:chOff x="0" y="0"/>
+          <a:chExt cx="0" cy="0"/>
+        </a:xfrm>
+      </p:grpSpPr>
+      <p:sp>
+        <p:nvSpPr>
+          <p:cNvPr id="2" name="Title 1">
+            <a:extLst>
+              <a:ext uri="{FF2B5EF4-FFF2-40B4-BE49-F238E27FC236}">
+                <a16:creationId xmlns:a16="http://schemas.microsoft.com/office/drawing/2014/main" id="{FF42CCD6-CD80-4F9B-B611-B82B946F5998}"/>
+              </a:ext>
+            </a:extLst>
+          </p:cNvPr>
+          <p:cNvSpPr>
+            <a:spLocks noGrp="1"/>
+          </p:cNvSpPr>
+          <p:nvPr>
+            <p:ph type="title"/>
+          </p:nvPr>
+        </p:nvSpPr>
+        <p:spPr/>
+        <p:txBody>
+          <a:bodyPr/>
+          <a:lstStyle/>
+          <a:p>
+            <a:r>
+              <a:rPr lang="en-US" sz="2400" dirty="0"/>
+              <a:t>FrameGraph - Design</a:t>
+            </a:r>
+            <a:endParaRPr lang="en-IN" dirty="0"/>
+          </a:p>
+        </p:txBody>
+      </p:sp>
+      <p:sp>
+        <p:nvSpPr>
+          <p:cNvPr id="3" name="Content Placeholder 2">
+            <a:extLst>
+              <a:ext uri="{FF2B5EF4-FFF2-40B4-BE49-F238E27FC236}">
+                <a16:creationId xmlns:a16="http://schemas.microsoft.com/office/drawing/2014/main" id="{064FE946-355F-E7BD-2C5B-0121721FA401}"/>
+              </a:ext>
+            </a:extLst>
+          </p:cNvPr>
+          <p:cNvSpPr>
+            <a:spLocks noGrp="1"/>
+          </p:cNvSpPr>
+          <p:nvPr>
+            <p:ph idx="1"/>
+          </p:nvPr>
+        </p:nvSpPr>
+        <p:spPr/>
+        <p:txBody>
+          <a:bodyPr/>
+          <a:lstStyle/>
+          <a:p>
+            <a:endParaRPr lang="en-IN" dirty="0"/>
+          </a:p>
+        </p:txBody>
+      </p:sp>
+    </p:spTree>
+    <p:extLst>
+      <p:ext uri="{BB962C8B-B14F-4D97-AF65-F5344CB8AC3E}">
+        <p14:creationId xmlns:p14="http://schemas.microsoft.com/office/powerpoint/2010/main" val="4006450084"/>
       </p:ext>
     </p:extLst>
   </p:cSld>

</xml_diff>

<commit_message>
fixed framegraph compilation errors;
</commit_message>
<xml_diff>
--- a/Docs/Features overview.pptx
+++ b/Docs/Features overview.pptx
@@ -9,6 +9,7 @@
     <p:sldId id="258" r:id="rId3"/>
     <p:sldId id="259" r:id="rId4"/>
     <p:sldId id="260" r:id="rId5"/>
+    <p:sldId id="261" r:id="rId6"/>
   </p:sldIdLst>
   <p:sldSz cx="12192000" cy="6858000"/>
   <p:notesSz cx="6858000" cy="9144000"/>
@@ -120,6 +121,7 @@
           <p14:sldIdLst>
             <p14:sldId id="259"/>
             <p14:sldId id="260"/>
+            <p14:sldId id="261"/>
           </p14:sldIdLst>
         </p14:section>
       </p14:sectionLst>
@@ -294,7 +296,7 @@
           <a:p>
             <a:fld id="{84B6F61C-9FA5-4C35-A1D3-00EE2C15A6C0}" type="datetimeFigureOut">
               <a:rPr lang="en-IN" smtClean="0"/>
-              <a:t>16-12-2022</a:t>
+              <a:t>19-12-2022</a:t>
             </a:fld>
             <a:endParaRPr lang="en-IN"/>
           </a:p>
@@ -518,7 +520,7 @@
           <a:p>
             <a:fld id="{84B6F61C-9FA5-4C35-A1D3-00EE2C15A6C0}" type="datetimeFigureOut">
               <a:rPr lang="en-IN" smtClean="0"/>
-              <a:t>16-12-2022</a:t>
+              <a:t>19-12-2022</a:t>
             </a:fld>
             <a:endParaRPr lang="en-IN"/>
           </a:p>
@@ -742,7 +744,7 @@
           <a:p>
             <a:fld id="{84B6F61C-9FA5-4C35-A1D3-00EE2C15A6C0}" type="datetimeFigureOut">
               <a:rPr lang="en-IN" smtClean="0"/>
-              <a:t>16-12-2022</a:t>
+              <a:t>19-12-2022</a:t>
             </a:fld>
             <a:endParaRPr lang="en-IN"/>
           </a:p>
@@ -996,7 +998,7 @@
           <a:p>
             <a:fld id="{84B6F61C-9FA5-4C35-A1D3-00EE2C15A6C0}" type="datetimeFigureOut">
               <a:rPr lang="en-IN" smtClean="0"/>
-              <a:t>16-12-2022</a:t>
+              <a:t>19-12-2022</a:t>
             </a:fld>
             <a:endParaRPr lang="en-IN" dirty="0"/>
           </a:p>
@@ -1377,7 +1379,7 @@
           <a:p>
             <a:fld id="{84B6F61C-9FA5-4C35-A1D3-00EE2C15A6C0}" type="datetimeFigureOut">
               <a:rPr lang="en-IN" smtClean="0"/>
-              <a:t>16-12-2022</a:t>
+              <a:t>19-12-2022</a:t>
             </a:fld>
             <a:endParaRPr lang="en-IN"/>
           </a:p>
@@ -1659,7 +1661,7 @@
           <a:p>
             <a:fld id="{84B6F61C-9FA5-4C35-A1D3-00EE2C15A6C0}" type="datetimeFigureOut">
               <a:rPr lang="en-IN" smtClean="0"/>
-              <a:t>16-12-2022</a:t>
+              <a:t>19-12-2022</a:t>
             </a:fld>
             <a:endParaRPr lang="en-IN"/>
           </a:p>
@@ -2088,7 +2090,7 @@
           <a:p>
             <a:fld id="{84B6F61C-9FA5-4C35-A1D3-00EE2C15A6C0}" type="datetimeFigureOut">
               <a:rPr lang="en-IN" smtClean="0"/>
-              <a:t>16-12-2022</a:t>
+              <a:t>19-12-2022</a:t>
             </a:fld>
             <a:endParaRPr lang="en-IN" dirty="0"/>
           </a:p>
@@ -2252,7 +2254,7 @@
           <a:p>
             <a:fld id="{84B6F61C-9FA5-4C35-A1D3-00EE2C15A6C0}" type="datetimeFigureOut">
               <a:rPr lang="en-IN" smtClean="0"/>
-              <a:t>16-12-2022</a:t>
+              <a:t>19-12-2022</a:t>
             </a:fld>
             <a:endParaRPr lang="en-IN"/>
           </a:p>
@@ -2379,7 +2381,7 @@
           <a:p>
             <a:fld id="{84B6F61C-9FA5-4C35-A1D3-00EE2C15A6C0}" type="datetimeFigureOut">
               <a:rPr lang="en-IN" smtClean="0"/>
-              <a:t>16-12-2022</a:t>
+              <a:t>19-12-2022</a:t>
             </a:fld>
             <a:endParaRPr lang="en-IN"/>
           </a:p>
@@ -2706,7 +2708,7 @@
           <a:p>
             <a:fld id="{84B6F61C-9FA5-4C35-A1D3-00EE2C15A6C0}" type="datetimeFigureOut">
               <a:rPr lang="en-IN" smtClean="0"/>
-              <a:t>16-12-2022</a:t>
+              <a:t>19-12-2022</a:t>
             </a:fld>
             <a:endParaRPr lang="en-IN"/>
           </a:p>
@@ -3009,7 +3011,7 @@
           <a:p>
             <a:fld id="{84B6F61C-9FA5-4C35-A1D3-00EE2C15A6C0}" type="datetimeFigureOut">
               <a:rPr lang="en-IN" smtClean="0"/>
-              <a:t>16-12-2022</a:t>
+              <a:t>19-12-2022</a:t>
             </a:fld>
             <a:endParaRPr lang="en-IN"/>
           </a:p>
@@ -3261,7 +3263,7 @@
           <a:p>
             <a:fld id="{84B6F61C-9FA5-4C35-A1D3-00EE2C15A6C0}" type="datetimeFigureOut">
               <a:rPr lang="en-IN" smtClean="0"/>
-              <a:t>16-12-2022</a:t>
+              <a:t>19-12-2022</a:t>
             </a:fld>
             <a:endParaRPr lang="en-IN"/>
           </a:p>
@@ -3953,13 +3955,13 @@
           <a:p>
             <a:r>
               <a:rPr lang="en-US" sz="1600" dirty="0"/>
-              <a:t>Razix is the Next Gen open-source engine for testing and researching AAA practices</a:t>
+              <a:t>Razix is the Next Gen open-source engine for testing and researching AAA algorithms and designs</a:t>
             </a:r>
           </a:p>
           <a:p>
             <a:r>
               <a:rPr lang="en-US" sz="1600" dirty="0"/>
-              <a:t>Features include Frame Graph, Graphics API agnostic API for rendering</a:t>
+              <a:t>Features include Frame Graph, Graphics API agnostic Rendering API</a:t>
             </a:r>
           </a:p>
           <a:p>
@@ -4033,10 +4035,10 @@
           <a:lstStyle/>
           <a:p>
             <a:r>
-              <a:rPr lang="en-US" sz="2600" dirty="0"/>
+              <a:rPr lang="en-US" dirty="0"/>
               <a:t>FrameGraph in Razix</a:t>
             </a:r>
-            <a:endParaRPr lang="en-IN" sz="2600" dirty="0"/>
+            <a:endParaRPr lang="en-IN" dirty="0"/>
           </a:p>
         </p:txBody>
       </p:sp>
@@ -4101,7 +4103,25 @@
                   </a:schemeClr>
                 </a:solidFill>
               </a:rPr>
-              <a:t>Use a WorldRenderer to build the passes in a single file</a:t>
+              <a:t>Uses a </a:t>
+            </a:r>
+            <a:r>
+              <a:rPr lang="en-IN" dirty="0">
+                <a:solidFill>
+                  <a:schemeClr val="accent1"/>
+                </a:solidFill>
+              </a:rPr>
+              <a:t>WorldRenderer</a:t>
+            </a:r>
+            <a:r>
+              <a:rPr lang="en-IN" dirty="0">
+                <a:solidFill>
+                  <a:schemeClr val="bg1">
+                    <a:lumMod val="95000"/>
+                  </a:schemeClr>
+                </a:solidFill>
+              </a:rPr>
+              <a:t> to build the passes in a single file</a:t>
             </a:r>
           </a:p>
           <a:p>
@@ -4126,7 +4146,25 @@
                   </a:schemeClr>
                 </a:solidFill>
               </a:rPr>
-              <a:t>Passes are built using C++ lambdas instead of classes (more in coming slides)</a:t>
+              <a:t>Passes are built using </a:t>
+            </a:r>
+            <a:r>
+              <a:rPr lang="en-IN" dirty="0">
+                <a:solidFill>
+                  <a:schemeClr val="accent1"/>
+                </a:solidFill>
+              </a:rPr>
+              <a:t>C++ lambdas </a:t>
+            </a:r>
+            <a:r>
+              <a:rPr lang="en-IN" dirty="0">
+                <a:solidFill>
+                  <a:schemeClr val="bg1">
+                    <a:lumMod val="95000"/>
+                  </a:schemeClr>
+                </a:solidFill>
+              </a:rPr>
+              <a:t>instead of classes </a:t>
             </a:r>
           </a:p>
           <a:p>
@@ -4150,7 +4188,7 @@
                   </a:schemeClr>
                 </a:solidFill>
               </a:rPr>
-              <a:t>External resources can be imported via Import and Materials</a:t>
+              <a:t>External resources can be imported via Import</a:t>
             </a:r>
           </a:p>
           <a:p>
@@ -4175,7 +4213,7 @@
                   </a:schemeClr>
                 </a:solidFill>
               </a:rPr>
-              <a:t>Descriptor binding vs command buffer recording is still the same</a:t>
+              <a:t>Descriptor binding vs command buffer recording API is still the same</a:t>
             </a:r>
           </a:p>
           <a:p>
@@ -4187,7 +4225,7 @@
                   </a:schemeClr>
                 </a:solidFill>
               </a:rPr>
-              <a:t>Single threaded</a:t>
+              <a:t>Single threaded as of now</a:t>
             </a:r>
           </a:p>
         </p:txBody>
@@ -4272,6 +4310,10 @@
           <a:bodyPr/>
           <a:lstStyle/>
           <a:p>
+            <a:r>
+              <a:rPr lang="en-US" dirty="0"/>
+              <a:t>Coming...</a:t>
+            </a:r>
             <a:endParaRPr lang="en-IN" dirty="0"/>
           </a:p>
         </p:txBody>
@@ -4280,6 +4322,220 @@
     <p:extLst>
       <p:ext uri="{BB962C8B-B14F-4D97-AF65-F5344CB8AC3E}">
         <p14:creationId xmlns:p14="http://schemas.microsoft.com/office/powerpoint/2010/main" val="4006450084"/>
+      </p:ext>
+    </p:extLst>
+  </p:cSld>
+  <p:clrMapOvr>
+    <a:masterClrMapping/>
+  </p:clrMapOvr>
+</p:sld>
+</file>
+
+<file path=ppt/slides/slide5.xml><?xml version="1.0" encoding="utf-8"?>
+<p:sld xmlns:a="http://schemas.openxmlformats.org/drawingml/2006/main" xmlns:r="http://schemas.openxmlformats.org/officeDocument/2006/relationships" xmlns:p="http://schemas.openxmlformats.org/presentationml/2006/main">
+  <p:cSld>
+    <p:spTree>
+      <p:nvGrpSpPr>
+        <p:cNvPr id="1" name=""/>
+        <p:cNvGrpSpPr/>
+        <p:nvPr/>
+      </p:nvGrpSpPr>
+      <p:grpSpPr>
+        <a:xfrm>
+          <a:off x="0" y="0"/>
+          <a:ext cx="0" cy="0"/>
+          <a:chOff x="0" y="0"/>
+          <a:chExt cx="0" cy="0"/>
+        </a:xfrm>
+      </p:grpSpPr>
+      <p:sp>
+        <p:nvSpPr>
+          <p:cNvPr id="2" name="Title 1">
+            <a:extLst>
+              <a:ext uri="{FF2B5EF4-FFF2-40B4-BE49-F238E27FC236}">
+                <a16:creationId xmlns:a16="http://schemas.microsoft.com/office/drawing/2014/main" id="{CEB4959C-DCD4-2858-717A-B322064FF9DB}"/>
+              </a:ext>
+            </a:extLst>
+          </p:cNvPr>
+          <p:cNvSpPr>
+            <a:spLocks noGrp="1"/>
+          </p:cNvSpPr>
+          <p:nvPr>
+            <p:ph type="title"/>
+          </p:nvPr>
+        </p:nvSpPr>
+        <p:spPr/>
+        <p:txBody>
+          <a:bodyPr/>
+          <a:lstStyle/>
+          <a:p>
+            <a:r>
+              <a:rPr lang="en-US" dirty="0"/>
+              <a:t>FrameGraph – WorldRenderer</a:t>
+            </a:r>
+            <a:endParaRPr lang="en-IN" dirty="0"/>
+          </a:p>
+        </p:txBody>
+      </p:sp>
+      <p:sp>
+        <p:nvSpPr>
+          <p:cNvPr id="3" name="Content Placeholder 2">
+            <a:extLst>
+              <a:ext uri="{FF2B5EF4-FFF2-40B4-BE49-F238E27FC236}">
+                <a16:creationId xmlns:a16="http://schemas.microsoft.com/office/drawing/2014/main" id="{9EA5FBDB-3BE2-7866-BA93-4B62F3E2F815}"/>
+              </a:ext>
+            </a:extLst>
+          </p:cNvPr>
+          <p:cNvSpPr>
+            <a:spLocks noGrp="1"/>
+          </p:cNvSpPr>
+          <p:nvPr>
+            <p:ph idx="1"/>
+          </p:nvPr>
+        </p:nvSpPr>
+        <p:spPr/>
+        <p:txBody>
+          <a:bodyPr/>
+          <a:lstStyle/>
+          <a:p>
+            <a:r>
+              <a:rPr lang="en-US" dirty="0">
+                <a:solidFill>
+                  <a:schemeClr val="accent1"/>
+                </a:solidFill>
+              </a:rPr>
+              <a:t>RZWorldRenderer</a:t>
+            </a:r>
+            <a:r>
+              <a:rPr lang="en-US" dirty="0"/>
+              <a:t> is responsible for building the frame graph passes </a:t>
+            </a:r>
+          </a:p>
+          <a:p>
+            <a:pPr lvl="1"/>
+            <a:r>
+              <a:rPr lang="en-US" dirty="0">
+                <a:solidFill>
+                  <a:schemeClr val="accent2">
+                    <a:lumMod val="85000"/>
+                  </a:schemeClr>
+                </a:solidFill>
+              </a:rPr>
+              <a:t>Hooking up R/W resources </a:t>
+            </a:r>
+          </a:p>
+          <a:p>
+            <a:pPr lvl="1"/>
+            <a:r>
+              <a:rPr lang="en-US" dirty="0">
+                <a:solidFill>
+                  <a:schemeClr val="accent2">
+                    <a:lumMod val="85000"/>
+                  </a:schemeClr>
+                </a:solidFill>
+              </a:rPr>
+              <a:t>Execution &amp; Submission of commands to the GPU</a:t>
+            </a:r>
+          </a:p>
+          <a:p>
+            <a:pPr lvl="1"/>
+            <a:r>
+              <a:rPr lang="en-US" dirty="0">
+                <a:solidFill>
+                  <a:schemeClr val="accent2">
+                    <a:lumMod val="85000"/>
+                  </a:schemeClr>
+                </a:solidFill>
+              </a:rPr>
+              <a:t>Managing RTs and read/write operations from other passes</a:t>
+            </a:r>
+          </a:p>
+          <a:p>
+            <a:r>
+              <a:rPr lang="en-US" dirty="0"/>
+              <a:t>The </a:t>
+            </a:r>
+            <a:r>
+              <a:rPr lang="en-US" b="1" dirty="0"/>
+              <a:t>execute</a:t>
+            </a:r>
+            <a:r>
+              <a:rPr lang="en-US" dirty="0"/>
+              <a:t> function for a </a:t>
+            </a:r>
+            <a:r>
+              <a:rPr lang="en-US" dirty="0">
+                <a:solidFill>
+                  <a:schemeClr val="accent1"/>
+                </a:solidFill>
+              </a:rPr>
+              <a:t>FrameGraphPass</a:t>
+            </a:r>
+            <a:r>
+              <a:rPr lang="en-US" dirty="0"/>
+              <a:t> is responsible for rendering</a:t>
+            </a:r>
+          </a:p>
+          <a:p>
+            <a:r>
+              <a:rPr lang="en-US" dirty="0"/>
+              <a:t>The </a:t>
+            </a:r>
+            <a:r>
+              <a:rPr lang="en-US" b="1" dirty="0"/>
+              <a:t>setup </a:t>
+            </a:r>
+            <a:r>
+              <a:rPr lang="en-US" dirty="0"/>
+              <a:t>function is responsible for creating the resources uses in the </a:t>
+            </a:r>
+            <a:r>
+              <a:rPr lang="en-US" dirty="0">
+                <a:solidFill>
+                  <a:schemeClr val="accent1"/>
+                </a:solidFill>
+              </a:rPr>
+              <a:t>FrameGraphPass</a:t>
+            </a:r>
+          </a:p>
+          <a:p>
+            <a:r>
+              <a:rPr lang="en-US" dirty="0"/>
+              <a:t>Every pass has it’s own set of CommandBuffers</a:t>
+            </a:r>
+          </a:p>
+          <a:p>
+            <a:r>
+              <a:rPr lang="en-US" dirty="0"/>
+              <a:t>Every pass renders onto it’s own RenderTexture</a:t>
+            </a:r>
+          </a:p>
+          <a:p>
+            <a:pPr lvl="1"/>
+            <a:r>
+              <a:rPr lang="en-US" dirty="0">
+                <a:solidFill>
+                  <a:schemeClr val="tx2">
+                    <a:lumMod val="10000"/>
+                    <a:lumOff val="90000"/>
+                  </a:schemeClr>
+                </a:solidFill>
+              </a:rPr>
+              <a:t>Passed onto the next pass until the final composite pass</a:t>
+            </a:r>
+          </a:p>
+          <a:p>
+            <a:endParaRPr lang="en-US" dirty="0"/>
+          </a:p>
+          <a:p>
+            <a:endParaRPr lang="en-IN" dirty="0"/>
+          </a:p>
+        </p:txBody>
+      </p:sp>
+    </p:spTree>
+    <p:extLst>
+      <p:ext uri="{BB962C8B-B14F-4D97-AF65-F5344CB8AC3E}">
+        <p14:creationId xmlns:p14="http://schemas.microsoft.com/office/powerpoint/2010/main" val="340220132"/>
       </p:ext>
     </p:extLst>
   </p:cSld>

</xml_diff>

<commit_message>
kind of fixed rotating directional light vector;
</commit_message>
<xml_diff>
--- a/Docs/Features overview.pptx
+++ b/Docs/Features overview.pptx
@@ -10,6 +10,7 @@
     <p:sldId id="259" r:id="rId4"/>
     <p:sldId id="260" r:id="rId5"/>
     <p:sldId id="261" r:id="rId6"/>
+    <p:sldId id="262" r:id="rId7"/>
   </p:sldIdLst>
   <p:sldSz cx="12192000" cy="6858000"/>
   <p:notesSz cx="6858000" cy="9144000"/>
@@ -122,6 +123,7 @@
             <p14:sldId id="259"/>
             <p14:sldId id="260"/>
             <p14:sldId id="261"/>
+            <p14:sldId id="262"/>
           </p14:sldIdLst>
         </p14:section>
       </p14:sectionLst>
@@ -296,7 +298,7 @@
           <a:p>
             <a:fld id="{84B6F61C-9FA5-4C35-A1D3-00EE2C15A6C0}" type="datetimeFigureOut">
               <a:rPr lang="en-IN" smtClean="0"/>
-              <a:t>19-12-2022</a:t>
+              <a:t>15-02-2023</a:t>
             </a:fld>
             <a:endParaRPr lang="en-IN"/>
           </a:p>
@@ -520,7 +522,7 @@
           <a:p>
             <a:fld id="{84B6F61C-9FA5-4C35-A1D3-00EE2C15A6C0}" type="datetimeFigureOut">
               <a:rPr lang="en-IN" smtClean="0"/>
-              <a:t>19-12-2022</a:t>
+              <a:t>15-02-2023</a:t>
             </a:fld>
             <a:endParaRPr lang="en-IN"/>
           </a:p>
@@ -744,7 +746,7 @@
           <a:p>
             <a:fld id="{84B6F61C-9FA5-4C35-A1D3-00EE2C15A6C0}" type="datetimeFigureOut">
               <a:rPr lang="en-IN" smtClean="0"/>
-              <a:t>19-12-2022</a:t>
+              <a:t>15-02-2023</a:t>
             </a:fld>
             <a:endParaRPr lang="en-IN"/>
           </a:p>
@@ -998,7 +1000,7 @@
           <a:p>
             <a:fld id="{84B6F61C-9FA5-4C35-A1D3-00EE2C15A6C0}" type="datetimeFigureOut">
               <a:rPr lang="en-IN" smtClean="0"/>
-              <a:t>19-12-2022</a:t>
+              <a:t>15-02-2023</a:t>
             </a:fld>
             <a:endParaRPr lang="en-IN" dirty="0"/>
           </a:p>
@@ -1379,7 +1381,7 @@
           <a:p>
             <a:fld id="{84B6F61C-9FA5-4C35-A1D3-00EE2C15A6C0}" type="datetimeFigureOut">
               <a:rPr lang="en-IN" smtClean="0"/>
-              <a:t>19-12-2022</a:t>
+              <a:t>15-02-2023</a:t>
             </a:fld>
             <a:endParaRPr lang="en-IN"/>
           </a:p>
@@ -1661,7 +1663,7 @@
           <a:p>
             <a:fld id="{84B6F61C-9FA5-4C35-A1D3-00EE2C15A6C0}" type="datetimeFigureOut">
               <a:rPr lang="en-IN" smtClean="0"/>
-              <a:t>19-12-2022</a:t>
+              <a:t>15-02-2023</a:t>
             </a:fld>
             <a:endParaRPr lang="en-IN"/>
           </a:p>
@@ -2090,7 +2092,7 @@
           <a:p>
             <a:fld id="{84B6F61C-9FA5-4C35-A1D3-00EE2C15A6C0}" type="datetimeFigureOut">
               <a:rPr lang="en-IN" smtClean="0"/>
-              <a:t>19-12-2022</a:t>
+              <a:t>15-02-2023</a:t>
             </a:fld>
             <a:endParaRPr lang="en-IN" dirty="0"/>
           </a:p>
@@ -2254,7 +2256,7 @@
           <a:p>
             <a:fld id="{84B6F61C-9FA5-4C35-A1D3-00EE2C15A6C0}" type="datetimeFigureOut">
               <a:rPr lang="en-IN" smtClean="0"/>
-              <a:t>19-12-2022</a:t>
+              <a:t>15-02-2023</a:t>
             </a:fld>
             <a:endParaRPr lang="en-IN"/>
           </a:p>
@@ -2381,7 +2383,7 @@
           <a:p>
             <a:fld id="{84B6F61C-9FA5-4C35-A1D3-00EE2C15A6C0}" type="datetimeFigureOut">
               <a:rPr lang="en-IN" smtClean="0"/>
-              <a:t>19-12-2022</a:t>
+              <a:t>15-02-2023</a:t>
             </a:fld>
             <a:endParaRPr lang="en-IN"/>
           </a:p>
@@ -2708,7 +2710,7 @@
           <a:p>
             <a:fld id="{84B6F61C-9FA5-4C35-A1D3-00EE2C15A6C0}" type="datetimeFigureOut">
               <a:rPr lang="en-IN" smtClean="0"/>
-              <a:t>19-12-2022</a:t>
+              <a:t>15-02-2023</a:t>
             </a:fld>
             <a:endParaRPr lang="en-IN"/>
           </a:p>
@@ -3011,7 +3013,7 @@
           <a:p>
             <a:fld id="{84B6F61C-9FA5-4C35-A1D3-00EE2C15A6C0}" type="datetimeFigureOut">
               <a:rPr lang="en-IN" smtClean="0"/>
-              <a:t>19-12-2022</a:t>
+              <a:t>15-02-2023</a:t>
             </a:fld>
             <a:endParaRPr lang="en-IN"/>
           </a:p>
@@ -3263,7 +3265,7 @@
           <a:p>
             <a:fld id="{84B6F61C-9FA5-4C35-A1D3-00EE2C15A6C0}" type="datetimeFigureOut">
               <a:rPr lang="en-IN" smtClean="0"/>
-              <a:t>19-12-2022</a:t>
+              <a:t>15-02-2023</a:t>
             </a:fld>
             <a:endParaRPr lang="en-IN"/>
           </a:p>
@@ -3764,12 +3766,9 @@
           <a:p>
             <a:pPr algn="ctr"/>
             <a:r>
-              <a:rPr lang="en-US" sz="1400" b="1" dirty="0">
+              <a:rPr lang="en-US" sz="1400" dirty="0">
                 <a:solidFill>
-                  <a:schemeClr val="bg2">
-                    <a:lumMod val="20000"/>
-                    <a:lumOff val="80000"/>
-                  </a:schemeClr>
+                  <a:schemeClr val="accent1"/>
                 </a:solidFill>
                 <a:latin typeface="Fira Code" panose="020B0809050000020004" pitchFamily="49" charset="0"/>
                 <a:ea typeface="Fira Code" panose="020B0809050000020004" pitchFamily="49" charset="0"/>
@@ -3954,27 +3953,66 @@
           <a:lstStyle/>
           <a:p>
             <a:r>
-              <a:rPr lang="en-US" sz="1600" dirty="0"/>
+              <a:rPr lang="en-US" sz="1600" dirty="0">
+                <a:latin typeface="Calibri" panose="020F0502020204030204" pitchFamily="34" charset="0"/>
+                <a:ea typeface="Calibri" panose="020F0502020204030204" pitchFamily="34" charset="0"/>
+                <a:cs typeface="Calibri" panose="020F0502020204030204" pitchFamily="34" charset="0"/>
+              </a:rPr>
               <a:t>Razix is the Next Gen open-source engine for testing and researching AAA algorithms and designs</a:t>
             </a:r>
           </a:p>
           <a:p>
             <a:r>
-              <a:rPr lang="en-US" sz="1600" dirty="0"/>
-              <a:t>Features include Frame Graph, Graphics API agnostic Rendering API</a:t>
-            </a:r>
-          </a:p>
-          <a:p>
-            <a:r>
-              <a:rPr lang="en-US" sz="1600" dirty="0"/>
-              <a:t>Mesh shaders and ReSTIR based DI+GI</a:t>
-            </a:r>
-          </a:p>
-          <a:p>
-            <a:r>
-              <a:rPr lang="en-US" sz="1600" dirty="0"/>
-              <a:t>Visibility buffer based bindless shading model</a:t>
-            </a:r>
+              <a:rPr lang="en-US" sz="1600" dirty="0">
+                <a:latin typeface="Calibri" panose="020F0502020204030204" pitchFamily="34" charset="0"/>
+                <a:ea typeface="Calibri" panose="020F0502020204030204" pitchFamily="34" charset="0"/>
+                <a:cs typeface="Calibri" panose="020F0502020204030204" pitchFamily="34" charset="0"/>
+              </a:rPr>
+              <a:t>Features include Frame Graph, backend agnostic Rendering API (single RHI for Vulkan, D3D12, OpenGL, Metal etc.)</a:t>
+            </a:r>
+          </a:p>
+          <a:p>
+            <a:r>
+              <a:rPr lang="en-US" sz="1600" dirty="0">
+                <a:latin typeface="Calibri" panose="020F0502020204030204" pitchFamily="34" charset="0"/>
+                <a:ea typeface="Calibri" panose="020F0502020204030204" pitchFamily="34" charset="0"/>
+                <a:cs typeface="Calibri" panose="020F0502020204030204" pitchFamily="34" charset="0"/>
+              </a:rPr>
+              <a:t>Mesh shaders and ReSTIR based DI + GI</a:t>
+            </a:r>
+          </a:p>
+          <a:p>
+            <a:r>
+              <a:rPr lang="en-US" sz="1600" dirty="0">
+                <a:latin typeface="Calibri" panose="020F0502020204030204" pitchFamily="34" charset="0"/>
+                <a:ea typeface="Calibri" panose="020F0502020204030204" pitchFamily="34" charset="0"/>
+                <a:cs typeface="Calibri" panose="020F0502020204030204" pitchFamily="34" charset="0"/>
+              </a:rPr>
+              <a:t>Visibility buffer based bindless materials</a:t>
+            </a:r>
+          </a:p>
+          <a:p>
+            <a:r>
+              <a:rPr lang="en-US" dirty="0">
+                <a:latin typeface="Calibri" panose="020F0502020204030204" pitchFamily="34" charset="0"/>
+                <a:ea typeface="Calibri" panose="020F0502020204030204" pitchFamily="34" charset="0"/>
+                <a:cs typeface="Calibri" panose="020F0502020204030204" pitchFamily="34" charset="0"/>
+              </a:rPr>
+              <a:t>Indirect draw as </a:t>
+            </a:r>
+            <a:r>
+              <a:rPr lang="en-US">
+                <a:latin typeface="Calibri" panose="020F0502020204030204" pitchFamily="34" charset="0"/>
+                <a:ea typeface="Calibri" panose="020F0502020204030204" pitchFamily="34" charset="0"/>
+                <a:cs typeface="Calibri" panose="020F0502020204030204" pitchFamily="34" charset="0"/>
+              </a:rPr>
+              <a:t>fallback system</a:t>
+            </a:r>
+            <a:endParaRPr lang="en-US" sz="1600" dirty="0">
+              <a:latin typeface="Calibri" panose="020F0502020204030204" pitchFamily="34" charset="0"/>
+              <a:ea typeface="Calibri" panose="020F0502020204030204" pitchFamily="34" charset="0"/>
+              <a:cs typeface="Calibri" panose="020F0502020204030204" pitchFamily="34" charset="0"/>
+            </a:endParaRPr>
           </a:p>
           <a:p>
             <a:endParaRPr lang="en-IN" sz="1600" dirty="0"/>
@@ -4408,7 +4446,15 @@
             </a:r>
             <a:r>
               <a:rPr lang="en-US" dirty="0"/>
-              <a:t> is responsible for building the frame graph passes </a:t>
+              <a:t> </a:t>
+            </a:r>
+            <a:r>
+              <a:rPr lang="en-US" dirty="0">
+                <a:latin typeface="Calibri" panose="020F0502020204030204" pitchFamily="34" charset="0"/>
+                <a:ea typeface="Calibri" panose="020F0502020204030204" pitchFamily="34" charset="0"/>
+                <a:cs typeface="Calibri" panose="020F0502020204030204" pitchFamily="34" charset="0"/>
+              </a:rPr>
+              <a:t>is responsible for building the frame graph passes </a:t>
             </a:r>
           </a:p>
           <a:p>
@@ -4420,6 +4466,9 @@
                     <a:lumMod val="85000"/>
                   </a:schemeClr>
                 </a:solidFill>
+                <a:latin typeface="Calibri" panose="020F0502020204030204" pitchFamily="34" charset="0"/>
+                <a:ea typeface="Calibri" panose="020F0502020204030204" pitchFamily="34" charset="0"/>
+                <a:cs typeface="Calibri" panose="020F0502020204030204" pitchFamily="34" charset="0"/>
               </a:rPr>
               <a:t>Hooking up R/W resources </a:t>
             </a:r>
@@ -4433,6 +4482,9 @@
                     <a:lumMod val="85000"/>
                   </a:schemeClr>
                 </a:solidFill>
+                <a:latin typeface="Calibri" panose="020F0502020204030204" pitchFamily="34" charset="0"/>
+                <a:ea typeface="Calibri" panose="020F0502020204030204" pitchFamily="34" charset="0"/>
+                <a:cs typeface="Calibri" panose="020F0502020204030204" pitchFamily="34" charset="0"/>
               </a:rPr>
               <a:t>Execution &amp; Submission of commands to the GPU</a:t>
             </a:r>
@@ -4446,6 +4498,9 @@
                     <a:lumMod val="85000"/>
                   </a:schemeClr>
                 </a:solidFill>
+                <a:latin typeface="Calibri" panose="020F0502020204030204" pitchFamily="34" charset="0"/>
+                <a:ea typeface="Calibri" panose="020F0502020204030204" pitchFamily="34" charset="0"/>
+                <a:cs typeface="Calibri" panose="020F0502020204030204" pitchFamily="34" charset="0"/>
               </a:rPr>
               <a:t>Managing RTs and read/write operations from other passes</a:t>
             </a:r>
@@ -4536,6 +4591,86 @@
     <p:extLst>
       <p:ext uri="{BB962C8B-B14F-4D97-AF65-F5344CB8AC3E}">
         <p14:creationId xmlns:p14="http://schemas.microsoft.com/office/powerpoint/2010/main" val="340220132"/>
+      </p:ext>
+    </p:extLst>
+  </p:cSld>
+  <p:clrMapOvr>
+    <a:masterClrMapping/>
+  </p:clrMapOvr>
+</p:sld>
+</file>
+
+<file path=ppt/slides/slide6.xml><?xml version="1.0" encoding="utf-8"?>
+<p:sld xmlns:a="http://schemas.openxmlformats.org/drawingml/2006/main" xmlns:r="http://schemas.openxmlformats.org/officeDocument/2006/relationships" xmlns:p="http://schemas.openxmlformats.org/presentationml/2006/main">
+  <p:cSld>
+    <p:spTree>
+      <p:nvGrpSpPr>
+        <p:cNvPr id="1" name=""/>
+        <p:cNvGrpSpPr/>
+        <p:nvPr/>
+      </p:nvGrpSpPr>
+      <p:grpSpPr>
+        <a:xfrm>
+          <a:off x="0" y="0"/>
+          <a:ext cx="0" cy="0"/>
+          <a:chOff x="0" y="0"/>
+          <a:chExt cx="0" cy="0"/>
+        </a:xfrm>
+      </p:grpSpPr>
+      <p:sp>
+        <p:nvSpPr>
+          <p:cNvPr id="2" name="Title 1">
+            <a:extLst>
+              <a:ext uri="{FF2B5EF4-FFF2-40B4-BE49-F238E27FC236}">
+                <a16:creationId xmlns:a16="http://schemas.microsoft.com/office/drawing/2014/main" id="{7D180A5A-9C56-7CC7-616A-C0589550AEE7}"/>
+              </a:ext>
+            </a:extLst>
+          </p:cNvPr>
+          <p:cNvSpPr>
+            <a:spLocks noGrp="1"/>
+          </p:cNvSpPr>
+          <p:nvPr>
+            <p:ph type="title"/>
+          </p:nvPr>
+        </p:nvSpPr>
+        <p:spPr/>
+        <p:txBody>
+          <a:bodyPr/>
+          <a:lstStyle/>
+          <a:p>
+            <a:endParaRPr lang="en-IN" dirty="0"/>
+          </a:p>
+        </p:txBody>
+      </p:sp>
+      <p:sp>
+        <p:nvSpPr>
+          <p:cNvPr id="3" name="Content Placeholder 2">
+            <a:extLst>
+              <a:ext uri="{FF2B5EF4-FFF2-40B4-BE49-F238E27FC236}">
+                <a16:creationId xmlns:a16="http://schemas.microsoft.com/office/drawing/2014/main" id="{3844D5A2-A46E-08C4-B510-C0405F5C7C5B}"/>
+              </a:ext>
+            </a:extLst>
+          </p:cNvPr>
+          <p:cNvSpPr>
+            <a:spLocks noGrp="1"/>
+          </p:cNvSpPr>
+          <p:nvPr>
+            <p:ph idx="1"/>
+          </p:nvPr>
+        </p:nvSpPr>
+        <p:spPr/>
+        <p:txBody>
+          <a:bodyPr/>
+          <a:lstStyle/>
+          <a:p>
+            <a:endParaRPr lang="en-IN"/>
+          </a:p>
+        </p:txBody>
+      </p:sp>
+    </p:spTree>
+    <p:extLst>
+      <p:ext uri="{BB962C8B-B14F-4D97-AF65-F5344CB8AC3E}">
+        <p14:creationId xmlns:p14="http://schemas.microsoft.com/office/powerpoint/2010/main" val="3039434187"/>
       </p:ext>
     </p:extLst>
   </p:cSld>

</xml_diff>

<commit_message>
added basic shadow renderer + updated readme;
</commit_message>
<xml_diff>
--- a/Docs/Features overview.pptx
+++ b/Docs/Features overview.pptx
@@ -298,7 +298,7 @@
           <a:p>
             <a:fld id="{84B6F61C-9FA5-4C35-A1D3-00EE2C15A6C0}" type="datetimeFigureOut">
               <a:rPr lang="en-IN" smtClean="0"/>
-              <a:t>15-02-2023</a:t>
+              <a:t>28-03-2023</a:t>
             </a:fld>
             <a:endParaRPr lang="en-IN"/>
           </a:p>
@@ -522,7 +522,7 @@
           <a:p>
             <a:fld id="{84B6F61C-9FA5-4C35-A1D3-00EE2C15A6C0}" type="datetimeFigureOut">
               <a:rPr lang="en-IN" smtClean="0"/>
-              <a:t>15-02-2023</a:t>
+              <a:t>28-03-2023</a:t>
             </a:fld>
             <a:endParaRPr lang="en-IN"/>
           </a:p>
@@ -746,7 +746,7 @@
           <a:p>
             <a:fld id="{84B6F61C-9FA5-4C35-A1D3-00EE2C15A6C0}" type="datetimeFigureOut">
               <a:rPr lang="en-IN" smtClean="0"/>
-              <a:t>15-02-2023</a:t>
+              <a:t>28-03-2023</a:t>
             </a:fld>
             <a:endParaRPr lang="en-IN"/>
           </a:p>
@@ -1000,7 +1000,7 @@
           <a:p>
             <a:fld id="{84B6F61C-9FA5-4C35-A1D3-00EE2C15A6C0}" type="datetimeFigureOut">
               <a:rPr lang="en-IN" smtClean="0"/>
-              <a:t>15-02-2023</a:t>
+              <a:t>28-03-2023</a:t>
             </a:fld>
             <a:endParaRPr lang="en-IN" dirty="0"/>
           </a:p>
@@ -1381,7 +1381,7 @@
           <a:p>
             <a:fld id="{84B6F61C-9FA5-4C35-A1D3-00EE2C15A6C0}" type="datetimeFigureOut">
               <a:rPr lang="en-IN" smtClean="0"/>
-              <a:t>15-02-2023</a:t>
+              <a:t>28-03-2023</a:t>
             </a:fld>
             <a:endParaRPr lang="en-IN"/>
           </a:p>
@@ -1663,7 +1663,7 @@
           <a:p>
             <a:fld id="{84B6F61C-9FA5-4C35-A1D3-00EE2C15A6C0}" type="datetimeFigureOut">
               <a:rPr lang="en-IN" smtClean="0"/>
-              <a:t>15-02-2023</a:t>
+              <a:t>28-03-2023</a:t>
             </a:fld>
             <a:endParaRPr lang="en-IN"/>
           </a:p>
@@ -2092,7 +2092,7 @@
           <a:p>
             <a:fld id="{84B6F61C-9FA5-4C35-A1D3-00EE2C15A6C0}" type="datetimeFigureOut">
               <a:rPr lang="en-IN" smtClean="0"/>
-              <a:t>15-02-2023</a:t>
+              <a:t>28-03-2023</a:t>
             </a:fld>
             <a:endParaRPr lang="en-IN" dirty="0"/>
           </a:p>
@@ -2256,7 +2256,7 @@
           <a:p>
             <a:fld id="{84B6F61C-9FA5-4C35-A1D3-00EE2C15A6C0}" type="datetimeFigureOut">
               <a:rPr lang="en-IN" smtClean="0"/>
-              <a:t>15-02-2023</a:t>
+              <a:t>28-03-2023</a:t>
             </a:fld>
             <a:endParaRPr lang="en-IN"/>
           </a:p>
@@ -2383,7 +2383,7 @@
           <a:p>
             <a:fld id="{84B6F61C-9FA5-4C35-A1D3-00EE2C15A6C0}" type="datetimeFigureOut">
               <a:rPr lang="en-IN" smtClean="0"/>
-              <a:t>15-02-2023</a:t>
+              <a:t>28-03-2023</a:t>
             </a:fld>
             <a:endParaRPr lang="en-IN"/>
           </a:p>
@@ -2710,7 +2710,7 @@
           <a:p>
             <a:fld id="{84B6F61C-9FA5-4C35-A1D3-00EE2C15A6C0}" type="datetimeFigureOut">
               <a:rPr lang="en-IN" smtClean="0"/>
-              <a:t>15-02-2023</a:t>
+              <a:t>28-03-2023</a:t>
             </a:fld>
             <a:endParaRPr lang="en-IN"/>
           </a:p>
@@ -3013,7 +3013,7 @@
           <a:p>
             <a:fld id="{84B6F61C-9FA5-4C35-A1D3-00EE2C15A6C0}" type="datetimeFigureOut">
               <a:rPr lang="en-IN" smtClean="0"/>
-              <a:t>15-02-2023</a:t>
+              <a:t>28-03-2023</a:t>
             </a:fld>
             <a:endParaRPr lang="en-IN"/>
           </a:p>
@@ -3265,7 +3265,7 @@
           <a:p>
             <a:fld id="{84B6F61C-9FA5-4C35-A1D3-00EE2C15A6C0}" type="datetimeFigureOut">
               <a:rPr lang="en-IN" smtClean="0"/>
-              <a:t>15-02-2023</a:t>
+              <a:t>28-03-2023</a:t>
             </a:fld>
             <a:endParaRPr lang="en-IN"/>
           </a:p>
@@ -4638,35 +4638,43 @@
           <a:bodyPr/>
           <a:lstStyle/>
           <a:p>
+            <a:r>
+              <a:rPr lang="en-US"/>
+              <a:t>projcoords.z</a:t>
+            </a:r>
             <a:endParaRPr lang="en-IN" dirty="0"/>
           </a:p>
         </p:txBody>
       </p:sp>
-      <p:sp>
-        <p:nvSpPr>
-          <p:cNvPr id="3" name="Content Placeholder 2">
-            <a:extLst>
-              <a:ext uri="{FF2B5EF4-FFF2-40B4-BE49-F238E27FC236}">
-                <a16:creationId xmlns:a16="http://schemas.microsoft.com/office/drawing/2014/main" id="{3844D5A2-A46E-08C4-B510-C0405F5C7C5B}"/>
-              </a:ext>
-            </a:extLst>
-          </p:cNvPr>
-          <p:cNvSpPr>
-            <a:spLocks noGrp="1"/>
-          </p:cNvSpPr>
+      <p:pic>
+        <p:nvPicPr>
+          <p:cNvPr id="5" name="Content Placeholder 4">
+            <a:extLst>
+              <a:ext uri="{FF2B5EF4-FFF2-40B4-BE49-F238E27FC236}">
+                <a16:creationId xmlns:a16="http://schemas.microsoft.com/office/drawing/2014/main" id="{81C70317-BE96-0E40-C50F-A0C741EF9A3C}"/>
+              </a:ext>
+            </a:extLst>
+          </p:cNvPr>
+          <p:cNvPicPr>
+            <a:picLocks noGrp="1" noChangeAspect="1"/>
+          </p:cNvPicPr>
           <p:nvPr>
             <p:ph idx="1"/>
           </p:nvPr>
-        </p:nvSpPr>
-        <p:spPr/>
-        <p:txBody>
-          <a:bodyPr/>
-          <a:lstStyle/>
-          <a:p>
-            <a:endParaRPr lang="en-IN"/>
-          </a:p>
-        </p:txBody>
-      </p:sp>
+        </p:nvPicPr>
+        <p:blipFill>
+          <a:blip r:embed="rId2"/>
+          <a:stretch>
+            <a:fillRect/>
+          </a:stretch>
+        </p:blipFill>
+        <p:spPr>
+          <a:xfrm>
+            <a:off x="1688035" y="1219200"/>
+            <a:ext cx="8519067" cy="4957763"/>
+          </a:xfrm>
+        </p:spPr>
+      </p:pic>
     </p:spTree>
     <p:extLst>
       <p:ext uri="{BB962C8B-B14F-4D97-AF65-F5344CB8AC3E}">

</xml_diff>

<commit_message>
moved skybox to internal folders; struct based API refactor WIP;
</commit_message>
<xml_diff>
--- a/Docs/Features overview.pptx
+++ b/Docs/Features overview.pptx
@@ -298,7 +298,7 @@
           <a:p>
             <a:fld id="{84B6F61C-9FA5-4C35-A1D3-00EE2C15A6C0}" type="datetimeFigureOut">
               <a:rPr lang="en-IN" smtClean="0"/>
-              <a:t>28-03-2023</a:t>
+              <a:t>05-06-2023</a:t>
             </a:fld>
             <a:endParaRPr lang="en-IN"/>
           </a:p>
@@ -522,7 +522,7 @@
           <a:p>
             <a:fld id="{84B6F61C-9FA5-4C35-A1D3-00EE2C15A6C0}" type="datetimeFigureOut">
               <a:rPr lang="en-IN" smtClean="0"/>
-              <a:t>28-03-2023</a:t>
+              <a:t>05-06-2023</a:t>
             </a:fld>
             <a:endParaRPr lang="en-IN"/>
           </a:p>
@@ -746,7 +746,7 @@
           <a:p>
             <a:fld id="{84B6F61C-9FA5-4C35-A1D3-00EE2C15A6C0}" type="datetimeFigureOut">
               <a:rPr lang="en-IN" smtClean="0"/>
-              <a:t>28-03-2023</a:t>
+              <a:t>05-06-2023</a:t>
             </a:fld>
             <a:endParaRPr lang="en-IN"/>
           </a:p>
@@ -1000,7 +1000,7 @@
           <a:p>
             <a:fld id="{84B6F61C-9FA5-4C35-A1D3-00EE2C15A6C0}" type="datetimeFigureOut">
               <a:rPr lang="en-IN" smtClean="0"/>
-              <a:t>28-03-2023</a:t>
+              <a:t>05-06-2023</a:t>
             </a:fld>
             <a:endParaRPr lang="en-IN" dirty="0"/>
           </a:p>
@@ -1381,7 +1381,7 @@
           <a:p>
             <a:fld id="{84B6F61C-9FA5-4C35-A1D3-00EE2C15A6C0}" type="datetimeFigureOut">
               <a:rPr lang="en-IN" smtClean="0"/>
-              <a:t>28-03-2023</a:t>
+              <a:t>05-06-2023</a:t>
             </a:fld>
             <a:endParaRPr lang="en-IN"/>
           </a:p>
@@ -1663,7 +1663,7 @@
           <a:p>
             <a:fld id="{84B6F61C-9FA5-4C35-A1D3-00EE2C15A6C0}" type="datetimeFigureOut">
               <a:rPr lang="en-IN" smtClean="0"/>
-              <a:t>28-03-2023</a:t>
+              <a:t>05-06-2023</a:t>
             </a:fld>
             <a:endParaRPr lang="en-IN"/>
           </a:p>
@@ -2092,7 +2092,7 @@
           <a:p>
             <a:fld id="{84B6F61C-9FA5-4C35-A1D3-00EE2C15A6C0}" type="datetimeFigureOut">
               <a:rPr lang="en-IN" smtClean="0"/>
-              <a:t>28-03-2023</a:t>
+              <a:t>05-06-2023</a:t>
             </a:fld>
             <a:endParaRPr lang="en-IN" dirty="0"/>
           </a:p>
@@ -2256,7 +2256,7 @@
           <a:p>
             <a:fld id="{84B6F61C-9FA5-4C35-A1D3-00EE2C15A6C0}" type="datetimeFigureOut">
               <a:rPr lang="en-IN" smtClean="0"/>
-              <a:t>28-03-2023</a:t>
+              <a:t>05-06-2023</a:t>
             </a:fld>
             <a:endParaRPr lang="en-IN"/>
           </a:p>
@@ -2383,7 +2383,7 @@
           <a:p>
             <a:fld id="{84B6F61C-9FA5-4C35-A1D3-00EE2C15A6C0}" type="datetimeFigureOut">
               <a:rPr lang="en-IN" smtClean="0"/>
-              <a:t>28-03-2023</a:t>
+              <a:t>05-06-2023</a:t>
             </a:fld>
             <a:endParaRPr lang="en-IN"/>
           </a:p>
@@ -2710,7 +2710,7 @@
           <a:p>
             <a:fld id="{84B6F61C-9FA5-4C35-A1D3-00EE2C15A6C0}" type="datetimeFigureOut">
               <a:rPr lang="en-IN" smtClean="0"/>
-              <a:t>28-03-2023</a:t>
+              <a:t>05-06-2023</a:t>
             </a:fld>
             <a:endParaRPr lang="en-IN"/>
           </a:p>
@@ -3013,7 +3013,7 @@
           <a:p>
             <a:fld id="{84B6F61C-9FA5-4C35-A1D3-00EE2C15A6C0}" type="datetimeFigureOut">
               <a:rPr lang="en-IN" smtClean="0"/>
-              <a:t>28-03-2023</a:t>
+              <a:t>05-06-2023</a:t>
             </a:fld>
             <a:endParaRPr lang="en-IN"/>
           </a:p>
@@ -3265,7 +3265,7 @@
           <a:p>
             <a:fld id="{84B6F61C-9FA5-4C35-A1D3-00EE2C15A6C0}" type="datetimeFigureOut">
               <a:rPr lang="en-IN" smtClean="0"/>
-              <a:t>28-03-2023</a:t>
+              <a:t>05-06-2023</a:t>
             </a:fld>
             <a:endParaRPr lang="en-IN"/>
           </a:p>
@@ -3998,24 +3998,13 @@
                 <a:ea typeface="Calibri" panose="020F0502020204030204" pitchFamily="34" charset="0"/>
                 <a:cs typeface="Calibri" panose="020F0502020204030204" pitchFamily="34" charset="0"/>
               </a:rPr>
-              <a:t>Indirect draw as </a:t>
-            </a:r>
-            <a:r>
-              <a:rPr lang="en-US">
-                <a:latin typeface="Calibri" panose="020F0502020204030204" pitchFamily="34" charset="0"/>
-                <a:ea typeface="Calibri" panose="020F0502020204030204" pitchFamily="34" charset="0"/>
-                <a:cs typeface="Calibri" panose="020F0502020204030204" pitchFamily="34" charset="0"/>
-              </a:rPr>
-              <a:t>fallback system</a:t>
+              <a:t>Indirect draw as fallback system</a:t>
             </a:r>
             <a:endParaRPr lang="en-US" sz="1600" dirty="0">
               <a:latin typeface="Calibri" panose="020F0502020204030204" pitchFamily="34" charset="0"/>
               <a:ea typeface="Calibri" panose="020F0502020204030204" pitchFamily="34" charset="0"/>
               <a:cs typeface="Calibri" panose="020F0502020204030204" pitchFamily="34" charset="0"/>
             </a:endParaRPr>
-          </a:p>
-          <a:p>
-            <a:endParaRPr lang="en-IN" sz="1600" dirty="0"/>
           </a:p>
         </p:txBody>
       </p:sp>

</xml_diff>

<commit_message>
[Graphics] solved issue with vkPresentQueueKHR taking too much time; Need to add memory/pipeline barriers in FrameGraph; Optimization - 1;
</commit_message>
<xml_diff>
--- a/Docs/Features overview.pptx
+++ b/Docs/Features overview.pptx
@@ -11,6 +11,7 @@
     <p:sldId id="260" r:id="rId5"/>
     <p:sldId id="261" r:id="rId6"/>
     <p:sldId id="262" r:id="rId7"/>
+    <p:sldId id="263" r:id="rId8"/>
   </p:sldIdLst>
   <p:sldSz cx="12192000" cy="6858000"/>
   <p:notesSz cx="6858000" cy="9144000"/>
@@ -126,6 +127,11 @@
             <p14:sldId id="262"/>
           </p14:sldIdLst>
         </p14:section>
+        <p14:section name="Performance Improvements" id="{245578FE-32D1-46ED-9D76-A9FD4E05A08C}">
+          <p14:sldIdLst>
+            <p14:sldId id="263"/>
+          </p14:sldIdLst>
+        </p14:section>
       </p14:sectionLst>
     </p:ext>
     <p:ext uri="{EFAFB233-063F-42B5-8137-9DF3F51BA10A}">
@@ -298,7 +304,7 @@
           <a:p>
             <a:fld id="{84B6F61C-9FA5-4C35-A1D3-00EE2C15A6C0}" type="datetimeFigureOut">
               <a:rPr lang="en-IN" smtClean="0"/>
-              <a:t>05-06-2023</a:t>
+              <a:t>02-07-2023</a:t>
             </a:fld>
             <a:endParaRPr lang="en-IN"/>
           </a:p>
@@ -522,7 +528,7 @@
           <a:p>
             <a:fld id="{84B6F61C-9FA5-4C35-A1D3-00EE2C15A6C0}" type="datetimeFigureOut">
               <a:rPr lang="en-IN" smtClean="0"/>
-              <a:t>05-06-2023</a:t>
+              <a:t>02-07-2023</a:t>
             </a:fld>
             <a:endParaRPr lang="en-IN"/>
           </a:p>
@@ -746,7 +752,7 @@
           <a:p>
             <a:fld id="{84B6F61C-9FA5-4C35-A1D3-00EE2C15A6C0}" type="datetimeFigureOut">
               <a:rPr lang="en-IN" smtClean="0"/>
-              <a:t>05-06-2023</a:t>
+              <a:t>02-07-2023</a:t>
             </a:fld>
             <a:endParaRPr lang="en-IN"/>
           </a:p>
@@ -1000,7 +1006,7 @@
           <a:p>
             <a:fld id="{84B6F61C-9FA5-4C35-A1D3-00EE2C15A6C0}" type="datetimeFigureOut">
               <a:rPr lang="en-IN" smtClean="0"/>
-              <a:t>05-06-2023</a:t>
+              <a:t>02-07-2023</a:t>
             </a:fld>
             <a:endParaRPr lang="en-IN" dirty="0"/>
           </a:p>
@@ -1381,7 +1387,7 @@
           <a:p>
             <a:fld id="{84B6F61C-9FA5-4C35-A1D3-00EE2C15A6C0}" type="datetimeFigureOut">
               <a:rPr lang="en-IN" smtClean="0"/>
-              <a:t>05-06-2023</a:t>
+              <a:t>02-07-2023</a:t>
             </a:fld>
             <a:endParaRPr lang="en-IN"/>
           </a:p>
@@ -1663,7 +1669,7 @@
           <a:p>
             <a:fld id="{84B6F61C-9FA5-4C35-A1D3-00EE2C15A6C0}" type="datetimeFigureOut">
               <a:rPr lang="en-IN" smtClean="0"/>
-              <a:t>05-06-2023</a:t>
+              <a:t>02-07-2023</a:t>
             </a:fld>
             <a:endParaRPr lang="en-IN"/>
           </a:p>
@@ -2092,7 +2098,7 @@
           <a:p>
             <a:fld id="{84B6F61C-9FA5-4C35-A1D3-00EE2C15A6C0}" type="datetimeFigureOut">
               <a:rPr lang="en-IN" smtClean="0"/>
-              <a:t>05-06-2023</a:t>
+              <a:t>02-07-2023</a:t>
             </a:fld>
             <a:endParaRPr lang="en-IN" dirty="0"/>
           </a:p>
@@ -2256,7 +2262,7 @@
           <a:p>
             <a:fld id="{84B6F61C-9FA5-4C35-A1D3-00EE2C15A6C0}" type="datetimeFigureOut">
               <a:rPr lang="en-IN" smtClean="0"/>
-              <a:t>05-06-2023</a:t>
+              <a:t>02-07-2023</a:t>
             </a:fld>
             <a:endParaRPr lang="en-IN"/>
           </a:p>
@@ -2383,7 +2389,7 @@
           <a:p>
             <a:fld id="{84B6F61C-9FA5-4C35-A1D3-00EE2C15A6C0}" type="datetimeFigureOut">
               <a:rPr lang="en-IN" smtClean="0"/>
-              <a:t>05-06-2023</a:t>
+              <a:t>02-07-2023</a:t>
             </a:fld>
             <a:endParaRPr lang="en-IN"/>
           </a:p>
@@ -2710,7 +2716,7 @@
           <a:p>
             <a:fld id="{84B6F61C-9FA5-4C35-A1D3-00EE2C15A6C0}" type="datetimeFigureOut">
               <a:rPr lang="en-IN" smtClean="0"/>
-              <a:t>05-06-2023</a:t>
+              <a:t>02-07-2023</a:t>
             </a:fld>
             <a:endParaRPr lang="en-IN"/>
           </a:p>
@@ -3013,7 +3019,7 @@
           <a:p>
             <a:fld id="{84B6F61C-9FA5-4C35-A1D3-00EE2C15A6C0}" type="datetimeFigureOut">
               <a:rPr lang="en-IN" smtClean="0"/>
-              <a:t>05-06-2023</a:t>
+              <a:t>02-07-2023</a:t>
             </a:fld>
             <a:endParaRPr lang="en-IN"/>
           </a:p>
@@ -3265,7 +3271,7 @@
           <a:p>
             <a:fld id="{84B6F61C-9FA5-4C35-A1D3-00EE2C15A6C0}" type="datetimeFigureOut">
               <a:rPr lang="en-IN" smtClean="0"/>
-              <a:t>05-06-2023</a:t>
+              <a:t>02-07-2023</a:t>
             </a:fld>
             <a:endParaRPr lang="en-IN"/>
           </a:p>
@@ -4677,6 +4683,308 @@
 </p:sld>
 </file>
 
+<file path=ppt/slides/slide7.xml><?xml version="1.0" encoding="utf-8"?>
+<p:sld xmlns:a="http://schemas.openxmlformats.org/drawingml/2006/main" xmlns:r="http://schemas.openxmlformats.org/officeDocument/2006/relationships" xmlns:p="http://schemas.openxmlformats.org/presentationml/2006/main">
+  <p:cSld>
+    <p:spTree>
+      <p:nvGrpSpPr>
+        <p:cNvPr id="1" name=""/>
+        <p:cNvGrpSpPr/>
+        <p:nvPr/>
+      </p:nvGrpSpPr>
+      <p:grpSpPr>
+        <a:xfrm>
+          <a:off x="0" y="0"/>
+          <a:ext cx="0" cy="0"/>
+          <a:chOff x="0" y="0"/>
+          <a:chExt cx="0" cy="0"/>
+        </a:xfrm>
+      </p:grpSpPr>
+      <p:sp>
+        <p:nvSpPr>
+          <p:cNvPr id="2" name="Title 1">
+            <a:extLst>
+              <a:ext uri="{FF2B5EF4-FFF2-40B4-BE49-F238E27FC236}">
+                <a16:creationId xmlns:a16="http://schemas.microsoft.com/office/drawing/2014/main" id="{0F68DE61-F4A0-01F3-833B-5EF6841E2FDC}"/>
+              </a:ext>
+            </a:extLst>
+          </p:cNvPr>
+          <p:cNvSpPr>
+            <a:spLocks noGrp="1"/>
+          </p:cNvSpPr>
+          <p:nvPr>
+            <p:ph type="title"/>
+          </p:nvPr>
+        </p:nvSpPr>
+        <p:spPr/>
+        <p:txBody>
+          <a:bodyPr>
+            <a:normAutofit/>
+          </a:bodyPr>
+          <a:lstStyle/>
+          <a:p>
+            <a:r>
+              <a:rPr lang="en-US" dirty="0"/>
+              <a:t>Performance Bottleneck – </a:t>
+            </a:r>
+            <a:r>
+              <a:rPr lang="en-US" sz="2000" dirty="0">
+                <a:solidFill>
+                  <a:srgbClr val="FFB556"/>
+                </a:solidFill>
+              </a:rPr>
+              <a:t>vkQueuePresentKHR/</a:t>
+            </a:r>
+            <a:r>
+              <a:rPr lang="en-US" sz="2000" dirty="0" err="1">
+                <a:solidFill>
+                  <a:srgbClr val="FFB556"/>
+                </a:solidFill>
+              </a:rPr>
+              <a:t>vkQueueSubmitKHR</a:t>
+            </a:r>
+            <a:endParaRPr lang="en-IN" sz="2000" dirty="0">
+              <a:solidFill>
+                <a:srgbClr val="FFB556"/>
+              </a:solidFill>
+            </a:endParaRPr>
+          </a:p>
+        </p:txBody>
+      </p:sp>
+      <p:sp>
+        <p:nvSpPr>
+          <p:cNvPr id="3" name="Content Placeholder 2">
+            <a:extLst>
+              <a:ext uri="{FF2B5EF4-FFF2-40B4-BE49-F238E27FC236}">
+                <a16:creationId xmlns:a16="http://schemas.microsoft.com/office/drawing/2014/main" id="{142BF2F0-15EF-C441-4887-EC3FEA12F04A}"/>
+              </a:ext>
+            </a:extLst>
+          </p:cNvPr>
+          <p:cNvSpPr>
+            <a:spLocks noGrp="1"/>
+          </p:cNvSpPr>
+          <p:nvPr>
+            <p:ph idx="1"/>
+          </p:nvPr>
+        </p:nvSpPr>
+        <p:spPr>
+          <a:xfrm>
+            <a:off x="541176" y="1219454"/>
+            <a:ext cx="10812624" cy="1930801"/>
+          </a:xfrm>
+        </p:spPr>
+        <p:txBody>
+          <a:bodyPr>
+            <a:normAutofit/>
+          </a:bodyPr>
+          <a:lstStyle/>
+          <a:p>
+            <a:pPr marL="0" indent="0">
+              <a:buNone/>
+            </a:pPr>
+            <a:r>
+              <a:rPr lang="en-US" sz="1800" dirty="0"/>
+              <a:t>Problem</a:t>
+            </a:r>
+          </a:p>
+          <a:p>
+            <a:r>
+              <a:rPr lang="en-US" sz="1400" dirty="0">
+                <a:solidFill>
+                  <a:schemeClr val="accent3">
+                    <a:lumMod val="75000"/>
+                  </a:schemeClr>
+                </a:solidFill>
+              </a:rPr>
+              <a:t>Presentation of frame is taking around </a:t>
+            </a:r>
+            <a:r>
+              <a:rPr lang="en-US" sz="1400" u="sng" dirty="0">
+                <a:solidFill>
+                  <a:schemeClr val="accent3">
+                    <a:lumMod val="75000"/>
+                  </a:schemeClr>
+                </a:solidFill>
+              </a:rPr>
+              <a:t>1.2-2.0</a:t>
+            </a:r>
+            <a:r>
+              <a:rPr lang="en-US" sz="1400" i="1" u="sng" dirty="0">
+                <a:solidFill>
+                  <a:schemeClr val="accent3">
+                    <a:lumMod val="75000"/>
+                  </a:schemeClr>
+                </a:solidFill>
+              </a:rPr>
+              <a:t>ms</a:t>
+            </a:r>
+            <a:r>
+              <a:rPr lang="en-US" sz="1400" dirty="0">
+                <a:solidFill>
+                  <a:schemeClr val="accent3">
+                    <a:lumMod val="75000"/>
+                  </a:schemeClr>
+                </a:solidFill>
+              </a:rPr>
+              <a:t> in Razix</a:t>
+            </a:r>
+            <a:r>
+              <a:rPr lang="en-US" sz="1400" dirty="0"/>
+              <a:t>, typical native Vulkan app takes around 0.06-0.08</a:t>
+            </a:r>
+            <a:r>
+              <a:rPr lang="en-US" sz="1400" i="1" dirty="0"/>
+              <a:t>ms</a:t>
+            </a:r>
+            <a:r>
+              <a:rPr lang="en-US" sz="1400" dirty="0"/>
+              <a:t> (avg. &lt; 0.1</a:t>
+            </a:r>
+            <a:r>
+              <a:rPr lang="en-US" sz="1400" i="1" dirty="0"/>
+              <a:t>ms</a:t>
+            </a:r>
+            <a:r>
+              <a:rPr lang="en-US" sz="1400" dirty="0"/>
+              <a:t>)</a:t>
+            </a:r>
+          </a:p>
+          <a:p>
+            <a:pPr lvl="1"/>
+            <a:r>
+              <a:rPr lang="en-US" sz="1000" dirty="0">
+                <a:solidFill>
+                  <a:schemeClr val="bg1"/>
+                </a:solidFill>
+              </a:rPr>
+              <a:t>This includes time for both </a:t>
+            </a:r>
+            <a:r>
+              <a:rPr lang="en-US" sz="1000" dirty="0">
+                <a:solidFill>
+                  <a:schemeClr val="accent1"/>
+                </a:solidFill>
+              </a:rPr>
+              <a:t>vkQueuePresentKHR</a:t>
+            </a:r>
+            <a:r>
+              <a:rPr lang="en-US" sz="1000" dirty="0">
+                <a:solidFill>
+                  <a:srgbClr val="C00000"/>
+                </a:solidFill>
+              </a:rPr>
+              <a:t>(0.04-0.06ms)</a:t>
+            </a:r>
+            <a:r>
+              <a:rPr lang="en-US" sz="1000" dirty="0">
+                <a:solidFill>
+                  <a:schemeClr val="bg1"/>
+                </a:solidFill>
+              </a:rPr>
+              <a:t> and </a:t>
+            </a:r>
+            <a:r>
+              <a:rPr lang="en-US" sz="1000" dirty="0">
+                <a:solidFill>
+                  <a:schemeClr val="accent1"/>
+                </a:solidFill>
+              </a:rPr>
+              <a:t>vkWaitForFences</a:t>
+            </a:r>
+            <a:r>
+              <a:rPr lang="en-US" sz="1000" dirty="0">
+                <a:solidFill>
+                  <a:srgbClr val="C00000"/>
+                </a:solidFill>
+              </a:rPr>
+              <a:t>(taking around 0.8-1.2ms)</a:t>
+            </a:r>
+          </a:p>
+          <a:p>
+            <a:pPr lvl="1"/>
+            <a:r>
+              <a:rPr lang="en-US" sz="1000" dirty="0">
+                <a:solidFill>
+                  <a:schemeClr val="bg1"/>
+                </a:solidFill>
+              </a:rPr>
+              <a:t>Could be due to absence of memory and pipeline barriers for </a:t>
+            </a:r>
+            <a:r>
+              <a:rPr lang="en-US" sz="1000" dirty="0">
+                <a:solidFill>
+                  <a:schemeClr val="accent6">
+                    <a:lumMod val="60000"/>
+                    <a:lumOff val="40000"/>
+                  </a:schemeClr>
+                </a:solidFill>
+              </a:rPr>
+              <a:t>Render Targets</a:t>
+            </a:r>
+            <a:r>
+              <a:rPr lang="en-US" sz="1000" dirty="0">
+                <a:solidFill>
+                  <a:schemeClr val="bg1"/>
+                </a:solidFill>
+              </a:rPr>
+              <a:t> b/w the FrameGraph passes, presentation engine is resolving the dependencies and it taking a lot of time</a:t>
+            </a:r>
+          </a:p>
+          <a:p>
+            <a:pPr lvl="1"/>
+            <a:r>
+              <a:rPr lang="en-US" sz="1000" dirty="0">
+                <a:solidFill>
+                  <a:schemeClr val="bg1"/>
+                </a:solidFill>
+              </a:rPr>
+              <a:t>Or since it’s separated into many virtual functions this could be causing issues, since we have fixed no. of semaphores per frame, try implementing them in a single function inside the </a:t>
+            </a:r>
+            <a:r>
+              <a:rPr lang="en-US" sz="1000" dirty="0">
+                <a:solidFill>
+                  <a:schemeClr val="accent3">
+                    <a:lumMod val="60000"/>
+                    <a:lumOff val="40000"/>
+                  </a:schemeClr>
+                </a:solidFill>
+              </a:rPr>
+              <a:t>VKSwapchain</a:t>
+            </a:r>
+            <a:r>
+              <a:rPr lang="en-US" sz="1000" dirty="0">
+                <a:solidFill>
+                  <a:schemeClr val="bg1"/>
+                </a:solidFill>
+              </a:rPr>
+              <a:t> itself to make things simple and fast and have less cache misses</a:t>
+            </a:r>
+          </a:p>
+          <a:p>
+            <a:pPr marL="457177" lvl="1" indent="0">
+              <a:buNone/>
+            </a:pPr>
+            <a:endParaRPr lang="en-US" sz="1000" dirty="0">
+              <a:solidFill>
+                <a:schemeClr val="bg1"/>
+              </a:solidFill>
+            </a:endParaRPr>
+          </a:p>
+        </p:txBody>
+      </p:sp>
+    </p:spTree>
+    <p:extLst>
+      <p:ext uri="{BB962C8B-B14F-4D97-AF65-F5344CB8AC3E}">
+        <p14:creationId xmlns:p14="http://schemas.microsoft.com/office/powerpoint/2010/main" val="2919453556"/>
+      </p:ext>
+    </p:extLst>
+  </p:cSld>
+  <p:clrMapOvr>
+    <a:masterClrMapping/>
+  </p:clrMapOvr>
+</p:sld>
+</file>
+
 <file path=ppt/theme/theme1.xml><?xml version="1.0" encoding="utf-8"?>
 <a:theme xmlns:a="http://schemas.openxmlformats.org/drawingml/2006/main" name="Office Theme">
   <a:themeElements>

</xml_diff>

<commit_message>
[Docs] docs + ppt update;
</commit_message>
<xml_diff>
--- a/Docs/Features overview.pptx
+++ b/Docs/Features overview.pptx
@@ -3960,7 +3960,7 @@
           <a:p>
             <a:r>
               <a:rPr lang="en-US" sz="1600" dirty="0">
-                <a:latin typeface="Calibri" panose="020F0502020204030204" pitchFamily="34" charset="0"/>
+                <a:latin typeface="+mj-lt"/>
                 <a:ea typeface="Calibri" panose="020F0502020204030204" pitchFamily="34" charset="0"/>
                 <a:cs typeface="Calibri" panose="020F0502020204030204" pitchFamily="34" charset="0"/>
               </a:rPr>
@@ -3970,44 +3970,132 @@
           <a:p>
             <a:r>
               <a:rPr lang="en-US" sz="1600" dirty="0">
-                <a:latin typeface="Calibri" panose="020F0502020204030204" pitchFamily="34" charset="0"/>
+                <a:latin typeface="+mj-lt"/>
                 <a:ea typeface="Calibri" panose="020F0502020204030204" pitchFamily="34" charset="0"/>
                 <a:cs typeface="Calibri" panose="020F0502020204030204" pitchFamily="34" charset="0"/>
               </a:rPr>
-              <a:t>Features include Frame Graph, backend agnostic Rendering API (single RHI for Vulkan, D3D12, OpenGL, Metal etc.)</a:t>
-            </a:r>
-          </a:p>
-          <a:p>
+              <a:t>Features include Frame Graph, backend agnostic Rendering API (single RHI for </a:t>
+            </a:r>
             <a:r>
               <a:rPr lang="en-US" sz="1600" dirty="0">
-                <a:latin typeface="Calibri" panose="020F0502020204030204" pitchFamily="34" charset="0"/>
+                <a:solidFill>
+                  <a:schemeClr val="accent3">
+                    <a:lumMod val="40000"/>
+                    <a:lumOff val="60000"/>
+                  </a:schemeClr>
+                </a:solidFill>
+                <a:latin typeface="+mj-lt"/>
                 <a:ea typeface="Calibri" panose="020F0502020204030204" pitchFamily="34" charset="0"/>
                 <a:cs typeface="Calibri" panose="020F0502020204030204" pitchFamily="34" charset="0"/>
               </a:rPr>
-              <a:t>Mesh shaders and ReSTIR based DI + GI</a:t>
-            </a:r>
-          </a:p>
-          <a:p>
+              <a:t>Vulkan</a:t>
+            </a:r>
             <a:r>
               <a:rPr lang="en-US" sz="1600" dirty="0">
-                <a:latin typeface="Calibri" panose="020F0502020204030204" pitchFamily="34" charset="0"/>
+                <a:latin typeface="+mj-lt"/>
                 <a:ea typeface="Calibri" panose="020F0502020204030204" pitchFamily="34" charset="0"/>
                 <a:cs typeface="Calibri" panose="020F0502020204030204" pitchFamily="34" charset="0"/>
               </a:rPr>
-              <a:t>Visibility buffer based bindless materials</a:t>
-            </a:r>
-          </a:p>
-          <a:p>
-            <a:r>
-              <a:rPr lang="en-US" dirty="0">
-                <a:latin typeface="Calibri" panose="020F0502020204030204" pitchFamily="34" charset="0"/>
+              <a:t>, </a:t>
+            </a:r>
+            <a:r>
+              <a:rPr lang="en-US" sz="1600" dirty="0">
+                <a:solidFill>
+                  <a:schemeClr val="accent6">
+                    <a:lumMod val="40000"/>
+                    <a:lumOff val="60000"/>
+                  </a:schemeClr>
+                </a:solidFill>
+                <a:latin typeface="+mj-lt"/>
                 <a:ea typeface="Calibri" panose="020F0502020204030204" pitchFamily="34" charset="0"/>
                 <a:cs typeface="Calibri" panose="020F0502020204030204" pitchFamily="34" charset="0"/>
               </a:rPr>
+              <a:t>D3D12</a:t>
+            </a:r>
+            <a:r>
+              <a:rPr lang="en-US" sz="1600" dirty="0">
+                <a:latin typeface="+mj-lt"/>
+                <a:ea typeface="Calibri" panose="020F0502020204030204" pitchFamily="34" charset="0"/>
+                <a:cs typeface="Calibri" panose="020F0502020204030204" pitchFamily="34" charset="0"/>
+              </a:rPr>
+              <a:t>, </a:t>
+            </a:r>
+            <a:r>
+              <a:rPr lang="en-US" sz="1600" dirty="0">
+                <a:solidFill>
+                  <a:schemeClr val="accent1">
+                    <a:lumMod val="60000"/>
+                    <a:lumOff val="40000"/>
+                  </a:schemeClr>
+                </a:solidFill>
+                <a:latin typeface="+mj-lt"/>
+                <a:ea typeface="Calibri" panose="020F0502020204030204" pitchFamily="34" charset="0"/>
+                <a:cs typeface="Calibri" panose="020F0502020204030204" pitchFamily="34" charset="0"/>
+              </a:rPr>
+              <a:t>OpenGL</a:t>
+            </a:r>
+            <a:r>
+              <a:rPr lang="en-US" sz="1600" dirty="0">
+                <a:latin typeface="+mj-lt"/>
+                <a:ea typeface="Calibri" panose="020F0502020204030204" pitchFamily="34" charset="0"/>
+                <a:cs typeface="Calibri" panose="020F0502020204030204" pitchFamily="34" charset="0"/>
+              </a:rPr>
+              <a:t>, </a:t>
+            </a:r>
+            <a:r>
+              <a:rPr lang="en-US" sz="1600" dirty="0">
+                <a:solidFill>
+                  <a:schemeClr val="accent5">
+                    <a:lumMod val="40000"/>
+                    <a:lumOff val="60000"/>
+                  </a:schemeClr>
+                </a:solidFill>
+                <a:latin typeface="+mj-lt"/>
+                <a:ea typeface="Calibri" panose="020F0502020204030204" pitchFamily="34" charset="0"/>
+                <a:cs typeface="Calibri" panose="020F0502020204030204" pitchFamily="34" charset="0"/>
+              </a:rPr>
+              <a:t>Metal</a:t>
+            </a:r>
+            <a:r>
+              <a:rPr lang="en-US" sz="1600" dirty="0">
+                <a:latin typeface="+mj-lt"/>
+                <a:ea typeface="Calibri" panose="020F0502020204030204" pitchFamily="34" charset="0"/>
+                <a:cs typeface="Calibri" panose="020F0502020204030204" pitchFamily="34" charset="0"/>
+              </a:rPr>
+              <a:t> etc.)</a:t>
+            </a:r>
+          </a:p>
+          <a:p>
+            <a:r>
+              <a:rPr lang="en-US" sz="1600" dirty="0">
+                <a:latin typeface="+mj-lt"/>
+                <a:ea typeface="Calibri" panose="020F0502020204030204" pitchFamily="34" charset="0"/>
+                <a:cs typeface="Calibri" panose="020F0502020204030204" pitchFamily="34" charset="0"/>
+              </a:rPr>
+              <a:t>Mesh shaders and ReSTIR based DI + GI</a:t>
+            </a:r>
+          </a:p>
+          <a:p>
+            <a:r>
+              <a:rPr lang="en-US" sz="1600" dirty="0">
+                <a:latin typeface="+mj-lt"/>
+                <a:ea typeface="Calibri" panose="020F0502020204030204" pitchFamily="34" charset="0"/>
+                <a:cs typeface="Calibri" panose="020F0502020204030204" pitchFamily="34" charset="0"/>
+              </a:rPr>
+              <a:t>Visibility buffer based bindless materials</a:t>
+            </a:r>
+          </a:p>
+          <a:p>
+            <a:r>
+              <a:rPr lang="en-US" dirty="0">
+                <a:latin typeface="+mj-lt"/>
+                <a:ea typeface="Calibri" panose="020F0502020204030204" pitchFamily="34" charset="0"/>
+                <a:cs typeface="Calibri" panose="020F0502020204030204" pitchFamily="34" charset="0"/>
+              </a:rPr>
               <a:t>Indirect draw as fallback system</a:t>
             </a:r>
             <a:endParaRPr lang="en-US" sz="1600" dirty="0">
-              <a:latin typeface="Calibri" panose="020F0502020204030204" pitchFamily="34" charset="0"/>
+              <a:latin typeface="+mj-lt"/>
               <a:ea typeface="Calibri" panose="020F0502020204030204" pitchFamily="34" charset="0"/>
               <a:cs typeface="Calibri" panose="020F0502020204030204" pitchFamily="34" charset="0"/>
             </a:endParaRPr>
@@ -4547,35 +4635,29 @@
               </a:rPr>
               <a:t>FrameGraphPass</a:t>
             </a:r>
+            <a:endParaRPr lang="en-US" dirty="0"/>
           </a:p>
           <a:p>
             <a:r>
               <a:rPr lang="en-US" dirty="0"/>
-              <a:t>Every pass has it’s own set of CommandBuffers</a:t>
-            </a:r>
-          </a:p>
-          <a:p>
-            <a:r>
-              <a:rPr lang="en-US" dirty="0"/>
-              <a:t>Every pass renders onto it’s own RenderTexture</a:t>
-            </a:r>
+              <a:t>Every pass renders onto it’s own set of </a:t>
+            </a:r>
+            <a:r>
+              <a:rPr lang="en-US" dirty="0" err="1"/>
+              <a:t>RenderTextures</a:t>
+            </a:r>
+            <a:endParaRPr lang="en-US" dirty="0"/>
           </a:p>
           <a:p>
             <a:pPr lvl="1"/>
             <a:r>
               <a:rPr lang="en-US" dirty="0">
                 <a:solidFill>
-                  <a:schemeClr val="tx2">
-                    <a:lumMod val="10000"/>
-                    <a:lumOff val="90000"/>
-                  </a:schemeClr>
-                </a:solidFill>
-              </a:rPr>
-              <a:t>Passed onto the next pass until the final composite pass</a:t>
-            </a:r>
-          </a:p>
-          <a:p>
-            <a:endParaRPr lang="en-US" dirty="0"/>
+                  <a:schemeClr val="bg1"/>
+                </a:solidFill>
+              </a:rPr>
+              <a:t>Materials will have to compatible with that pass</a:t>
+            </a:r>
           </a:p>
           <a:p>
             <a:endParaRPr lang="en-IN" dirty="0"/>
@@ -4733,15 +4815,7 @@
                   <a:srgbClr val="FFB556"/>
                 </a:solidFill>
               </a:rPr>
-              <a:t>vkQueuePresentKHR/</a:t>
-            </a:r>
-            <a:r>
-              <a:rPr lang="en-US" sz="2000" dirty="0" err="1">
-                <a:solidFill>
-                  <a:srgbClr val="FFB556"/>
-                </a:solidFill>
-              </a:rPr>
-              <a:t>vkQueueSubmitKHR</a:t>
+              <a:t>vkQueuePresentKHR/vkQueueSubmitKHR</a:t>
             </a:r>
             <a:endParaRPr lang="en-IN" sz="2000" dirty="0">
               <a:solidFill>
@@ -4770,7 +4844,7 @@
         <p:spPr>
           <a:xfrm>
             <a:off x="541176" y="1219454"/>
-            <a:ext cx="10812624" cy="1930801"/>
+            <a:ext cx="10812624" cy="4114546"/>
           </a:xfrm>
         </p:spPr>
         <p:txBody>
@@ -4783,7 +4857,14 @@
               <a:buNone/>
             </a:pPr>
             <a:r>
-              <a:rPr lang="en-US" sz="1800" dirty="0"/>
+              <a:rPr lang="en-US" sz="1700" dirty="0">
+                <a:solidFill>
+                  <a:schemeClr val="accent3">
+                    <a:lumMod val="40000"/>
+                    <a:lumOff val="60000"/>
+                  </a:schemeClr>
+                </a:solidFill>
+              </a:rPr>
               <a:t>Problem</a:t>
             </a:r>
           </a:p>
@@ -4838,7 +4919,7 @@
             </a:r>
             <a:r>
               <a:rPr lang="en-US" sz="1400" dirty="0"/>
-              <a:t> (avg. &lt; 0.1</a:t>
+              <a:t> (avg. &lt; 1.0</a:t>
             </a:r>
             <a:r>
               <a:rPr lang="en-US" sz="1400" i="1" dirty="0"/>
@@ -4852,7 +4933,7 @@
           <a:p>
             <a:pPr lvl="1"/>
             <a:r>
-              <a:rPr lang="en-US" sz="1000" dirty="0">
+              <a:rPr lang="en-US" dirty="0">
                 <a:solidFill>
                   <a:schemeClr val="bg1"/>
                 </a:solidFill>
@@ -4860,7 +4941,7 @@
               <a:t>This includes time for both </a:t>
             </a:r>
             <a:r>
-              <a:rPr lang="en-US" sz="1000" dirty="0">
+              <a:rPr lang="en-US" dirty="0">
                 <a:solidFill>
                   <a:schemeClr val="accent1"/>
                 </a:solidFill>
@@ -4868,7 +4949,7 @@
               <a:t>vkQueuePresentKHR</a:t>
             </a:r>
             <a:r>
-              <a:rPr lang="en-US" sz="1000" dirty="0">
+              <a:rPr lang="en-US" dirty="0">
                 <a:solidFill>
                   <a:srgbClr val="C00000"/>
                 </a:solidFill>
@@ -4876,7 +4957,7 @@
               <a:t>(0.04-0.06ms)</a:t>
             </a:r>
             <a:r>
-              <a:rPr lang="en-US" sz="1000" dirty="0">
+              <a:rPr lang="en-US" dirty="0">
                 <a:solidFill>
                   <a:schemeClr val="bg1"/>
                 </a:solidFill>
@@ -4884,7 +4965,7 @@
               <a:t> and </a:t>
             </a:r>
             <a:r>
-              <a:rPr lang="en-US" sz="1000" dirty="0">
+              <a:rPr lang="en-US" dirty="0">
                 <a:solidFill>
                   <a:schemeClr val="accent1"/>
                 </a:solidFill>
@@ -4892,7 +4973,7 @@
               <a:t>vkWaitForFences</a:t>
             </a:r>
             <a:r>
-              <a:rPr lang="en-US" sz="1000" dirty="0">
+              <a:rPr lang="en-US" dirty="0">
                 <a:solidFill>
                   <a:srgbClr val="C00000"/>
                 </a:solidFill>
@@ -4903,7 +4984,7 @@
           <a:p>
             <a:pPr lvl="1"/>
             <a:r>
-              <a:rPr lang="en-US" sz="1000" dirty="0">
+              <a:rPr lang="en-US" dirty="0">
                 <a:solidFill>
                   <a:schemeClr val="bg1"/>
                 </a:solidFill>
@@ -4911,7 +4992,7 @@
               <a:t>Could be due to absence of memory and pipeline barriers for </a:t>
             </a:r>
             <a:r>
-              <a:rPr lang="en-US" sz="1000" dirty="0">
+              <a:rPr lang="en-US" dirty="0">
                 <a:solidFill>
                   <a:schemeClr val="accent6">
                     <a:lumMod val="60000"/>
@@ -4922,7 +5003,7 @@
               <a:t>Render Targets</a:t>
             </a:r>
             <a:r>
-              <a:rPr lang="en-US" sz="1000" dirty="0">
+              <a:rPr lang="en-US" dirty="0">
                 <a:solidFill>
                   <a:schemeClr val="bg1"/>
                 </a:solidFill>
@@ -4933,7 +5014,7 @@
           <a:p>
             <a:pPr lvl="1"/>
             <a:r>
-              <a:rPr lang="en-US" sz="1000" dirty="0">
+              <a:rPr lang="en-US" dirty="0">
                 <a:solidFill>
                   <a:schemeClr val="bg1"/>
                 </a:solidFill>
@@ -4941,7 +5022,7 @@
               <a:t>Or since it’s separated into many virtual functions this could be causing issues, since we have fixed no. of semaphores per frame, try implementing them in a single function inside the </a:t>
             </a:r>
             <a:r>
-              <a:rPr lang="en-US" sz="1000" dirty="0">
+              <a:rPr lang="en-US" dirty="0">
                 <a:solidFill>
                   <a:schemeClr val="accent3">
                     <a:lumMod val="60000"/>
@@ -4952,13 +5033,96 @@
               <a:t>VKSwapchain</a:t>
             </a:r>
             <a:r>
-              <a:rPr lang="en-US" sz="1000" dirty="0">
+              <a:rPr lang="en-US" dirty="0">
                 <a:solidFill>
                   <a:schemeClr val="bg1"/>
                 </a:solidFill>
               </a:rPr>
               <a:t> itself to make things simple and fast and have less cache misses</a:t>
             </a:r>
+          </a:p>
+          <a:p>
+            <a:pPr lvl="1"/>
+            <a:endParaRPr lang="en-US" sz="1000" dirty="0">
+              <a:solidFill>
+                <a:schemeClr val="bg1"/>
+              </a:solidFill>
+            </a:endParaRPr>
+          </a:p>
+          <a:p>
+            <a:pPr marL="0" indent="0">
+              <a:buNone/>
+            </a:pPr>
+            <a:r>
+              <a:rPr lang="en-US" sz="1700" dirty="0">
+                <a:solidFill>
+                  <a:schemeClr val="accent6">
+                    <a:lumMod val="60000"/>
+                    <a:lumOff val="40000"/>
+                  </a:schemeClr>
+                </a:solidFill>
+              </a:rPr>
+              <a:t>Solution</a:t>
+            </a:r>
+          </a:p>
+          <a:p>
+            <a:r>
+              <a:rPr lang="en-US" sz="1400" dirty="0"/>
+              <a:t>Merge submission and presentation into a single function to avoid redirection that too through virtual functions</a:t>
+            </a:r>
+          </a:p>
+          <a:p>
+            <a:r>
+              <a:rPr lang="en-US" sz="1400" dirty="0" err="1"/>
+              <a:t>VKSwapchain</a:t>
+            </a:r>
+            <a:r>
+              <a:rPr lang="en-US" sz="1400" dirty="0"/>
+              <a:t> will manage the frameSyncData ({imageReadySemaphore, renderingDoneSemaphore, </a:t>
+            </a:r>
+            <a:r>
+              <a:rPr lang="en-US" sz="1400" dirty="0" err="1"/>
+              <a:t>inFlightFence</a:t>
+            </a:r>
+            <a:r>
+              <a:rPr lang="en-US" sz="1400" dirty="0"/>
+              <a:t>} x </a:t>
+            </a:r>
+            <a:r>
+              <a:rPr lang="en-US" sz="1400" dirty="0">
+                <a:solidFill>
+                  <a:srgbClr val="7030A0"/>
+                </a:solidFill>
+              </a:rPr>
+              <a:t>MAX_SWAP_IMAGES(3)</a:t>
+            </a:r>
+            <a:r>
+              <a:rPr lang="en-US" sz="1400" dirty="0"/>
+              <a:t>)</a:t>
+            </a:r>
+          </a:p>
+          <a:p>
+            <a:r>
+              <a:rPr lang="en-US" sz="1400" dirty="0"/>
+              <a:t>Pipeline/Memory barriers will help in synchronization of pass resources and presentation only waits on </a:t>
+            </a:r>
+            <a:r>
+              <a:rPr lang="en-US" sz="1400" dirty="0">
+                <a:solidFill>
+                  <a:srgbClr val="7030A0"/>
+                </a:solidFill>
+                <a:latin typeface="Cascadia Mono" panose="020B0609020000020004" pitchFamily="49" charset="0"/>
+              </a:rPr>
+              <a:t>VK_PIPELINE_STAGE_COLOR_ATTACHMENT_OUTPUT_BIT</a:t>
+            </a:r>
+            <a:endParaRPr lang="en-US" sz="1400" dirty="0">
+              <a:solidFill>
+                <a:srgbClr val="7030A0"/>
+              </a:solidFill>
+            </a:endParaRPr>
+          </a:p>
+          <a:p>
+            <a:endParaRPr lang="en-US" sz="1500" dirty="0"/>
           </a:p>
           <a:p>
             <a:pPr marL="457177" lvl="1" indent="0">
@@ -4967,6 +5131,202 @@
             <a:endParaRPr lang="en-US" sz="1000" dirty="0">
               <a:solidFill>
                 <a:schemeClr val="bg1"/>
+              </a:solidFill>
+            </a:endParaRPr>
+          </a:p>
+        </p:txBody>
+      </p:sp>
+      <p:pic>
+        <p:nvPicPr>
+          <p:cNvPr id="5" name="Picture 4">
+            <a:extLst>
+              <a:ext uri="{FF2B5EF4-FFF2-40B4-BE49-F238E27FC236}">
+                <a16:creationId xmlns:a16="http://schemas.microsoft.com/office/drawing/2014/main" id="{9D2E9F68-9244-BC23-BB44-6846B47AE10D}"/>
+              </a:ext>
+            </a:extLst>
+          </p:cNvPr>
+          <p:cNvPicPr>
+            <a:picLocks noChangeAspect="1"/>
+          </p:cNvPicPr>
+          <p:nvPr/>
+        </p:nvPicPr>
+        <p:blipFill>
+          <a:blip r:embed="rId2"/>
+          <a:stretch>
+            <a:fillRect/>
+          </a:stretch>
+        </p:blipFill>
+        <p:spPr>
+          <a:xfrm>
+            <a:off x="1491278" y="5380218"/>
+            <a:ext cx="7171093" cy="1407471"/>
+          </a:xfrm>
+          <a:prstGeom prst="rect">
+            <a:avLst/>
+          </a:prstGeom>
+        </p:spPr>
+      </p:pic>
+      <p:sp>
+        <p:nvSpPr>
+          <p:cNvPr id="6" name="TextBox 5">
+            <a:extLst>
+              <a:ext uri="{FF2B5EF4-FFF2-40B4-BE49-F238E27FC236}">
+                <a16:creationId xmlns:a16="http://schemas.microsoft.com/office/drawing/2014/main" id="{DE840441-9B46-45BA-ED78-107447FA4C36}"/>
+              </a:ext>
+            </a:extLst>
+          </p:cNvPr>
+          <p:cNvSpPr txBox="1"/>
+          <p:nvPr/>
+        </p:nvSpPr>
+        <p:spPr>
+          <a:xfrm>
+            <a:off x="3517900" y="6526032"/>
+            <a:ext cx="3117850" cy="369332"/>
+          </a:xfrm>
+          <a:prstGeom prst="rect">
+            <a:avLst/>
+          </a:prstGeom>
+          <a:noFill/>
+        </p:spPr>
+        <p:txBody>
+          <a:bodyPr wrap="square" rtlCol="0">
+            <a:spAutoFit/>
+          </a:bodyPr>
+          <a:lstStyle/>
+          <a:p>
+            <a:pPr algn="ctr"/>
+            <a:r>
+              <a:rPr lang="en-US" dirty="0">
+                <a:solidFill>
+                  <a:schemeClr val="accent1">
+                    <a:lumMod val="40000"/>
+                    <a:lumOff val="60000"/>
+                  </a:schemeClr>
+                </a:solidFill>
+              </a:rPr>
+              <a:t>Razix Frame</a:t>
+            </a:r>
+            <a:endParaRPr lang="en-IN" dirty="0">
+              <a:solidFill>
+                <a:schemeClr val="accent1">
+                  <a:lumMod val="40000"/>
+                  <a:lumOff val="60000"/>
+                </a:schemeClr>
+              </a:solidFill>
+            </a:endParaRPr>
+          </a:p>
+        </p:txBody>
+      </p:sp>
+      <p:sp>
+        <p:nvSpPr>
+          <p:cNvPr id="7" name="TextBox 6">
+            <a:extLst>
+              <a:ext uri="{FF2B5EF4-FFF2-40B4-BE49-F238E27FC236}">
+                <a16:creationId xmlns:a16="http://schemas.microsoft.com/office/drawing/2014/main" id="{62E77515-B11F-E0F0-FFB7-E7355FA7F5C3}"/>
+              </a:ext>
+            </a:extLst>
+          </p:cNvPr>
+          <p:cNvSpPr txBox="1"/>
+          <p:nvPr/>
+        </p:nvSpPr>
+        <p:spPr>
+          <a:xfrm>
+            <a:off x="7391400" y="6372144"/>
+            <a:ext cx="1117600" cy="338554"/>
+          </a:xfrm>
+          <a:prstGeom prst="rect">
+            <a:avLst/>
+          </a:prstGeom>
+          <a:noFill/>
+        </p:spPr>
+        <p:txBody>
+          <a:bodyPr wrap="square" rtlCol="0">
+            <a:spAutoFit/>
+          </a:bodyPr>
+          <a:lstStyle/>
+          <a:p>
+            <a:r>
+              <a:rPr lang="en-US" sz="800" dirty="0">
+                <a:solidFill>
+                  <a:schemeClr val="accent3">
+                    <a:lumMod val="60000"/>
+                    <a:lumOff val="40000"/>
+                  </a:schemeClr>
+                </a:solidFill>
+              </a:rPr>
+              <a:t>Presentation is under </a:t>
+            </a:r>
+            <a:r>
+              <a:rPr lang="en-US" sz="800" i="1" dirty="0">
+                <a:solidFill>
+                  <a:schemeClr val="accent3">
+                    <a:lumMod val="60000"/>
+                    <a:lumOff val="40000"/>
+                  </a:schemeClr>
+                </a:solidFill>
+              </a:rPr>
+              <a:t>1.0ms</a:t>
+            </a:r>
+            <a:endParaRPr lang="en-IN" sz="800" i="1" dirty="0">
+              <a:solidFill>
+                <a:schemeClr val="accent3">
+                  <a:lumMod val="60000"/>
+                  <a:lumOff val="40000"/>
+                </a:schemeClr>
+              </a:solidFill>
+            </a:endParaRPr>
+          </a:p>
+        </p:txBody>
+      </p:sp>
+      <p:sp>
+        <p:nvSpPr>
+          <p:cNvPr id="8" name="Left Brace 7">
+            <a:extLst>
+              <a:ext uri="{FF2B5EF4-FFF2-40B4-BE49-F238E27FC236}">
+                <a16:creationId xmlns:a16="http://schemas.microsoft.com/office/drawing/2014/main" id="{15442EDF-7BEC-75AE-DD3E-17D3D576A752}"/>
+              </a:ext>
+            </a:extLst>
+          </p:cNvPr>
+          <p:cNvSpPr/>
+          <p:nvPr/>
+        </p:nvSpPr>
+        <p:spPr>
+          <a:xfrm rot="16200000">
+            <a:off x="7823640" y="6068750"/>
+            <a:ext cx="107075" cy="514349"/>
+          </a:xfrm>
+          <a:prstGeom prst="leftBrace">
+            <a:avLst>
+              <a:gd name="adj1" fmla="val 23901"/>
+              <a:gd name="adj2" fmla="val 50463"/>
+            </a:avLst>
+          </a:prstGeom>
+        </p:spPr>
+        <p:style>
+          <a:lnRef idx="1">
+            <a:schemeClr val="accent3"/>
+          </a:lnRef>
+          <a:fillRef idx="0">
+            <a:schemeClr val="accent3"/>
+          </a:fillRef>
+          <a:effectRef idx="0">
+            <a:schemeClr val="accent3"/>
+          </a:effectRef>
+          <a:fontRef idx="minor">
+            <a:schemeClr val="tx1"/>
+          </a:fontRef>
+        </p:style>
+        <p:txBody>
+          <a:bodyPr rtlCol="0" anchor="ctr"/>
+          <a:lstStyle/>
+          <a:p>
+            <a:pPr algn="ctr"/>
+            <a:endParaRPr lang="en-IN">
+              <a:solidFill>
+                <a:schemeClr val="accent3">
+                  <a:lumMod val="60000"/>
+                  <a:lumOff val="40000"/>
+                </a:schemeClr>
               </a:solidFill>
             </a:endParaRPr>
           </a:p>

</xml_diff>

<commit_message>
Using RGBA16F RTs instead of RGBA32F to save memory B/W;
</commit_message>
<xml_diff>
--- a/Docs/Features overview.pptx
+++ b/Docs/Features overview.pptx
@@ -10,7 +10,7 @@
     <p:sldId id="259" r:id="rId4"/>
     <p:sldId id="260" r:id="rId5"/>
     <p:sldId id="261" r:id="rId6"/>
-    <p:sldId id="262" r:id="rId7"/>
+    <p:sldId id="264" r:id="rId7"/>
     <p:sldId id="263" r:id="rId8"/>
   </p:sldIdLst>
   <p:sldSz cx="12192000" cy="6858000"/>
@@ -124,7 +124,11 @@
             <p14:sldId id="259"/>
             <p14:sldId id="260"/>
             <p14:sldId id="261"/>
-            <p14:sldId id="262"/>
+          </p14:sldIdLst>
+        </p14:section>
+        <p14:section name="Graphics Features" id="{840BAED3-5ED1-4238-B89B-07D3713A0757}">
+          <p14:sldIdLst>
+            <p14:sldId id="264"/>
           </p14:sldIdLst>
         </p14:section>
         <p14:section name="Performance Improvements" id="{245578FE-32D1-46ED-9D76-A9FD4E05A08C}">
@@ -304,7 +308,7 @@
           <a:p>
             <a:fld id="{84B6F61C-9FA5-4C35-A1D3-00EE2C15A6C0}" type="datetimeFigureOut">
               <a:rPr lang="en-IN" smtClean="0"/>
-              <a:t>02-07-2023</a:t>
+              <a:t>05-04-2024</a:t>
             </a:fld>
             <a:endParaRPr lang="en-IN"/>
           </a:p>
@@ -528,7 +532,7 @@
           <a:p>
             <a:fld id="{84B6F61C-9FA5-4C35-A1D3-00EE2C15A6C0}" type="datetimeFigureOut">
               <a:rPr lang="en-IN" smtClean="0"/>
-              <a:t>02-07-2023</a:t>
+              <a:t>05-04-2024</a:t>
             </a:fld>
             <a:endParaRPr lang="en-IN"/>
           </a:p>
@@ -752,7 +756,7 @@
           <a:p>
             <a:fld id="{84B6F61C-9FA5-4C35-A1D3-00EE2C15A6C0}" type="datetimeFigureOut">
               <a:rPr lang="en-IN" smtClean="0"/>
-              <a:t>02-07-2023</a:t>
+              <a:t>05-04-2024</a:t>
             </a:fld>
             <a:endParaRPr lang="en-IN"/>
           </a:p>
@@ -1006,7 +1010,7 @@
           <a:p>
             <a:fld id="{84B6F61C-9FA5-4C35-A1D3-00EE2C15A6C0}" type="datetimeFigureOut">
               <a:rPr lang="en-IN" smtClean="0"/>
-              <a:t>02-07-2023</a:t>
+              <a:t>05-04-2024</a:t>
             </a:fld>
             <a:endParaRPr lang="en-IN" dirty="0"/>
           </a:p>
@@ -1387,7 +1391,7 @@
           <a:p>
             <a:fld id="{84B6F61C-9FA5-4C35-A1D3-00EE2C15A6C0}" type="datetimeFigureOut">
               <a:rPr lang="en-IN" smtClean="0"/>
-              <a:t>02-07-2023</a:t>
+              <a:t>05-04-2024</a:t>
             </a:fld>
             <a:endParaRPr lang="en-IN"/>
           </a:p>
@@ -1669,7 +1673,7 @@
           <a:p>
             <a:fld id="{84B6F61C-9FA5-4C35-A1D3-00EE2C15A6C0}" type="datetimeFigureOut">
               <a:rPr lang="en-IN" smtClean="0"/>
-              <a:t>02-07-2023</a:t>
+              <a:t>05-04-2024</a:t>
             </a:fld>
             <a:endParaRPr lang="en-IN"/>
           </a:p>
@@ -2098,7 +2102,7 @@
           <a:p>
             <a:fld id="{84B6F61C-9FA5-4C35-A1D3-00EE2C15A6C0}" type="datetimeFigureOut">
               <a:rPr lang="en-IN" smtClean="0"/>
-              <a:t>02-07-2023</a:t>
+              <a:t>05-04-2024</a:t>
             </a:fld>
             <a:endParaRPr lang="en-IN" dirty="0"/>
           </a:p>
@@ -2262,7 +2266,7 @@
           <a:p>
             <a:fld id="{84B6F61C-9FA5-4C35-A1D3-00EE2C15A6C0}" type="datetimeFigureOut">
               <a:rPr lang="en-IN" smtClean="0"/>
-              <a:t>02-07-2023</a:t>
+              <a:t>05-04-2024</a:t>
             </a:fld>
             <a:endParaRPr lang="en-IN"/>
           </a:p>
@@ -2389,7 +2393,7 @@
           <a:p>
             <a:fld id="{84B6F61C-9FA5-4C35-A1D3-00EE2C15A6C0}" type="datetimeFigureOut">
               <a:rPr lang="en-IN" smtClean="0"/>
-              <a:t>02-07-2023</a:t>
+              <a:t>05-04-2024</a:t>
             </a:fld>
             <a:endParaRPr lang="en-IN"/>
           </a:p>
@@ -2716,7 +2720,7 @@
           <a:p>
             <a:fld id="{84B6F61C-9FA5-4C35-A1D3-00EE2C15A6C0}" type="datetimeFigureOut">
               <a:rPr lang="en-IN" smtClean="0"/>
-              <a:t>02-07-2023</a:t>
+              <a:t>05-04-2024</a:t>
             </a:fld>
             <a:endParaRPr lang="en-IN"/>
           </a:p>
@@ -3019,7 +3023,7 @@
           <a:p>
             <a:fld id="{84B6F61C-9FA5-4C35-A1D3-00EE2C15A6C0}" type="datetimeFigureOut">
               <a:rPr lang="en-IN" smtClean="0"/>
-              <a:t>02-07-2023</a:t>
+              <a:t>05-04-2024</a:t>
             </a:fld>
             <a:endParaRPr lang="en-IN"/>
           </a:p>
@@ -3271,7 +3275,7 @@
           <a:p>
             <a:fld id="{84B6F61C-9FA5-4C35-A1D3-00EE2C15A6C0}" type="datetimeFigureOut">
               <a:rPr lang="en-IN" smtClean="0"/>
-              <a:t>02-07-2023</a:t>
+              <a:t>05-04-2024</a:t>
             </a:fld>
             <a:endParaRPr lang="en-IN"/>
           </a:p>
@@ -4699,7 +4703,7 @@
           <p:cNvPr id="2" name="Title 1">
             <a:extLst>
               <a:ext uri="{FF2B5EF4-FFF2-40B4-BE49-F238E27FC236}">
-                <a16:creationId xmlns:a16="http://schemas.microsoft.com/office/drawing/2014/main" id="{7D180A5A-9C56-7CC7-616A-C0589550AEE7}"/>
+                <a16:creationId xmlns:a16="http://schemas.microsoft.com/office/drawing/2014/main" id="{DC614B7A-FECA-1987-4399-C7BB9962085B}"/>
               </a:ext>
             </a:extLst>
           </p:cNvPr>
@@ -4716,8 +4720,8 @@
           <a:lstStyle/>
           <a:p>
             <a:r>
-              <a:rPr lang="en-US"/>
-              <a:t>projcoords.z</a:t>
+              <a:rPr lang="en-US" dirty="0"/>
+              <a:t>FXAA + TAA</a:t>
             </a:r>
             <a:endParaRPr lang="en-IN" dirty="0"/>
           </a:p>
@@ -4725,19 +4729,17 @@
       </p:sp>
       <p:pic>
         <p:nvPicPr>
-          <p:cNvPr id="5" name="Content Placeholder 4">
-            <a:extLst>
-              <a:ext uri="{FF2B5EF4-FFF2-40B4-BE49-F238E27FC236}">
-                <a16:creationId xmlns:a16="http://schemas.microsoft.com/office/drawing/2014/main" id="{81C70317-BE96-0E40-C50F-A0C741EF9A3C}"/>
+          <p:cNvPr id="5" name="Picture 4">
+            <a:extLst>
+              <a:ext uri="{FF2B5EF4-FFF2-40B4-BE49-F238E27FC236}">
+                <a16:creationId xmlns:a16="http://schemas.microsoft.com/office/drawing/2014/main" id="{8D5DC127-26CF-084B-FED8-38E29BACF3E1}"/>
               </a:ext>
             </a:extLst>
           </p:cNvPr>
           <p:cNvPicPr>
-            <a:picLocks noGrp="1" noChangeAspect="1"/>
+            <a:picLocks noChangeAspect="1"/>
           </p:cNvPicPr>
-          <p:nvPr>
-            <p:ph idx="1"/>
-          </p:nvPr>
+          <p:nvPr/>
         </p:nvPicPr>
         <p:blipFill>
           <a:blip r:embed="rId2"/>
@@ -4747,15 +4749,298 @@
         </p:blipFill>
         <p:spPr>
           <a:xfrm>
-            <a:off x="1688035" y="1219200"/>
-            <a:ext cx="8519067" cy="4957763"/>
+            <a:off x="558933" y="1680519"/>
+            <a:ext cx="3537331" cy="2532530"/>
           </a:xfrm>
+          <a:prstGeom prst="rect">
+            <a:avLst/>
+          </a:prstGeom>
         </p:spPr>
       </p:pic>
+      <p:pic>
+        <p:nvPicPr>
+          <p:cNvPr id="7" name="Picture 6">
+            <a:extLst>
+              <a:ext uri="{FF2B5EF4-FFF2-40B4-BE49-F238E27FC236}">
+                <a16:creationId xmlns:a16="http://schemas.microsoft.com/office/drawing/2014/main" id="{5D4E1045-996D-DE80-E370-F54E37DB742F}"/>
+              </a:ext>
+            </a:extLst>
+          </p:cNvPr>
+          <p:cNvPicPr>
+            <a:picLocks noChangeAspect="1"/>
+          </p:cNvPicPr>
+          <p:nvPr/>
+        </p:nvPicPr>
+        <p:blipFill>
+          <a:blip r:embed="rId3"/>
+          <a:stretch>
+            <a:fillRect/>
+          </a:stretch>
+        </p:blipFill>
+        <p:spPr>
+          <a:xfrm>
+            <a:off x="4624528" y="2292321"/>
+            <a:ext cx="1841125" cy="1464133"/>
+          </a:xfrm>
+          <a:prstGeom prst="rect">
+            <a:avLst/>
+          </a:prstGeom>
+        </p:spPr>
+      </p:pic>
+      <p:sp>
+        <p:nvSpPr>
+          <p:cNvPr id="8" name="Oval 7">
+            <a:extLst>
+              <a:ext uri="{FF2B5EF4-FFF2-40B4-BE49-F238E27FC236}">
+                <a16:creationId xmlns:a16="http://schemas.microsoft.com/office/drawing/2014/main" id="{951A9695-DCD1-523D-CE83-B560F361D302}"/>
+              </a:ext>
+            </a:extLst>
+          </p:cNvPr>
+          <p:cNvSpPr/>
+          <p:nvPr/>
+        </p:nvSpPr>
+        <p:spPr>
+          <a:xfrm>
+            <a:off x="1915297" y="2387640"/>
+            <a:ext cx="1519881" cy="1118287"/>
+          </a:xfrm>
+          <a:prstGeom prst="ellipse">
+            <a:avLst/>
+          </a:prstGeom>
+          <a:noFill/>
+          <a:ln>
+            <a:solidFill>
+              <a:schemeClr val="tx2"/>
+            </a:solidFill>
+          </a:ln>
+        </p:spPr>
+        <p:style>
+          <a:lnRef idx="2">
+            <a:schemeClr val="accent1">
+              <a:shade val="15000"/>
+            </a:schemeClr>
+          </a:lnRef>
+          <a:fillRef idx="1">
+            <a:schemeClr val="accent1"/>
+          </a:fillRef>
+          <a:effectRef idx="0">
+            <a:schemeClr val="accent1"/>
+          </a:effectRef>
+          <a:fontRef idx="minor">
+            <a:schemeClr val="lt1"/>
+          </a:fontRef>
+        </p:style>
+        <p:txBody>
+          <a:bodyPr rtlCol="0" anchor="ctr"/>
+          <a:lstStyle/>
+          <a:p>
+            <a:pPr algn="ctr"/>
+            <a:endParaRPr lang="en-IN"/>
+          </a:p>
+        </p:txBody>
+      </p:sp>
+      <p:cxnSp>
+        <p:nvCxnSpPr>
+          <p:cNvPr id="10" name="Straight Connector 9">
+            <a:extLst>
+              <a:ext uri="{FF2B5EF4-FFF2-40B4-BE49-F238E27FC236}">
+                <a16:creationId xmlns:a16="http://schemas.microsoft.com/office/drawing/2014/main" id="{7DE133C4-29B7-8317-3873-F39C96E25BE8}"/>
+              </a:ext>
+            </a:extLst>
+          </p:cNvPr>
+          <p:cNvCxnSpPr>
+            <a:stCxn id="8" idx="0"/>
+          </p:cNvCxnSpPr>
+          <p:nvPr/>
+        </p:nvCxnSpPr>
+        <p:spPr>
+          <a:xfrm flipV="1">
+            <a:off x="2675238" y="2292321"/>
+            <a:ext cx="1949290" cy="95319"/>
+          </a:xfrm>
+          <a:prstGeom prst="line">
+            <a:avLst/>
+          </a:prstGeom>
+          <a:ln w="12700"/>
+        </p:spPr>
+        <p:style>
+          <a:lnRef idx="1">
+            <a:schemeClr val="dk1"/>
+          </a:lnRef>
+          <a:fillRef idx="0">
+            <a:schemeClr val="dk1"/>
+          </a:fillRef>
+          <a:effectRef idx="0">
+            <a:schemeClr val="dk1"/>
+          </a:effectRef>
+          <a:fontRef idx="minor">
+            <a:schemeClr val="tx1"/>
+          </a:fontRef>
+        </p:style>
+      </p:cxnSp>
+      <p:cxnSp>
+        <p:nvCxnSpPr>
+          <p:cNvPr id="11" name="Straight Connector 10">
+            <a:extLst>
+              <a:ext uri="{FF2B5EF4-FFF2-40B4-BE49-F238E27FC236}">
+                <a16:creationId xmlns:a16="http://schemas.microsoft.com/office/drawing/2014/main" id="{3D98AE87-5708-2537-FDAE-8328E2EB8156}"/>
+              </a:ext>
+            </a:extLst>
+          </p:cNvPr>
+          <p:cNvCxnSpPr>
+            <a:cxnSpLocks/>
+            <a:stCxn id="8" idx="4"/>
+          </p:cNvCxnSpPr>
+          <p:nvPr/>
+        </p:nvCxnSpPr>
+        <p:spPr>
+          <a:xfrm>
+            <a:off x="2675238" y="3505927"/>
+            <a:ext cx="1949290" cy="247447"/>
+          </a:xfrm>
+          <a:prstGeom prst="line">
+            <a:avLst/>
+          </a:prstGeom>
+          <a:ln w="12700"/>
+        </p:spPr>
+        <p:style>
+          <a:lnRef idx="1">
+            <a:schemeClr val="dk1"/>
+          </a:lnRef>
+          <a:fillRef idx="0">
+            <a:schemeClr val="dk1"/>
+          </a:fillRef>
+          <a:effectRef idx="0">
+            <a:schemeClr val="dk1"/>
+          </a:effectRef>
+          <a:fontRef idx="minor">
+            <a:schemeClr val="tx1"/>
+          </a:fontRef>
+        </p:style>
+      </p:cxnSp>
+      <p:sp>
+        <p:nvSpPr>
+          <p:cNvPr id="14" name="TextBox 13">
+            <a:extLst>
+              <a:ext uri="{FF2B5EF4-FFF2-40B4-BE49-F238E27FC236}">
+                <a16:creationId xmlns:a16="http://schemas.microsoft.com/office/drawing/2014/main" id="{E2FD9D4A-C5E4-95F1-635F-29099D2A1E13}"/>
+              </a:ext>
+            </a:extLst>
+          </p:cNvPr>
+          <p:cNvSpPr txBox="1"/>
+          <p:nvPr/>
+        </p:nvSpPr>
+        <p:spPr>
+          <a:xfrm>
+            <a:off x="5103130" y="4028383"/>
+            <a:ext cx="883920" cy="369332"/>
+          </a:xfrm>
+          <a:prstGeom prst="rect">
+            <a:avLst/>
+          </a:prstGeom>
+          <a:noFill/>
+        </p:spPr>
+        <p:txBody>
+          <a:bodyPr wrap="square" rtlCol="0">
+            <a:spAutoFit/>
+          </a:bodyPr>
+          <a:lstStyle/>
+          <a:p>
+            <a:r>
+              <a:rPr lang="en-US" dirty="0">
+                <a:solidFill>
+                  <a:schemeClr val="bg1"/>
+                </a:solidFill>
+              </a:rPr>
+              <a:t>No AA</a:t>
+            </a:r>
+            <a:endParaRPr lang="en-IN" dirty="0">
+              <a:solidFill>
+                <a:schemeClr val="bg1"/>
+              </a:solidFill>
+            </a:endParaRPr>
+          </a:p>
+        </p:txBody>
+      </p:sp>
+      <p:pic>
+        <p:nvPicPr>
+          <p:cNvPr id="16" name="Picture 15">
+            <a:extLst>
+              <a:ext uri="{FF2B5EF4-FFF2-40B4-BE49-F238E27FC236}">
+                <a16:creationId xmlns:a16="http://schemas.microsoft.com/office/drawing/2014/main" id="{E450DE86-F790-F749-F537-AE8BACC11C06}"/>
+              </a:ext>
+            </a:extLst>
+          </p:cNvPr>
+          <p:cNvPicPr>
+            <a:picLocks noChangeAspect="1"/>
+          </p:cNvPicPr>
+          <p:nvPr/>
+        </p:nvPicPr>
+        <p:blipFill>
+          <a:blip r:embed="rId4"/>
+          <a:stretch>
+            <a:fillRect/>
+          </a:stretch>
+        </p:blipFill>
+        <p:spPr>
+          <a:xfrm>
+            <a:off x="7504888" y="2292574"/>
+            <a:ext cx="2203423" cy="1463626"/>
+          </a:xfrm>
+          <a:prstGeom prst="rect">
+            <a:avLst/>
+          </a:prstGeom>
+        </p:spPr>
+      </p:pic>
+      <p:sp>
+        <p:nvSpPr>
+          <p:cNvPr id="17" name="TextBox 16">
+            <a:extLst>
+              <a:ext uri="{FF2B5EF4-FFF2-40B4-BE49-F238E27FC236}">
+                <a16:creationId xmlns:a16="http://schemas.microsoft.com/office/drawing/2014/main" id="{ED4EDAB3-0185-DB18-744D-2AC7399553D2}"/>
+              </a:ext>
+            </a:extLst>
+          </p:cNvPr>
+          <p:cNvSpPr txBox="1"/>
+          <p:nvPr/>
+        </p:nvSpPr>
+        <p:spPr>
+          <a:xfrm>
+            <a:off x="8164639" y="4028383"/>
+            <a:ext cx="883920" cy="369332"/>
+          </a:xfrm>
+          <a:prstGeom prst="rect">
+            <a:avLst/>
+          </a:prstGeom>
+          <a:noFill/>
+        </p:spPr>
+        <p:txBody>
+          <a:bodyPr wrap="square" rtlCol="0">
+            <a:spAutoFit/>
+          </a:bodyPr>
+          <a:lstStyle/>
+          <a:p>
+            <a:pPr algn="ctr"/>
+            <a:r>
+              <a:rPr lang="en-US" dirty="0">
+                <a:solidFill>
+                  <a:schemeClr val="bg1"/>
+                </a:solidFill>
+              </a:rPr>
+              <a:t>FXAA</a:t>
+            </a:r>
+            <a:endParaRPr lang="en-IN" dirty="0">
+              <a:solidFill>
+                <a:schemeClr val="bg1"/>
+              </a:solidFill>
+            </a:endParaRPr>
+          </a:p>
+        </p:txBody>
+      </p:sp>
     </p:spTree>
     <p:extLst>
       <p:ext uri="{BB962C8B-B14F-4D97-AF65-F5344CB8AC3E}">
-        <p14:creationId xmlns:p14="http://schemas.microsoft.com/office/powerpoint/2010/main" val="3039434187"/>
+        <p14:creationId xmlns:p14="http://schemas.microsoft.com/office/powerpoint/2010/main" val="3966651940"/>
       </p:ext>
     </p:extLst>
   </p:cSld>
@@ -5158,12 +5443,13 @@
         </p:blipFill>
         <p:spPr>
           <a:xfrm>
-            <a:off x="1491278" y="5380218"/>
+            <a:off x="2146559" y="5298381"/>
             <a:ext cx="7171093" cy="1407471"/>
           </a:xfrm>
           <a:prstGeom prst="rect">
             <a:avLst/>
           </a:prstGeom>
+          <a:effectLst/>
         </p:spPr>
       </p:pic>
       <p:sp>
@@ -5180,7 +5466,7 @@
         </p:nvSpPr>
         <p:spPr>
           <a:xfrm>
-            <a:off x="3517900" y="6526032"/>
+            <a:off x="4113410" y="6396286"/>
             <a:ext cx="3117850" cy="369332"/>
           </a:xfrm>
           <a:prstGeom prst="rect">
@@ -5231,7 +5517,7 @@
         </p:nvSpPr>
         <p:spPr>
           <a:xfrm>
-            <a:off x="7391400" y="6372144"/>
+            <a:off x="8033951" y="6242398"/>
             <a:ext cx="1117600" cy="338554"/>
           </a:xfrm>
           <a:prstGeom prst="rect">
@@ -5292,7 +5578,7 @@
         </p:nvSpPr>
         <p:spPr>
           <a:xfrm rot="16200000">
-            <a:off x="7823640" y="6068750"/>
+            <a:off x="8466191" y="5939004"/>
             <a:ext cx="107075" cy="514349"/>
           </a:xfrm>
           <a:prstGeom prst="leftBrace">

</xml_diff>

<commit_message>
[WIP] Base for RZWorld and RZSceneview structs;
</commit_message>
<xml_diff>
--- a/Docs/Features overview.pptx
+++ b/Docs/Features overview.pptx
@@ -243,7 +243,7 @@
           <a:p>
             <a:fld id="{3F16BF55-C0A5-4A93-9892-A2EE55AC4C70}" type="datetimeFigureOut">
               <a:rPr lang="en-IN" smtClean="0"/>
-              <a:t>27-04-2024</a:t>
+              <a:t>28-04-2024</a:t>
             </a:fld>
             <a:endParaRPr lang="en-IN"/>
           </a:p>
@@ -678,7 +678,7 @@
           <a:p>
             <a:fld id="{84B6F61C-9FA5-4C35-A1D3-00EE2C15A6C0}" type="datetimeFigureOut">
               <a:rPr lang="en-IN" smtClean="0"/>
-              <a:t>27-04-2024</a:t>
+              <a:t>28-04-2024</a:t>
             </a:fld>
             <a:endParaRPr lang="en-IN"/>
           </a:p>
@@ -907,7 +907,7 @@
           <a:p>
             <a:fld id="{84B6F61C-9FA5-4C35-A1D3-00EE2C15A6C0}" type="datetimeFigureOut">
               <a:rPr lang="en-IN" smtClean="0"/>
-              <a:t>27-04-2024</a:t>
+              <a:t>28-04-2024</a:t>
             </a:fld>
             <a:endParaRPr lang="en-IN"/>
           </a:p>
@@ -1131,7 +1131,7 @@
           <a:p>
             <a:fld id="{84B6F61C-9FA5-4C35-A1D3-00EE2C15A6C0}" type="datetimeFigureOut">
               <a:rPr lang="en-IN" smtClean="0"/>
-              <a:t>27-04-2024</a:t>
+              <a:t>28-04-2024</a:t>
             </a:fld>
             <a:endParaRPr lang="en-IN"/>
           </a:p>
@@ -1401,7 +1401,7 @@
           <a:p>
             <a:fld id="{84B6F61C-9FA5-4C35-A1D3-00EE2C15A6C0}" type="datetimeFigureOut">
               <a:rPr lang="en-IN" smtClean="0"/>
-              <a:t>27-04-2024</a:t>
+              <a:t>28-04-2024</a:t>
             </a:fld>
             <a:endParaRPr lang="en-IN" dirty="0"/>
           </a:p>
@@ -1788,7 +1788,7 @@
           <a:p>
             <a:fld id="{84B6F61C-9FA5-4C35-A1D3-00EE2C15A6C0}" type="datetimeFigureOut">
               <a:rPr lang="en-IN" smtClean="0"/>
-              <a:t>27-04-2024</a:t>
+              <a:t>28-04-2024</a:t>
             </a:fld>
             <a:endParaRPr lang="en-IN"/>
           </a:p>
@@ -2155,7 +2155,7 @@
           <a:p>
             <a:fld id="{84B6F61C-9FA5-4C35-A1D3-00EE2C15A6C0}" type="datetimeFigureOut">
               <a:rPr lang="en-IN" smtClean="0"/>
-              <a:t>27-04-2024</a:t>
+              <a:t>28-04-2024</a:t>
             </a:fld>
             <a:endParaRPr lang="en-IN"/>
           </a:p>
@@ -2584,7 +2584,7 @@
           <a:p>
             <a:fld id="{84B6F61C-9FA5-4C35-A1D3-00EE2C15A6C0}" type="datetimeFigureOut">
               <a:rPr lang="en-IN" smtClean="0"/>
-              <a:t>27-04-2024</a:t>
+              <a:t>28-04-2024</a:t>
             </a:fld>
             <a:endParaRPr lang="en-IN" dirty="0"/>
           </a:p>
@@ -2748,7 +2748,7 @@
           <a:p>
             <a:fld id="{84B6F61C-9FA5-4C35-A1D3-00EE2C15A6C0}" type="datetimeFigureOut">
               <a:rPr lang="en-IN" smtClean="0"/>
-              <a:t>27-04-2024</a:t>
+              <a:t>28-04-2024</a:t>
             </a:fld>
             <a:endParaRPr lang="en-IN"/>
           </a:p>
@@ -2880,7 +2880,7 @@
           <a:p>
             <a:fld id="{84B6F61C-9FA5-4C35-A1D3-00EE2C15A6C0}" type="datetimeFigureOut">
               <a:rPr lang="en-IN" smtClean="0"/>
-              <a:t>27-04-2024</a:t>
+              <a:t>28-04-2024</a:t>
             </a:fld>
             <a:endParaRPr lang="en-IN"/>
           </a:p>
@@ -3212,7 +3212,7 @@
           <a:p>
             <a:fld id="{84B6F61C-9FA5-4C35-A1D3-00EE2C15A6C0}" type="datetimeFigureOut">
               <a:rPr lang="en-IN" smtClean="0"/>
-              <a:t>27-04-2024</a:t>
+              <a:t>28-04-2024</a:t>
             </a:fld>
             <a:endParaRPr lang="en-IN"/>
           </a:p>
@@ -3515,7 +3515,7 @@
           <a:p>
             <a:fld id="{84B6F61C-9FA5-4C35-A1D3-00EE2C15A6C0}" type="datetimeFigureOut">
               <a:rPr lang="en-IN" smtClean="0"/>
-              <a:t>27-04-2024</a:t>
+              <a:t>28-04-2024</a:t>
             </a:fld>
             <a:endParaRPr lang="en-IN"/>
           </a:p>
@@ -3767,7 +3767,7 @@
           <a:p>
             <a:fld id="{84B6F61C-9FA5-4C35-A1D3-00EE2C15A6C0}" type="datetimeFigureOut">
               <a:rPr lang="en-IN" smtClean="0"/>
-              <a:t>27-04-2024</a:t>
+              <a:t>28-04-2024</a:t>
             </a:fld>
             <a:endParaRPr lang="en-IN"/>
           </a:p>
@@ -4270,7 +4270,7 @@
             <a:r>
               <a:rPr lang="en-US" sz="1400" dirty="0">
                 <a:solidFill>
-                  <a:schemeClr val="accent1"/>
+                  <a:srgbClr val="FFB556"/>
                 </a:solidFill>
                 <a:latin typeface="Fira Code" panose="020B0809050000020004" pitchFamily="49" charset="0"/>
                 <a:ea typeface="Fira Code" panose="020B0809050000020004" pitchFamily="49" charset="0"/>
@@ -5306,7 +5306,7 @@
             <a:r>
               <a:rPr lang="en-IN" dirty="0">
                 <a:solidFill>
-                  <a:schemeClr val="accent1"/>
+                  <a:srgbClr val="FFB556"/>
                 </a:solidFill>
               </a:rPr>
               <a:t>WorldRenderer</a:t>
@@ -5349,7 +5349,9 @@
             <a:r>
               <a:rPr lang="en-IN" dirty="0">
                 <a:solidFill>
-                  <a:schemeClr val="accent1"/>
+                  <a:schemeClr val="accent6">
+                    <a:lumMod val="75000"/>
+                  </a:schemeClr>
                 </a:solidFill>
               </a:rPr>
               <a:t>C++ lambdas </a:t>
@@ -6803,47 +6805,7 @@
                 <a:latin typeface="Courier New" panose="02070309020205020404" pitchFamily="49" charset="0"/>
                 <a:cs typeface="Courier New" panose="02070309020205020404" pitchFamily="49" charset="0"/>
               </a:rPr>
-              <a:t>Update (</a:t>
-            </a:r>
-            <a:r>
-              <a:rPr lang="en-IN" sz="1000" dirty="0" err="1">
-                <a:solidFill>
-                  <a:schemeClr val="bg1"/>
-                </a:solidFill>
-                <a:latin typeface="Courier New" panose="02070309020205020404" pitchFamily="49" charset="0"/>
-                <a:cs typeface="Courier New" panose="02070309020205020404" pitchFamily="49" charset="0"/>
-              </a:rPr>
-              <a:t>RZScene</a:t>
-            </a:r>
-            <a:r>
-              <a:rPr lang="en-IN" sz="1000" dirty="0">
-                <a:solidFill>
-                  <a:schemeClr val="bg1"/>
-                </a:solidFill>
-                <a:latin typeface="Courier New" panose="02070309020205020404" pitchFamily="49" charset="0"/>
-                <a:cs typeface="Courier New" panose="02070309020205020404" pitchFamily="49" charset="0"/>
-              </a:rPr>
-              <a:t>*, </a:t>
-            </a:r>
-            <a:r>
-              <a:rPr lang="en-IN" sz="1000" dirty="0" err="1">
-                <a:solidFill>
-                  <a:schemeClr val="bg1"/>
-                </a:solidFill>
-                <a:latin typeface="Courier New" panose="02070309020205020404" pitchFamily="49" charset="0"/>
-                <a:cs typeface="Courier New" panose="02070309020205020404" pitchFamily="49" charset="0"/>
-              </a:rPr>
-              <a:t>CmdBuff</a:t>
-            </a:r>
-            <a:r>
-              <a:rPr lang="en-IN" sz="1000" dirty="0">
-                <a:solidFill>
-                  <a:schemeClr val="bg1"/>
-                </a:solidFill>
-                <a:latin typeface="Courier New" panose="02070309020205020404" pitchFamily="49" charset="0"/>
-                <a:cs typeface="Courier New" panose="02070309020205020404" pitchFamily="49" charset="0"/>
-              </a:rPr>
-              <a:t>)</a:t>
+              <a:t>Update (RZScene*, CmdBuff)</a:t>
             </a:r>
           </a:p>
         </p:txBody>
@@ -10354,7 +10316,7 @@
         </p:nvSpPr>
         <p:spPr>
           <a:xfrm>
-            <a:off x="474306" y="3364493"/>
+            <a:off x="3948939" y="3595326"/>
             <a:ext cx="4294121" cy="461665"/>
           </a:xfrm>
           <a:prstGeom prst="rect">
@@ -10531,31 +10493,7 @@
                 <a:cs typeface="Calibri Light" panose="020F0302020204030204" pitchFamily="34" charset="0"/>
                 <a:hlinkClick r:id="rId4"/>
               </a:rPr>
-              <a:t>https://docs.unrealengine.com/4.27/en</a:t>
-            </a:r>
-            <a:r>
-              <a:rPr lang="en-IN" sz="1200" dirty="0">
-                <a:solidFill>
-                  <a:schemeClr val="bg1"/>
-                </a:solidFill>
-                <a:latin typeface="Calibri Light" panose="020F0302020204030204" pitchFamily="34" charset="0"/>
-                <a:ea typeface="Calibri Light" panose="020F0302020204030204" pitchFamily="34" charset="0"/>
-                <a:cs typeface="Calibri Light" panose="020F0302020204030204" pitchFamily="34" charset="0"/>
-                <a:hlinkClick r:id="rId4"/>
-              </a:rPr>
-              <a:t>-</a:t>
-            </a:r>
-            <a:r>
-              <a:rPr lang="en-IN" sz="1200" dirty="0">
-                <a:solidFill>
-                  <a:schemeClr val="bg1"/>
-                </a:solidFill>
-                <a:latin typeface="Calibri Light" panose="020F0302020204030204" pitchFamily="34" charset="0"/>
-                <a:ea typeface="Calibri Light" panose="020F0302020204030204" pitchFamily="34" charset="0"/>
-                <a:cs typeface="Calibri Light" panose="020F0302020204030204" pitchFamily="34" charset="0"/>
-                <a:hlinkClick r:id="rId4"/>
-              </a:rPr>
-              <a:t>US/RenderingAndGraphics/PostProcessEffects/ColorGrading/</a:t>
+              <a:t>https://docs.unrealengine.com/4.27/en-US/RenderingAndGraphics/PostProcessEffects/ColorGrading/</a:t>
             </a:r>
             <a:endParaRPr lang="en-IN" sz="1200" dirty="0">
               <a:solidFill>

</xml_diff>

<commit_message>
[❤️ Diana; Graphics] Renamed High Level Renderer to Diana; Cause I love princess diana;
</commit_message>
<xml_diff>
--- a/Docs/Features overview.pptx
+++ b/Docs/Features overview.pptx
@@ -243,7 +243,7 @@
           <a:p>
             <a:fld id="{3F16BF55-C0A5-4A93-9892-A2EE55AC4C70}" type="datetimeFigureOut">
               <a:rPr lang="en-IN" smtClean="0"/>
-              <a:t>28-04-2024</a:t>
+              <a:t>29-04-2024</a:t>
             </a:fld>
             <a:endParaRPr lang="en-IN"/>
           </a:p>
@@ -678,7 +678,7 @@
           <a:p>
             <a:fld id="{84B6F61C-9FA5-4C35-A1D3-00EE2C15A6C0}" type="datetimeFigureOut">
               <a:rPr lang="en-IN" smtClean="0"/>
-              <a:t>28-04-2024</a:t>
+              <a:t>29-04-2024</a:t>
             </a:fld>
             <a:endParaRPr lang="en-IN"/>
           </a:p>
@@ -907,7 +907,7 @@
           <a:p>
             <a:fld id="{84B6F61C-9FA5-4C35-A1D3-00EE2C15A6C0}" type="datetimeFigureOut">
               <a:rPr lang="en-IN" smtClean="0"/>
-              <a:t>28-04-2024</a:t>
+              <a:t>29-04-2024</a:t>
             </a:fld>
             <a:endParaRPr lang="en-IN"/>
           </a:p>
@@ -1131,7 +1131,7 @@
           <a:p>
             <a:fld id="{84B6F61C-9FA5-4C35-A1D3-00EE2C15A6C0}" type="datetimeFigureOut">
               <a:rPr lang="en-IN" smtClean="0"/>
-              <a:t>28-04-2024</a:t>
+              <a:t>29-04-2024</a:t>
             </a:fld>
             <a:endParaRPr lang="en-IN"/>
           </a:p>
@@ -1401,7 +1401,7 @@
           <a:p>
             <a:fld id="{84B6F61C-9FA5-4C35-A1D3-00EE2C15A6C0}" type="datetimeFigureOut">
               <a:rPr lang="en-IN" smtClean="0"/>
-              <a:t>28-04-2024</a:t>
+              <a:t>29-04-2024</a:t>
             </a:fld>
             <a:endParaRPr lang="en-IN" dirty="0"/>
           </a:p>
@@ -1788,7 +1788,7 @@
           <a:p>
             <a:fld id="{84B6F61C-9FA5-4C35-A1D3-00EE2C15A6C0}" type="datetimeFigureOut">
               <a:rPr lang="en-IN" smtClean="0"/>
-              <a:t>28-04-2024</a:t>
+              <a:t>29-04-2024</a:t>
             </a:fld>
             <a:endParaRPr lang="en-IN"/>
           </a:p>
@@ -2155,7 +2155,7 @@
           <a:p>
             <a:fld id="{84B6F61C-9FA5-4C35-A1D3-00EE2C15A6C0}" type="datetimeFigureOut">
               <a:rPr lang="en-IN" smtClean="0"/>
-              <a:t>28-04-2024</a:t>
+              <a:t>29-04-2024</a:t>
             </a:fld>
             <a:endParaRPr lang="en-IN"/>
           </a:p>
@@ -2584,7 +2584,7 @@
           <a:p>
             <a:fld id="{84B6F61C-9FA5-4C35-A1D3-00EE2C15A6C0}" type="datetimeFigureOut">
               <a:rPr lang="en-IN" smtClean="0"/>
-              <a:t>28-04-2024</a:t>
+              <a:t>29-04-2024</a:t>
             </a:fld>
             <a:endParaRPr lang="en-IN" dirty="0"/>
           </a:p>
@@ -2748,7 +2748,7 @@
           <a:p>
             <a:fld id="{84B6F61C-9FA5-4C35-A1D3-00EE2C15A6C0}" type="datetimeFigureOut">
               <a:rPr lang="en-IN" smtClean="0"/>
-              <a:t>28-04-2024</a:t>
+              <a:t>29-04-2024</a:t>
             </a:fld>
             <a:endParaRPr lang="en-IN"/>
           </a:p>
@@ -2880,7 +2880,7 @@
           <a:p>
             <a:fld id="{84B6F61C-9FA5-4C35-A1D3-00EE2C15A6C0}" type="datetimeFigureOut">
               <a:rPr lang="en-IN" smtClean="0"/>
-              <a:t>28-04-2024</a:t>
+              <a:t>29-04-2024</a:t>
             </a:fld>
             <a:endParaRPr lang="en-IN"/>
           </a:p>
@@ -3212,7 +3212,7 @@
           <a:p>
             <a:fld id="{84B6F61C-9FA5-4C35-A1D3-00EE2C15A6C0}" type="datetimeFigureOut">
               <a:rPr lang="en-IN" smtClean="0"/>
-              <a:t>28-04-2024</a:t>
+              <a:t>29-04-2024</a:t>
             </a:fld>
             <a:endParaRPr lang="en-IN"/>
           </a:p>
@@ -3515,7 +3515,7 @@
           <a:p>
             <a:fld id="{84B6F61C-9FA5-4C35-A1D3-00EE2C15A6C0}" type="datetimeFigureOut">
               <a:rPr lang="en-IN" smtClean="0"/>
-              <a:t>28-04-2024</a:t>
+              <a:t>29-04-2024</a:t>
             </a:fld>
             <a:endParaRPr lang="en-IN"/>
           </a:p>
@@ -3767,7 +3767,7 @@
           <a:p>
             <a:fld id="{84B6F61C-9FA5-4C35-A1D3-00EE2C15A6C0}" type="datetimeFigureOut">
               <a:rPr lang="en-IN" smtClean="0"/>
-              <a:t>28-04-2024</a:t>
+              <a:t>29-04-2024</a:t>
             </a:fld>
             <a:endParaRPr lang="en-IN"/>
           </a:p>
@@ -7335,7 +7335,7 @@
                 <a:ea typeface="Calibri Light" panose="020F0302020204030204" pitchFamily="34" charset="0"/>
                 <a:cs typeface="Courier New" panose="02070309020205020404" pitchFamily="49" charset="0"/>
               </a:rPr>
-              <a:t>Pompeius::BuildDrawables(RZWorld::meshes/decals)</a:t>
+              <a:t>Diana::BuildDrawables(RZWorld::meshes/decals)</a:t>
             </a:r>
             <a:endParaRPr lang="en-IN" sz="800" dirty="0">
               <a:solidFill>
@@ -7447,7 +7447,7 @@
                 <a:ea typeface="Calibri Light" panose="020F0302020204030204" pitchFamily="34" charset="0"/>
                 <a:cs typeface="Courier New" panose="02070309020205020404" pitchFamily="49" charset="0"/>
               </a:rPr>
-              <a:t>Pompeius::BuildBatches(Drawables*) </a:t>
+              <a:t>Diana::BuildBatches(Drawables*) </a:t>
             </a:r>
             <a:endParaRPr lang="en-IN" sz="800" dirty="0">
               <a:solidFill>
@@ -9053,7 +9053,7 @@
                   <a:srgbClr val="FFFF00"/>
                 </a:highlight>
               </a:rPr>
-              <a:t>Pompeius</a:t>
+              <a:t>Diana</a:t>
             </a:r>
             <a:r>
               <a:rPr lang="en-US" sz="1000" dirty="0">
@@ -9069,12 +9069,26 @@
                   <a:schemeClr val="tx1"/>
                 </a:solidFill>
               </a:rPr>
-              <a:t>High Level Renderer for Scene to RHI data conversion for Razix Engine.</a:t>
-            </a:r>
-            <a:endParaRPr lang="en-IN" sz="1000" dirty="0">
+              <a:t>High Level Renderer for Scene to RHI data conversion for Razix Engine. </a:t>
+            </a:r>
+            <a:r>
+              <a:rPr lang="en-US" sz="1000" i="1" dirty="0">
+                <a:solidFill>
+                  <a:schemeClr val="tx1"/>
+                </a:solidFill>
+                <a:latin typeface="Calibri Light" panose="020F0302020204030204" pitchFamily="34" charset="0"/>
+                <a:ea typeface="Calibri Light" panose="020F0302020204030204" pitchFamily="34" charset="0"/>
+                <a:cs typeface="Calibri Light" panose="020F0302020204030204" pitchFamily="34" charset="0"/>
+              </a:rPr>
+              <a:t>Named after princess Diana.</a:t>
+            </a:r>
+            <a:endParaRPr lang="en-IN" sz="1000" i="1" dirty="0">
               <a:solidFill>
                 <a:schemeClr val="tx1"/>
               </a:solidFill>
+              <a:latin typeface="Calibri Light" panose="020F0302020204030204" pitchFamily="34" charset="0"/>
+              <a:ea typeface="Calibri Light" panose="020F0302020204030204" pitchFamily="34" charset="0"/>
+              <a:cs typeface="Calibri Light" panose="020F0302020204030204" pitchFamily="34" charset="0"/>
             </a:endParaRPr>
           </a:p>
         </p:txBody>

</xml_diff>

<commit_message>
using bitshift for multiplication since better perf;
</commit_message>
<xml_diff>
--- a/Docs/Features overview.pptx
+++ b/Docs/Features overview.pptx
@@ -149,6 +149,9 @@
             <p14:sldId id="263"/>
           </p14:sldIdLst>
         </p14:section>
+        <p14:section name="Appendix" id="{23B43516-7304-48D8-B7D5-D2E67884751B}">
+          <p14:sldIdLst/>
+        </p14:section>
       </p14:sectionLst>
     </p:ext>
     <p:ext uri="{EFAFB233-063F-42B5-8137-9DF3F51BA10A}">
@@ -243,7 +246,7 @@
           <a:p>
             <a:fld id="{3F16BF55-C0A5-4A93-9892-A2EE55AC4C70}" type="datetimeFigureOut">
               <a:rPr lang="en-IN" smtClean="0"/>
-              <a:t>29-04-2024</a:t>
+              <a:t>05-06-2024</a:t>
             </a:fld>
             <a:endParaRPr lang="en-IN"/>
           </a:p>
@@ -678,7 +681,7 @@
           <a:p>
             <a:fld id="{84B6F61C-9FA5-4C35-A1D3-00EE2C15A6C0}" type="datetimeFigureOut">
               <a:rPr lang="en-IN" smtClean="0"/>
-              <a:t>29-04-2024</a:t>
+              <a:t>05-06-2024</a:t>
             </a:fld>
             <a:endParaRPr lang="en-IN"/>
           </a:p>
@@ -907,7 +910,7 @@
           <a:p>
             <a:fld id="{84B6F61C-9FA5-4C35-A1D3-00EE2C15A6C0}" type="datetimeFigureOut">
               <a:rPr lang="en-IN" smtClean="0"/>
-              <a:t>29-04-2024</a:t>
+              <a:t>05-06-2024</a:t>
             </a:fld>
             <a:endParaRPr lang="en-IN"/>
           </a:p>
@@ -1131,7 +1134,7 @@
           <a:p>
             <a:fld id="{84B6F61C-9FA5-4C35-A1D3-00EE2C15A6C0}" type="datetimeFigureOut">
               <a:rPr lang="en-IN" smtClean="0"/>
-              <a:t>29-04-2024</a:t>
+              <a:t>05-06-2024</a:t>
             </a:fld>
             <a:endParaRPr lang="en-IN"/>
           </a:p>
@@ -1401,7 +1404,7 @@
           <a:p>
             <a:fld id="{84B6F61C-9FA5-4C35-A1D3-00EE2C15A6C0}" type="datetimeFigureOut">
               <a:rPr lang="en-IN" smtClean="0"/>
-              <a:t>29-04-2024</a:t>
+              <a:t>05-06-2024</a:t>
             </a:fld>
             <a:endParaRPr lang="en-IN" dirty="0"/>
           </a:p>
@@ -1788,7 +1791,7 @@
           <a:p>
             <a:fld id="{84B6F61C-9FA5-4C35-A1D3-00EE2C15A6C0}" type="datetimeFigureOut">
               <a:rPr lang="en-IN" smtClean="0"/>
-              <a:t>29-04-2024</a:t>
+              <a:t>05-06-2024</a:t>
             </a:fld>
             <a:endParaRPr lang="en-IN"/>
           </a:p>
@@ -2155,7 +2158,7 @@
           <a:p>
             <a:fld id="{84B6F61C-9FA5-4C35-A1D3-00EE2C15A6C0}" type="datetimeFigureOut">
               <a:rPr lang="en-IN" smtClean="0"/>
-              <a:t>29-04-2024</a:t>
+              <a:t>05-06-2024</a:t>
             </a:fld>
             <a:endParaRPr lang="en-IN"/>
           </a:p>
@@ -2584,7 +2587,7 @@
           <a:p>
             <a:fld id="{84B6F61C-9FA5-4C35-A1D3-00EE2C15A6C0}" type="datetimeFigureOut">
               <a:rPr lang="en-IN" smtClean="0"/>
-              <a:t>29-04-2024</a:t>
+              <a:t>05-06-2024</a:t>
             </a:fld>
             <a:endParaRPr lang="en-IN" dirty="0"/>
           </a:p>
@@ -2748,7 +2751,7 @@
           <a:p>
             <a:fld id="{84B6F61C-9FA5-4C35-A1D3-00EE2C15A6C0}" type="datetimeFigureOut">
               <a:rPr lang="en-IN" smtClean="0"/>
-              <a:t>29-04-2024</a:t>
+              <a:t>05-06-2024</a:t>
             </a:fld>
             <a:endParaRPr lang="en-IN"/>
           </a:p>
@@ -2880,7 +2883,7 @@
           <a:p>
             <a:fld id="{84B6F61C-9FA5-4C35-A1D3-00EE2C15A6C0}" type="datetimeFigureOut">
               <a:rPr lang="en-IN" smtClean="0"/>
-              <a:t>29-04-2024</a:t>
+              <a:t>05-06-2024</a:t>
             </a:fld>
             <a:endParaRPr lang="en-IN"/>
           </a:p>
@@ -3212,7 +3215,7 @@
           <a:p>
             <a:fld id="{84B6F61C-9FA5-4C35-A1D3-00EE2C15A6C0}" type="datetimeFigureOut">
               <a:rPr lang="en-IN" smtClean="0"/>
-              <a:t>29-04-2024</a:t>
+              <a:t>05-06-2024</a:t>
             </a:fld>
             <a:endParaRPr lang="en-IN"/>
           </a:p>
@@ -3515,7 +3518,7 @@
           <a:p>
             <a:fld id="{84B6F61C-9FA5-4C35-A1D3-00EE2C15A6C0}" type="datetimeFigureOut">
               <a:rPr lang="en-IN" smtClean="0"/>
-              <a:t>29-04-2024</a:t>
+              <a:t>05-06-2024</a:t>
             </a:fld>
             <a:endParaRPr lang="en-IN"/>
           </a:p>
@@ -3767,7 +3770,7 @@
           <a:p>
             <a:fld id="{84B6F61C-9FA5-4C35-A1D3-00EE2C15A6C0}" type="datetimeFigureOut">
               <a:rPr lang="en-IN" smtClean="0"/>
-              <a:t>29-04-2024</a:t>
+              <a:t>05-06-2024</a:t>
             </a:fld>
             <a:endParaRPr lang="en-IN"/>
           </a:p>
@@ -4802,21 +4805,21 @@
             <a:r>
               <a:rPr lang="en-US" dirty="0">
                 <a:solidFill>
-                  <a:schemeClr val="accent1">
-                    <a:lumMod val="40000"/>
-                    <a:lumOff val="60000"/>
-                  </a:schemeClr>
-                </a:solidFill>
+                  <a:srgbClr val="FF0000"/>
+                </a:solidFill>
+                <a:highlight>
+                  <a:srgbClr val="FFFF00"/>
+                </a:highlight>
               </a:rPr>
               <a:t>Razix Frame</a:t>
             </a:r>
             <a:endParaRPr lang="en-IN" dirty="0">
               <a:solidFill>
-                <a:schemeClr val="accent1">
-                  <a:lumMod val="40000"/>
-                  <a:lumOff val="60000"/>
-                </a:schemeClr>
+                <a:srgbClr val="FF0000"/>
               </a:solidFill>
+              <a:highlight>
+                <a:srgbClr val="FFFF00"/>
+              </a:highlight>
             </a:endParaRPr>
           </a:p>
         </p:txBody>
@@ -4836,7 +4839,7 @@
         <p:spPr>
           <a:xfrm>
             <a:off x="8033951" y="6242398"/>
-            <a:ext cx="1117600" cy="338554"/>
+            <a:ext cx="1117600" cy="400110"/>
           </a:xfrm>
           <a:prstGeom prst="rect">
             <a:avLst/>
@@ -4850,34 +4853,34 @@
           <a:lstStyle/>
           <a:p>
             <a:r>
-              <a:rPr lang="en-US" sz="800" dirty="0">
-                <a:solidFill>
-                  <a:schemeClr val="accent3">
-                    <a:lumMod val="60000"/>
-                    <a:lumOff val="40000"/>
-                  </a:schemeClr>
-                </a:solidFill>
+              <a:rPr lang="en-US" sz="1000" dirty="0">
+                <a:solidFill>
+                  <a:srgbClr val="FF0000"/>
+                </a:solidFill>
+                <a:highlight>
+                  <a:srgbClr val="FFFF00"/>
+                </a:highlight>
               </a:rPr>
               <a:t>Presentation is under </a:t>
             </a:r>
             <a:r>
-              <a:rPr lang="en-US" sz="800" i="1" dirty="0">
-                <a:solidFill>
-                  <a:schemeClr val="accent3">
-                    <a:lumMod val="60000"/>
-                    <a:lumOff val="40000"/>
-                  </a:schemeClr>
-                </a:solidFill>
+              <a:rPr lang="en-US" sz="1000" i="1" dirty="0">
+                <a:solidFill>
+                  <a:srgbClr val="FF0000"/>
+                </a:solidFill>
+                <a:highlight>
+                  <a:srgbClr val="FFFF00"/>
+                </a:highlight>
               </a:rPr>
               <a:t>1.0ms</a:t>
             </a:r>
-            <a:endParaRPr lang="en-IN" sz="800" i="1" dirty="0">
+            <a:endParaRPr lang="en-IN" sz="1000" i="1" dirty="0">
               <a:solidFill>
-                <a:schemeClr val="accent3">
-                  <a:lumMod val="60000"/>
-                  <a:lumOff val="40000"/>
-                </a:schemeClr>
+                <a:srgbClr val="FF0000"/>
               </a:solidFill>
+              <a:highlight>
+                <a:srgbClr val="FFFF00"/>
+              </a:highlight>
             </a:endParaRPr>
           </a:p>
         </p:txBody>
@@ -10696,7 +10699,11 @@
             <a:avLst/>
           </a:prstGeom>
           <a:noFill/>
-          <a:ln w="12700"/>
+          <a:ln w="12700">
+            <a:solidFill>
+              <a:srgbClr val="FF0000"/>
+            </a:solidFill>
+          </a:ln>
         </p:spPr>
         <p:style>
           <a:lnRef idx="1">
@@ -10744,7 +10751,11 @@
           <a:prstGeom prst="line">
             <a:avLst/>
           </a:prstGeom>
-          <a:ln w="12700"/>
+          <a:ln w="12700">
+            <a:solidFill>
+              <a:srgbClr val="FF0000"/>
+            </a:solidFill>
+          </a:ln>
         </p:spPr>
         <p:style>
           <a:lnRef idx="1">
@@ -10784,7 +10795,11 @@
           <a:prstGeom prst="line">
             <a:avLst/>
           </a:prstGeom>
-          <a:ln w="12700"/>
+          <a:ln w="12700">
+            <a:solidFill>
+              <a:srgbClr val="FF0000"/>
+            </a:solidFill>
+          </a:ln>
         </p:spPr>
         <p:style>
           <a:lnRef idx="1">
@@ -10949,6 +10964,151 @@
           </a:prstGeom>
         </p:spPr>
       </p:pic>
+      <p:sp>
+        <p:nvSpPr>
+          <p:cNvPr id="3" name="Oval 2">
+            <a:extLst>
+              <a:ext uri="{FF2B5EF4-FFF2-40B4-BE49-F238E27FC236}">
+                <a16:creationId xmlns:a16="http://schemas.microsoft.com/office/drawing/2014/main" id="{BEBCA419-DED0-CC17-FDEE-A1ABE84BC5CC}"/>
+              </a:ext>
+            </a:extLst>
+          </p:cNvPr>
+          <p:cNvSpPr/>
+          <p:nvPr/>
+        </p:nvSpPr>
+        <p:spPr>
+          <a:xfrm>
+            <a:off x="4917243" y="1884334"/>
+            <a:ext cx="282646" cy="1767170"/>
+          </a:xfrm>
+          <a:prstGeom prst="ellipse">
+            <a:avLst/>
+          </a:prstGeom>
+          <a:noFill/>
+          <a:ln w="12700">
+            <a:solidFill>
+              <a:srgbClr val="FF0000"/>
+            </a:solidFill>
+          </a:ln>
+        </p:spPr>
+        <p:style>
+          <a:lnRef idx="1">
+            <a:schemeClr val="accent3"/>
+          </a:lnRef>
+          <a:fillRef idx="2">
+            <a:schemeClr val="accent3"/>
+          </a:fillRef>
+          <a:effectRef idx="1">
+            <a:schemeClr val="accent3"/>
+          </a:effectRef>
+          <a:fontRef idx="minor">
+            <a:schemeClr val="dk1"/>
+          </a:fontRef>
+        </p:style>
+        <p:txBody>
+          <a:bodyPr rtlCol="0" anchor="ctr"/>
+          <a:lstStyle/>
+          <a:p>
+            <a:pPr algn="ctr"/>
+            <a:endParaRPr lang="en-IN"/>
+          </a:p>
+        </p:txBody>
+      </p:sp>
+      <p:sp>
+        <p:nvSpPr>
+          <p:cNvPr id="5" name="Oval 4">
+            <a:extLst>
+              <a:ext uri="{FF2B5EF4-FFF2-40B4-BE49-F238E27FC236}">
+                <a16:creationId xmlns:a16="http://schemas.microsoft.com/office/drawing/2014/main" id="{A4535D7B-E753-F9F7-EDBD-916ECDC985DC}"/>
+              </a:ext>
+            </a:extLst>
+          </p:cNvPr>
+          <p:cNvSpPr/>
+          <p:nvPr/>
+        </p:nvSpPr>
+        <p:spPr>
+          <a:xfrm>
+            <a:off x="6906278" y="1884334"/>
+            <a:ext cx="282646" cy="1767170"/>
+          </a:xfrm>
+          <a:prstGeom prst="ellipse">
+            <a:avLst/>
+          </a:prstGeom>
+          <a:noFill/>
+          <a:ln w="12700">
+            <a:solidFill>
+              <a:srgbClr val="FF0000"/>
+            </a:solidFill>
+          </a:ln>
+        </p:spPr>
+        <p:style>
+          <a:lnRef idx="1">
+            <a:schemeClr val="accent3"/>
+          </a:lnRef>
+          <a:fillRef idx="2">
+            <a:schemeClr val="accent3"/>
+          </a:fillRef>
+          <a:effectRef idx="1">
+            <a:schemeClr val="accent3"/>
+          </a:effectRef>
+          <a:fontRef idx="minor">
+            <a:schemeClr val="dk1"/>
+          </a:fontRef>
+        </p:style>
+        <p:txBody>
+          <a:bodyPr rtlCol="0" anchor="ctr"/>
+          <a:lstStyle/>
+          <a:p>
+            <a:pPr algn="ctr"/>
+            <a:endParaRPr lang="en-IN"/>
+          </a:p>
+        </p:txBody>
+      </p:sp>
+      <p:sp>
+        <p:nvSpPr>
+          <p:cNvPr id="6" name="TextBox 5">
+            <a:extLst>
+              <a:ext uri="{FF2B5EF4-FFF2-40B4-BE49-F238E27FC236}">
+                <a16:creationId xmlns:a16="http://schemas.microsoft.com/office/drawing/2014/main" id="{AE1E207A-2317-3E6B-1CF6-7ABD416800C1}"/>
+              </a:ext>
+            </a:extLst>
+          </p:cNvPr>
+          <p:cNvSpPr txBox="1"/>
+          <p:nvPr/>
+        </p:nvSpPr>
+        <p:spPr>
+          <a:xfrm>
+            <a:off x="9530858" y="4028383"/>
+            <a:ext cx="1350502" cy="369332"/>
+          </a:xfrm>
+          <a:prstGeom prst="rect">
+            <a:avLst/>
+          </a:prstGeom>
+          <a:noFill/>
+        </p:spPr>
+        <p:txBody>
+          <a:bodyPr wrap="square" rtlCol="0">
+            <a:spAutoFit/>
+          </a:bodyPr>
+          <a:lstStyle/>
+          <a:p>
+            <a:pPr algn="ctr"/>
+            <a:r>
+              <a:rPr lang="en-US" dirty="0">
+                <a:solidFill>
+                  <a:schemeClr val="bg1"/>
+                </a:solidFill>
+              </a:rPr>
+              <a:t>FXAA + TAA</a:t>
+            </a:r>
+            <a:endParaRPr lang="en-IN" dirty="0">
+              <a:solidFill>
+                <a:schemeClr val="bg1"/>
+              </a:solidFill>
+            </a:endParaRPr>
+          </a:p>
+        </p:txBody>
+      </p:sp>
     </p:spTree>
     <p:extLst>
       <p:ext uri="{BB962C8B-B14F-4D97-AF65-F5344CB8AC3E}">

</xml_diff>

<commit_message>
perf-sweep; vkWaitForFences if fucked up;
</commit_message>
<xml_diff>
--- a/Docs/Features overview.pptx
+++ b/Docs/Features overview.pptx
@@ -5,7 +5,7 @@
     <p:sldMasterId id="2147483648" r:id="rId1"/>
   </p:sldMasterIdLst>
   <p:notesMasterIdLst>
-    <p:notesMasterId r:id="rId12"/>
+    <p:notesMasterId r:id="rId13"/>
   </p:notesMasterIdLst>
   <p:sldIdLst>
     <p:sldId id="257" r:id="rId2"/>
@@ -18,6 +18,7 @@
     <p:sldId id="267" r:id="rId9"/>
     <p:sldId id="264" r:id="rId10"/>
     <p:sldId id="263" r:id="rId11"/>
+    <p:sldId id="268" r:id="rId12"/>
   </p:sldIdLst>
   <p:sldSz cx="12192000" cy="6858000"/>
   <p:notesSz cx="6858000" cy="9144000"/>
@@ -147,6 +148,7 @@
         <p14:section name="Performance Improvements" id="{245578FE-32D1-46ED-9D76-A9FD4E05A08C}">
           <p14:sldIdLst>
             <p14:sldId id="263"/>
+            <p14:sldId id="268"/>
           </p14:sldIdLst>
         </p14:section>
         <p14:section name="Appendix" id="{23B43516-7304-48D8-B7D5-D2E67884751B}">
@@ -246,7 +248,7 @@
           <a:p>
             <a:fld id="{3F16BF55-C0A5-4A93-9892-A2EE55AC4C70}" type="datetimeFigureOut">
               <a:rPr lang="en-IN" smtClean="0"/>
-              <a:t>05-06-2024</a:t>
+              <a:t>19-06-2024</a:t>
             </a:fld>
             <a:endParaRPr lang="en-IN"/>
           </a:p>
@@ -681,7 +683,7 @@
           <a:p>
             <a:fld id="{84B6F61C-9FA5-4C35-A1D3-00EE2C15A6C0}" type="datetimeFigureOut">
               <a:rPr lang="en-IN" smtClean="0"/>
-              <a:t>05-06-2024</a:t>
+              <a:t>19-06-2024</a:t>
             </a:fld>
             <a:endParaRPr lang="en-IN"/>
           </a:p>
@@ -910,7 +912,7 @@
           <a:p>
             <a:fld id="{84B6F61C-9FA5-4C35-A1D3-00EE2C15A6C0}" type="datetimeFigureOut">
               <a:rPr lang="en-IN" smtClean="0"/>
-              <a:t>05-06-2024</a:t>
+              <a:t>19-06-2024</a:t>
             </a:fld>
             <a:endParaRPr lang="en-IN"/>
           </a:p>
@@ -1134,7 +1136,7 @@
           <a:p>
             <a:fld id="{84B6F61C-9FA5-4C35-A1D3-00EE2C15A6C0}" type="datetimeFigureOut">
               <a:rPr lang="en-IN" smtClean="0"/>
-              <a:t>05-06-2024</a:t>
+              <a:t>19-06-2024</a:t>
             </a:fld>
             <a:endParaRPr lang="en-IN"/>
           </a:p>
@@ -1404,7 +1406,7 @@
           <a:p>
             <a:fld id="{84B6F61C-9FA5-4C35-A1D3-00EE2C15A6C0}" type="datetimeFigureOut">
               <a:rPr lang="en-IN" smtClean="0"/>
-              <a:t>05-06-2024</a:t>
+              <a:t>19-06-2024</a:t>
             </a:fld>
             <a:endParaRPr lang="en-IN" dirty="0"/>
           </a:p>
@@ -1791,7 +1793,7 @@
           <a:p>
             <a:fld id="{84B6F61C-9FA5-4C35-A1D3-00EE2C15A6C0}" type="datetimeFigureOut">
               <a:rPr lang="en-IN" smtClean="0"/>
-              <a:t>05-06-2024</a:t>
+              <a:t>19-06-2024</a:t>
             </a:fld>
             <a:endParaRPr lang="en-IN"/>
           </a:p>
@@ -2158,7 +2160,7 @@
           <a:p>
             <a:fld id="{84B6F61C-9FA5-4C35-A1D3-00EE2C15A6C0}" type="datetimeFigureOut">
               <a:rPr lang="en-IN" smtClean="0"/>
-              <a:t>05-06-2024</a:t>
+              <a:t>19-06-2024</a:t>
             </a:fld>
             <a:endParaRPr lang="en-IN"/>
           </a:p>
@@ -2587,7 +2589,7 @@
           <a:p>
             <a:fld id="{84B6F61C-9FA5-4C35-A1D3-00EE2C15A6C0}" type="datetimeFigureOut">
               <a:rPr lang="en-IN" smtClean="0"/>
-              <a:t>05-06-2024</a:t>
+              <a:t>19-06-2024</a:t>
             </a:fld>
             <a:endParaRPr lang="en-IN" dirty="0"/>
           </a:p>
@@ -2751,7 +2753,7 @@
           <a:p>
             <a:fld id="{84B6F61C-9FA5-4C35-A1D3-00EE2C15A6C0}" type="datetimeFigureOut">
               <a:rPr lang="en-IN" smtClean="0"/>
-              <a:t>05-06-2024</a:t>
+              <a:t>19-06-2024</a:t>
             </a:fld>
             <a:endParaRPr lang="en-IN"/>
           </a:p>
@@ -2883,7 +2885,7 @@
           <a:p>
             <a:fld id="{84B6F61C-9FA5-4C35-A1D3-00EE2C15A6C0}" type="datetimeFigureOut">
               <a:rPr lang="en-IN" smtClean="0"/>
-              <a:t>05-06-2024</a:t>
+              <a:t>19-06-2024</a:t>
             </a:fld>
             <a:endParaRPr lang="en-IN"/>
           </a:p>
@@ -3215,7 +3217,7 @@
           <a:p>
             <a:fld id="{84B6F61C-9FA5-4C35-A1D3-00EE2C15A6C0}" type="datetimeFigureOut">
               <a:rPr lang="en-IN" smtClean="0"/>
-              <a:t>05-06-2024</a:t>
+              <a:t>19-06-2024</a:t>
             </a:fld>
             <a:endParaRPr lang="en-IN"/>
           </a:p>
@@ -3518,7 +3520,7 @@
           <a:p>
             <a:fld id="{84B6F61C-9FA5-4C35-A1D3-00EE2C15A6C0}" type="datetimeFigureOut">
               <a:rPr lang="en-IN" smtClean="0"/>
-              <a:t>05-06-2024</a:t>
+              <a:t>19-06-2024</a:t>
             </a:fld>
             <a:endParaRPr lang="en-IN"/>
           </a:p>
@@ -3770,7 +3772,7 @@
           <a:p>
             <a:fld id="{84B6F61C-9FA5-4C35-A1D3-00EE2C15A6C0}" type="datetimeFigureOut">
               <a:rPr lang="en-IN" smtClean="0"/>
-              <a:t>05-06-2024</a:t>
+              <a:t>19-06-2024</a:t>
             </a:fld>
             <a:endParaRPr lang="en-IN"/>
           </a:p>
@@ -4943,6 +4945,215 @@
     <p:extLst>
       <p:ext uri="{BB962C8B-B14F-4D97-AF65-F5344CB8AC3E}">
         <p14:creationId xmlns:p14="http://schemas.microsoft.com/office/powerpoint/2010/main" val="2919453556"/>
+      </p:ext>
+    </p:extLst>
+  </p:cSld>
+  <p:clrMapOvr>
+    <a:masterClrMapping/>
+  </p:clrMapOvr>
+</p:sld>
+</file>
+
+<file path=ppt/slides/slide11.xml><?xml version="1.0" encoding="utf-8"?>
+<p:sld xmlns:a="http://schemas.openxmlformats.org/drawingml/2006/main" xmlns:r="http://schemas.openxmlformats.org/officeDocument/2006/relationships" xmlns:p="http://schemas.openxmlformats.org/presentationml/2006/main">
+  <p:cSld>
+    <p:spTree>
+      <p:nvGrpSpPr>
+        <p:cNvPr id="1" name=""/>
+        <p:cNvGrpSpPr/>
+        <p:nvPr/>
+      </p:nvGrpSpPr>
+      <p:grpSpPr>
+        <a:xfrm>
+          <a:off x="0" y="0"/>
+          <a:ext cx="0" cy="0"/>
+          <a:chOff x="0" y="0"/>
+          <a:chExt cx="0" cy="0"/>
+        </a:xfrm>
+      </p:grpSpPr>
+      <p:sp>
+        <p:nvSpPr>
+          <p:cNvPr id="2" name="Title 1">
+            <a:extLst>
+              <a:ext uri="{FF2B5EF4-FFF2-40B4-BE49-F238E27FC236}">
+                <a16:creationId xmlns:a16="http://schemas.microsoft.com/office/drawing/2014/main" id="{9A2600AA-922C-E4B4-702E-5A97F2DAA1BD}"/>
+              </a:ext>
+            </a:extLst>
+          </p:cNvPr>
+          <p:cNvSpPr>
+            <a:spLocks noGrp="1"/>
+          </p:cNvSpPr>
+          <p:nvPr>
+            <p:ph type="title"/>
+          </p:nvPr>
+        </p:nvSpPr>
+        <p:spPr/>
+        <p:txBody>
+          <a:bodyPr/>
+          <a:lstStyle/>
+          <a:p>
+            <a:r>
+              <a:rPr lang="en-US" dirty="0"/>
+              <a:t>Vulkan </a:t>
+            </a:r>
+            <a:r>
+              <a:rPr lang="en-US" dirty="0">
+                <a:solidFill>
+                  <a:srgbClr val="FF0000"/>
+                </a:solidFill>
+              </a:rPr>
+              <a:t>perf-drop</a:t>
+            </a:r>
+            <a:endParaRPr lang="en-IN" dirty="0">
+              <a:solidFill>
+                <a:srgbClr val="FF0000"/>
+              </a:solidFill>
+            </a:endParaRPr>
+          </a:p>
+        </p:txBody>
+      </p:sp>
+      <p:pic>
+        <p:nvPicPr>
+          <p:cNvPr id="5" name="Picture 4">
+            <a:extLst>
+              <a:ext uri="{FF2B5EF4-FFF2-40B4-BE49-F238E27FC236}">
+                <a16:creationId xmlns:a16="http://schemas.microsoft.com/office/drawing/2014/main" id="{F62C2456-71AF-009D-B0EC-46AC104643F6}"/>
+              </a:ext>
+            </a:extLst>
+          </p:cNvPr>
+          <p:cNvPicPr>
+            <a:picLocks noChangeAspect="1"/>
+          </p:cNvPicPr>
+          <p:nvPr/>
+        </p:nvPicPr>
+        <p:blipFill>
+          <a:blip r:embed="rId2"/>
+          <a:stretch>
+            <a:fillRect/>
+          </a:stretch>
+        </p:blipFill>
+        <p:spPr>
+          <a:xfrm>
+            <a:off x="104728" y="1375878"/>
+            <a:ext cx="12036813" cy="2379043"/>
+          </a:xfrm>
+          <a:prstGeom prst="rect">
+            <a:avLst/>
+          </a:prstGeom>
+        </p:spPr>
+      </p:pic>
+      <p:sp>
+        <p:nvSpPr>
+          <p:cNvPr id="7" name="TextBox 6">
+            <a:extLst>
+              <a:ext uri="{FF2B5EF4-FFF2-40B4-BE49-F238E27FC236}">
+                <a16:creationId xmlns:a16="http://schemas.microsoft.com/office/drawing/2014/main" id="{DE68C69D-D210-035B-C458-E644EA72FEEC}"/>
+              </a:ext>
+            </a:extLst>
+          </p:cNvPr>
+          <p:cNvSpPr txBox="1"/>
+          <p:nvPr/>
+        </p:nvSpPr>
+        <p:spPr>
+          <a:xfrm>
+            <a:off x="254858" y="1006546"/>
+            <a:ext cx="6094970" cy="369332"/>
+          </a:xfrm>
+          <a:prstGeom prst="rect">
+            <a:avLst/>
+          </a:prstGeom>
+          <a:noFill/>
+        </p:spPr>
+        <p:txBody>
+          <a:bodyPr wrap="square">
+            <a:spAutoFit/>
+          </a:bodyPr>
+          <a:lstStyle/>
+          <a:p>
+            <a:r>
+              <a:rPr lang="en-IN" b="1" dirty="0">
+                <a:solidFill>
+                  <a:schemeClr val="bg1"/>
+                </a:solidFill>
+              </a:rPr>
+              <a:t>60pfs@1920x1080 RT Sponza Sandbox</a:t>
+            </a:r>
+          </a:p>
+        </p:txBody>
+      </p:sp>
+      <p:pic>
+        <p:nvPicPr>
+          <p:cNvPr id="9" name="Picture 8">
+            <a:extLst>
+              <a:ext uri="{FF2B5EF4-FFF2-40B4-BE49-F238E27FC236}">
+                <a16:creationId xmlns:a16="http://schemas.microsoft.com/office/drawing/2014/main" id="{EBB497E5-E82D-A46D-3AC2-C3CE437177C5}"/>
+              </a:ext>
+            </a:extLst>
+          </p:cNvPr>
+          <p:cNvPicPr>
+            <a:picLocks noChangeAspect="1"/>
+          </p:cNvPicPr>
+          <p:nvPr/>
+        </p:nvPicPr>
+        <p:blipFill>
+          <a:blip r:embed="rId3"/>
+          <a:stretch>
+            <a:fillRect/>
+          </a:stretch>
+        </p:blipFill>
+        <p:spPr>
+          <a:xfrm>
+            <a:off x="104729" y="4321646"/>
+            <a:ext cx="12036813" cy="2230653"/>
+          </a:xfrm>
+          <a:prstGeom prst="rect">
+            <a:avLst/>
+          </a:prstGeom>
+        </p:spPr>
+      </p:pic>
+      <p:sp>
+        <p:nvSpPr>
+          <p:cNvPr id="10" name="TextBox 9">
+            <a:extLst>
+              <a:ext uri="{FF2B5EF4-FFF2-40B4-BE49-F238E27FC236}">
+                <a16:creationId xmlns:a16="http://schemas.microsoft.com/office/drawing/2014/main" id="{A9119C11-E34A-C879-1D41-1F0C4829F8AA}"/>
+              </a:ext>
+            </a:extLst>
+          </p:cNvPr>
+          <p:cNvSpPr txBox="1"/>
+          <p:nvPr/>
+        </p:nvSpPr>
+        <p:spPr>
+          <a:xfrm>
+            <a:off x="28164" y="3952314"/>
+            <a:ext cx="6094970" cy="369332"/>
+          </a:xfrm>
+          <a:prstGeom prst="rect">
+            <a:avLst/>
+          </a:prstGeom>
+          <a:noFill/>
+        </p:spPr>
+        <p:txBody>
+          <a:bodyPr wrap="square">
+            <a:spAutoFit/>
+          </a:bodyPr>
+          <a:lstStyle/>
+          <a:p>
+            <a:r>
+              <a:rPr lang="en-IN" b="1" dirty="0">
+                <a:solidFill>
+                  <a:schemeClr val="bg1"/>
+                </a:solidFill>
+              </a:rPr>
+              <a:t>24pfs@2560x1440 RT Sponza Sandbox</a:t>
+            </a:r>
+          </a:p>
+        </p:txBody>
+      </p:sp>
+    </p:spTree>
+    <p:extLst>
+      <p:ext uri="{BB962C8B-B14F-4D97-AF65-F5344CB8AC3E}">
+        <p14:creationId xmlns:p14="http://schemas.microsoft.com/office/powerpoint/2010/main" val="4118400366"/>
       </p:ext>
     </p:extLst>
   </p:cSld>

</xml_diff>

<commit_message>
new assets + VB fill pass test
</commit_message>
<xml_diff>
--- a/Docs/Features overview.pptx
+++ b/Docs/Features overview.pptx
@@ -5,7 +5,7 @@
     <p:sldMasterId id="2147483648" r:id="rId1"/>
   </p:sldMasterIdLst>
   <p:notesMasterIdLst>
-    <p:notesMasterId r:id="rId13"/>
+    <p:notesMasterId r:id="rId15"/>
   </p:notesMasterIdLst>
   <p:sldIdLst>
     <p:sldId id="257" r:id="rId2"/>
@@ -16,9 +16,11 @@
     <p:sldId id="265" r:id="rId7"/>
     <p:sldId id="266" r:id="rId8"/>
     <p:sldId id="267" r:id="rId9"/>
-    <p:sldId id="264" r:id="rId10"/>
-    <p:sldId id="263" r:id="rId11"/>
-    <p:sldId id="268" r:id="rId12"/>
+    <p:sldId id="269" r:id="rId10"/>
+    <p:sldId id="270" r:id="rId11"/>
+    <p:sldId id="264" r:id="rId12"/>
+    <p:sldId id="263" r:id="rId13"/>
+    <p:sldId id="268" r:id="rId14"/>
   </p:sldIdLst>
   <p:sldSz cx="12192000" cy="6858000"/>
   <p:notesSz cx="6858000" cy="9144000"/>
@@ -138,6 +140,8 @@
             <p14:sldId id="265"/>
             <p14:sldId id="266"/>
             <p14:sldId id="267"/>
+            <p14:sldId id="269"/>
+            <p14:sldId id="270"/>
           </p14:sldIdLst>
         </p14:section>
         <p14:section name="Graphics Features" id="{840BAED3-5ED1-4238-B89B-07D3713A0757}">
@@ -248,7 +252,7 @@
           <a:p>
             <a:fld id="{3F16BF55-C0A5-4A93-9892-A2EE55AC4C70}" type="datetimeFigureOut">
               <a:rPr lang="en-IN" smtClean="0"/>
-              <a:t>19-06-2024</a:t>
+              <a:t>17-09-2024</a:t>
             </a:fld>
             <a:endParaRPr lang="en-IN"/>
           </a:p>
@@ -683,7 +687,7 @@
           <a:p>
             <a:fld id="{84B6F61C-9FA5-4C35-A1D3-00EE2C15A6C0}" type="datetimeFigureOut">
               <a:rPr lang="en-IN" smtClean="0"/>
-              <a:t>19-06-2024</a:t>
+              <a:t>17-09-2024</a:t>
             </a:fld>
             <a:endParaRPr lang="en-IN"/>
           </a:p>
@@ -912,7 +916,7 @@
           <a:p>
             <a:fld id="{84B6F61C-9FA5-4C35-A1D3-00EE2C15A6C0}" type="datetimeFigureOut">
               <a:rPr lang="en-IN" smtClean="0"/>
-              <a:t>19-06-2024</a:t>
+              <a:t>17-09-2024</a:t>
             </a:fld>
             <a:endParaRPr lang="en-IN"/>
           </a:p>
@@ -1136,7 +1140,7 @@
           <a:p>
             <a:fld id="{84B6F61C-9FA5-4C35-A1D3-00EE2C15A6C0}" type="datetimeFigureOut">
               <a:rPr lang="en-IN" smtClean="0"/>
-              <a:t>19-06-2024</a:t>
+              <a:t>17-09-2024</a:t>
             </a:fld>
             <a:endParaRPr lang="en-IN"/>
           </a:p>
@@ -1406,7 +1410,7 @@
           <a:p>
             <a:fld id="{84B6F61C-9FA5-4C35-A1D3-00EE2C15A6C0}" type="datetimeFigureOut">
               <a:rPr lang="en-IN" smtClean="0"/>
-              <a:t>19-06-2024</a:t>
+              <a:t>17-09-2024</a:t>
             </a:fld>
             <a:endParaRPr lang="en-IN" dirty="0"/>
           </a:p>
@@ -1793,7 +1797,7 @@
           <a:p>
             <a:fld id="{84B6F61C-9FA5-4C35-A1D3-00EE2C15A6C0}" type="datetimeFigureOut">
               <a:rPr lang="en-IN" smtClean="0"/>
-              <a:t>19-06-2024</a:t>
+              <a:t>17-09-2024</a:t>
             </a:fld>
             <a:endParaRPr lang="en-IN"/>
           </a:p>
@@ -2160,7 +2164,7 @@
           <a:p>
             <a:fld id="{84B6F61C-9FA5-4C35-A1D3-00EE2C15A6C0}" type="datetimeFigureOut">
               <a:rPr lang="en-IN" smtClean="0"/>
-              <a:t>19-06-2024</a:t>
+              <a:t>17-09-2024</a:t>
             </a:fld>
             <a:endParaRPr lang="en-IN"/>
           </a:p>
@@ -2589,7 +2593,7 @@
           <a:p>
             <a:fld id="{84B6F61C-9FA5-4C35-A1D3-00EE2C15A6C0}" type="datetimeFigureOut">
               <a:rPr lang="en-IN" smtClean="0"/>
-              <a:t>19-06-2024</a:t>
+              <a:t>17-09-2024</a:t>
             </a:fld>
             <a:endParaRPr lang="en-IN" dirty="0"/>
           </a:p>
@@ -2753,7 +2757,7 @@
           <a:p>
             <a:fld id="{84B6F61C-9FA5-4C35-A1D3-00EE2C15A6C0}" type="datetimeFigureOut">
               <a:rPr lang="en-IN" smtClean="0"/>
-              <a:t>19-06-2024</a:t>
+              <a:t>17-09-2024</a:t>
             </a:fld>
             <a:endParaRPr lang="en-IN"/>
           </a:p>
@@ -2885,7 +2889,7 @@
           <a:p>
             <a:fld id="{84B6F61C-9FA5-4C35-A1D3-00EE2C15A6C0}" type="datetimeFigureOut">
               <a:rPr lang="en-IN" smtClean="0"/>
-              <a:t>19-06-2024</a:t>
+              <a:t>17-09-2024</a:t>
             </a:fld>
             <a:endParaRPr lang="en-IN"/>
           </a:p>
@@ -3217,7 +3221,7 @@
           <a:p>
             <a:fld id="{84B6F61C-9FA5-4C35-A1D3-00EE2C15A6C0}" type="datetimeFigureOut">
               <a:rPr lang="en-IN" smtClean="0"/>
-              <a:t>19-06-2024</a:t>
+              <a:t>17-09-2024</a:t>
             </a:fld>
             <a:endParaRPr lang="en-IN"/>
           </a:p>
@@ -3520,7 +3524,7 @@
           <a:p>
             <a:fld id="{84B6F61C-9FA5-4C35-A1D3-00EE2C15A6C0}" type="datetimeFigureOut">
               <a:rPr lang="en-IN" smtClean="0"/>
-              <a:t>19-06-2024</a:t>
+              <a:t>17-09-2024</a:t>
             </a:fld>
             <a:endParaRPr lang="en-IN"/>
           </a:p>
@@ -3772,7 +3776,7 @@
           <a:p>
             <a:fld id="{84B6F61C-9FA5-4C35-A1D3-00EE2C15A6C0}" type="datetimeFigureOut">
               <a:rPr lang="en-IN" smtClean="0"/>
-              <a:t>19-06-2024</a:t>
+              <a:t>17-09-2024</a:t>
             </a:fld>
             <a:endParaRPr lang="en-IN"/>
           </a:p>
@@ -4395,6 +4399,585 @@
           <p:cNvPr id="2" name="Title 1">
             <a:extLst>
               <a:ext uri="{FF2B5EF4-FFF2-40B4-BE49-F238E27FC236}">
+                <a16:creationId xmlns:a16="http://schemas.microsoft.com/office/drawing/2014/main" id="{29B77EB9-5BBE-EC6D-AC6E-0F405F8E38B2}"/>
+              </a:ext>
+            </a:extLst>
+          </p:cNvPr>
+          <p:cNvSpPr>
+            <a:spLocks noGrp="1"/>
+          </p:cNvSpPr>
+          <p:nvPr>
+            <p:ph type="title"/>
+          </p:nvPr>
+        </p:nvSpPr>
+        <p:spPr/>
+        <p:txBody>
+          <a:bodyPr/>
+          <a:lstStyle/>
+          <a:p>
+            <a:r>
+              <a:rPr lang="en-US" dirty="0"/>
+              <a:t>Visibility Buffer</a:t>
+            </a:r>
+            <a:endParaRPr lang="en-IN" dirty="0"/>
+          </a:p>
+        </p:txBody>
+      </p:sp>
+    </p:spTree>
+    <p:extLst>
+      <p:ext uri="{BB962C8B-B14F-4D97-AF65-F5344CB8AC3E}">
+        <p14:creationId xmlns:p14="http://schemas.microsoft.com/office/powerpoint/2010/main" val="3794138533"/>
+      </p:ext>
+    </p:extLst>
+  </p:cSld>
+  <p:clrMapOvr>
+    <a:masterClrMapping/>
+  </p:clrMapOvr>
+</p:sld>
+</file>
+
+<file path=ppt/slides/slide11.xml><?xml version="1.0" encoding="utf-8"?>
+<p:sld xmlns:a="http://schemas.openxmlformats.org/drawingml/2006/main" xmlns:r="http://schemas.openxmlformats.org/officeDocument/2006/relationships" xmlns:p="http://schemas.openxmlformats.org/presentationml/2006/main">
+  <p:cSld>
+    <p:spTree>
+      <p:nvGrpSpPr>
+        <p:cNvPr id="1" name=""/>
+        <p:cNvGrpSpPr/>
+        <p:nvPr/>
+      </p:nvGrpSpPr>
+      <p:grpSpPr>
+        <a:xfrm>
+          <a:off x="0" y="0"/>
+          <a:ext cx="0" cy="0"/>
+          <a:chOff x="0" y="0"/>
+          <a:chExt cx="0" cy="0"/>
+        </a:xfrm>
+      </p:grpSpPr>
+      <p:pic>
+        <p:nvPicPr>
+          <p:cNvPr id="18" name="Picture 17">
+            <a:extLst>
+              <a:ext uri="{FF2B5EF4-FFF2-40B4-BE49-F238E27FC236}">
+                <a16:creationId xmlns:a16="http://schemas.microsoft.com/office/drawing/2014/main" id="{3071FAE2-2529-6868-D262-AA34FE6D8332}"/>
+              </a:ext>
+            </a:extLst>
+          </p:cNvPr>
+          <p:cNvPicPr>
+            <a:picLocks noChangeAspect="1"/>
+          </p:cNvPicPr>
+          <p:nvPr/>
+        </p:nvPicPr>
+        <p:blipFill>
+          <a:blip r:embed="rId2"/>
+          <a:stretch>
+            <a:fillRect/>
+          </a:stretch>
+        </p:blipFill>
+        <p:spPr>
+          <a:xfrm>
+            <a:off x="328677" y="1533422"/>
+            <a:ext cx="4131282" cy="2587510"/>
+          </a:xfrm>
+          <a:prstGeom prst="rect">
+            <a:avLst/>
+          </a:prstGeom>
+        </p:spPr>
+      </p:pic>
+      <p:sp>
+        <p:nvSpPr>
+          <p:cNvPr id="2" name="Title 1">
+            <a:extLst>
+              <a:ext uri="{FF2B5EF4-FFF2-40B4-BE49-F238E27FC236}">
+                <a16:creationId xmlns:a16="http://schemas.microsoft.com/office/drawing/2014/main" id="{DC614B7A-FECA-1987-4399-C7BB9962085B}"/>
+              </a:ext>
+            </a:extLst>
+          </p:cNvPr>
+          <p:cNvSpPr>
+            <a:spLocks noGrp="1"/>
+          </p:cNvSpPr>
+          <p:nvPr>
+            <p:ph type="title"/>
+          </p:nvPr>
+        </p:nvSpPr>
+        <p:spPr/>
+        <p:txBody>
+          <a:bodyPr/>
+          <a:lstStyle/>
+          <a:p>
+            <a:r>
+              <a:rPr lang="en-US" dirty="0"/>
+              <a:t>FXAA + TAA</a:t>
+            </a:r>
+            <a:endParaRPr lang="en-IN" dirty="0"/>
+          </a:p>
+        </p:txBody>
+      </p:sp>
+      <p:sp>
+        <p:nvSpPr>
+          <p:cNvPr id="8" name="Oval 7">
+            <a:extLst>
+              <a:ext uri="{FF2B5EF4-FFF2-40B4-BE49-F238E27FC236}">
+                <a16:creationId xmlns:a16="http://schemas.microsoft.com/office/drawing/2014/main" id="{951A9695-DCD1-523D-CE83-B560F361D302}"/>
+              </a:ext>
+            </a:extLst>
+          </p:cNvPr>
+          <p:cNvSpPr/>
+          <p:nvPr/>
+        </p:nvSpPr>
+        <p:spPr>
+          <a:xfrm>
+            <a:off x="1817761" y="2746709"/>
+            <a:ext cx="449951" cy="400151"/>
+          </a:xfrm>
+          <a:prstGeom prst="ellipse">
+            <a:avLst/>
+          </a:prstGeom>
+          <a:noFill/>
+          <a:ln w="12700">
+            <a:solidFill>
+              <a:srgbClr val="FF0000"/>
+            </a:solidFill>
+          </a:ln>
+        </p:spPr>
+        <p:style>
+          <a:lnRef idx="1">
+            <a:schemeClr val="accent3"/>
+          </a:lnRef>
+          <a:fillRef idx="2">
+            <a:schemeClr val="accent3"/>
+          </a:fillRef>
+          <a:effectRef idx="1">
+            <a:schemeClr val="accent3"/>
+          </a:effectRef>
+          <a:fontRef idx="minor">
+            <a:schemeClr val="dk1"/>
+          </a:fontRef>
+        </p:style>
+        <p:txBody>
+          <a:bodyPr rtlCol="0" anchor="ctr"/>
+          <a:lstStyle/>
+          <a:p>
+            <a:pPr algn="ctr"/>
+            <a:endParaRPr lang="en-IN"/>
+          </a:p>
+        </p:txBody>
+      </p:sp>
+      <p:cxnSp>
+        <p:nvCxnSpPr>
+          <p:cNvPr id="10" name="Straight Connector 9">
+            <a:extLst>
+              <a:ext uri="{FF2B5EF4-FFF2-40B4-BE49-F238E27FC236}">
+                <a16:creationId xmlns:a16="http://schemas.microsoft.com/office/drawing/2014/main" id="{7DE133C4-29B7-8317-3873-F39C96E25BE8}"/>
+              </a:ext>
+            </a:extLst>
+          </p:cNvPr>
+          <p:cNvCxnSpPr>
+            <a:cxnSpLocks/>
+            <a:stCxn id="8" idx="0"/>
+          </p:cNvCxnSpPr>
+          <p:nvPr/>
+        </p:nvCxnSpPr>
+        <p:spPr>
+          <a:xfrm flipV="1">
+            <a:off x="2042737" y="1741767"/>
+            <a:ext cx="2881548" cy="1004942"/>
+          </a:xfrm>
+          <a:prstGeom prst="line">
+            <a:avLst/>
+          </a:prstGeom>
+          <a:ln w="12700">
+            <a:solidFill>
+              <a:srgbClr val="FF0000"/>
+            </a:solidFill>
+          </a:ln>
+        </p:spPr>
+        <p:style>
+          <a:lnRef idx="1">
+            <a:schemeClr val="accent3"/>
+          </a:lnRef>
+          <a:fillRef idx="2">
+            <a:schemeClr val="accent3"/>
+          </a:fillRef>
+          <a:effectRef idx="1">
+            <a:schemeClr val="accent3"/>
+          </a:effectRef>
+          <a:fontRef idx="minor">
+            <a:schemeClr val="dk1"/>
+          </a:fontRef>
+        </p:style>
+      </p:cxnSp>
+      <p:cxnSp>
+        <p:nvCxnSpPr>
+          <p:cNvPr id="11" name="Straight Connector 10">
+            <a:extLst>
+              <a:ext uri="{FF2B5EF4-FFF2-40B4-BE49-F238E27FC236}">
+                <a16:creationId xmlns:a16="http://schemas.microsoft.com/office/drawing/2014/main" id="{3D98AE87-5708-2537-FDAE-8328E2EB8156}"/>
+              </a:ext>
+            </a:extLst>
+          </p:cNvPr>
+          <p:cNvCxnSpPr>
+            <a:cxnSpLocks/>
+            <a:stCxn id="8" idx="4"/>
+          </p:cNvCxnSpPr>
+          <p:nvPr/>
+        </p:nvCxnSpPr>
+        <p:spPr>
+          <a:xfrm>
+            <a:off x="2042737" y="3146860"/>
+            <a:ext cx="2881548" cy="770606"/>
+          </a:xfrm>
+          <a:prstGeom prst="line">
+            <a:avLst/>
+          </a:prstGeom>
+          <a:ln w="12700">
+            <a:solidFill>
+              <a:srgbClr val="FF0000"/>
+            </a:solidFill>
+          </a:ln>
+        </p:spPr>
+        <p:style>
+          <a:lnRef idx="1">
+            <a:schemeClr val="accent3"/>
+          </a:lnRef>
+          <a:fillRef idx="0">
+            <a:schemeClr val="accent3"/>
+          </a:fillRef>
+          <a:effectRef idx="0">
+            <a:schemeClr val="accent3"/>
+          </a:effectRef>
+          <a:fontRef idx="minor">
+            <a:schemeClr val="tx1"/>
+          </a:fontRef>
+        </p:style>
+      </p:cxnSp>
+      <p:sp>
+        <p:nvSpPr>
+          <p:cNvPr id="14" name="TextBox 13">
+            <a:extLst>
+              <a:ext uri="{FF2B5EF4-FFF2-40B4-BE49-F238E27FC236}">
+                <a16:creationId xmlns:a16="http://schemas.microsoft.com/office/drawing/2014/main" id="{E2FD9D4A-C5E4-95F1-635F-29099D2A1E13}"/>
+              </a:ext>
+            </a:extLst>
+          </p:cNvPr>
+          <p:cNvSpPr txBox="1"/>
+          <p:nvPr/>
+        </p:nvSpPr>
+        <p:spPr>
+          <a:xfrm>
+            <a:off x="5290146" y="4028383"/>
+            <a:ext cx="883920" cy="369332"/>
+          </a:xfrm>
+          <a:prstGeom prst="rect">
+            <a:avLst/>
+          </a:prstGeom>
+          <a:noFill/>
+        </p:spPr>
+        <p:txBody>
+          <a:bodyPr wrap="square" rtlCol="0">
+            <a:spAutoFit/>
+          </a:bodyPr>
+          <a:lstStyle/>
+          <a:p>
+            <a:r>
+              <a:rPr lang="en-US" dirty="0">
+                <a:solidFill>
+                  <a:schemeClr val="bg1"/>
+                </a:solidFill>
+              </a:rPr>
+              <a:t>No AA</a:t>
+            </a:r>
+            <a:endParaRPr lang="en-IN" dirty="0">
+              <a:solidFill>
+                <a:schemeClr val="bg1"/>
+              </a:solidFill>
+            </a:endParaRPr>
+          </a:p>
+        </p:txBody>
+      </p:sp>
+      <p:sp>
+        <p:nvSpPr>
+          <p:cNvPr id="17" name="TextBox 16">
+            <a:extLst>
+              <a:ext uri="{FF2B5EF4-FFF2-40B4-BE49-F238E27FC236}">
+                <a16:creationId xmlns:a16="http://schemas.microsoft.com/office/drawing/2014/main" id="{ED4EDAB3-0185-DB18-744D-2AC7399553D2}"/>
+              </a:ext>
+            </a:extLst>
+          </p:cNvPr>
+          <p:cNvSpPr txBox="1"/>
+          <p:nvPr/>
+        </p:nvSpPr>
+        <p:spPr>
+          <a:xfrm>
+            <a:off x="7237238" y="4028383"/>
+            <a:ext cx="883920" cy="369332"/>
+          </a:xfrm>
+          <a:prstGeom prst="rect">
+            <a:avLst/>
+          </a:prstGeom>
+          <a:noFill/>
+        </p:spPr>
+        <p:txBody>
+          <a:bodyPr wrap="square" rtlCol="0">
+            <a:spAutoFit/>
+          </a:bodyPr>
+          <a:lstStyle/>
+          <a:p>
+            <a:pPr algn="ctr"/>
+            <a:r>
+              <a:rPr lang="en-US" dirty="0">
+                <a:solidFill>
+                  <a:schemeClr val="bg1"/>
+                </a:solidFill>
+              </a:rPr>
+              <a:t>FXAA</a:t>
+            </a:r>
+            <a:endParaRPr lang="en-IN" dirty="0">
+              <a:solidFill>
+                <a:schemeClr val="bg1"/>
+              </a:solidFill>
+            </a:endParaRPr>
+          </a:p>
+        </p:txBody>
+      </p:sp>
+      <p:pic>
+        <p:nvPicPr>
+          <p:cNvPr id="4" name="Picture 3">
+            <a:extLst>
+              <a:ext uri="{FF2B5EF4-FFF2-40B4-BE49-F238E27FC236}">
+                <a16:creationId xmlns:a16="http://schemas.microsoft.com/office/drawing/2014/main" id="{A94D6D2A-B283-C537-B474-F282633B6B24}"/>
+              </a:ext>
+            </a:extLst>
+          </p:cNvPr>
+          <p:cNvPicPr>
+            <a:picLocks noChangeAspect="1"/>
+          </p:cNvPicPr>
+          <p:nvPr/>
+        </p:nvPicPr>
+        <p:blipFill>
+          <a:blip r:embed="rId3"/>
+          <a:stretch>
+            <a:fillRect/>
+          </a:stretch>
+        </p:blipFill>
+        <p:spPr>
+          <a:xfrm>
+            <a:off x="4917242" y="1741767"/>
+            <a:ext cx="1531753" cy="2175699"/>
+          </a:xfrm>
+          <a:prstGeom prst="rect">
+            <a:avLst/>
+          </a:prstGeom>
+        </p:spPr>
+      </p:pic>
+      <p:pic>
+        <p:nvPicPr>
+          <p:cNvPr id="9" name="Picture 8">
+            <a:extLst>
+              <a:ext uri="{FF2B5EF4-FFF2-40B4-BE49-F238E27FC236}">
+                <a16:creationId xmlns:a16="http://schemas.microsoft.com/office/drawing/2014/main" id="{37EBE483-D51E-90A7-932A-6BABF301564D}"/>
+              </a:ext>
+            </a:extLst>
+          </p:cNvPr>
+          <p:cNvPicPr>
+            <a:picLocks noChangeAspect="1"/>
+          </p:cNvPicPr>
+          <p:nvPr/>
+        </p:nvPicPr>
+        <p:blipFill rotWithShape="1">
+          <a:blip r:embed="rId4"/>
+          <a:srcRect l="4293" r="3173"/>
+          <a:stretch/>
+        </p:blipFill>
+        <p:spPr>
+          <a:xfrm>
+            <a:off x="6913321" y="1741767"/>
+            <a:ext cx="1531754" cy="2175699"/>
+          </a:xfrm>
+          <a:prstGeom prst="rect">
+            <a:avLst/>
+          </a:prstGeom>
+        </p:spPr>
+      </p:pic>
+      <p:sp>
+        <p:nvSpPr>
+          <p:cNvPr id="3" name="Oval 2">
+            <a:extLst>
+              <a:ext uri="{FF2B5EF4-FFF2-40B4-BE49-F238E27FC236}">
+                <a16:creationId xmlns:a16="http://schemas.microsoft.com/office/drawing/2014/main" id="{BEBCA419-DED0-CC17-FDEE-A1ABE84BC5CC}"/>
+              </a:ext>
+            </a:extLst>
+          </p:cNvPr>
+          <p:cNvSpPr/>
+          <p:nvPr/>
+        </p:nvSpPr>
+        <p:spPr>
+          <a:xfrm>
+            <a:off x="4917243" y="1884334"/>
+            <a:ext cx="282646" cy="1767170"/>
+          </a:xfrm>
+          <a:prstGeom prst="ellipse">
+            <a:avLst/>
+          </a:prstGeom>
+          <a:noFill/>
+          <a:ln w="12700">
+            <a:solidFill>
+              <a:srgbClr val="FF0000"/>
+            </a:solidFill>
+          </a:ln>
+        </p:spPr>
+        <p:style>
+          <a:lnRef idx="1">
+            <a:schemeClr val="accent3"/>
+          </a:lnRef>
+          <a:fillRef idx="2">
+            <a:schemeClr val="accent3"/>
+          </a:fillRef>
+          <a:effectRef idx="1">
+            <a:schemeClr val="accent3"/>
+          </a:effectRef>
+          <a:fontRef idx="minor">
+            <a:schemeClr val="dk1"/>
+          </a:fontRef>
+        </p:style>
+        <p:txBody>
+          <a:bodyPr rtlCol="0" anchor="ctr"/>
+          <a:lstStyle/>
+          <a:p>
+            <a:pPr algn="ctr"/>
+            <a:endParaRPr lang="en-IN"/>
+          </a:p>
+        </p:txBody>
+      </p:sp>
+      <p:sp>
+        <p:nvSpPr>
+          <p:cNvPr id="5" name="Oval 4">
+            <a:extLst>
+              <a:ext uri="{FF2B5EF4-FFF2-40B4-BE49-F238E27FC236}">
+                <a16:creationId xmlns:a16="http://schemas.microsoft.com/office/drawing/2014/main" id="{A4535D7B-E753-F9F7-EDBD-916ECDC985DC}"/>
+              </a:ext>
+            </a:extLst>
+          </p:cNvPr>
+          <p:cNvSpPr/>
+          <p:nvPr/>
+        </p:nvSpPr>
+        <p:spPr>
+          <a:xfrm>
+            <a:off x="6906278" y="1884334"/>
+            <a:ext cx="282646" cy="1767170"/>
+          </a:xfrm>
+          <a:prstGeom prst="ellipse">
+            <a:avLst/>
+          </a:prstGeom>
+          <a:noFill/>
+          <a:ln w="12700">
+            <a:solidFill>
+              <a:srgbClr val="FF0000"/>
+            </a:solidFill>
+          </a:ln>
+        </p:spPr>
+        <p:style>
+          <a:lnRef idx="1">
+            <a:schemeClr val="accent3"/>
+          </a:lnRef>
+          <a:fillRef idx="2">
+            <a:schemeClr val="accent3"/>
+          </a:fillRef>
+          <a:effectRef idx="1">
+            <a:schemeClr val="accent3"/>
+          </a:effectRef>
+          <a:fontRef idx="minor">
+            <a:schemeClr val="dk1"/>
+          </a:fontRef>
+        </p:style>
+        <p:txBody>
+          <a:bodyPr rtlCol="0" anchor="ctr"/>
+          <a:lstStyle/>
+          <a:p>
+            <a:pPr algn="ctr"/>
+            <a:endParaRPr lang="en-IN"/>
+          </a:p>
+        </p:txBody>
+      </p:sp>
+      <p:sp>
+        <p:nvSpPr>
+          <p:cNvPr id="6" name="TextBox 5">
+            <a:extLst>
+              <a:ext uri="{FF2B5EF4-FFF2-40B4-BE49-F238E27FC236}">
+                <a16:creationId xmlns:a16="http://schemas.microsoft.com/office/drawing/2014/main" id="{AE1E207A-2317-3E6B-1CF6-7ABD416800C1}"/>
+              </a:ext>
+            </a:extLst>
+          </p:cNvPr>
+          <p:cNvSpPr txBox="1"/>
+          <p:nvPr/>
+        </p:nvSpPr>
+        <p:spPr>
+          <a:xfrm>
+            <a:off x="9530858" y="4028383"/>
+            <a:ext cx="1350502" cy="369332"/>
+          </a:xfrm>
+          <a:prstGeom prst="rect">
+            <a:avLst/>
+          </a:prstGeom>
+          <a:noFill/>
+        </p:spPr>
+        <p:txBody>
+          <a:bodyPr wrap="square" rtlCol="0">
+            <a:spAutoFit/>
+          </a:bodyPr>
+          <a:lstStyle/>
+          <a:p>
+            <a:pPr algn="ctr"/>
+            <a:r>
+              <a:rPr lang="en-US" dirty="0">
+                <a:solidFill>
+                  <a:schemeClr val="bg1"/>
+                </a:solidFill>
+              </a:rPr>
+              <a:t>FXAA + TAA</a:t>
+            </a:r>
+            <a:endParaRPr lang="en-IN" dirty="0">
+              <a:solidFill>
+                <a:schemeClr val="bg1"/>
+              </a:solidFill>
+            </a:endParaRPr>
+          </a:p>
+        </p:txBody>
+      </p:sp>
+    </p:spTree>
+    <p:extLst>
+      <p:ext uri="{BB962C8B-B14F-4D97-AF65-F5344CB8AC3E}">
+        <p14:creationId xmlns:p14="http://schemas.microsoft.com/office/powerpoint/2010/main" val="3966651940"/>
+      </p:ext>
+    </p:extLst>
+  </p:cSld>
+  <p:clrMapOvr>
+    <a:masterClrMapping/>
+  </p:clrMapOvr>
+</p:sld>
+</file>
+
+<file path=ppt/slides/slide12.xml><?xml version="1.0" encoding="utf-8"?>
+<p:sld xmlns:a="http://schemas.openxmlformats.org/drawingml/2006/main" xmlns:r="http://schemas.openxmlformats.org/officeDocument/2006/relationships" xmlns:p="http://schemas.openxmlformats.org/presentationml/2006/main">
+  <p:cSld>
+    <p:spTree>
+      <p:nvGrpSpPr>
+        <p:cNvPr id="1" name=""/>
+        <p:cNvGrpSpPr/>
+        <p:nvPr/>
+      </p:nvGrpSpPr>
+      <p:grpSpPr>
+        <a:xfrm>
+          <a:off x="0" y="0"/>
+          <a:ext cx="0" cy="0"/>
+          <a:chOff x="0" y="0"/>
+          <a:chExt cx="0" cy="0"/>
+        </a:xfrm>
+      </p:grpSpPr>
+      <p:sp>
+        <p:nvSpPr>
+          <p:cNvPr id="2" name="Title 1">
+            <a:extLst>
+              <a:ext uri="{FF2B5EF4-FFF2-40B4-BE49-F238E27FC236}">
                 <a16:creationId xmlns:a16="http://schemas.microsoft.com/office/drawing/2014/main" id="{0F68DE61-F4A0-01F3-833B-5EF6841E2FDC}"/>
               </a:ext>
             </a:extLst>
@@ -4954,7 +5537,7 @@
 </p:sld>
 </file>
 
-<file path=ppt/slides/slide11.xml><?xml version="1.0" encoding="utf-8"?>
+<file path=ppt/slides/slide13.xml><?xml version="1.0" encoding="utf-8"?>
 <p:sld xmlns:a="http://schemas.openxmlformats.org/drawingml/2006/main" xmlns:r="http://schemas.openxmlformats.org/officeDocument/2006/relationships" xmlns:p="http://schemas.openxmlformats.org/presentationml/2006/main">
   <p:cSld>
     <p:spTree>
@@ -10830,12 +11413,41 @@
           <a:chExt cx="0" cy="0"/>
         </a:xfrm>
       </p:grpSpPr>
+      <p:sp>
+        <p:nvSpPr>
+          <p:cNvPr id="2" name="Title 1">
+            <a:extLst>
+              <a:ext uri="{FF2B5EF4-FFF2-40B4-BE49-F238E27FC236}">
+                <a16:creationId xmlns:a16="http://schemas.microsoft.com/office/drawing/2014/main" id="{EA8547A1-DC4B-FAD6-56C5-C766B24032CC}"/>
+              </a:ext>
+            </a:extLst>
+          </p:cNvPr>
+          <p:cNvSpPr>
+            <a:spLocks noGrp="1"/>
+          </p:cNvSpPr>
+          <p:nvPr>
+            <p:ph type="title"/>
+          </p:nvPr>
+        </p:nvSpPr>
+        <p:spPr/>
+        <p:txBody>
+          <a:bodyPr/>
+          <a:lstStyle/>
+          <a:p>
+            <a:r>
+              <a:rPr lang="en-US" dirty="0"/>
+              <a:t>Visibility Buffer</a:t>
+            </a:r>
+            <a:endParaRPr lang="en-IN" dirty="0"/>
+          </a:p>
+        </p:txBody>
+      </p:sp>
       <p:pic>
         <p:nvPicPr>
-          <p:cNvPr id="18" name="Picture 17">
-            <a:extLst>
-              <a:ext uri="{FF2B5EF4-FFF2-40B4-BE49-F238E27FC236}">
-                <a16:creationId xmlns:a16="http://schemas.microsoft.com/office/drawing/2014/main" id="{3071FAE2-2529-6868-D262-AA34FE6D8332}"/>
+          <p:cNvPr id="7" name="Picture 6">
+            <a:extLst>
+              <a:ext uri="{FF2B5EF4-FFF2-40B4-BE49-F238E27FC236}">
+                <a16:creationId xmlns:a16="http://schemas.microsoft.com/office/drawing/2014/main" id="{A68B85AC-AEC4-7D84-4CD9-0484613CB7BD}"/>
               </a:ext>
             </a:extLst>
           </p:cNvPr>
@@ -10845,485 +11457,61 @@
           <p:nvPr/>
         </p:nvPicPr>
         <p:blipFill>
-          <a:blip r:embed="rId2"/>
+          <a:blip r:embed="rId2">
+            <a:extLst>
+              <a:ext uri="{28A0092B-C50C-407E-A947-70E740481C1C}">
+                <a14:useLocalDpi xmlns:a14="http://schemas.microsoft.com/office/drawing/2010/main" val="0"/>
+              </a:ext>
+            </a:extLst>
+          </a:blip>
           <a:stretch>
             <a:fillRect/>
           </a:stretch>
         </p:blipFill>
         <p:spPr>
           <a:xfrm>
-            <a:off x="328677" y="1533422"/>
-            <a:ext cx="4131282" cy="2587510"/>
+            <a:off x="474306" y="1438432"/>
+            <a:ext cx="9931280" cy="4711159"/>
           </a:xfrm>
-          <a:prstGeom prst="rect">
+          <a:prstGeom prst="snip2DiagRect">
             <a:avLst/>
           </a:prstGeom>
+          <a:solidFill>
+            <a:srgbClr val="FFFFFF">
+              <a:shade val="85000"/>
+            </a:srgbClr>
+          </a:solidFill>
+          <a:ln w="88900" cap="sq">
+            <a:solidFill>
+              <a:srgbClr val="FFFFFF"/>
+            </a:solidFill>
+            <a:miter lim="800000"/>
+          </a:ln>
+          <a:effectLst>
+            <a:outerShdw blurRad="88900" algn="tl" rotWithShape="0">
+              <a:srgbClr val="000000">
+                <a:alpha val="45000"/>
+              </a:srgbClr>
+            </a:outerShdw>
+          </a:effectLst>
+          <a:scene3d>
+            <a:camera prst="orthographicFront"/>
+            <a:lightRig rig="twoPt" dir="t">
+              <a:rot lat="0" lon="0" rev="7200000"/>
+            </a:lightRig>
+          </a:scene3d>
+          <a:sp3d>
+            <a:bevelT w="25400" h="19050"/>
+            <a:contourClr>
+              <a:srgbClr val="FFFFFF"/>
+            </a:contourClr>
+          </a:sp3d>
         </p:spPr>
       </p:pic>
-      <p:sp>
-        <p:nvSpPr>
-          <p:cNvPr id="2" name="Title 1">
-            <a:extLst>
-              <a:ext uri="{FF2B5EF4-FFF2-40B4-BE49-F238E27FC236}">
-                <a16:creationId xmlns:a16="http://schemas.microsoft.com/office/drawing/2014/main" id="{DC614B7A-FECA-1987-4399-C7BB9962085B}"/>
-              </a:ext>
-            </a:extLst>
-          </p:cNvPr>
-          <p:cNvSpPr>
-            <a:spLocks noGrp="1"/>
-          </p:cNvSpPr>
-          <p:nvPr>
-            <p:ph type="title"/>
-          </p:nvPr>
-        </p:nvSpPr>
-        <p:spPr/>
-        <p:txBody>
-          <a:bodyPr/>
-          <a:lstStyle/>
-          <a:p>
-            <a:r>
-              <a:rPr lang="en-US" dirty="0"/>
-              <a:t>FXAA + TAA</a:t>
-            </a:r>
-            <a:endParaRPr lang="en-IN" dirty="0"/>
-          </a:p>
-        </p:txBody>
-      </p:sp>
-      <p:sp>
-        <p:nvSpPr>
-          <p:cNvPr id="8" name="Oval 7">
-            <a:extLst>
-              <a:ext uri="{FF2B5EF4-FFF2-40B4-BE49-F238E27FC236}">
-                <a16:creationId xmlns:a16="http://schemas.microsoft.com/office/drawing/2014/main" id="{951A9695-DCD1-523D-CE83-B560F361D302}"/>
-              </a:ext>
-            </a:extLst>
-          </p:cNvPr>
-          <p:cNvSpPr/>
-          <p:nvPr/>
-        </p:nvSpPr>
-        <p:spPr>
-          <a:xfrm>
-            <a:off x="1817761" y="2746709"/>
-            <a:ext cx="449951" cy="400151"/>
-          </a:xfrm>
-          <a:prstGeom prst="ellipse">
-            <a:avLst/>
-          </a:prstGeom>
-          <a:noFill/>
-          <a:ln w="12700">
-            <a:solidFill>
-              <a:srgbClr val="FF0000"/>
-            </a:solidFill>
-          </a:ln>
-        </p:spPr>
-        <p:style>
-          <a:lnRef idx="1">
-            <a:schemeClr val="accent3"/>
-          </a:lnRef>
-          <a:fillRef idx="2">
-            <a:schemeClr val="accent3"/>
-          </a:fillRef>
-          <a:effectRef idx="1">
-            <a:schemeClr val="accent3"/>
-          </a:effectRef>
-          <a:fontRef idx="minor">
-            <a:schemeClr val="dk1"/>
-          </a:fontRef>
-        </p:style>
-        <p:txBody>
-          <a:bodyPr rtlCol="0" anchor="ctr"/>
-          <a:lstStyle/>
-          <a:p>
-            <a:pPr algn="ctr"/>
-            <a:endParaRPr lang="en-IN"/>
-          </a:p>
-        </p:txBody>
-      </p:sp>
-      <p:cxnSp>
-        <p:nvCxnSpPr>
-          <p:cNvPr id="10" name="Straight Connector 9">
-            <a:extLst>
-              <a:ext uri="{FF2B5EF4-FFF2-40B4-BE49-F238E27FC236}">
-                <a16:creationId xmlns:a16="http://schemas.microsoft.com/office/drawing/2014/main" id="{7DE133C4-29B7-8317-3873-F39C96E25BE8}"/>
-              </a:ext>
-            </a:extLst>
-          </p:cNvPr>
-          <p:cNvCxnSpPr>
-            <a:cxnSpLocks/>
-            <a:stCxn id="8" idx="0"/>
-          </p:cNvCxnSpPr>
-          <p:nvPr/>
-        </p:nvCxnSpPr>
-        <p:spPr>
-          <a:xfrm flipV="1">
-            <a:off x="2042737" y="1741767"/>
-            <a:ext cx="2881548" cy="1004942"/>
-          </a:xfrm>
-          <a:prstGeom prst="line">
-            <a:avLst/>
-          </a:prstGeom>
-          <a:ln w="12700">
-            <a:solidFill>
-              <a:srgbClr val="FF0000"/>
-            </a:solidFill>
-          </a:ln>
-        </p:spPr>
-        <p:style>
-          <a:lnRef idx="1">
-            <a:schemeClr val="accent3"/>
-          </a:lnRef>
-          <a:fillRef idx="2">
-            <a:schemeClr val="accent3"/>
-          </a:fillRef>
-          <a:effectRef idx="1">
-            <a:schemeClr val="accent3"/>
-          </a:effectRef>
-          <a:fontRef idx="minor">
-            <a:schemeClr val="dk1"/>
-          </a:fontRef>
-        </p:style>
-      </p:cxnSp>
-      <p:cxnSp>
-        <p:nvCxnSpPr>
-          <p:cNvPr id="11" name="Straight Connector 10">
-            <a:extLst>
-              <a:ext uri="{FF2B5EF4-FFF2-40B4-BE49-F238E27FC236}">
-                <a16:creationId xmlns:a16="http://schemas.microsoft.com/office/drawing/2014/main" id="{3D98AE87-5708-2537-FDAE-8328E2EB8156}"/>
-              </a:ext>
-            </a:extLst>
-          </p:cNvPr>
-          <p:cNvCxnSpPr>
-            <a:cxnSpLocks/>
-            <a:stCxn id="8" idx="4"/>
-          </p:cNvCxnSpPr>
-          <p:nvPr/>
-        </p:nvCxnSpPr>
-        <p:spPr>
-          <a:xfrm>
-            <a:off x="2042737" y="3146860"/>
-            <a:ext cx="2881548" cy="770606"/>
-          </a:xfrm>
-          <a:prstGeom prst="line">
-            <a:avLst/>
-          </a:prstGeom>
-          <a:ln w="12700">
-            <a:solidFill>
-              <a:srgbClr val="FF0000"/>
-            </a:solidFill>
-          </a:ln>
-        </p:spPr>
-        <p:style>
-          <a:lnRef idx="1">
-            <a:schemeClr val="accent3"/>
-          </a:lnRef>
-          <a:fillRef idx="0">
-            <a:schemeClr val="accent3"/>
-          </a:fillRef>
-          <a:effectRef idx="0">
-            <a:schemeClr val="accent3"/>
-          </a:effectRef>
-          <a:fontRef idx="minor">
-            <a:schemeClr val="tx1"/>
-          </a:fontRef>
-        </p:style>
-      </p:cxnSp>
-      <p:sp>
-        <p:nvSpPr>
-          <p:cNvPr id="14" name="TextBox 13">
-            <a:extLst>
-              <a:ext uri="{FF2B5EF4-FFF2-40B4-BE49-F238E27FC236}">
-                <a16:creationId xmlns:a16="http://schemas.microsoft.com/office/drawing/2014/main" id="{E2FD9D4A-C5E4-95F1-635F-29099D2A1E13}"/>
-              </a:ext>
-            </a:extLst>
-          </p:cNvPr>
-          <p:cNvSpPr txBox="1"/>
-          <p:nvPr/>
-        </p:nvSpPr>
-        <p:spPr>
-          <a:xfrm>
-            <a:off x="5290146" y="4028383"/>
-            <a:ext cx="883920" cy="369332"/>
-          </a:xfrm>
-          <a:prstGeom prst="rect">
-            <a:avLst/>
-          </a:prstGeom>
-          <a:noFill/>
-        </p:spPr>
-        <p:txBody>
-          <a:bodyPr wrap="square" rtlCol="0">
-            <a:spAutoFit/>
-          </a:bodyPr>
-          <a:lstStyle/>
-          <a:p>
-            <a:r>
-              <a:rPr lang="en-US" dirty="0">
-                <a:solidFill>
-                  <a:schemeClr val="bg1"/>
-                </a:solidFill>
-              </a:rPr>
-              <a:t>No AA</a:t>
-            </a:r>
-            <a:endParaRPr lang="en-IN" dirty="0">
-              <a:solidFill>
-                <a:schemeClr val="bg1"/>
-              </a:solidFill>
-            </a:endParaRPr>
-          </a:p>
-        </p:txBody>
-      </p:sp>
-      <p:sp>
-        <p:nvSpPr>
-          <p:cNvPr id="17" name="TextBox 16">
-            <a:extLst>
-              <a:ext uri="{FF2B5EF4-FFF2-40B4-BE49-F238E27FC236}">
-                <a16:creationId xmlns:a16="http://schemas.microsoft.com/office/drawing/2014/main" id="{ED4EDAB3-0185-DB18-744D-2AC7399553D2}"/>
-              </a:ext>
-            </a:extLst>
-          </p:cNvPr>
-          <p:cNvSpPr txBox="1"/>
-          <p:nvPr/>
-        </p:nvSpPr>
-        <p:spPr>
-          <a:xfrm>
-            <a:off x="7237238" y="4028383"/>
-            <a:ext cx="883920" cy="369332"/>
-          </a:xfrm>
-          <a:prstGeom prst="rect">
-            <a:avLst/>
-          </a:prstGeom>
-          <a:noFill/>
-        </p:spPr>
-        <p:txBody>
-          <a:bodyPr wrap="square" rtlCol="0">
-            <a:spAutoFit/>
-          </a:bodyPr>
-          <a:lstStyle/>
-          <a:p>
-            <a:pPr algn="ctr"/>
-            <a:r>
-              <a:rPr lang="en-US" dirty="0">
-                <a:solidFill>
-                  <a:schemeClr val="bg1"/>
-                </a:solidFill>
-              </a:rPr>
-              <a:t>FXAA</a:t>
-            </a:r>
-            <a:endParaRPr lang="en-IN" dirty="0">
-              <a:solidFill>
-                <a:schemeClr val="bg1"/>
-              </a:solidFill>
-            </a:endParaRPr>
-          </a:p>
-        </p:txBody>
-      </p:sp>
-      <p:pic>
-        <p:nvPicPr>
-          <p:cNvPr id="4" name="Picture 3">
-            <a:extLst>
-              <a:ext uri="{FF2B5EF4-FFF2-40B4-BE49-F238E27FC236}">
-                <a16:creationId xmlns:a16="http://schemas.microsoft.com/office/drawing/2014/main" id="{A94D6D2A-B283-C537-B474-F282633B6B24}"/>
-              </a:ext>
-            </a:extLst>
-          </p:cNvPr>
-          <p:cNvPicPr>
-            <a:picLocks noChangeAspect="1"/>
-          </p:cNvPicPr>
-          <p:nvPr/>
-        </p:nvPicPr>
-        <p:blipFill>
-          <a:blip r:embed="rId3"/>
-          <a:stretch>
-            <a:fillRect/>
-          </a:stretch>
-        </p:blipFill>
-        <p:spPr>
-          <a:xfrm>
-            <a:off x="4917242" y="1741767"/>
-            <a:ext cx="1531753" cy="2175699"/>
-          </a:xfrm>
-          <a:prstGeom prst="rect">
-            <a:avLst/>
-          </a:prstGeom>
-        </p:spPr>
-      </p:pic>
-      <p:pic>
-        <p:nvPicPr>
-          <p:cNvPr id="9" name="Picture 8">
-            <a:extLst>
-              <a:ext uri="{FF2B5EF4-FFF2-40B4-BE49-F238E27FC236}">
-                <a16:creationId xmlns:a16="http://schemas.microsoft.com/office/drawing/2014/main" id="{37EBE483-D51E-90A7-932A-6BABF301564D}"/>
-              </a:ext>
-            </a:extLst>
-          </p:cNvPr>
-          <p:cNvPicPr>
-            <a:picLocks noChangeAspect="1"/>
-          </p:cNvPicPr>
-          <p:nvPr/>
-        </p:nvPicPr>
-        <p:blipFill rotWithShape="1">
-          <a:blip r:embed="rId4"/>
-          <a:srcRect l="4293" r="3173"/>
-          <a:stretch/>
-        </p:blipFill>
-        <p:spPr>
-          <a:xfrm>
-            <a:off x="6913321" y="1741767"/>
-            <a:ext cx="1531754" cy="2175699"/>
-          </a:xfrm>
-          <a:prstGeom prst="rect">
-            <a:avLst/>
-          </a:prstGeom>
-        </p:spPr>
-      </p:pic>
-      <p:sp>
-        <p:nvSpPr>
-          <p:cNvPr id="3" name="Oval 2">
-            <a:extLst>
-              <a:ext uri="{FF2B5EF4-FFF2-40B4-BE49-F238E27FC236}">
-                <a16:creationId xmlns:a16="http://schemas.microsoft.com/office/drawing/2014/main" id="{BEBCA419-DED0-CC17-FDEE-A1ABE84BC5CC}"/>
-              </a:ext>
-            </a:extLst>
-          </p:cNvPr>
-          <p:cNvSpPr/>
-          <p:nvPr/>
-        </p:nvSpPr>
-        <p:spPr>
-          <a:xfrm>
-            <a:off x="4917243" y="1884334"/>
-            <a:ext cx="282646" cy="1767170"/>
-          </a:xfrm>
-          <a:prstGeom prst="ellipse">
-            <a:avLst/>
-          </a:prstGeom>
-          <a:noFill/>
-          <a:ln w="12700">
-            <a:solidFill>
-              <a:srgbClr val="FF0000"/>
-            </a:solidFill>
-          </a:ln>
-        </p:spPr>
-        <p:style>
-          <a:lnRef idx="1">
-            <a:schemeClr val="accent3"/>
-          </a:lnRef>
-          <a:fillRef idx="2">
-            <a:schemeClr val="accent3"/>
-          </a:fillRef>
-          <a:effectRef idx="1">
-            <a:schemeClr val="accent3"/>
-          </a:effectRef>
-          <a:fontRef idx="minor">
-            <a:schemeClr val="dk1"/>
-          </a:fontRef>
-        </p:style>
-        <p:txBody>
-          <a:bodyPr rtlCol="0" anchor="ctr"/>
-          <a:lstStyle/>
-          <a:p>
-            <a:pPr algn="ctr"/>
-            <a:endParaRPr lang="en-IN"/>
-          </a:p>
-        </p:txBody>
-      </p:sp>
-      <p:sp>
-        <p:nvSpPr>
-          <p:cNvPr id="5" name="Oval 4">
-            <a:extLst>
-              <a:ext uri="{FF2B5EF4-FFF2-40B4-BE49-F238E27FC236}">
-                <a16:creationId xmlns:a16="http://schemas.microsoft.com/office/drawing/2014/main" id="{A4535D7B-E753-F9F7-EDBD-916ECDC985DC}"/>
-              </a:ext>
-            </a:extLst>
-          </p:cNvPr>
-          <p:cNvSpPr/>
-          <p:nvPr/>
-        </p:nvSpPr>
-        <p:spPr>
-          <a:xfrm>
-            <a:off x="6906278" y="1884334"/>
-            <a:ext cx="282646" cy="1767170"/>
-          </a:xfrm>
-          <a:prstGeom prst="ellipse">
-            <a:avLst/>
-          </a:prstGeom>
-          <a:noFill/>
-          <a:ln w="12700">
-            <a:solidFill>
-              <a:srgbClr val="FF0000"/>
-            </a:solidFill>
-          </a:ln>
-        </p:spPr>
-        <p:style>
-          <a:lnRef idx="1">
-            <a:schemeClr val="accent3"/>
-          </a:lnRef>
-          <a:fillRef idx="2">
-            <a:schemeClr val="accent3"/>
-          </a:fillRef>
-          <a:effectRef idx="1">
-            <a:schemeClr val="accent3"/>
-          </a:effectRef>
-          <a:fontRef idx="minor">
-            <a:schemeClr val="dk1"/>
-          </a:fontRef>
-        </p:style>
-        <p:txBody>
-          <a:bodyPr rtlCol="0" anchor="ctr"/>
-          <a:lstStyle/>
-          <a:p>
-            <a:pPr algn="ctr"/>
-            <a:endParaRPr lang="en-IN"/>
-          </a:p>
-        </p:txBody>
-      </p:sp>
-      <p:sp>
-        <p:nvSpPr>
-          <p:cNvPr id="6" name="TextBox 5">
-            <a:extLst>
-              <a:ext uri="{FF2B5EF4-FFF2-40B4-BE49-F238E27FC236}">
-                <a16:creationId xmlns:a16="http://schemas.microsoft.com/office/drawing/2014/main" id="{AE1E207A-2317-3E6B-1CF6-7ABD416800C1}"/>
-              </a:ext>
-            </a:extLst>
-          </p:cNvPr>
-          <p:cNvSpPr txBox="1"/>
-          <p:nvPr/>
-        </p:nvSpPr>
-        <p:spPr>
-          <a:xfrm>
-            <a:off x="9530858" y="4028383"/>
-            <a:ext cx="1350502" cy="369332"/>
-          </a:xfrm>
-          <a:prstGeom prst="rect">
-            <a:avLst/>
-          </a:prstGeom>
-          <a:noFill/>
-        </p:spPr>
-        <p:txBody>
-          <a:bodyPr wrap="square" rtlCol="0">
-            <a:spAutoFit/>
-          </a:bodyPr>
-          <a:lstStyle/>
-          <a:p>
-            <a:pPr algn="ctr"/>
-            <a:r>
-              <a:rPr lang="en-US" dirty="0">
-                <a:solidFill>
-                  <a:schemeClr val="bg1"/>
-                </a:solidFill>
-              </a:rPr>
-              <a:t>FXAA + TAA</a:t>
-            </a:r>
-            <a:endParaRPr lang="en-IN" dirty="0">
-              <a:solidFill>
-                <a:schemeClr val="bg1"/>
-              </a:solidFill>
-            </a:endParaRPr>
-          </a:p>
-        </p:txBody>
-      </p:sp>
     </p:spTree>
     <p:extLst>
       <p:ext uri="{BB962C8B-B14F-4D97-AF65-F5344CB8AC3E}">
-        <p14:creationId xmlns:p14="http://schemas.microsoft.com/office/powerpoint/2010/main" val="3966651940"/>
+        <p14:creationId xmlns:p14="http://schemas.microsoft.com/office/powerpoint/2010/main" val="1500864763"/>
       </p:ext>
     </p:extLst>
   </p:cSld>

</xml_diff>

<commit_message>
Added design for Asset Registry
</commit_message>
<xml_diff>
--- a/Docs/Features overview.pptx
+++ b/Docs/Features overview.pptx
@@ -5,7 +5,7 @@
     <p:sldMasterId id="2147483648" r:id="rId1"/>
   </p:sldMasterIdLst>
   <p:notesMasterIdLst>
-    <p:notesMasterId r:id="rId15"/>
+    <p:notesMasterId r:id="rId16"/>
   </p:notesMasterIdLst>
   <p:sldIdLst>
     <p:sldId id="257" r:id="rId2"/>
@@ -14,13 +14,14 @@
     <p:sldId id="260" r:id="rId5"/>
     <p:sldId id="261" r:id="rId6"/>
     <p:sldId id="265" r:id="rId7"/>
-    <p:sldId id="266" r:id="rId8"/>
-    <p:sldId id="267" r:id="rId9"/>
-    <p:sldId id="269" r:id="rId10"/>
-    <p:sldId id="270" r:id="rId11"/>
-    <p:sldId id="264" r:id="rId12"/>
-    <p:sldId id="263" r:id="rId13"/>
-    <p:sldId id="268" r:id="rId14"/>
+    <p:sldId id="271" r:id="rId8"/>
+    <p:sldId id="266" r:id="rId9"/>
+    <p:sldId id="267" r:id="rId10"/>
+    <p:sldId id="269" r:id="rId11"/>
+    <p:sldId id="270" r:id="rId12"/>
+    <p:sldId id="264" r:id="rId13"/>
+    <p:sldId id="263" r:id="rId14"/>
+    <p:sldId id="268" r:id="rId15"/>
   </p:sldIdLst>
   <p:sldSz cx="12192000" cy="6858000"/>
   <p:notesSz cx="6858000" cy="9144000"/>
@@ -138,6 +139,7 @@
         <p14:section name="Architecture" id="{1E3DDF86-35A2-4C35-AE2F-3253D6142A16}">
           <p14:sldIdLst>
             <p14:sldId id="265"/>
+            <p14:sldId id="271"/>
             <p14:sldId id="266"/>
             <p14:sldId id="267"/>
             <p14:sldId id="269"/>
@@ -252,7 +254,7 @@
           <a:p>
             <a:fld id="{3F16BF55-C0A5-4A93-9892-A2EE55AC4C70}" type="datetimeFigureOut">
               <a:rPr lang="en-IN" smtClean="0"/>
-              <a:t>17-09-2024</a:t>
+              <a:t>22-11-2024</a:t>
             </a:fld>
             <a:endParaRPr lang="en-IN"/>
           </a:p>
@@ -687,7 +689,7 @@
           <a:p>
             <a:fld id="{84B6F61C-9FA5-4C35-A1D3-00EE2C15A6C0}" type="datetimeFigureOut">
               <a:rPr lang="en-IN" smtClean="0"/>
-              <a:t>17-09-2024</a:t>
+              <a:t>22-11-2024</a:t>
             </a:fld>
             <a:endParaRPr lang="en-IN"/>
           </a:p>
@@ -916,7 +918,7 @@
           <a:p>
             <a:fld id="{84B6F61C-9FA5-4C35-A1D3-00EE2C15A6C0}" type="datetimeFigureOut">
               <a:rPr lang="en-IN" smtClean="0"/>
-              <a:t>17-09-2024</a:t>
+              <a:t>22-11-2024</a:t>
             </a:fld>
             <a:endParaRPr lang="en-IN"/>
           </a:p>
@@ -1140,7 +1142,7 @@
           <a:p>
             <a:fld id="{84B6F61C-9FA5-4C35-A1D3-00EE2C15A6C0}" type="datetimeFigureOut">
               <a:rPr lang="en-IN" smtClean="0"/>
-              <a:t>17-09-2024</a:t>
+              <a:t>22-11-2024</a:t>
             </a:fld>
             <a:endParaRPr lang="en-IN"/>
           </a:p>
@@ -1410,7 +1412,7 @@
           <a:p>
             <a:fld id="{84B6F61C-9FA5-4C35-A1D3-00EE2C15A6C0}" type="datetimeFigureOut">
               <a:rPr lang="en-IN" smtClean="0"/>
-              <a:t>17-09-2024</a:t>
+              <a:t>22-11-2024</a:t>
             </a:fld>
             <a:endParaRPr lang="en-IN" dirty="0"/>
           </a:p>
@@ -1797,7 +1799,7 @@
           <a:p>
             <a:fld id="{84B6F61C-9FA5-4C35-A1D3-00EE2C15A6C0}" type="datetimeFigureOut">
               <a:rPr lang="en-IN" smtClean="0"/>
-              <a:t>17-09-2024</a:t>
+              <a:t>22-11-2024</a:t>
             </a:fld>
             <a:endParaRPr lang="en-IN"/>
           </a:p>
@@ -2164,7 +2166,7 @@
           <a:p>
             <a:fld id="{84B6F61C-9FA5-4C35-A1D3-00EE2C15A6C0}" type="datetimeFigureOut">
               <a:rPr lang="en-IN" smtClean="0"/>
-              <a:t>17-09-2024</a:t>
+              <a:t>22-11-2024</a:t>
             </a:fld>
             <a:endParaRPr lang="en-IN"/>
           </a:p>
@@ -2593,7 +2595,7 @@
           <a:p>
             <a:fld id="{84B6F61C-9FA5-4C35-A1D3-00EE2C15A6C0}" type="datetimeFigureOut">
               <a:rPr lang="en-IN" smtClean="0"/>
-              <a:t>17-09-2024</a:t>
+              <a:t>22-11-2024</a:t>
             </a:fld>
             <a:endParaRPr lang="en-IN" dirty="0"/>
           </a:p>
@@ -2757,7 +2759,7 @@
           <a:p>
             <a:fld id="{84B6F61C-9FA5-4C35-A1D3-00EE2C15A6C0}" type="datetimeFigureOut">
               <a:rPr lang="en-IN" smtClean="0"/>
-              <a:t>17-09-2024</a:t>
+              <a:t>22-11-2024</a:t>
             </a:fld>
             <a:endParaRPr lang="en-IN"/>
           </a:p>
@@ -2889,7 +2891,7 @@
           <a:p>
             <a:fld id="{84B6F61C-9FA5-4C35-A1D3-00EE2C15A6C0}" type="datetimeFigureOut">
               <a:rPr lang="en-IN" smtClean="0"/>
-              <a:t>17-09-2024</a:t>
+              <a:t>22-11-2024</a:t>
             </a:fld>
             <a:endParaRPr lang="en-IN"/>
           </a:p>
@@ -3221,7 +3223,7 @@
           <a:p>
             <a:fld id="{84B6F61C-9FA5-4C35-A1D3-00EE2C15A6C0}" type="datetimeFigureOut">
               <a:rPr lang="en-IN" smtClean="0"/>
-              <a:t>17-09-2024</a:t>
+              <a:t>22-11-2024</a:t>
             </a:fld>
             <a:endParaRPr lang="en-IN"/>
           </a:p>
@@ -3524,7 +3526,7 @@
           <a:p>
             <a:fld id="{84B6F61C-9FA5-4C35-A1D3-00EE2C15A6C0}" type="datetimeFigureOut">
               <a:rPr lang="en-IN" smtClean="0"/>
-              <a:t>17-09-2024</a:t>
+              <a:t>22-11-2024</a:t>
             </a:fld>
             <a:endParaRPr lang="en-IN"/>
           </a:p>
@@ -3776,7 +3778,7 @@
           <a:p>
             <a:fld id="{84B6F61C-9FA5-4C35-A1D3-00EE2C15A6C0}" type="datetimeFigureOut">
               <a:rPr lang="en-IN" smtClean="0"/>
-              <a:t>17-09-2024</a:t>
+              <a:t>22-11-2024</a:t>
             </a:fld>
             <a:endParaRPr lang="en-IN"/>
           </a:p>
@@ -4399,6 +4401,131 @@
           <p:cNvPr id="2" name="Title 1">
             <a:extLst>
               <a:ext uri="{FF2B5EF4-FFF2-40B4-BE49-F238E27FC236}">
+                <a16:creationId xmlns:a16="http://schemas.microsoft.com/office/drawing/2014/main" id="{EA8547A1-DC4B-FAD6-56C5-C766B24032CC}"/>
+              </a:ext>
+            </a:extLst>
+          </p:cNvPr>
+          <p:cNvSpPr>
+            <a:spLocks noGrp="1"/>
+          </p:cNvSpPr>
+          <p:nvPr>
+            <p:ph type="title"/>
+          </p:nvPr>
+        </p:nvSpPr>
+        <p:spPr/>
+        <p:txBody>
+          <a:bodyPr/>
+          <a:lstStyle/>
+          <a:p>
+            <a:r>
+              <a:rPr lang="en-US" dirty="0"/>
+              <a:t>Visibility Buffer</a:t>
+            </a:r>
+            <a:endParaRPr lang="en-IN" dirty="0"/>
+          </a:p>
+        </p:txBody>
+      </p:sp>
+      <p:pic>
+        <p:nvPicPr>
+          <p:cNvPr id="7" name="Picture 6">
+            <a:extLst>
+              <a:ext uri="{FF2B5EF4-FFF2-40B4-BE49-F238E27FC236}">
+                <a16:creationId xmlns:a16="http://schemas.microsoft.com/office/drawing/2014/main" id="{A68B85AC-AEC4-7D84-4CD9-0484613CB7BD}"/>
+              </a:ext>
+            </a:extLst>
+          </p:cNvPr>
+          <p:cNvPicPr>
+            <a:picLocks noChangeAspect="1"/>
+          </p:cNvPicPr>
+          <p:nvPr/>
+        </p:nvPicPr>
+        <p:blipFill>
+          <a:blip r:embed="rId2">
+            <a:extLst>
+              <a:ext uri="{28A0092B-C50C-407E-A947-70E740481C1C}">
+                <a14:useLocalDpi xmlns:a14="http://schemas.microsoft.com/office/drawing/2010/main" val="0"/>
+              </a:ext>
+            </a:extLst>
+          </a:blip>
+          <a:stretch>
+            <a:fillRect/>
+          </a:stretch>
+        </p:blipFill>
+        <p:spPr>
+          <a:xfrm>
+            <a:off x="474306" y="1438432"/>
+            <a:ext cx="9931280" cy="4711159"/>
+          </a:xfrm>
+          <a:prstGeom prst="snip2DiagRect">
+            <a:avLst/>
+          </a:prstGeom>
+          <a:solidFill>
+            <a:srgbClr val="FFFFFF">
+              <a:shade val="85000"/>
+            </a:srgbClr>
+          </a:solidFill>
+          <a:ln w="88900" cap="sq">
+            <a:solidFill>
+              <a:srgbClr val="FFFFFF"/>
+            </a:solidFill>
+            <a:miter lim="800000"/>
+          </a:ln>
+          <a:effectLst>
+            <a:outerShdw blurRad="88900" algn="tl" rotWithShape="0">
+              <a:srgbClr val="000000">
+                <a:alpha val="45000"/>
+              </a:srgbClr>
+            </a:outerShdw>
+          </a:effectLst>
+          <a:scene3d>
+            <a:camera prst="orthographicFront"/>
+            <a:lightRig rig="twoPt" dir="t">
+              <a:rot lat="0" lon="0" rev="7200000"/>
+            </a:lightRig>
+          </a:scene3d>
+          <a:sp3d>
+            <a:bevelT w="25400" h="19050"/>
+            <a:contourClr>
+              <a:srgbClr val="FFFFFF"/>
+            </a:contourClr>
+          </a:sp3d>
+        </p:spPr>
+      </p:pic>
+    </p:spTree>
+    <p:extLst>
+      <p:ext uri="{BB962C8B-B14F-4D97-AF65-F5344CB8AC3E}">
+        <p14:creationId xmlns:p14="http://schemas.microsoft.com/office/powerpoint/2010/main" val="1500864763"/>
+      </p:ext>
+    </p:extLst>
+  </p:cSld>
+  <p:clrMapOvr>
+    <a:masterClrMapping/>
+  </p:clrMapOvr>
+</p:sld>
+</file>
+
+<file path=ppt/slides/slide11.xml><?xml version="1.0" encoding="utf-8"?>
+<p:sld xmlns:a="http://schemas.openxmlformats.org/drawingml/2006/main" xmlns:r="http://schemas.openxmlformats.org/officeDocument/2006/relationships" xmlns:p="http://schemas.openxmlformats.org/presentationml/2006/main">
+  <p:cSld>
+    <p:spTree>
+      <p:nvGrpSpPr>
+        <p:cNvPr id="1" name=""/>
+        <p:cNvGrpSpPr/>
+        <p:nvPr/>
+      </p:nvGrpSpPr>
+      <p:grpSpPr>
+        <a:xfrm>
+          <a:off x="0" y="0"/>
+          <a:ext cx="0" cy="0"/>
+          <a:chOff x="0" y="0"/>
+          <a:chExt cx="0" cy="0"/>
+        </a:xfrm>
+      </p:grpSpPr>
+      <p:sp>
+        <p:nvSpPr>
+          <p:cNvPr id="2" name="Title 1">
+            <a:extLst>
+              <a:ext uri="{FF2B5EF4-FFF2-40B4-BE49-F238E27FC236}">
                 <a16:creationId xmlns:a16="http://schemas.microsoft.com/office/drawing/2014/main" id="{29B77EB9-5BBE-EC6D-AC6E-0F405F8E38B2}"/>
               </a:ext>
             </a:extLst>
@@ -4436,7 +4563,7 @@
 </p:sld>
 </file>
 
-<file path=ppt/slides/slide11.xml><?xml version="1.0" encoding="utf-8"?>
+<file path=ppt/slides/slide12.xml><?xml version="1.0" encoding="utf-8"?>
 <p:sld xmlns:a="http://schemas.openxmlformats.org/drawingml/2006/main" xmlns:r="http://schemas.openxmlformats.org/officeDocument/2006/relationships" xmlns:p="http://schemas.openxmlformats.org/presentationml/2006/main">
   <p:cSld>
     <p:spTree>
@@ -4956,7 +5083,7 @@
 </p:sld>
 </file>
 
-<file path=ppt/slides/slide12.xml><?xml version="1.0" encoding="utf-8"?>
+<file path=ppt/slides/slide13.xml><?xml version="1.0" encoding="utf-8"?>
 <p:sld xmlns:a="http://schemas.openxmlformats.org/drawingml/2006/main" xmlns:r="http://schemas.openxmlformats.org/officeDocument/2006/relationships" xmlns:p="http://schemas.openxmlformats.org/presentationml/2006/main">
   <p:cSld>
     <p:spTree>
@@ -5537,7 +5664,7 @@
 </p:sld>
 </file>
 
-<file path=ppt/slides/slide13.xml><?xml version="1.0" encoding="utf-8"?>
+<file path=ppt/slides/slide14.xml><?xml version="1.0" encoding="utf-8"?>
 <p:sld xmlns:a="http://schemas.openxmlformats.org/drawingml/2006/main" xmlns:r="http://schemas.openxmlformats.org/officeDocument/2006/relationships" xmlns:p="http://schemas.openxmlformats.org/presentationml/2006/main">
   <p:cSld>
     <p:spTree>
@@ -9103,7 +9230,7 @@
         <p:spPr>
           <a:xfrm>
             <a:off x="9756773" y="5018649"/>
-            <a:ext cx="2129014" cy="286512"/>
+            <a:ext cx="2069305" cy="286512"/>
           </a:xfrm>
           <a:prstGeom prst="rect">
             <a:avLst/>
@@ -9146,10 +9273,14 @@
           <a:p>
             <a:pPr algn="ctr"/>
             <a:r>
-              <a:rPr lang="en-US" b="1" dirty="0"/>
-              <a:t>DrawCommandLists</a:t>
-            </a:r>
-            <a:endParaRPr lang="en-IN" b="1" dirty="0"/>
+              <a:rPr lang="en-US" sz="1200" b="1" dirty="0"/>
+              <a:t>Draw/Async </a:t>
+            </a:r>
+            <a:r>
+              <a:rPr lang="en-US" sz="1200" b="1" dirty="0" err="1"/>
+              <a:t>CommandLists</a:t>
+            </a:r>
+            <a:endParaRPr lang="en-IN" sz="1200" b="1" dirty="0"/>
           </a:p>
         </p:txBody>
       </p:sp>
@@ -9211,9 +9342,19 @@
                   </a:schemeClr>
                 </a:solidFill>
               </a:rPr>
-              <a:t>//TODO: Used to cache render commands for drawing batches b/w frames. </a:t>
-            </a:r>
-            <a:endParaRPr lang="en-IN" sz="1000" dirty="0">
+              <a:t>//TODO: Used to cache render commands for drawing batches b/w frames</a:t>
+            </a:r>
+            <a:r>
+              <a:rPr lang="en-US" sz="1000" b="1" dirty="0">
+                <a:solidFill>
+                  <a:schemeClr val="accent6">
+                    <a:lumMod val="50000"/>
+                  </a:schemeClr>
+                </a:solidFill>
+              </a:rPr>
+              <a:t>.  Commandlets????? </a:t>
+            </a:r>
+            <a:endParaRPr lang="en-IN" sz="1000" b="1" dirty="0">
               <a:solidFill>
                 <a:schemeClr val="accent6">
                   <a:lumMod val="50000"/>
@@ -9957,6 +10098,1858 @@
 </file>
 
 <file path=ppt/slides/slide7.xml><?xml version="1.0" encoding="utf-8"?>
+<p:sld xmlns:a="http://schemas.openxmlformats.org/drawingml/2006/main" xmlns:r="http://schemas.openxmlformats.org/officeDocument/2006/relationships" xmlns:p="http://schemas.openxmlformats.org/presentationml/2006/main">
+  <p:cSld>
+    <p:spTree>
+      <p:nvGrpSpPr>
+        <p:cNvPr id="1" name=""/>
+        <p:cNvGrpSpPr/>
+        <p:nvPr/>
+      </p:nvGrpSpPr>
+      <p:grpSpPr>
+        <a:xfrm>
+          <a:off x="0" y="0"/>
+          <a:ext cx="0" cy="0"/>
+          <a:chOff x="0" y="0"/>
+          <a:chExt cx="0" cy="0"/>
+        </a:xfrm>
+      </p:grpSpPr>
+      <p:sp>
+        <p:nvSpPr>
+          <p:cNvPr id="58" name="Rectangle 57">
+            <a:extLst>
+              <a:ext uri="{FF2B5EF4-FFF2-40B4-BE49-F238E27FC236}">
+                <a16:creationId xmlns:a16="http://schemas.microsoft.com/office/drawing/2014/main" id="{12809BDD-0631-4146-6B6E-CF0FEA436E48}"/>
+              </a:ext>
+            </a:extLst>
+          </p:cNvPr>
+          <p:cNvSpPr/>
+          <p:nvPr/>
+        </p:nvSpPr>
+        <p:spPr>
+          <a:xfrm>
+            <a:off x="738497" y="2699057"/>
+            <a:ext cx="10820776" cy="214815"/>
+          </a:xfrm>
+          <a:prstGeom prst="rect">
+            <a:avLst/>
+          </a:prstGeom>
+        </p:spPr>
+        <p:style>
+          <a:lnRef idx="2">
+            <a:schemeClr val="accent3">
+              <a:shade val="15000"/>
+            </a:schemeClr>
+          </a:lnRef>
+          <a:fillRef idx="1">
+            <a:schemeClr val="accent3"/>
+          </a:fillRef>
+          <a:effectRef idx="0">
+            <a:schemeClr val="accent3"/>
+          </a:effectRef>
+          <a:fontRef idx="minor">
+            <a:schemeClr val="lt1"/>
+          </a:fontRef>
+        </p:style>
+        <p:txBody>
+          <a:bodyPr rtlCol="0" anchor="ctr"/>
+          <a:lstStyle/>
+          <a:p>
+            <a:pPr algn="ctr"/>
+            <a:r>
+              <a:rPr lang="en-US" sz="1200" dirty="0">
+                <a:solidFill>
+                  <a:schemeClr val="tx1"/>
+                </a:solidFill>
+                <a:highlight>
+                  <a:srgbClr val="FFFF00"/>
+                </a:highlight>
+              </a:rPr>
+              <a:t>This whole process if </a:t>
+            </a:r>
+            <a:r>
+              <a:rPr lang="en-US" sz="1200" b="1" dirty="0">
+                <a:solidFill>
+                  <a:schemeClr val="tx1"/>
+                </a:solidFill>
+                <a:highlight>
+                  <a:srgbClr val="FFFF00"/>
+                </a:highlight>
+              </a:rPr>
+              <a:t>to and fro </a:t>
+            </a:r>
+            <a:r>
+              <a:rPr lang="en-US" sz="1200" dirty="0">
+                <a:solidFill>
+                  <a:schemeClr val="tx1"/>
+                </a:solidFill>
+                <a:highlight>
+                  <a:srgbClr val="FFFF00"/>
+                </a:highlight>
+              </a:rPr>
+              <a:t>compatible: Easy serialization of GPU run-time resources</a:t>
+            </a:r>
+            <a:endParaRPr lang="en-IN" sz="1200" dirty="0">
+              <a:solidFill>
+                <a:schemeClr val="tx1"/>
+              </a:solidFill>
+              <a:highlight>
+                <a:srgbClr val="FFFF00"/>
+              </a:highlight>
+            </a:endParaRPr>
+          </a:p>
+        </p:txBody>
+      </p:sp>
+      <p:sp>
+        <p:nvSpPr>
+          <p:cNvPr id="8" name="Rectangle 7">
+            <a:extLst>
+              <a:ext uri="{FF2B5EF4-FFF2-40B4-BE49-F238E27FC236}">
+                <a16:creationId xmlns:a16="http://schemas.microsoft.com/office/drawing/2014/main" id="{694BDC3F-46B9-C8E7-C20E-E01124DAA895}"/>
+              </a:ext>
+            </a:extLst>
+          </p:cNvPr>
+          <p:cNvSpPr/>
+          <p:nvPr/>
+        </p:nvSpPr>
+        <p:spPr>
+          <a:xfrm>
+            <a:off x="249765" y="4313445"/>
+            <a:ext cx="2313037" cy="836362"/>
+          </a:xfrm>
+          <a:prstGeom prst="rect">
+            <a:avLst/>
+          </a:prstGeom>
+        </p:spPr>
+        <p:style>
+          <a:lnRef idx="1">
+            <a:schemeClr val="accent6"/>
+          </a:lnRef>
+          <a:fillRef idx="3">
+            <a:schemeClr val="accent6"/>
+          </a:fillRef>
+          <a:effectRef idx="2">
+            <a:schemeClr val="accent6"/>
+          </a:effectRef>
+          <a:fontRef idx="minor">
+            <a:schemeClr val="lt1"/>
+          </a:fontRef>
+        </p:style>
+        <p:txBody>
+          <a:bodyPr rtlCol="0" anchor="ctr"/>
+          <a:lstStyle/>
+          <a:p>
+            <a:pPr algn="ctr"/>
+            <a:r>
+              <a:rPr lang="en-US" b="1" dirty="0">
+                <a:solidFill>
+                  <a:schemeClr val="tx1"/>
+                </a:solidFill>
+              </a:rPr>
+              <a:t>RZAssetDataBase</a:t>
+            </a:r>
+          </a:p>
+          <a:p>
+            <a:pPr algn="ctr"/>
+            <a:r>
+              <a:rPr lang="en-US" sz="1200" dirty="0">
+                <a:solidFill>
+                  <a:schemeClr val="tx1"/>
+                </a:solidFill>
+              </a:rPr>
+              <a:t>Creates, Add, Removes, provides references to </a:t>
+            </a:r>
+            <a:r>
+              <a:rPr lang="en-US" sz="1200" dirty="0">
+                <a:solidFill>
+                  <a:schemeClr val="tx1"/>
+                </a:solidFill>
+                <a:latin typeface="Courier New" panose="02070309020205020404" pitchFamily="49" charset="0"/>
+                <a:cs typeface="Courier New" panose="02070309020205020404" pitchFamily="49" charset="0"/>
+              </a:rPr>
+              <a:t>RZAssetBase</a:t>
+            </a:r>
+            <a:r>
+              <a:rPr lang="en-US" sz="1200" dirty="0">
+                <a:solidFill>
+                  <a:schemeClr val="tx1"/>
+                </a:solidFill>
+              </a:rPr>
+              <a:t> etc. </a:t>
+            </a:r>
+            <a:br>
+              <a:rPr lang="en-US" sz="1200" dirty="0">
+                <a:solidFill>
+                  <a:schemeClr val="tx1"/>
+                </a:solidFill>
+              </a:rPr>
+            </a:br>
+            <a:r>
+              <a:rPr lang="en-US" sz="1200" i="1" dirty="0">
+                <a:solidFill>
+                  <a:schemeClr val="tx1"/>
+                </a:solidFill>
+              </a:rPr>
+              <a:t>Backend</a:t>
+            </a:r>
+            <a:r>
+              <a:rPr lang="en-US" sz="1200" dirty="0">
+                <a:solidFill>
+                  <a:schemeClr val="tx1"/>
+                </a:solidFill>
+              </a:rPr>
+              <a:t>: </a:t>
+            </a:r>
+            <a:r>
+              <a:rPr lang="en-US" sz="1200" b="1" i="1" u="sng" dirty="0">
+                <a:solidFill>
+                  <a:schemeClr val="tx1"/>
+                </a:solidFill>
+              </a:rPr>
+              <a:t>Redis</a:t>
+            </a:r>
+            <a:endParaRPr lang="en-IN" sz="1200" b="1" i="1" u="sng" dirty="0">
+              <a:solidFill>
+                <a:schemeClr val="tx1"/>
+              </a:solidFill>
+            </a:endParaRPr>
+          </a:p>
+        </p:txBody>
+      </p:sp>
+      <p:sp>
+        <p:nvSpPr>
+          <p:cNvPr id="2" name="Title 1">
+            <a:extLst>
+              <a:ext uri="{FF2B5EF4-FFF2-40B4-BE49-F238E27FC236}">
+                <a16:creationId xmlns:a16="http://schemas.microsoft.com/office/drawing/2014/main" id="{E5C609C4-18F8-5DFA-06D4-AD900C8F5F01}"/>
+              </a:ext>
+            </a:extLst>
+          </p:cNvPr>
+          <p:cNvSpPr>
+            <a:spLocks noGrp="1"/>
+          </p:cNvSpPr>
+          <p:nvPr>
+            <p:ph type="title"/>
+          </p:nvPr>
+        </p:nvSpPr>
+        <p:spPr/>
+        <p:txBody>
+          <a:bodyPr/>
+          <a:lstStyle/>
+          <a:p>
+            <a:r>
+              <a:rPr lang="en-US" dirty="0"/>
+              <a:t>Asset Registry System</a:t>
+            </a:r>
+            <a:endParaRPr lang="en-IN" dirty="0"/>
+          </a:p>
+        </p:txBody>
+      </p:sp>
+      <p:grpSp>
+        <p:nvGrpSpPr>
+          <p:cNvPr id="7" name="Group 6">
+            <a:extLst>
+              <a:ext uri="{FF2B5EF4-FFF2-40B4-BE49-F238E27FC236}">
+                <a16:creationId xmlns:a16="http://schemas.microsoft.com/office/drawing/2014/main" id="{2C823D52-7CF3-1716-55AC-B3678290099E}"/>
+              </a:ext>
+            </a:extLst>
+          </p:cNvPr>
+          <p:cNvGrpSpPr/>
+          <p:nvPr/>
+        </p:nvGrpSpPr>
+        <p:grpSpPr>
+          <a:xfrm>
+            <a:off x="964849" y="5259377"/>
+            <a:ext cx="794582" cy="1147729"/>
+            <a:chOff x="586478" y="3033286"/>
+            <a:chExt cx="794582" cy="1147729"/>
+          </a:xfrm>
+        </p:grpSpPr>
+        <p:sp>
+          <p:nvSpPr>
+            <p:cNvPr id="6" name="Flowchart: Magnetic Disk 5">
+              <a:extLst>
+                <a:ext uri="{FF2B5EF4-FFF2-40B4-BE49-F238E27FC236}">
+                  <a16:creationId xmlns:a16="http://schemas.microsoft.com/office/drawing/2014/main" id="{49382EEF-4E53-B254-12EB-8B0D635F2CA4}"/>
+                </a:ext>
+              </a:extLst>
+            </p:cNvPr>
+            <p:cNvSpPr/>
+            <p:nvPr/>
+          </p:nvSpPr>
+          <p:spPr>
+            <a:xfrm>
+              <a:off x="586478" y="3033286"/>
+              <a:ext cx="794582" cy="1147729"/>
+            </a:xfrm>
+            <a:prstGeom prst="flowChartMagneticDisk">
+              <a:avLst/>
+            </a:prstGeom>
+          </p:spPr>
+          <p:style>
+            <a:lnRef idx="2">
+              <a:schemeClr val="accent4">
+                <a:shade val="15000"/>
+              </a:schemeClr>
+            </a:lnRef>
+            <a:fillRef idx="1">
+              <a:schemeClr val="accent4"/>
+            </a:fillRef>
+            <a:effectRef idx="0">
+              <a:schemeClr val="accent4"/>
+            </a:effectRef>
+            <a:fontRef idx="minor">
+              <a:schemeClr val="lt1"/>
+            </a:fontRef>
+          </p:style>
+          <p:txBody>
+            <a:bodyPr rtlCol="0" anchor="ctr"/>
+            <a:lstStyle/>
+            <a:p>
+              <a:pPr algn="ctr"/>
+              <a:endParaRPr lang="en-IN"/>
+            </a:p>
+          </p:txBody>
+        </p:sp>
+        <p:pic>
+          <p:nvPicPr>
+            <p:cNvPr id="1030" name="Picture 6" descr="Redis - Update logo [#3303487] | Drupal.org">
+              <a:extLst>
+                <a:ext uri="{FF2B5EF4-FFF2-40B4-BE49-F238E27FC236}">
+                  <a16:creationId xmlns:a16="http://schemas.microsoft.com/office/drawing/2014/main" id="{EAAEAC2D-F209-A667-E8A3-C2F374FEAB33}"/>
+                </a:ext>
+              </a:extLst>
+            </p:cNvPr>
+            <p:cNvPicPr>
+              <a:picLocks noChangeAspect="1" noChangeArrowheads="1"/>
+            </p:cNvPicPr>
+            <p:nvPr/>
+          </p:nvPicPr>
+          <p:blipFill>
+            <a:blip r:embed="rId2">
+              <a:extLst>
+                <a:ext uri="{28A0092B-C50C-407E-A947-70E740481C1C}">
+                  <a14:useLocalDpi xmlns:a14="http://schemas.microsoft.com/office/drawing/2010/main" val="0"/>
+                </a:ext>
+              </a:extLst>
+            </a:blip>
+            <a:srcRect/>
+            <a:stretch>
+              <a:fillRect/>
+            </a:stretch>
+          </p:blipFill>
+          <p:spPr bwMode="auto">
+            <a:xfrm>
+              <a:off x="586478" y="3428999"/>
+              <a:ext cx="794582" cy="752015"/>
+            </a:xfrm>
+            <a:prstGeom prst="rect">
+              <a:avLst/>
+            </a:prstGeom>
+            <a:noFill/>
+            <a:extLst>
+              <a:ext uri="{909E8E84-426E-40DD-AFC4-6F175D3DCCD1}">
+                <a14:hiddenFill xmlns:a14="http://schemas.microsoft.com/office/drawing/2010/main">
+                  <a:solidFill>
+                    <a:srgbClr val="FFFFFF"/>
+                  </a:solidFill>
+                </a14:hiddenFill>
+              </a:ext>
+            </a:extLst>
+          </p:spPr>
+        </p:pic>
+      </p:grpSp>
+      <p:sp>
+        <p:nvSpPr>
+          <p:cNvPr id="9" name="Rectangle 8">
+            <a:extLst>
+              <a:ext uri="{FF2B5EF4-FFF2-40B4-BE49-F238E27FC236}">
+                <a16:creationId xmlns:a16="http://schemas.microsoft.com/office/drawing/2014/main" id="{ACBB4DA5-BBDF-00AA-01B4-C5CD2077D5CF}"/>
+              </a:ext>
+            </a:extLst>
+          </p:cNvPr>
+          <p:cNvSpPr/>
+          <p:nvPr/>
+        </p:nvSpPr>
+        <p:spPr>
+          <a:xfrm>
+            <a:off x="738497" y="1058938"/>
+            <a:ext cx="1431509" cy="726792"/>
+          </a:xfrm>
+          <a:prstGeom prst="rect">
+            <a:avLst/>
+          </a:prstGeom>
+        </p:spPr>
+        <p:style>
+          <a:lnRef idx="2">
+            <a:schemeClr val="accent5">
+              <a:shade val="15000"/>
+            </a:schemeClr>
+          </a:lnRef>
+          <a:fillRef idx="1">
+            <a:schemeClr val="accent5"/>
+          </a:fillRef>
+          <a:effectRef idx="0">
+            <a:schemeClr val="accent5"/>
+          </a:effectRef>
+          <a:fontRef idx="minor">
+            <a:schemeClr val="lt1"/>
+          </a:fontRef>
+        </p:style>
+        <p:txBody>
+          <a:bodyPr rtlCol="0" anchor="ctr"/>
+          <a:lstStyle/>
+          <a:p>
+            <a:pPr algn="ctr"/>
+            <a:r>
+              <a:rPr lang="en-US" sz="1600" dirty="0">
+                <a:solidFill>
+                  <a:schemeClr val="tx1"/>
+                </a:solidFill>
+                <a:latin typeface="+mj-lt"/>
+                <a:cs typeface="Courier New" panose="02070309020205020404" pitchFamily="49" charset="0"/>
+              </a:rPr>
+              <a:t>RZAssetBase</a:t>
+            </a:r>
+          </a:p>
+          <a:p>
+            <a:pPr algn="ctr"/>
+            <a:r>
+              <a:rPr lang="en-US" sz="1000" dirty="0">
+                <a:solidFill>
+                  <a:schemeClr val="tx1"/>
+                </a:solidFill>
+                <a:latin typeface="+mj-lt"/>
+                <a:cs typeface="Courier New" panose="02070309020205020404" pitchFamily="49" charset="0"/>
+              </a:rPr>
+              <a:t>Common interface to create and register different types of assets</a:t>
+            </a:r>
+            <a:endParaRPr lang="en-IN" sz="1000" dirty="0">
+              <a:latin typeface="+mj-lt"/>
+            </a:endParaRPr>
+          </a:p>
+        </p:txBody>
+      </p:sp>
+      <p:sp>
+        <p:nvSpPr>
+          <p:cNvPr id="10" name="Rectangle 9">
+            <a:extLst>
+              <a:ext uri="{FF2B5EF4-FFF2-40B4-BE49-F238E27FC236}">
+                <a16:creationId xmlns:a16="http://schemas.microsoft.com/office/drawing/2014/main" id="{B09D01EE-89C3-99B7-3823-74BFF88E032A}"/>
+              </a:ext>
+            </a:extLst>
+          </p:cNvPr>
+          <p:cNvSpPr/>
+          <p:nvPr/>
+        </p:nvSpPr>
+        <p:spPr>
+          <a:xfrm>
+            <a:off x="738497" y="1886338"/>
+            <a:ext cx="1431509" cy="726792"/>
+          </a:xfrm>
+          <a:prstGeom prst="rect">
+            <a:avLst/>
+          </a:prstGeom>
+        </p:spPr>
+        <p:style>
+          <a:lnRef idx="2">
+            <a:schemeClr val="accent2">
+              <a:shade val="15000"/>
+            </a:schemeClr>
+          </a:lnRef>
+          <a:fillRef idx="1">
+            <a:schemeClr val="accent2"/>
+          </a:fillRef>
+          <a:effectRef idx="0">
+            <a:schemeClr val="accent2"/>
+          </a:effectRef>
+          <a:fontRef idx="minor">
+            <a:schemeClr val="lt1"/>
+          </a:fontRef>
+        </p:style>
+        <p:txBody>
+          <a:bodyPr rtlCol="0" anchor="ctr"/>
+          <a:lstStyle/>
+          <a:p>
+            <a:pPr algn="ctr"/>
+            <a:r>
+              <a:rPr lang="en-US" sz="1600" dirty="0">
+                <a:solidFill>
+                  <a:schemeClr val="tx1"/>
+                </a:solidFill>
+                <a:latin typeface="+mj-lt"/>
+                <a:cs typeface="Courier New" panose="02070309020205020404" pitchFamily="49" charset="0"/>
+              </a:rPr>
+              <a:t>RZSerializable</a:t>
+            </a:r>
+          </a:p>
+          <a:p>
+            <a:pPr algn="ctr"/>
+            <a:r>
+              <a:rPr lang="en-US" sz="1000" i="1" dirty="0">
+                <a:solidFill>
+                  <a:schemeClr val="tx1"/>
+                </a:solidFill>
+              </a:rPr>
+              <a:t>global serialization abstraction for the entire engine</a:t>
+            </a:r>
+            <a:endParaRPr lang="en-IN" sz="1000" dirty="0">
+              <a:latin typeface="+mj-lt"/>
+            </a:endParaRPr>
+          </a:p>
+        </p:txBody>
+      </p:sp>
+      <p:sp>
+        <p:nvSpPr>
+          <p:cNvPr id="11" name="Rectangle 10">
+            <a:extLst>
+              <a:ext uri="{FF2B5EF4-FFF2-40B4-BE49-F238E27FC236}">
+                <a16:creationId xmlns:a16="http://schemas.microsoft.com/office/drawing/2014/main" id="{AA34AFB5-60FB-2A02-1433-A9E1EE05D376}"/>
+              </a:ext>
+            </a:extLst>
+          </p:cNvPr>
+          <p:cNvSpPr/>
+          <p:nvPr/>
+        </p:nvSpPr>
+        <p:spPr>
+          <a:xfrm>
+            <a:off x="940965" y="3183430"/>
+            <a:ext cx="1026571" cy="836362"/>
+          </a:xfrm>
+          <a:prstGeom prst="rect">
+            <a:avLst/>
+          </a:prstGeom>
+          <a:solidFill>
+            <a:schemeClr val="accent3">
+              <a:alpha val="50000"/>
+            </a:schemeClr>
+          </a:solidFill>
+          <a:ln>
+            <a:noFill/>
+          </a:ln>
+        </p:spPr>
+        <p:style>
+          <a:lnRef idx="0">
+            <a:scrgbClr r="0" g="0" b="0"/>
+          </a:lnRef>
+          <a:fillRef idx="0">
+            <a:scrgbClr r="0" g="0" b="0"/>
+          </a:fillRef>
+          <a:effectRef idx="0">
+            <a:scrgbClr r="0" g="0" b="0"/>
+          </a:effectRef>
+          <a:fontRef idx="minor">
+            <a:schemeClr val="lt1"/>
+          </a:fontRef>
+        </p:style>
+        <p:txBody>
+          <a:bodyPr rtlCol="0" anchor="ctr"/>
+          <a:lstStyle/>
+          <a:p>
+            <a:pPr algn="ctr"/>
+            <a:r>
+              <a:rPr lang="en-US" sz="1000" dirty="0" err="1"/>
+              <a:t>RZModelAsset</a:t>
+            </a:r>
+            <a:br>
+              <a:rPr lang="en-US" sz="1000" dirty="0"/>
+            </a:br>
+            <a:r>
+              <a:rPr lang="en-US" sz="1000" dirty="0" err="1"/>
+              <a:t>RZTextureAsset</a:t>
+            </a:r>
+            <a:br>
+              <a:rPr lang="en-US" sz="1000" dirty="0"/>
+            </a:br>
+            <a:r>
+              <a:rPr lang="en-US" sz="1000" dirty="0" err="1"/>
+              <a:t>RZPlayerAsset</a:t>
+            </a:r>
+            <a:br>
+              <a:rPr lang="en-US" sz="1000" dirty="0"/>
+            </a:br>
+            <a:r>
+              <a:rPr lang="en-US" sz="1000" dirty="0" err="1"/>
+              <a:t>RZVehicleAsset</a:t>
+            </a:r>
+            <a:br>
+              <a:rPr lang="en-US" sz="1000" dirty="0"/>
+            </a:br>
+            <a:r>
+              <a:rPr lang="en-US" sz="1000" dirty="0" err="1"/>
+              <a:t>etc</a:t>
+            </a:r>
+            <a:r>
+              <a:rPr lang="en-US" sz="1000" dirty="0"/>
+              <a:t>…</a:t>
+            </a:r>
+            <a:endParaRPr lang="en-IN" sz="1000" dirty="0"/>
+          </a:p>
+        </p:txBody>
+      </p:sp>
+      <p:sp>
+        <p:nvSpPr>
+          <p:cNvPr id="16" name="TextBox 15">
+            <a:extLst>
+              <a:ext uri="{FF2B5EF4-FFF2-40B4-BE49-F238E27FC236}">
+                <a16:creationId xmlns:a16="http://schemas.microsoft.com/office/drawing/2014/main" id="{9250BDB5-7CD6-0DA3-4E1A-FA877812ADCB}"/>
+              </a:ext>
+            </a:extLst>
+          </p:cNvPr>
+          <p:cNvSpPr txBox="1"/>
+          <p:nvPr/>
+        </p:nvSpPr>
+        <p:spPr>
+          <a:xfrm>
+            <a:off x="1917088" y="3093779"/>
+            <a:ext cx="3604785" cy="1015663"/>
+          </a:xfrm>
+          <a:prstGeom prst="rect">
+            <a:avLst/>
+          </a:prstGeom>
+        </p:spPr>
+        <p:style>
+          <a:lnRef idx="0">
+            <a:schemeClr val="accent3"/>
+          </a:lnRef>
+          <a:fillRef idx="3">
+            <a:schemeClr val="accent3"/>
+          </a:fillRef>
+          <a:effectRef idx="3">
+            <a:schemeClr val="accent3"/>
+          </a:effectRef>
+          <a:fontRef idx="minor">
+            <a:schemeClr val="lt1"/>
+          </a:fontRef>
+        </p:style>
+        <p:txBody>
+          <a:bodyPr wrap="square" rtlCol="0">
+            <a:spAutoFit/>
+          </a:bodyPr>
+          <a:lstStyle/>
+          <a:p>
+            <a:r>
+              <a:rPr lang="en-US" sz="1200" dirty="0">
+                <a:solidFill>
+                  <a:schemeClr val="tx1"/>
+                </a:solidFill>
+              </a:rPr>
+              <a:t>All assets that are stored in the database are derived from </a:t>
+            </a:r>
+            <a:r>
+              <a:rPr lang="en-US" sz="1200" b="1" dirty="0">
+                <a:solidFill>
+                  <a:schemeClr val="tx1"/>
+                </a:solidFill>
+              </a:rPr>
+              <a:t>RZSerializable</a:t>
+            </a:r>
+            <a:r>
+              <a:rPr lang="en-US" sz="1200" dirty="0">
+                <a:solidFill>
+                  <a:schemeClr val="tx1"/>
+                </a:solidFill>
+              </a:rPr>
+              <a:t> + </a:t>
+            </a:r>
+            <a:r>
+              <a:rPr lang="en-US" sz="1200" b="1" dirty="0">
+                <a:solidFill>
+                  <a:schemeClr val="tx1"/>
+                </a:solidFill>
+              </a:rPr>
+              <a:t>RZAssetBase</a:t>
+            </a:r>
+            <a:r>
+              <a:rPr lang="en-US" sz="1200" dirty="0">
+                <a:solidFill>
+                  <a:schemeClr val="tx1"/>
+                </a:solidFill>
+              </a:rPr>
+              <a:t>….stored into </a:t>
+            </a:r>
+          </a:p>
+          <a:p>
+            <a:r>
+              <a:rPr lang="en-US" sz="1200" dirty="0">
+                <a:solidFill>
+                  <a:schemeClr val="tx1"/>
+                </a:solidFill>
+              </a:rPr>
+              <a:t>database-&gt;</a:t>
+            </a:r>
+            <a:r>
+              <a:rPr lang="en-US" sz="1200" b="1" dirty="0" err="1">
+                <a:solidFill>
+                  <a:schemeClr val="tx1"/>
+                </a:solidFill>
+              </a:rPr>
+              <a:t>rz_game_assets.redisdb</a:t>
+            </a:r>
+            <a:r>
+              <a:rPr lang="en-US" sz="1200" b="1" dirty="0">
+                <a:solidFill>
+                  <a:schemeClr val="tx1"/>
+                </a:solidFill>
+              </a:rPr>
+              <a:t> </a:t>
+            </a:r>
+            <a:r>
+              <a:rPr lang="en-US" sz="1200" dirty="0">
+                <a:solidFill>
+                  <a:schemeClr val="tx1"/>
+                </a:solidFill>
+              </a:rPr>
+              <a:t>and are called </a:t>
+            </a:r>
+            <a:r>
+              <a:rPr lang="en-US" sz="1200" b="1" dirty="0">
+                <a:solidFill>
+                  <a:schemeClr val="tx1"/>
+                </a:solidFill>
+              </a:rPr>
+              <a:t>*.asset</a:t>
+            </a:r>
+            <a:r>
+              <a:rPr lang="en-US" sz="1200" dirty="0">
+                <a:solidFill>
+                  <a:schemeClr val="tx1"/>
+                </a:solidFill>
+              </a:rPr>
+              <a:t>…we also provide APIs to </a:t>
+            </a:r>
+            <a:r>
+              <a:rPr lang="en-US" sz="1200" u="sng" dirty="0">
+                <a:solidFill>
+                  <a:schemeClr val="tx1"/>
+                </a:solidFill>
+              </a:rPr>
+              <a:t>extend to new types and make serialization easy</a:t>
+            </a:r>
+            <a:r>
+              <a:rPr lang="en-US" sz="1200" dirty="0">
+                <a:solidFill>
+                  <a:schemeClr val="tx1"/>
+                </a:solidFill>
+              </a:rPr>
+              <a:t>.</a:t>
+            </a:r>
+            <a:endParaRPr lang="en-IN" sz="1200" dirty="0">
+              <a:solidFill>
+                <a:schemeClr val="tx1"/>
+              </a:solidFill>
+            </a:endParaRPr>
+          </a:p>
+        </p:txBody>
+      </p:sp>
+      <p:sp>
+        <p:nvSpPr>
+          <p:cNvPr id="17" name="Rectangle 16">
+            <a:extLst>
+              <a:ext uri="{FF2B5EF4-FFF2-40B4-BE49-F238E27FC236}">
+                <a16:creationId xmlns:a16="http://schemas.microsoft.com/office/drawing/2014/main" id="{0071345C-C008-7D63-CB74-2F069D787241}"/>
+              </a:ext>
+            </a:extLst>
+          </p:cNvPr>
+          <p:cNvSpPr/>
+          <p:nvPr/>
+        </p:nvSpPr>
+        <p:spPr>
+          <a:xfrm>
+            <a:off x="1917088" y="5301879"/>
+            <a:ext cx="3604785" cy="1458435"/>
+          </a:xfrm>
+          <a:prstGeom prst="rect">
+            <a:avLst/>
+          </a:prstGeom>
+        </p:spPr>
+        <p:style>
+          <a:lnRef idx="0">
+            <a:schemeClr val="accent4"/>
+          </a:lnRef>
+          <a:fillRef idx="3">
+            <a:schemeClr val="accent4"/>
+          </a:fillRef>
+          <a:effectRef idx="3">
+            <a:schemeClr val="accent4"/>
+          </a:effectRef>
+          <a:fontRef idx="minor">
+            <a:schemeClr val="lt1"/>
+          </a:fontRef>
+        </p:style>
+        <p:txBody>
+          <a:bodyPr rtlCol="0" anchor="ctr"/>
+          <a:lstStyle/>
+          <a:p>
+            <a:pPr marL="171450" indent="-171450">
+              <a:buFont typeface="Arial" panose="020B0604020202020204" pitchFamily="34" charset="0"/>
+              <a:buChar char="•"/>
+            </a:pPr>
+            <a:r>
+              <a:rPr lang="en-US" sz="1200" i="1" u="sng" dirty="0">
+                <a:solidFill>
+                  <a:schemeClr val="tx1"/>
+                </a:solidFill>
+              </a:rPr>
+              <a:t>Created and Maintained by the Engine Instance.</a:t>
+            </a:r>
+          </a:p>
+          <a:p>
+            <a:pPr marL="171450" indent="-171450">
+              <a:buFont typeface="Arial" panose="020B0604020202020204" pitchFamily="34" charset="0"/>
+              <a:buChar char="•"/>
+            </a:pPr>
+            <a:r>
+              <a:rPr lang="en-US" sz="1200" i="1" u="sng" dirty="0">
+                <a:solidFill>
+                  <a:schemeClr val="tx1"/>
+                </a:solidFill>
+              </a:rPr>
+              <a:t>Primarily Used to load assets into run-time and manage Serialization and lifetime.</a:t>
+            </a:r>
+          </a:p>
+          <a:p>
+            <a:pPr marL="171450" indent="-171450">
+              <a:buFont typeface="Arial" panose="020B0604020202020204" pitchFamily="34" charset="0"/>
+              <a:buChar char="•"/>
+            </a:pPr>
+            <a:r>
+              <a:rPr lang="en-US" sz="1200" dirty="0">
+                <a:solidFill>
+                  <a:schemeClr val="tx1"/>
+                </a:solidFill>
+              </a:rPr>
+              <a:t>Editor can connect via Network if needed and issue command for RZAssetDBNetworkTranslatorLayer to instantiate resources in the engine.</a:t>
+            </a:r>
+          </a:p>
+          <a:p>
+            <a:pPr marL="171450" indent="-171450">
+              <a:buFont typeface="Arial" panose="020B0604020202020204" pitchFamily="34" charset="0"/>
+              <a:buChar char="•"/>
+            </a:pPr>
+            <a:r>
+              <a:rPr lang="en-US" sz="1200" dirty="0">
+                <a:solidFill>
+                  <a:schemeClr val="tx1"/>
+                </a:solidFill>
+              </a:rPr>
+              <a:t>[Optional] Might use a </a:t>
+            </a:r>
+            <a:r>
+              <a:rPr lang="en-US" sz="1200" i="1" dirty="0">
+                <a:solidFill>
+                  <a:schemeClr val="tx1"/>
+                </a:solidFill>
+              </a:rPr>
+              <a:t>secondary</a:t>
+            </a:r>
+            <a:r>
+              <a:rPr lang="en-US" sz="1200" dirty="0">
+                <a:solidFill>
+                  <a:schemeClr val="tx1"/>
+                </a:solidFill>
+              </a:rPr>
+              <a:t> Redis server to manage vault resources for Game Team.</a:t>
+            </a:r>
+            <a:endParaRPr lang="en-IN" sz="1200" dirty="0">
+              <a:solidFill>
+                <a:schemeClr val="tx1"/>
+              </a:solidFill>
+            </a:endParaRPr>
+          </a:p>
+        </p:txBody>
+      </p:sp>
+      <p:sp>
+        <p:nvSpPr>
+          <p:cNvPr id="24" name="Rectangle 23">
+            <a:extLst>
+              <a:ext uri="{FF2B5EF4-FFF2-40B4-BE49-F238E27FC236}">
+                <a16:creationId xmlns:a16="http://schemas.microsoft.com/office/drawing/2014/main" id="{85142CAE-F660-B59B-9729-F579C50DCDEE}"/>
+              </a:ext>
+            </a:extLst>
+          </p:cNvPr>
+          <p:cNvSpPr/>
+          <p:nvPr/>
+        </p:nvSpPr>
+        <p:spPr>
+          <a:xfrm>
+            <a:off x="2781037" y="1372634"/>
+            <a:ext cx="2121329" cy="1082858"/>
+          </a:xfrm>
+          <a:prstGeom prst="rect">
+            <a:avLst/>
+          </a:prstGeom>
+          <a:gradFill flip="none" rotWithShape="1">
+            <a:gsLst>
+              <a:gs pos="0">
+                <a:schemeClr val="accent5">
+                  <a:lumMod val="67000"/>
+                </a:schemeClr>
+              </a:gs>
+              <a:gs pos="48000">
+                <a:schemeClr val="accent5">
+                  <a:lumMod val="97000"/>
+                  <a:lumOff val="3000"/>
+                </a:schemeClr>
+              </a:gs>
+              <a:gs pos="100000">
+                <a:schemeClr val="accent5">
+                  <a:lumMod val="60000"/>
+                  <a:lumOff val="40000"/>
+                </a:schemeClr>
+              </a:gs>
+            </a:gsLst>
+            <a:lin ang="16200000" scaled="1"/>
+            <a:tileRect/>
+          </a:gradFill>
+          <a:ln>
+            <a:noFill/>
+          </a:ln>
+        </p:spPr>
+        <p:style>
+          <a:lnRef idx="0">
+            <a:scrgbClr r="0" g="0" b="0"/>
+          </a:lnRef>
+          <a:fillRef idx="0">
+            <a:scrgbClr r="0" g="0" b="0"/>
+          </a:fillRef>
+          <a:effectRef idx="0">
+            <a:scrgbClr r="0" g="0" b="0"/>
+          </a:effectRef>
+          <a:fontRef idx="minor">
+            <a:schemeClr val="lt1"/>
+          </a:fontRef>
+        </p:style>
+        <p:txBody>
+          <a:bodyPr rtlCol="0" anchor="ctr"/>
+          <a:lstStyle/>
+          <a:p>
+            <a:pPr algn="ctr"/>
+            <a:r>
+              <a:rPr lang="en-US" sz="1600" dirty="0" err="1">
+                <a:solidFill>
+                  <a:schemeClr val="tx1"/>
+                </a:solidFill>
+                <a:latin typeface="+mj-lt"/>
+                <a:cs typeface="Courier New" panose="02070309020205020404" pitchFamily="49" charset="0"/>
+              </a:rPr>
+              <a:t>RZAssetBuilder</a:t>
+            </a:r>
+            <a:endParaRPr lang="en-US" sz="1600" dirty="0">
+              <a:solidFill>
+                <a:schemeClr val="tx1"/>
+              </a:solidFill>
+              <a:latin typeface="+mj-lt"/>
+              <a:cs typeface="Courier New" panose="02070309020205020404" pitchFamily="49" charset="0"/>
+            </a:endParaRPr>
+          </a:p>
+          <a:p>
+            <a:pPr algn="ctr"/>
+            <a:r>
+              <a:rPr lang="en-US" sz="1000" dirty="0">
+                <a:solidFill>
+                  <a:schemeClr val="tx1"/>
+                </a:solidFill>
+                <a:latin typeface="+mj-lt"/>
+                <a:cs typeface="Courier New" panose="02070309020205020404" pitchFamily="49" charset="0"/>
+              </a:rPr>
+              <a:t>Class to create new assets types and assign data to it. Also, this class manages Proxies to convert to and from the RZAssetBase using </a:t>
+            </a:r>
+            <a:r>
+              <a:rPr lang="en-US" sz="1000" dirty="0" err="1">
+                <a:solidFill>
+                  <a:schemeClr val="tx1"/>
+                </a:solidFill>
+                <a:latin typeface="+mj-lt"/>
+                <a:cs typeface="Courier New" panose="02070309020205020404" pitchFamily="49" charset="0"/>
+              </a:rPr>
+              <a:t>RZAssetProxy</a:t>
+            </a:r>
+            <a:endParaRPr lang="en-IN" sz="1000" b="1" dirty="0">
+              <a:latin typeface="+mj-lt"/>
+            </a:endParaRPr>
+          </a:p>
+        </p:txBody>
+      </p:sp>
+      <p:cxnSp>
+        <p:nvCxnSpPr>
+          <p:cNvPr id="25" name="Connector: Elbow 24">
+            <a:extLst>
+              <a:ext uri="{FF2B5EF4-FFF2-40B4-BE49-F238E27FC236}">
+                <a16:creationId xmlns:a16="http://schemas.microsoft.com/office/drawing/2014/main" id="{BBEDE229-AC36-A2FA-7F7E-1A32F91929C0}"/>
+              </a:ext>
+            </a:extLst>
+          </p:cNvPr>
+          <p:cNvCxnSpPr>
+            <a:cxnSpLocks/>
+            <a:stCxn id="9" idx="3"/>
+            <a:endCxn id="24" idx="1"/>
+          </p:cNvCxnSpPr>
+          <p:nvPr/>
+        </p:nvCxnSpPr>
+        <p:spPr>
+          <a:xfrm>
+            <a:off x="2170006" y="1422334"/>
+            <a:ext cx="611031" cy="491729"/>
+          </a:xfrm>
+          <a:prstGeom prst="bentConnector3">
+            <a:avLst/>
+          </a:prstGeom>
+          <a:ln>
+            <a:tailEnd type="triangle"/>
+          </a:ln>
+        </p:spPr>
+        <p:style>
+          <a:lnRef idx="2">
+            <a:schemeClr val="accent3"/>
+          </a:lnRef>
+          <a:fillRef idx="0">
+            <a:schemeClr val="accent3"/>
+          </a:fillRef>
+          <a:effectRef idx="1">
+            <a:schemeClr val="accent3"/>
+          </a:effectRef>
+          <a:fontRef idx="minor">
+            <a:schemeClr val="tx1"/>
+          </a:fontRef>
+        </p:style>
+      </p:cxnSp>
+      <p:sp>
+        <p:nvSpPr>
+          <p:cNvPr id="34" name="Rectangle 33">
+            <a:extLst>
+              <a:ext uri="{FF2B5EF4-FFF2-40B4-BE49-F238E27FC236}">
+                <a16:creationId xmlns:a16="http://schemas.microsoft.com/office/drawing/2014/main" id="{1A82CE7B-97B2-000C-ADB3-40AD83931A4E}"/>
+              </a:ext>
+            </a:extLst>
+          </p:cNvPr>
+          <p:cNvSpPr/>
+          <p:nvPr/>
+        </p:nvSpPr>
+        <p:spPr>
+          <a:xfrm>
+            <a:off x="5188576" y="1557574"/>
+            <a:ext cx="1431509" cy="726792"/>
+          </a:xfrm>
+          <a:prstGeom prst="rect">
+            <a:avLst/>
+          </a:prstGeom>
+        </p:spPr>
+        <p:style>
+          <a:lnRef idx="2">
+            <a:schemeClr val="accent5">
+              <a:shade val="15000"/>
+            </a:schemeClr>
+          </a:lnRef>
+          <a:fillRef idx="1">
+            <a:schemeClr val="accent5"/>
+          </a:fillRef>
+          <a:effectRef idx="0">
+            <a:schemeClr val="accent5"/>
+          </a:effectRef>
+          <a:fontRef idx="minor">
+            <a:schemeClr val="lt1"/>
+          </a:fontRef>
+        </p:style>
+        <p:txBody>
+          <a:bodyPr rtlCol="0" anchor="ctr"/>
+          <a:lstStyle/>
+          <a:p>
+            <a:pPr algn="ctr"/>
+            <a:r>
+              <a:rPr lang="en-US" sz="1600" dirty="0" err="1">
+                <a:solidFill>
+                  <a:schemeClr val="tx1"/>
+                </a:solidFill>
+                <a:latin typeface="+mj-lt"/>
+                <a:cs typeface="Courier New" panose="02070309020205020404" pitchFamily="49" charset="0"/>
+              </a:rPr>
+              <a:t>RZAssetProxy</a:t>
+            </a:r>
+            <a:endParaRPr lang="en-US" sz="1600" dirty="0">
+              <a:solidFill>
+                <a:schemeClr val="tx1"/>
+              </a:solidFill>
+              <a:latin typeface="+mj-lt"/>
+              <a:cs typeface="Courier New" panose="02070309020205020404" pitchFamily="49" charset="0"/>
+            </a:endParaRPr>
+          </a:p>
+          <a:p>
+            <a:pPr algn="ctr"/>
+            <a:r>
+              <a:rPr lang="en-US" sz="1000" dirty="0">
+                <a:solidFill>
+                  <a:schemeClr val="tx1"/>
+                </a:solidFill>
+                <a:latin typeface="+mj-lt"/>
+                <a:cs typeface="Courier New" panose="02070309020205020404" pitchFamily="49" charset="0"/>
+              </a:rPr>
+              <a:t>Minimal view of the asset to help create the Resource</a:t>
+            </a:r>
+            <a:endParaRPr lang="en-IN" sz="1000" dirty="0">
+              <a:latin typeface="+mj-lt"/>
+            </a:endParaRPr>
+          </a:p>
+        </p:txBody>
+      </p:sp>
+      <p:cxnSp>
+        <p:nvCxnSpPr>
+          <p:cNvPr id="35" name="Connector: Elbow 24">
+            <a:extLst>
+              <a:ext uri="{FF2B5EF4-FFF2-40B4-BE49-F238E27FC236}">
+                <a16:creationId xmlns:a16="http://schemas.microsoft.com/office/drawing/2014/main" id="{D22655E6-171D-F3E7-9843-70E2E9FB8EBC}"/>
+              </a:ext>
+            </a:extLst>
+          </p:cNvPr>
+          <p:cNvCxnSpPr>
+            <a:cxnSpLocks/>
+            <a:stCxn id="24" idx="3"/>
+            <a:endCxn id="34" idx="1"/>
+          </p:cNvCxnSpPr>
+          <p:nvPr/>
+        </p:nvCxnSpPr>
+        <p:spPr>
+          <a:xfrm>
+            <a:off x="4902366" y="1914063"/>
+            <a:ext cx="286210" cy="6907"/>
+          </a:xfrm>
+          <a:prstGeom prst="straightConnector1">
+            <a:avLst/>
+          </a:prstGeom>
+          <a:ln>
+            <a:tailEnd type="triangle"/>
+          </a:ln>
+        </p:spPr>
+        <p:style>
+          <a:lnRef idx="2">
+            <a:schemeClr val="accent3"/>
+          </a:lnRef>
+          <a:fillRef idx="0">
+            <a:schemeClr val="accent3"/>
+          </a:fillRef>
+          <a:effectRef idx="1">
+            <a:schemeClr val="accent3"/>
+          </a:effectRef>
+          <a:fontRef idx="minor">
+            <a:schemeClr val="tx1"/>
+          </a:fontRef>
+        </p:style>
+      </p:cxnSp>
+      <p:sp>
+        <p:nvSpPr>
+          <p:cNvPr id="39" name="Rectangle 38">
+            <a:extLst>
+              <a:ext uri="{FF2B5EF4-FFF2-40B4-BE49-F238E27FC236}">
+                <a16:creationId xmlns:a16="http://schemas.microsoft.com/office/drawing/2014/main" id="{AF21E671-9348-534D-84D2-C998A92665D8}"/>
+              </a:ext>
+            </a:extLst>
+          </p:cNvPr>
+          <p:cNvSpPr/>
+          <p:nvPr/>
+        </p:nvSpPr>
+        <p:spPr>
+          <a:xfrm>
+            <a:off x="6906295" y="1516085"/>
+            <a:ext cx="1873283" cy="805689"/>
+          </a:xfrm>
+          <a:prstGeom prst="rect">
+            <a:avLst/>
+          </a:prstGeom>
+          <a:gradFill>
+            <a:gsLst>
+              <a:gs pos="63000">
+                <a:srgbClr val="EA00EA">
+                  <a:alpha val="52000"/>
+                </a:srgbClr>
+              </a:gs>
+              <a:gs pos="0">
+                <a:srgbClr val="FF8FFF"/>
+              </a:gs>
+              <a:gs pos="100000">
+                <a:srgbClr val="660066"/>
+              </a:gs>
+            </a:gsLst>
+            <a:lin ang="5400000" scaled="1"/>
+          </a:gradFill>
+        </p:spPr>
+        <p:style>
+          <a:lnRef idx="2">
+            <a:schemeClr val="accent5">
+              <a:shade val="15000"/>
+            </a:schemeClr>
+          </a:lnRef>
+          <a:fillRef idx="1">
+            <a:schemeClr val="accent5"/>
+          </a:fillRef>
+          <a:effectRef idx="0">
+            <a:schemeClr val="accent5"/>
+          </a:effectRef>
+          <a:fontRef idx="minor">
+            <a:schemeClr val="lt1"/>
+          </a:fontRef>
+        </p:style>
+        <p:txBody>
+          <a:bodyPr rtlCol="0" anchor="ctr"/>
+          <a:lstStyle/>
+          <a:p>
+            <a:pPr algn="ctr"/>
+            <a:r>
+              <a:rPr lang="en-US" sz="1600" dirty="0" err="1">
+                <a:solidFill>
+                  <a:schemeClr val="tx1"/>
+                </a:solidFill>
+                <a:latin typeface="+mj-lt"/>
+                <a:cs typeface="Courier New" panose="02070309020205020404" pitchFamily="49" charset="0"/>
+              </a:rPr>
+              <a:t>RZProxyInterchangeManager</a:t>
+            </a:r>
+            <a:endParaRPr lang="en-US" sz="1600" dirty="0">
+              <a:solidFill>
+                <a:schemeClr val="tx1"/>
+              </a:solidFill>
+              <a:latin typeface="+mj-lt"/>
+              <a:cs typeface="Courier New" panose="02070309020205020404" pitchFamily="49" charset="0"/>
+            </a:endParaRPr>
+          </a:p>
+          <a:p>
+            <a:pPr algn="ctr"/>
+            <a:r>
+              <a:rPr lang="en-US" sz="1000" dirty="0">
+                <a:solidFill>
+                  <a:schemeClr val="tx1"/>
+                </a:solidFill>
+                <a:latin typeface="+mj-lt"/>
+                <a:cs typeface="Courier New" panose="02070309020205020404" pitchFamily="49" charset="0"/>
+              </a:rPr>
+              <a:t>Class to interchange between different proxy states</a:t>
+            </a:r>
+            <a:endParaRPr lang="en-IN" sz="1000" dirty="0">
+              <a:latin typeface="+mj-lt"/>
+            </a:endParaRPr>
+          </a:p>
+        </p:txBody>
+      </p:sp>
+      <p:cxnSp>
+        <p:nvCxnSpPr>
+          <p:cNvPr id="40" name="Connector: Elbow 24">
+            <a:extLst>
+              <a:ext uri="{FF2B5EF4-FFF2-40B4-BE49-F238E27FC236}">
+                <a16:creationId xmlns:a16="http://schemas.microsoft.com/office/drawing/2014/main" id="{62C7B320-6F56-1CC1-0B48-31FA0B3E0C83}"/>
+              </a:ext>
+            </a:extLst>
+          </p:cNvPr>
+          <p:cNvCxnSpPr>
+            <a:cxnSpLocks/>
+            <a:stCxn id="34" idx="3"/>
+            <a:endCxn id="39" idx="1"/>
+          </p:cNvCxnSpPr>
+          <p:nvPr/>
+        </p:nvCxnSpPr>
+        <p:spPr>
+          <a:xfrm flipV="1">
+            <a:off x="6620085" y="1918930"/>
+            <a:ext cx="286210" cy="2040"/>
+          </a:xfrm>
+          <a:prstGeom prst="straightConnector1">
+            <a:avLst/>
+          </a:prstGeom>
+          <a:ln>
+            <a:tailEnd type="triangle"/>
+          </a:ln>
+        </p:spPr>
+        <p:style>
+          <a:lnRef idx="2">
+            <a:schemeClr val="accent3"/>
+          </a:lnRef>
+          <a:fillRef idx="0">
+            <a:schemeClr val="accent3"/>
+          </a:fillRef>
+          <a:effectRef idx="1">
+            <a:schemeClr val="accent3"/>
+          </a:effectRef>
+          <a:fontRef idx="minor">
+            <a:schemeClr val="tx1"/>
+          </a:fontRef>
+        </p:style>
+      </p:cxnSp>
+      <p:sp>
+        <p:nvSpPr>
+          <p:cNvPr id="48" name="Rectangle 47">
+            <a:extLst>
+              <a:ext uri="{FF2B5EF4-FFF2-40B4-BE49-F238E27FC236}">
+                <a16:creationId xmlns:a16="http://schemas.microsoft.com/office/drawing/2014/main" id="{A4F39929-A520-884E-1961-7670F59FB91C}"/>
+              </a:ext>
+            </a:extLst>
+          </p:cNvPr>
+          <p:cNvSpPr/>
+          <p:nvPr/>
+        </p:nvSpPr>
+        <p:spPr>
+          <a:xfrm>
+            <a:off x="9226965" y="1289585"/>
+            <a:ext cx="2332312" cy="1082858"/>
+          </a:xfrm>
+          <a:prstGeom prst="rect">
+            <a:avLst/>
+          </a:prstGeom>
+        </p:spPr>
+        <p:style>
+          <a:lnRef idx="2">
+            <a:schemeClr val="accent6">
+              <a:shade val="15000"/>
+            </a:schemeClr>
+          </a:lnRef>
+          <a:fillRef idx="1">
+            <a:schemeClr val="accent6"/>
+          </a:fillRef>
+          <a:effectRef idx="0">
+            <a:schemeClr val="accent6"/>
+          </a:effectRef>
+          <a:fontRef idx="minor">
+            <a:schemeClr val="lt1"/>
+          </a:fontRef>
+        </p:style>
+        <p:txBody>
+          <a:bodyPr rtlCol="0" anchor="ctr"/>
+          <a:lstStyle/>
+          <a:p>
+            <a:r>
+              <a:rPr lang="en-US" sz="1600" dirty="0">
+                <a:solidFill>
+                  <a:schemeClr val="tx1"/>
+                </a:solidFill>
+                <a:latin typeface="+mj-lt"/>
+                <a:cs typeface="Courier New" panose="02070309020205020404" pitchFamily="49" charset="0"/>
+              </a:rPr>
+              <a:t>RZRenderResourceProxy</a:t>
+            </a:r>
+          </a:p>
+          <a:p>
+            <a:r>
+              <a:rPr lang="en-US" sz="1000" dirty="0">
+                <a:solidFill>
+                  <a:schemeClr val="tx1"/>
+                </a:solidFill>
+                <a:latin typeface="+mj-lt"/>
+                <a:cs typeface="Courier New" panose="02070309020205020404" pitchFamily="49" charset="0"/>
+              </a:rPr>
+              <a:t>Minimal view to represent the </a:t>
+            </a:r>
+            <a:r>
+              <a:rPr lang="en-US" sz="1000" b="1" dirty="0" err="1">
+                <a:solidFill>
+                  <a:schemeClr val="tx1"/>
+                </a:solidFill>
+                <a:latin typeface="+mj-lt"/>
+                <a:cs typeface="Courier New" panose="02070309020205020404" pitchFamily="49" charset="0"/>
+              </a:rPr>
+              <a:t>IRZResource</a:t>
+            </a:r>
+            <a:br>
+              <a:rPr lang="en-US" sz="1000" b="1" dirty="0">
+                <a:solidFill>
+                  <a:schemeClr val="tx1"/>
+                </a:solidFill>
+                <a:latin typeface="+mj-lt"/>
+                <a:cs typeface="Courier New" panose="02070309020205020404" pitchFamily="49" charset="0"/>
+              </a:rPr>
+            </a:br>
+            <a:br>
+              <a:rPr lang="en-US" sz="1000" b="1" dirty="0">
+                <a:solidFill>
+                  <a:schemeClr val="tx1"/>
+                </a:solidFill>
+                <a:latin typeface="+mj-lt"/>
+                <a:cs typeface="Courier New" panose="02070309020205020404" pitchFamily="49" charset="0"/>
+              </a:rPr>
+            </a:br>
+            <a:r>
+              <a:rPr lang="en-US" sz="1000" b="1" dirty="0">
+                <a:solidFill>
+                  <a:schemeClr val="tx1"/>
+                </a:solidFill>
+                <a:highlight>
+                  <a:srgbClr val="FFFF00"/>
+                </a:highlight>
+                <a:latin typeface="+mj-lt"/>
+                <a:cs typeface="Courier New" panose="02070309020205020404" pitchFamily="49" charset="0"/>
+              </a:rPr>
+              <a:t>Will be used by the </a:t>
+            </a:r>
+            <a:r>
+              <a:rPr lang="en-US" sz="1000" b="1" dirty="0" err="1">
+                <a:solidFill>
+                  <a:schemeClr val="tx1"/>
+                </a:solidFill>
+                <a:highlight>
+                  <a:srgbClr val="FFFF00"/>
+                </a:highlight>
+                <a:latin typeface="+mj-lt"/>
+                <a:cs typeface="Courier New" panose="02070309020205020404" pitchFamily="49" charset="0"/>
+              </a:rPr>
+              <a:t>RZResourceManager</a:t>
+            </a:r>
+            <a:r>
+              <a:rPr lang="en-US" sz="1000" b="1" dirty="0">
+                <a:solidFill>
+                  <a:schemeClr val="tx1"/>
+                </a:solidFill>
+                <a:highlight>
+                  <a:srgbClr val="FFFF00"/>
+                </a:highlight>
+                <a:latin typeface="+mj-lt"/>
+                <a:cs typeface="Courier New" panose="02070309020205020404" pitchFamily="49" charset="0"/>
+              </a:rPr>
+              <a:t> to create a </a:t>
+            </a:r>
+            <a:r>
+              <a:rPr lang="en-US" sz="1000" b="1" dirty="0" err="1">
+                <a:solidFill>
+                  <a:schemeClr val="tx1"/>
+                </a:solidFill>
+                <a:highlight>
+                  <a:srgbClr val="FFFF00"/>
+                </a:highlight>
+                <a:latin typeface="+mj-lt"/>
+                <a:cs typeface="Courier New" panose="02070309020205020404" pitchFamily="49" charset="0"/>
+              </a:rPr>
+              <a:t>IRZResource</a:t>
+            </a:r>
+            <a:r>
+              <a:rPr lang="en-US" sz="1000" b="1" dirty="0">
+                <a:solidFill>
+                  <a:schemeClr val="tx1"/>
+                </a:solidFill>
+                <a:highlight>
+                  <a:srgbClr val="FFFF00"/>
+                </a:highlight>
+                <a:latin typeface="+mj-lt"/>
+                <a:cs typeface="Courier New" panose="02070309020205020404" pitchFamily="49" charset="0"/>
+              </a:rPr>
+              <a:t> ref for this</a:t>
+            </a:r>
+            <a:endParaRPr lang="en-IN" sz="1000" b="1" dirty="0">
+              <a:highlight>
+                <a:srgbClr val="FFFF00"/>
+              </a:highlight>
+              <a:latin typeface="+mj-lt"/>
+            </a:endParaRPr>
+          </a:p>
+        </p:txBody>
+      </p:sp>
+      <p:cxnSp>
+        <p:nvCxnSpPr>
+          <p:cNvPr id="49" name="Connector: Elbow 24">
+            <a:extLst>
+              <a:ext uri="{FF2B5EF4-FFF2-40B4-BE49-F238E27FC236}">
+                <a16:creationId xmlns:a16="http://schemas.microsoft.com/office/drawing/2014/main" id="{128D5172-087C-BB44-369F-33F4C2F652CC}"/>
+              </a:ext>
+            </a:extLst>
+          </p:cNvPr>
+          <p:cNvCxnSpPr>
+            <a:cxnSpLocks/>
+            <a:stCxn id="39" idx="3"/>
+            <a:endCxn id="48" idx="1"/>
+          </p:cNvCxnSpPr>
+          <p:nvPr/>
+        </p:nvCxnSpPr>
+        <p:spPr>
+          <a:xfrm flipV="1">
+            <a:off x="8779578" y="1831014"/>
+            <a:ext cx="447387" cy="87916"/>
+          </a:xfrm>
+          <a:prstGeom prst="bentConnector3">
+            <a:avLst>
+              <a:gd name="adj1" fmla="val 50000"/>
+            </a:avLst>
+          </a:prstGeom>
+          <a:ln>
+            <a:tailEnd type="triangle"/>
+          </a:ln>
+        </p:spPr>
+        <p:style>
+          <a:lnRef idx="2">
+            <a:schemeClr val="accent3"/>
+          </a:lnRef>
+          <a:fillRef idx="0">
+            <a:schemeClr val="accent3"/>
+          </a:fillRef>
+          <a:effectRef idx="1">
+            <a:schemeClr val="accent3"/>
+          </a:effectRef>
+          <a:fontRef idx="minor">
+            <a:schemeClr val="tx1"/>
+          </a:fontRef>
+        </p:style>
+      </p:cxnSp>
+      <p:cxnSp>
+        <p:nvCxnSpPr>
+          <p:cNvPr id="12" name="Connector: Elbow 11">
+            <a:extLst>
+              <a:ext uri="{FF2B5EF4-FFF2-40B4-BE49-F238E27FC236}">
+                <a16:creationId xmlns:a16="http://schemas.microsoft.com/office/drawing/2014/main" id="{6DF3BE5D-372F-2AB0-9259-16FCAD850574}"/>
+              </a:ext>
+            </a:extLst>
+          </p:cNvPr>
+          <p:cNvCxnSpPr>
+            <a:cxnSpLocks/>
+            <a:stCxn id="10" idx="2"/>
+            <a:endCxn id="11" idx="0"/>
+          </p:cNvCxnSpPr>
+          <p:nvPr/>
+        </p:nvCxnSpPr>
+        <p:spPr>
+          <a:xfrm rot="5400000">
+            <a:off x="1169102" y="2898280"/>
+            <a:ext cx="570300" cy="1"/>
+          </a:xfrm>
+          <a:prstGeom prst="bentConnector3">
+            <a:avLst>
+              <a:gd name="adj1" fmla="val 50000"/>
+            </a:avLst>
+          </a:prstGeom>
+          <a:ln>
+            <a:tailEnd type="triangle"/>
+          </a:ln>
+        </p:spPr>
+        <p:style>
+          <a:lnRef idx="2">
+            <a:schemeClr val="accent3"/>
+          </a:lnRef>
+          <a:fillRef idx="0">
+            <a:schemeClr val="accent3"/>
+          </a:fillRef>
+          <a:effectRef idx="1">
+            <a:schemeClr val="accent3"/>
+          </a:effectRef>
+          <a:fontRef idx="minor">
+            <a:schemeClr val="tx1"/>
+          </a:fontRef>
+        </p:style>
+      </p:cxnSp>
+      <p:sp>
+        <p:nvSpPr>
+          <p:cNvPr id="62" name="Thought Bubble: Cloud 61">
+            <a:extLst>
+              <a:ext uri="{FF2B5EF4-FFF2-40B4-BE49-F238E27FC236}">
+                <a16:creationId xmlns:a16="http://schemas.microsoft.com/office/drawing/2014/main" id="{B088971C-52CD-9DF5-EA07-105719A509BA}"/>
+              </a:ext>
+            </a:extLst>
+          </p:cNvPr>
+          <p:cNvSpPr/>
+          <p:nvPr/>
+        </p:nvSpPr>
+        <p:spPr>
+          <a:xfrm>
+            <a:off x="5431477" y="3860755"/>
+            <a:ext cx="1959397" cy="1509123"/>
+          </a:xfrm>
+          <a:prstGeom prst="cloudCallout">
+            <a:avLst>
+              <a:gd name="adj1" fmla="val -33707"/>
+              <a:gd name="adj2" fmla="val 65425"/>
+            </a:avLst>
+          </a:prstGeom>
+        </p:spPr>
+        <p:style>
+          <a:lnRef idx="1">
+            <a:schemeClr val="dk1"/>
+          </a:lnRef>
+          <a:fillRef idx="2">
+            <a:schemeClr val="dk1"/>
+          </a:fillRef>
+          <a:effectRef idx="1">
+            <a:schemeClr val="dk1"/>
+          </a:effectRef>
+          <a:fontRef idx="minor">
+            <a:schemeClr val="dk1"/>
+          </a:fontRef>
+        </p:style>
+        <p:txBody>
+          <a:bodyPr rtlCol="0" anchor="ctr"/>
+          <a:lstStyle/>
+          <a:p>
+            <a:pPr algn="ctr"/>
+            <a:r>
+              <a:rPr lang="en-US" sz="1400" dirty="0">
+                <a:highlight>
+                  <a:srgbClr val="FFFF00"/>
+                </a:highlight>
+              </a:rPr>
+              <a:t>ECS and RZAssetBase? </a:t>
+            </a:r>
+          </a:p>
+          <a:p>
+            <a:pPr algn="ctr"/>
+            <a:r>
+              <a:rPr lang="en-US" sz="1400" dirty="0">
+                <a:highlight>
+                  <a:srgbClr val="FFFF00"/>
+                </a:highlight>
+              </a:rPr>
+              <a:t>Unify or not?</a:t>
+            </a:r>
+            <a:br>
+              <a:rPr lang="en-US" sz="1400" dirty="0">
+                <a:highlight>
+                  <a:srgbClr val="FFFF00"/>
+                </a:highlight>
+              </a:rPr>
+            </a:br>
+            <a:r>
+              <a:rPr lang="en-US" sz="1400" dirty="0">
+                <a:highlight>
+                  <a:srgbClr val="FFFF00"/>
+                </a:highlight>
+              </a:rPr>
+              <a:t>If so, how to represent?</a:t>
+            </a:r>
+            <a:endParaRPr lang="en-IN" sz="1400" dirty="0">
+              <a:highlight>
+                <a:srgbClr val="FFFF00"/>
+              </a:highlight>
+            </a:endParaRPr>
+          </a:p>
+        </p:txBody>
+      </p:sp>
+      <p:sp>
+        <p:nvSpPr>
+          <p:cNvPr id="63" name="TextBox 62">
+            <a:extLst>
+              <a:ext uri="{FF2B5EF4-FFF2-40B4-BE49-F238E27FC236}">
+                <a16:creationId xmlns:a16="http://schemas.microsoft.com/office/drawing/2014/main" id="{558CFDBF-8930-D0EE-5247-C8440E90A6EF}"/>
+              </a:ext>
+            </a:extLst>
+          </p:cNvPr>
+          <p:cNvSpPr txBox="1"/>
+          <p:nvPr/>
+        </p:nvSpPr>
+        <p:spPr>
+          <a:xfrm>
+            <a:off x="6815139" y="5003267"/>
+            <a:ext cx="2221123" cy="707886"/>
+          </a:xfrm>
+          <a:prstGeom prst="rect">
+            <a:avLst/>
+          </a:prstGeom>
+        </p:spPr>
+        <p:style>
+          <a:lnRef idx="1">
+            <a:schemeClr val="accent3"/>
+          </a:lnRef>
+          <a:fillRef idx="2">
+            <a:schemeClr val="accent3"/>
+          </a:fillRef>
+          <a:effectRef idx="1">
+            <a:schemeClr val="accent3"/>
+          </a:effectRef>
+          <a:fontRef idx="minor">
+            <a:schemeClr val="dk1"/>
+          </a:fontRef>
+        </p:style>
+        <p:txBody>
+          <a:bodyPr wrap="square" rtlCol="0">
+            <a:spAutoFit/>
+          </a:bodyPr>
+          <a:lstStyle/>
+          <a:p>
+            <a:r>
+              <a:rPr lang="en-US" sz="1000" dirty="0"/>
+              <a:t>At early prototype stage until we figure out how to unify them, we can just use the DB as memory backend for the ECS and still keep them decoupled.</a:t>
+            </a:r>
+            <a:endParaRPr lang="en-IN" sz="1000" dirty="0"/>
+          </a:p>
+        </p:txBody>
+      </p:sp>
+      <p:sp>
+        <p:nvSpPr>
+          <p:cNvPr id="1034" name="TextBox 1033">
+            <a:extLst>
+              <a:ext uri="{FF2B5EF4-FFF2-40B4-BE49-F238E27FC236}">
+                <a16:creationId xmlns:a16="http://schemas.microsoft.com/office/drawing/2014/main" id="{83B94623-06B9-6BD5-E895-24636D9C5655}"/>
+              </a:ext>
+            </a:extLst>
+          </p:cNvPr>
+          <p:cNvSpPr txBox="1"/>
+          <p:nvPr/>
+        </p:nvSpPr>
+        <p:spPr>
+          <a:xfrm>
+            <a:off x="9226965" y="3140141"/>
+            <a:ext cx="2332308" cy="461665"/>
+          </a:xfrm>
+          <a:prstGeom prst="rect">
+            <a:avLst/>
+          </a:prstGeom>
+        </p:spPr>
+        <p:style>
+          <a:lnRef idx="0">
+            <a:schemeClr val="accent6"/>
+          </a:lnRef>
+          <a:fillRef idx="3">
+            <a:schemeClr val="accent6"/>
+          </a:fillRef>
+          <a:effectRef idx="3">
+            <a:schemeClr val="accent6"/>
+          </a:effectRef>
+          <a:fontRef idx="minor">
+            <a:schemeClr val="lt1"/>
+          </a:fontRef>
+        </p:style>
+        <p:txBody>
+          <a:bodyPr wrap="square">
+            <a:spAutoFit/>
+          </a:bodyPr>
+          <a:lstStyle/>
+          <a:p>
+            <a:r>
+              <a:rPr lang="en-US" sz="1200" b="1" dirty="0">
+                <a:solidFill>
+                  <a:schemeClr val="tx1"/>
+                </a:solidFill>
+                <a:latin typeface="+mj-lt"/>
+                <a:cs typeface="Courier New" panose="02070309020205020404" pitchFamily="49" charset="0"/>
+              </a:rPr>
+              <a:t>A resource is a Gfx run-time view of an asset.</a:t>
+            </a:r>
+            <a:endParaRPr lang="en-IN" sz="1200" dirty="0"/>
+          </a:p>
+        </p:txBody>
+      </p:sp>
+      <p:sp>
+        <p:nvSpPr>
+          <p:cNvPr id="1035" name="TextBox 1034">
+            <a:extLst>
+              <a:ext uri="{FF2B5EF4-FFF2-40B4-BE49-F238E27FC236}">
+                <a16:creationId xmlns:a16="http://schemas.microsoft.com/office/drawing/2014/main" id="{31925BF6-1B87-ADBB-6986-CC6B5DBE1D4E}"/>
+              </a:ext>
+            </a:extLst>
+          </p:cNvPr>
+          <p:cNvSpPr txBox="1"/>
+          <p:nvPr/>
+        </p:nvSpPr>
+        <p:spPr>
+          <a:xfrm>
+            <a:off x="9226965" y="3724090"/>
+            <a:ext cx="2509870" cy="1261884"/>
+          </a:xfrm>
+          <a:prstGeom prst="rect">
+            <a:avLst/>
+          </a:prstGeom>
+        </p:spPr>
+        <p:style>
+          <a:lnRef idx="0">
+            <a:schemeClr val="accent2"/>
+          </a:lnRef>
+          <a:fillRef idx="3">
+            <a:schemeClr val="accent2"/>
+          </a:fillRef>
+          <a:effectRef idx="3">
+            <a:schemeClr val="accent2"/>
+          </a:effectRef>
+          <a:fontRef idx="minor">
+            <a:schemeClr val="lt1"/>
+          </a:fontRef>
+        </p:style>
+        <p:txBody>
+          <a:bodyPr wrap="square" rtlCol="0">
+            <a:spAutoFit/>
+          </a:bodyPr>
+          <a:lstStyle/>
+          <a:p>
+            <a:r>
+              <a:rPr lang="en-US" sz="1600" b="1" dirty="0">
+                <a:solidFill>
+                  <a:schemeClr val="tx1"/>
+                </a:solidFill>
+              </a:rPr>
+              <a:t>Future Expansion:</a:t>
+            </a:r>
+            <a:br>
+              <a:rPr lang="en-US" sz="1600" dirty="0">
+                <a:solidFill>
+                  <a:schemeClr val="tx1"/>
+                </a:solidFill>
+              </a:rPr>
+            </a:br>
+            <a:r>
+              <a:rPr lang="en-US" sz="1200" dirty="0">
+                <a:solidFill>
+                  <a:schemeClr val="tx1"/>
+                </a:solidFill>
+              </a:rPr>
+              <a:t>For streaming we can have the </a:t>
+            </a:r>
+            <a:r>
+              <a:rPr lang="en-US" sz="1200" dirty="0" err="1">
+                <a:solidFill>
+                  <a:schemeClr val="tx1"/>
+                </a:solidFill>
+              </a:rPr>
+              <a:t>AssetDB</a:t>
+            </a:r>
+            <a:r>
+              <a:rPr lang="en-US" sz="1200" dirty="0">
+                <a:solidFill>
+                  <a:schemeClr val="tx1"/>
+                </a:solidFill>
+              </a:rPr>
+              <a:t> class manage it and for the GPU to use it, we can have Multiple </a:t>
+            </a:r>
+            <a:r>
+              <a:rPr lang="en-US" sz="1200" dirty="0" err="1">
+                <a:solidFill>
+                  <a:schemeClr val="tx1"/>
+                </a:solidFill>
+              </a:rPr>
+              <a:t>ProxyViews</a:t>
+            </a:r>
+            <a:r>
+              <a:rPr lang="en-US" sz="1200" dirty="0">
+                <a:solidFill>
+                  <a:schemeClr val="tx1"/>
+                </a:solidFill>
+              </a:rPr>
+              <a:t> to view only part of the resources/asset such as for </a:t>
+            </a:r>
+            <a:r>
+              <a:rPr lang="en-US" sz="1200" dirty="0" err="1">
+                <a:solidFill>
+                  <a:schemeClr val="tx1"/>
+                </a:solidFill>
+              </a:rPr>
+              <a:t>mips</a:t>
+            </a:r>
+            <a:r>
+              <a:rPr lang="en-US" sz="1200" dirty="0">
+                <a:solidFill>
+                  <a:schemeClr val="tx1"/>
+                </a:solidFill>
+              </a:rPr>
+              <a:t> etc.</a:t>
+            </a:r>
+            <a:endParaRPr lang="en-IN" sz="1200" dirty="0">
+              <a:solidFill>
+                <a:schemeClr val="tx1"/>
+              </a:solidFill>
+            </a:endParaRPr>
+          </a:p>
+        </p:txBody>
+      </p:sp>
+    </p:spTree>
+    <p:extLst>
+      <p:ext uri="{BB962C8B-B14F-4D97-AF65-F5344CB8AC3E}">
+        <p14:creationId xmlns:p14="http://schemas.microsoft.com/office/powerpoint/2010/main" val="643420428"/>
+      </p:ext>
+    </p:extLst>
+  </p:cSld>
+  <p:clrMapOvr>
+    <a:masterClrMapping/>
+  </p:clrMapOvr>
+</p:sld>
+</file>
+
+<file path=ppt/slides/slide8.xml><?xml version="1.0" encoding="utf-8"?>
 <p:sld xmlns:a="http://schemas.openxmlformats.org/drawingml/2006/main" xmlns:r="http://schemas.openxmlformats.org/officeDocument/2006/relationships" xmlns:p="http://schemas.openxmlformats.org/presentationml/2006/main">
   <p:cSld>
     <p:spTree>
@@ -10832,7 +12825,7 @@
 </p:sld>
 </file>
 
-<file path=ppt/slides/slide8.xml><?xml version="1.0" encoding="utf-8"?>
+<file path=ppt/slides/slide9.xml><?xml version="1.0" encoding="utf-8"?>
 <p:sld xmlns:a="http://schemas.openxmlformats.org/drawingml/2006/main" xmlns:r="http://schemas.openxmlformats.org/officeDocument/2006/relationships" xmlns:p="http://schemas.openxmlformats.org/presentationml/2006/main">
   <p:cSld>
     <p:spTree>
@@ -11387,131 +13380,6 @@
     <p:extLst>
       <p:ext uri="{BB962C8B-B14F-4D97-AF65-F5344CB8AC3E}">
         <p14:creationId xmlns:p14="http://schemas.microsoft.com/office/powerpoint/2010/main" val="2919963422"/>
-      </p:ext>
-    </p:extLst>
-  </p:cSld>
-  <p:clrMapOvr>
-    <a:masterClrMapping/>
-  </p:clrMapOvr>
-</p:sld>
-</file>
-
-<file path=ppt/slides/slide9.xml><?xml version="1.0" encoding="utf-8"?>
-<p:sld xmlns:a="http://schemas.openxmlformats.org/drawingml/2006/main" xmlns:r="http://schemas.openxmlformats.org/officeDocument/2006/relationships" xmlns:p="http://schemas.openxmlformats.org/presentationml/2006/main">
-  <p:cSld>
-    <p:spTree>
-      <p:nvGrpSpPr>
-        <p:cNvPr id="1" name=""/>
-        <p:cNvGrpSpPr/>
-        <p:nvPr/>
-      </p:nvGrpSpPr>
-      <p:grpSpPr>
-        <a:xfrm>
-          <a:off x="0" y="0"/>
-          <a:ext cx="0" cy="0"/>
-          <a:chOff x="0" y="0"/>
-          <a:chExt cx="0" cy="0"/>
-        </a:xfrm>
-      </p:grpSpPr>
-      <p:sp>
-        <p:nvSpPr>
-          <p:cNvPr id="2" name="Title 1">
-            <a:extLst>
-              <a:ext uri="{FF2B5EF4-FFF2-40B4-BE49-F238E27FC236}">
-                <a16:creationId xmlns:a16="http://schemas.microsoft.com/office/drawing/2014/main" id="{EA8547A1-DC4B-FAD6-56C5-C766B24032CC}"/>
-              </a:ext>
-            </a:extLst>
-          </p:cNvPr>
-          <p:cNvSpPr>
-            <a:spLocks noGrp="1"/>
-          </p:cNvSpPr>
-          <p:nvPr>
-            <p:ph type="title"/>
-          </p:nvPr>
-        </p:nvSpPr>
-        <p:spPr/>
-        <p:txBody>
-          <a:bodyPr/>
-          <a:lstStyle/>
-          <a:p>
-            <a:r>
-              <a:rPr lang="en-US" dirty="0"/>
-              <a:t>Visibility Buffer</a:t>
-            </a:r>
-            <a:endParaRPr lang="en-IN" dirty="0"/>
-          </a:p>
-        </p:txBody>
-      </p:sp>
-      <p:pic>
-        <p:nvPicPr>
-          <p:cNvPr id="7" name="Picture 6">
-            <a:extLst>
-              <a:ext uri="{FF2B5EF4-FFF2-40B4-BE49-F238E27FC236}">
-                <a16:creationId xmlns:a16="http://schemas.microsoft.com/office/drawing/2014/main" id="{A68B85AC-AEC4-7D84-4CD9-0484613CB7BD}"/>
-              </a:ext>
-            </a:extLst>
-          </p:cNvPr>
-          <p:cNvPicPr>
-            <a:picLocks noChangeAspect="1"/>
-          </p:cNvPicPr>
-          <p:nvPr/>
-        </p:nvPicPr>
-        <p:blipFill>
-          <a:blip r:embed="rId2">
-            <a:extLst>
-              <a:ext uri="{28A0092B-C50C-407E-A947-70E740481C1C}">
-                <a14:useLocalDpi xmlns:a14="http://schemas.microsoft.com/office/drawing/2010/main" val="0"/>
-              </a:ext>
-            </a:extLst>
-          </a:blip>
-          <a:stretch>
-            <a:fillRect/>
-          </a:stretch>
-        </p:blipFill>
-        <p:spPr>
-          <a:xfrm>
-            <a:off x="474306" y="1438432"/>
-            <a:ext cx="9931280" cy="4711159"/>
-          </a:xfrm>
-          <a:prstGeom prst="snip2DiagRect">
-            <a:avLst/>
-          </a:prstGeom>
-          <a:solidFill>
-            <a:srgbClr val="FFFFFF">
-              <a:shade val="85000"/>
-            </a:srgbClr>
-          </a:solidFill>
-          <a:ln w="88900" cap="sq">
-            <a:solidFill>
-              <a:srgbClr val="FFFFFF"/>
-            </a:solidFill>
-            <a:miter lim="800000"/>
-          </a:ln>
-          <a:effectLst>
-            <a:outerShdw blurRad="88900" algn="tl" rotWithShape="0">
-              <a:srgbClr val="000000">
-                <a:alpha val="45000"/>
-              </a:srgbClr>
-            </a:outerShdw>
-          </a:effectLst>
-          <a:scene3d>
-            <a:camera prst="orthographicFront"/>
-            <a:lightRig rig="twoPt" dir="t">
-              <a:rot lat="0" lon="0" rev="7200000"/>
-            </a:lightRig>
-          </a:scene3d>
-          <a:sp3d>
-            <a:bevelT w="25400" h="19050"/>
-            <a:contourClr>
-              <a:srgbClr val="FFFFFF"/>
-            </a:contourClr>
-          </a:sp3d>
-        </p:spPr>
-      </p:pic>
-    </p:spTree>
-    <p:extLst>
-      <p:ext uri="{BB962C8B-B14F-4D97-AF65-F5344CB8AC3E}">
-        <p14:creationId xmlns:p14="http://schemas.microsoft.com/office/powerpoint/2010/main" val="1500864763"/>
       </p:ext>
     </p:extLst>
   </p:cSld>

</xml_diff>

<commit_message>
Changed sandbox to windowed app; AssetBase prototype class; clangformat run;
</commit_message>
<xml_diff>
--- a/Docs/Features overview.pptx
+++ b/Docs/Features overview.pptx
@@ -5,7 +5,7 @@
     <p:sldMasterId id="2147483648" r:id="rId1"/>
   </p:sldMasterIdLst>
   <p:notesMasterIdLst>
-    <p:notesMasterId r:id="rId16"/>
+    <p:notesMasterId r:id="rId17"/>
   </p:notesMasterIdLst>
   <p:sldIdLst>
     <p:sldId id="257" r:id="rId2"/>
@@ -14,14 +14,15 @@
     <p:sldId id="260" r:id="rId5"/>
     <p:sldId id="261" r:id="rId6"/>
     <p:sldId id="265" r:id="rId7"/>
-    <p:sldId id="271" r:id="rId8"/>
-    <p:sldId id="266" r:id="rId9"/>
-    <p:sldId id="267" r:id="rId10"/>
-    <p:sldId id="269" r:id="rId11"/>
-    <p:sldId id="270" r:id="rId12"/>
-    <p:sldId id="264" r:id="rId13"/>
-    <p:sldId id="263" r:id="rId14"/>
-    <p:sldId id="268" r:id="rId15"/>
+    <p:sldId id="272" r:id="rId8"/>
+    <p:sldId id="271" r:id="rId9"/>
+    <p:sldId id="266" r:id="rId10"/>
+    <p:sldId id="267" r:id="rId11"/>
+    <p:sldId id="269" r:id="rId12"/>
+    <p:sldId id="270" r:id="rId13"/>
+    <p:sldId id="264" r:id="rId14"/>
+    <p:sldId id="263" r:id="rId15"/>
+    <p:sldId id="268" r:id="rId16"/>
   </p:sldIdLst>
   <p:sldSz cx="12192000" cy="6858000"/>
   <p:notesSz cx="6858000" cy="9144000"/>
@@ -139,6 +140,7 @@
         <p14:section name="Architecture" id="{1E3DDF86-35A2-4C35-AE2F-3253D6142A16}">
           <p14:sldIdLst>
             <p14:sldId id="265"/>
+            <p14:sldId id="272"/>
             <p14:sldId id="271"/>
             <p14:sldId id="266"/>
             <p14:sldId id="267"/>
@@ -254,7 +256,7 @@
           <a:p>
             <a:fld id="{3F16BF55-C0A5-4A93-9892-A2EE55AC4C70}" type="datetimeFigureOut">
               <a:rPr lang="en-IN" smtClean="0"/>
-              <a:t>22-11-2024</a:t>
+              <a:t>30/11/24</a:t>
             </a:fld>
             <a:endParaRPr lang="en-IN"/>
           </a:p>
@@ -689,7 +691,7 @@
           <a:p>
             <a:fld id="{84B6F61C-9FA5-4C35-A1D3-00EE2C15A6C0}" type="datetimeFigureOut">
               <a:rPr lang="en-IN" smtClean="0"/>
-              <a:t>22-11-2024</a:t>
+              <a:t>30/11/24</a:t>
             </a:fld>
             <a:endParaRPr lang="en-IN"/>
           </a:p>
@@ -918,7 +920,7 @@
           <a:p>
             <a:fld id="{84B6F61C-9FA5-4C35-A1D3-00EE2C15A6C0}" type="datetimeFigureOut">
               <a:rPr lang="en-IN" smtClean="0"/>
-              <a:t>22-11-2024</a:t>
+              <a:t>30/11/24</a:t>
             </a:fld>
             <a:endParaRPr lang="en-IN"/>
           </a:p>
@@ -1142,7 +1144,7 @@
           <a:p>
             <a:fld id="{84B6F61C-9FA5-4C35-A1D3-00EE2C15A6C0}" type="datetimeFigureOut">
               <a:rPr lang="en-IN" smtClean="0"/>
-              <a:t>22-11-2024</a:t>
+              <a:t>30/11/24</a:t>
             </a:fld>
             <a:endParaRPr lang="en-IN"/>
           </a:p>
@@ -1412,7 +1414,7 @@
           <a:p>
             <a:fld id="{84B6F61C-9FA5-4C35-A1D3-00EE2C15A6C0}" type="datetimeFigureOut">
               <a:rPr lang="en-IN" smtClean="0"/>
-              <a:t>22-11-2024</a:t>
+              <a:t>30/11/24</a:t>
             </a:fld>
             <a:endParaRPr lang="en-IN" dirty="0"/>
           </a:p>
@@ -1799,7 +1801,7 @@
           <a:p>
             <a:fld id="{84B6F61C-9FA5-4C35-A1D3-00EE2C15A6C0}" type="datetimeFigureOut">
               <a:rPr lang="en-IN" smtClean="0"/>
-              <a:t>22-11-2024</a:t>
+              <a:t>30/11/24</a:t>
             </a:fld>
             <a:endParaRPr lang="en-IN"/>
           </a:p>
@@ -2166,7 +2168,7 @@
           <a:p>
             <a:fld id="{84B6F61C-9FA5-4C35-A1D3-00EE2C15A6C0}" type="datetimeFigureOut">
               <a:rPr lang="en-IN" smtClean="0"/>
-              <a:t>22-11-2024</a:t>
+              <a:t>30/11/24</a:t>
             </a:fld>
             <a:endParaRPr lang="en-IN"/>
           </a:p>
@@ -2595,7 +2597,7 @@
           <a:p>
             <a:fld id="{84B6F61C-9FA5-4C35-A1D3-00EE2C15A6C0}" type="datetimeFigureOut">
               <a:rPr lang="en-IN" smtClean="0"/>
-              <a:t>22-11-2024</a:t>
+              <a:t>30/11/24</a:t>
             </a:fld>
             <a:endParaRPr lang="en-IN" dirty="0"/>
           </a:p>
@@ -2759,7 +2761,7 @@
           <a:p>
             <a:fld id="{84B6F61C-9FA5-4C35-A1D3-00EE2C15A6C0}" type="datetimeFigureOut">
               <a:rPr lang="en-IN" smtClean="0"/>
-              <a:t>22-11-2024</a:t>
+              <a:t>30/11/24</a:t>
             </a:fld>
             <a:endParaRPr lang="en-IN"/>
           </a:p>
@@ -2891,7 +2893,7 @@
           <a:p>
             <a:fld id="{84B6F61C-9FA5-4C35-A1D3-00EE2C15A6C0}" type="datetimeFigureOut">
               <a:rPr lang="en-IN" smtClean="0"/>
-              <a:t>22-11-2024</a:t>
+              <a:t>30/11/24</a:t>
             </a:fld>
             <a:endParaRPr lang="en-IN"/>
           </a:p>
@@ -3223,7 +3225,7 @@
           <a:p>
             <a:fld id="{84B6F61C-9FA5-4C35-A1D3-00EE2C15A6C0}" type="datetimeFigureOut">
               <a:rPr lang="en-IN" smtClean="0"/>
-              <a:t>22-11-2024</a:t>
+              <a:t>30/11/24</a:t>
             </a:fld>
             <a:endParaRPr lang="en-IN"/>
           </a:p>
@@ -3526,7 +3528,7 @@
           <a:p>
             <a:fld id="{84B6F61C-9FA5-4C35-A1D3-00EE2C15A6C0}" type="datetimeFigureOut">
               <a:rPr lang="en-IN" smtClean="0"/>
-              <a:t>22-11-2024</a:t>
+              <a:t>30/11/24</a:t>
             </a:fld>
             <a:endParaRPr lang="en-IN"/>
           </a:p>
@@ -3778,7 +3780,7 @@
           <a:p>
             <a:fld id="{84B6F61C-9FA5-4C35-A1D3-00EE2C15A6C0}" type="datetimeFigureOut">
               <a:rPr lang="en-IN" smtClean="0"/>
-              <a:t>22-11-2024</a:t>
+              <a:t>30/11/24</a:t>
             </a:fld>
             <a:endParaRPr lang="en-IN"/>
           </a:p>
@@ -4398,6 +4400,570 @@
       </p:grpSpPr>
       <p:sp>
         <p:nvSpPr>
+          <p:cNvPr id="12" name="TextBox 11">
+            <a:extLst>
+              <a:ext uri="{FF2B5EF4-FFF2-40B4-BE49-F238E27FC236}">
+                <a16:creationId xmlns:a16="http://schemas.microsoft.com/office/drawing/2014/main" id="{44BF80BA-927D-163B-708A-1886227160E1}"/>
+              </a:ext>
+            </a:extLst>
+          </p:cNvPr>
+          <p:cNvSpPr txBox="1"/>
+          <p:nvPr/>
+        </p:nvSpPr>
+        <p:spPr>
+          <a:xfrm>
+            <a:off x="271108" y="1057471"/>
+            <a:ext cx="10274972" cy="861774"/>
+          </a:xfrm>
+          <a:prstGeom prst="rect">
+            <a:avLst/>
+          </a:prstGeom>
+          <a:noFill/>
+        </p:spPr>
+        <p:txBody>
+          <a:bodyPr wrap="square" rtlCol="0">
+            <a:spAutoFit/>
+          </a:bodyPr>
+          <a:lstStyle/>
+          <a:p>
+            <a:r>
+              <a:rPr lang="en-US" b="1" u="sng" dirty="0">
+                <a:solidFill>
+                  <a:schemeClr val="bg1"/>
+                </a:solidFill>
+              </a:rPr>
+              <a:t>Color Grading LUTs:</a:t>
+            </a:r>
+            <a:endParaRPr lang="en-US" dirty="0">
+              <a:solidFill>
+                <a:schemeClr val="bg1"/>
+              </a:solidFill>
+              <a:latin typeface="Calibri Light" panose="020F0302020204030204" pitchFamily="34" charset="0"/>
+              <a:ea typeface="Calibri Light" panose="020F0302020204030204" pitchFamily="34" charset="0"/>
+              <a:cs typeface="Calibri Light" panose="020F0302020204030204" pitchFamily="34" charset="0"/>
+            </a:endParaRPr>
+          </a:p>
+          <a:p>
+            <a:pPr marL="285750" indent="-285750">
+              <a:buFont typeface="Arial" panose="020B0604020202020204" pitchFamily="34" charset="0"/>
+              <a:buChar char="•"/>
+            </a:pPr>
+            <a:r>
+              <a:rPr lang="en-IN" sz="1600" dirty="0">
+                <a:solidFill>
+                  <a:schemeClr val="bg1"/>
+                </a:solidFill>
+                <a:latin typeface="Calibri Light" panose="020F0302020204030204" pitchFamily="34" charset="0"/>
+                <a:ea typeface="Calibri Light" panose="020F0302020204030204" pitchFamily="34" charset="0"/>
+                <a:cs typeface="Calibri Light" panose="020F0302020204030204" pitchFamily="34" charset="0"/>
+              </a:rPr>
+              <a:t>Engine has many tonemapping functions to convert b/w HDR and SDR.</a:t>
+            </a:r>
+          </a:p>
+          <a:p>
+            <a:pPr marL="285750" indent="-285750">
+              <a:buFont typeface="Arial" panose="020B0604020202020204" pitchFamily="34" charset="0"/>
+              <a:buChar char="•"/>
+            </a:pPr>
+            <a:r>
+              <a:rPr lang="en-IN" sz="1600" dirty="0">
+                <a:solidFill>
+                  <a:schemeClr val="bg1"/>
+                </a:solidFill>
+                <a:latin typeface="Calibri Light" panose="020F0302020204030204" pitchFamily="34" charset="0"/>
+                <a:ea typeface="Calibri Light" panose="020F0302020204030204" pitchFamily="34" charset="0"/>
+                <a:cs typeface="Calibri Light" panose="020F0302020204030204" pitchFamily="34" charset="0"/>
+              </a:rPr>
+              <a:t>For </a:t>
+            </a:r>
+            <a:r>
+              <a:rPr lang="en-IN" sz="1600" b="1" dirty="0">
+                <a:solidFill>
+                  <a:schemeClr val="bg1"/>
+                </a:solidFill>
+                <a:latin typeface="Calibri Light" panose="020F0302020204030204" pitchFamily="34" charset="0"/>
+                <a:ea typeface="Calibri Light" panose="020F0302020204030204" pitchFamily="34" charset="0"/>
+                <a:cs typeface="Calibri Light" panose="020F0302020204030204" pitchFamily="34" charset="0"/>
+              </a:rPr>
+              <a:t>HDR tonemapping we need to do it based on the display max brightness and the HDR color space being used.</a:t>
+            </a:r>
+          </a:p>
+        </p:txBody>
+      </p:sp>
+      <p:sp>
+        <p:nvSpPr>
+          <p:cNvPr id="4" name="Title 1">
+            <a:extLst>
+              <a:ext uri="{FF2B5EF4-FFF2-40B4-BE49-F238E27FC236}">
+                <a16:creationId xmlns:a16="http://schemas.microsoft.com/office/drawing/2014/main" id="{07A027EA-F35A-823E-C1E2-1D869D8517D4}"/>
+              </a:ext>
+            </a:extLst>
+          </p:cNvPr>
+          <p:cNvSpPr>
+            <a:spLocks noGrp="1"/>
+          </p:cNvSpPr>
+          <p:nvPr>
+            <p:ph type="title"/>
+          </p:nvPr>
+        </p:nvSpPr>
+        <p:spPr>
+          <a:xfrm>
+            <a:off x="474306" y="198393"/>
+            <a:ext cx="11351934" cy="520418"/>
+          </a:xfrm>
+          <a:noFill/>
+        </p:spPr>
+        <p:txBody>
+          <a:bodyPr/>
+          <a:lstStyle/>
+          <a:p>
+            <a:r>
+              <a:rPr lang="en-US" dirty="0">
+                <a:gradFill flip="none" rotWithShape="1">
+                  <a:gsLst>
+                    <a:gs pos="0">
+                      <a:srgbClr val="C00000"/>
+                    </a:gs>
+                    <a:gs pos="46000">
+                      <a:schemeClr val="accent6">
+                        <a:lumMod val="95000"/>
+                        <a:lumOff val="5000"/>
+                      </a:schemeClr>
+                    </a:gs>
+                    <a:gs pos="100000">
+                      <a:srgbClr val="00B0F0"/>
+                    </a:gs>
+                  </a:gsLst>
+                  <a:path path="circle">
+                    <a:fillToRect l="100000" t="100000"/>
+                  </a:path>
+                  <a:tileRect r="-100000" b="-100000"/>
+                </a:gradFill>
+              </a:rPr>
+              <a:t>Color Space, HDR, Tone mapping and LUT color grading…</a:t>
+            </a:r>
+            <a:endParaRPr lang="en-IN" dirty="0">
+              <a:gradFill flip="none" rotWithShape="1">
+                <a:gsLst>
+                  <a:gs pos="0">
+                    <a:srgbClr val="C00000"/>
+                  </a:gs>
+                  <a:gs pos="46000">
+                    <a:schemeClr val="accent6">
+                      <a:lumMod val="95000"/>
+                      <a:lumOff val="5000"/>
+                    </a:schemeClr>
+                  </a:gs>
+                  <a:gs pos="100000">
+                    <a:srgbClr val="00B0F0"/>
+                  </a:gs>
+                </a:gsLst>
+                <a:path path="circle">
+                  <a:fillToRect l="100000" t="100000"/>
+                </a:path>
+                <a:tileRect r="-100000" b="-100000"/>
+              </a:gradFill>
+            </a:endParaRPr>
+          </a:p>
+        </p:txBody>
+      </p:sp>
+      <p:pic>
+        <p:nvPicPr>
+          <p:cNvPr id="6" name="Picture 5">
+            <a:extLst>
+              <a:ext uri="{FF2B5EF4-FFF2-40B4-BE49-F238E27FC236}">
+                <a16:creationId xmlns:a16="http://schemas.microsoft.com/office/drawing/2014/main" id="{5C2B7755-7C4A-6B4D-2294-8F322D8E3F2A}"/>
+              </a:ext>
+            </a:extLst>
+          </p:cNvPr>
+          <p:cNvPicPr>
+            <a:picLocks noChangeAspect="1"/>
+          </p:cNvPicPr>
+          <p:nvPr/>
+        </p:nvPicPr>
+        <p:blipFill>
+          <a:blip r:embed="rId2">
+            <a:extLst>
+              <a:ext uri="{28A0092B-C50C-407E-A947-70E740481C1C}">
+                <a14:useLocalDpi xmlns:a14="http://schemas.microsoft.com/office/drawing/2010/main" val="0"/>
+              </a:ext>
+            </a:extLst>
+          </a:blip>
+          <a:stretch>
+            <a:fillRect/>
+          </a:stretch>
+        </p:blipFill>
+        <p:spPr>
+          <a:xfrm>
+            <a:off x="623350" y="2156317"/>
+            <a:ext cx="3250794" cy="203175"/>
+          </a:xfrm>
+          <a:prstGeom prst="rect">
+            <a:avLst/>
+          </a:prstGeom>
+        </p:spPr>
+      </p:pic>
+      <p:sp>
+        <p:nvSpPr>
+          <p:cNvPr id="7" name="TextBox 6">
+            <a:extLst>
+              <a:ext uri="{FF2B5EF4-FFF2-40B4-BE49-F238E27FC236}">
+                <a16:creationId xmlns:a16="http://schemas.microsoft.com/office/drawing/2014/main" id="{B2673922-557B-050E-C8D6-764A650E8745}"/>
+              </a:ext>
+            </a:extLst>
+          </p:cNvPr>
+          <p:cNvSpPr txBox="1"/>
+          <p:nvPr/>
+        </p:nvSpPr>
+        <p:spPr>
+          <a:xfrm>
+            <a:off x="562389" y="2526453"/>
+            <a:ext cx="4795317" cy="461665"/>
+          </a:xfrm>
+          <a:prstGeom prst="rect">
+            <a:avLst/>
+          </a:prstGeom>
+          <a:noFill/>
+        </p:spPr>
+        <p:txBody>
+          <a:bodyPr wrap="square" rtlCol="0">
+            <a:spAutoFit/>
+          </a:bodyPr>
+          <a:lstStyle/>
+          <a:p>
+            <a:r>
+              <a:rPr lang="en-IN" sz="1200" dirty="0">
+                <a:solidFill>
+                  <a:schemeClr val="bg1"/>
+                </a:solidFill>
+                <a:latin typeface="Calibri Light" panose="020F0302020204030204" pitchFamily="34" charset="0"/>
+                <a:ea typeface="Calibri Light" panose="020F0302020204030204" pitchFamily="34" charset="0"/>
+                <a:cs typeface="Calibri Light" panose="020F0302020204030204" pitchFamily="34" charset="0"/>
+              </a:rPr>
+              <a:t>Texture.Builtin.ColorGradingNeutralLUT16</a:t>
+            </a:r>
+          </a:p>
+          <a:p>
+            <a:pPr marL="171450" indent="-171450">
+              <a:buFont typeface="Arial" panose="020B0604020202020204" pitchFamily="34" charset="0"/>
+              <a:buChar char="•"/>
+            </a:pPr>
+            <a:r>
+              <a:rPr lang="en-IN" sz="1200" dirty="0">
+                <a:solidFill>
+                  <a:schemeClr val="bg1"/>
+                </a:solidFill>
+                <a:latin typeface="Calibri Light" panose="020F0302020204030204" pitchFamily="34" charset="0"/>
+                <a:ea typeface="Calibri Light" panose="020F0302020204030204" pitchFamily="34" charset="0"/>
+                <a:cs typeface="Calibri Light" panose="020F0302020204030204" pitchFamily="34" charset="0"/>
+              </a:rPr>
+              <a:t>Neutral looking color palette, use this to create your look.</a:t>
+            </a:r>
+          </a:p>
+        </p:txBody>
+      </p:sp>
+      <p:sp>
+        <p:nvSpPr>
+          <p:cNvPr id="8" name="Rectangle 7">
+            <a:extLst>
+              <a:ext uri="{FF2B5EF4-FFF2-40B4-BE49-F238E27FC236}">
+                <a16:creationId xmlns:a16="http://schemas.microsoft.com/office/drawing/2014/main" id="{B4015D95-1FB7-54F6-6882-0B288F69C9F7}"/>
+              </a:ext>
+            </a:extLst>
+          </p:cNvPr>
+          <p:cNvSpPr/>
+          <p:nvPr/>
+        </p:nvSpPr>
+        <p:spPr>
+          <a:xfrm>
+            <a:off x="3948939" y="3595326"/>
+            <a:ext cx="4294121" cy="461665"/>
+          </a:xfrm>
+          <a:prstGeom prst="rect">
+            <a:avLst/>
+          </a:prstGeom>
+          <a:solidFill>
+            <a:srgbClr val="FF5D78"/>
+          </a:solidFill>
+          <a:ln>
+            <a:solidFill>
+              <a:srgbClr val="C00000"/>
+            </a:solidFill>
+          </a:ln>
+        </p:spPr>
+        <p:style>
+          <a:lnRef idx="2">
+            <a:schemeClr val="accent1">
+              <a:shade val="15000"/>
+            </a:schemeClr>
+          </a:lnRef>
+          <a:fillRef idx="1">
+            <a:schemeClr val="accent1"/>
+          </a:fillRef>
+          <a:effectRef idx="0">
+            <a:schemeClr val="accent1"/>
+          </a:effectRef>
+          <a:fontRef idx="minor">
+            <a:schemeClr val="lt1"/>
+          </a:fontRef>
+        </p:style>
+        <p:txBody>
+          <a:bodyPr rtlCol="0" anchor="ctr"/>
+          <a:lstStyle/>
+          <a:p>
+            <a:pPr algn="ctr"/>
+            <a:r>
+              <a:rPr lang="en-US" sz="1200" dirty="0">
+                <a:solidFill>
+                  <a:schemeClr val="tx1"/>
+                </a:solidFill>
+                <a:latin typeface="+mj-lt"/>
+                <a:ea typeface="Calibri Light" panose="020F0302020204030204" pitchFamily="34" charset="0"/>
+                <a:cs typeface="Calibri Light" panose="020F0302020204030204" pitchFamily="34" charset="0"/>
+              </a:rPr>
+              <a:t>Razix has many more presets and supports loading your own LUT, use neutral LUTs  to configure as per your needs.</a:t>
+            </a:r>
+            <a:endParaRPr lang="en-IN" sz="1200" dirty="0">
+              <a:solidFill>
+                <a:schemeClr val="tx1"/>
+              </a:solidFill>
+              <a:latin typeface="+mj-lt"/>
+              <a:ea typeface="Calibri Light" panose="020F0302020204030204" pitchFamily="34" charset="0"/>
+              <a:cs typeface="Calibri Light" panose="020F0302020204030204" pitchFamily="34" charset="0"/>
+            </a:endParaRPr>
+          </a:p>
+        </p:txBody>
+      </p:sp>
+      <p:pic>
+        <p:nvPicPr>
+          <p:cNvPr id="10" name="Picture 9">
+            <a:extLst>
+              <a:ext uri="{FF2B5EF4-FFF2-40B4-BE49-F238E27FC236}">
+                <a16:creationId xmlns:a16="http://schemas.microsoft.com/office/drawing/2014/main" id="{B61B3C0E-3127-77DB-D480-CAAE458FD02C}"/>
+              </a:ext>
+            </a:extLst>
+          </p:cNvPr>
+          <p:cNvPicPr>
+            <a:picLocks noChangeAspect="1"/>
+          </p:cNvPicPr>
+          <p:nvPr/>
+        </p:nvPicPr>
+        <p:blipFill>
+          <a:blip r:embed="rId3">
+            <a:extLst>
+              <a:ext uri="{28A0092B-C50C-407E-A947-70E740481C1C}">
+                <a14:useLocalDpi xmlns:a14="http://schemas.microsoft.com/office/drawing/2010/main" val="0"/>
+              </a:ext>
+            </a:extLst>
+          </a:blip>
+          <a:stretch>
+            <a:fillRect/>
+          </a:stretch>
+        </p:blipFill>
+        <p:spPr>
+          <a:xfrm>
+            <a:off x="6096000" y="2156317"/>
+            <a:ext cx="3291428" cy="205714"/>
+          </a:xfrm>
+          <a:prstGeom prst="rect">
+            <a:avLst/>
+          </a:prstGeom>
+        </p:spPr>
+      </p:pic>
+      <p:sp>
+        <p:nvSpPr>
+          <p:cNvPr id="11" name="TextBox 10">
+            <a:extLst>
+              <a:ext uri="{FF2B5EF4-FFF2-40B4-BE49-F238E27FC236}">
+                <a16:creationId xmlns:a16="http://schemas.microsoft.com/office/drawing/2014/main" id="{89B42B05-EE57-40BB-4A43-7EF31F3CB18E}"/>
+              </a:ext>
+            </a:extLst>
+          </p:cNvPr>
+          <p:cNvSpPr txBox="1"/>
+          <p:nvPr/>
+        </p:nvSpPr>
+        <p:spPr>
+          <a:xfrm>
+            <a:off x="5977669" y="2526452"/>
+            <a:ext cx="5848571" cy="830997"/>
+          </a:xfrm>
+          <a:prstGeom prst="rect">
+            <a:avLst/>
+          </a:prstGeom>
+          <a:noFill/>
+        </p:spPr>
+        <p:txBody>
+          <a:bodyPr wrap="square" rtlCol="0">
+            <a:spAutoFit/>
+          </a:bodyPr>
+          <a:lstStyle/>
+          <a:p>
+            <a:r>
+              <a:rPr lang="en-IN" sz="1200" dirty="0">
+                <a:solidFill>
+                  <a:schemeClr val="bg1"/>
+                </a:solidFill>
+                <a:latin typeface="Calibri Light" panose="020F0302020204030204" pitchFamily="34" charset="0"/>
+                <a:ea typeface="Calibri Light" panose="020F0302020204030204" pitchFamily="34" charset="0"/>
+                <a:cs typeface="Calibri Light" panose="020F0302020204030204" pitchFamily="34" charset="0"/>
+              </a:rPr>
+              <a:t>Texture.Builtin.ColorGradingNeutralLUT16</a:t>
+            </a:r>
+          </a:p>
+          <a:p>
+            <a:pPr marL="171450" indent="-171450">
+              <a:buFont typeface="Arial" panose="020B0604020202020204" pitchFamily="34" charset="0"/>
+              <a:buChar char="•"/>
+            </a:pPr>
+            <a:r>
+              <a:rPr lang="en-IN" sz="1200" dirty="0">
+                <a:solidFill>
+                  <a:schemeClr val="bg1"/>
+                </a:solidFill>
+                <a:latin typeface="Calibri Light" panose="020F0302020204030204" pitchFamily="34" charset="0"/>
+                <a:ea typeface="Calibri Light" panose="020F0302020204030204" pitchFamily="34" charset="0"/>
+                <a:cs typeface="Calibri Light" panose="020F0302020204030204" pitchFamily="34" charset="0"/>
+              </a:rPr>
+              <a:t>Neutral looking color palette, use this to create your look.</a:t>
+            </a:r>
+          </a:p>
+          <a:p>
+            <a:pPr marL="171450" indent="-171450">
+              <a:buFont typeface="Arial" panose="020B0604020202020204" pitchFamily="34" charset="0"/>
+              <a:buChar char="•"/>
+            </a:pPr>
+            <a:r>
+              <a:rPr lang="en-IN" sz="1200" dirty="0">
+                <a:solidFill>
+                  <a:schemeClr val="bg1"/>
+                </a:solidFill>
+                <a:latin typeface="Calibri Light" panose="020F0302020204030204" pitchFamily="34" charset="0"/>
+                <a:ea typeface="Calibri Light" panose="020F0302020204030204" pitchFamily="34" charset="0"/>
+                <a:cs typeface="Calibri Light" panose="020F0302020204030204" pitchFamily="34" charset="0"/>
+              </a:rPr>
+              <a:t>Based on unreal Engine - </a:t>
+            </a:r>
+            <a:r>
+              <a:rPr lang="en-IN" sz="1200" dirty="0">
+                <a:solidFill>
+                  <a:schemeClr val="bg1"/>
+                </a:solidFill>
+                <a:latin typeface="Calibri Light" panose="020F0302020204030204" pitchFamily="34" charset="0"/>
+                <a:ea typeface="Calibri Light" panose="020F0302020204030204" pitchFamily="34" charset="0"/>
+                <a:cs typeface="Calibri Light" panose="020F0302020204030204" pitchFamily="34" charset="0"/>
+                <a:hlinkClick r:id="rId4"/>
+              </a:rPr>
+              <a:t>https://docs.unrealengine.com/4.27/en-US/RenderingAndGraphics/PostProcessEffects/ColorGrading/</a:t>
+            </a:r>
+            <a:endParaRPr lang="en-IN" sz="1200" dirty="0">
+              <a:solidFill>
+                <a:schemeClr val="bg1"/>
+              </a:solidFill>
+              <a:latin typeface="Calibri Light" panose="020F0302020204030204" pitchFamily="34" charset="0"/>
+              <a:ea typeface="Calibri Light" panose="020F0302020204030204" pitchFamily="34" charset="0"/>
+              <a:cs typeface="Calibri Light" panose="020F0302020204030204" pitchFamily="34" charset="0"/>
+            </a:endParaRPr>
+          </a:p>
+        </p:txBody>
+      </p:sp>
+      <p:sp>
+        <p:nvSpPr>
+          <p:cNvPr id="14" name="TextBox 13">
+            <a:extLst>
+              <a:ext uri="{FF2B5EF4-FFF2-40B4-BE49-F238E27FC236}">
+                <a16:creationId xmlns:a16="http://schemas.microsoft.com/office/drawing/2014/main" id="{73B6B01A-A9C4-5135-B9A4-B9B6DDF8AAFC}"/>
+              </a:ext>
+            </a:extLst>
+          </p:cNvPr>
+          <p:cNvSpPr txBox="1"/>
+          <p:nvPr/>
+        </p:nvSpPr>
+        <p:spPr>
+          <a:xfrm>
+            <a:off x="7321974" y="534145"/>
+            <a:ext cx="6096000" cy="369332"/>
+          </a:xfrm>
+          <a:prstGeom prst="rect">
+            <a:avLst/>
+          </a:prstGeom>
+          <a:noFill/>
+        </p:spPr>
+        <p:txBody>
+          <a:bodyPr wrap="square">
+            <a:spAutoFit/>
+          </a:bodyPr>
+          <a:lstStyle/>
+          <a:p>
+            <a:r>
+              <a:rPr lang="en-IN" dirty="0">
+                <a:solidFill>
+                  <a:schemeClr val="bg1"/>
+                </a:solidFill>
+                <a:hlinkClick r:id="rId5">
+                  <a:extLst>
+                    <a:ext uri="{A12FA001-AC4F-418D-AE19-62706E023703}">
+                      <ahyp:hlinkClr xmlns:ahyp="http://schemas.microsoft.com/office/drawing/2018/hyperlinkcolor" val="tx"/>
+                    </a:ext>
+                  </a:extLst>
+                </a:hlinkClick>
+              </a:rPr>
+              <a:t>[Source]:</a:t>
+            </a:r>
+            <a:r>
+              <a:rPr lang="en-IN" dirty="0">
+                <a:solidFill>
+                  <a:srgbClr val="0563C1"/>
+                </a:solidFill>
+                <a:hlinkClick r:id="rId5">
+                  <a:extLst>
+                    <a:ext uri="{A12FA001-AC4F-418D-AE19-62706E023703}">
+                      <ahyp:hlinkClr xmlns:ahyp="http://schemas.microsoft.com/office/drawing/2018/hyperlinkcolor" val="tx"/>
+                    </a:ext>
+                  </a:extLst>
+                </a:hlinkClick>
+              </a:rPr>
+              <a:t> https://defold.com/tutorials/grading/</a:t>
+            </a:r>
+            <a:endParaRPr lang="en-IN" dirty="0">
+              <a:solidFill>
+                <a:schemeClr val="bg1"/>
+              </a:solidFill>
+            </a:endParaRPr>
+          </a:p>
+        </p:txBody>
+      </p:sp>
+    </p:spTree>
+    <p:extLst>
+      <p:ext uri="{BB962C8B-B14F-4D97-AF65-F5344CB8AC3E}">
+        <p14:creationId xmlns:p14="http://schemas.microsoft.com/office/powerpoint/2010/main" val="2919963422"/>
+      </p:ext>
+    </p:extLst>
+  </p:cSld>
+  <p:clrMapOvr>
+    <a:masterClrMapping/>
+  </p:clrMapOvr>
+</p:sld>
+</file>
+
+<file path=ppt/slides/slide11.xml><?xml version="1.0" encoding="utf-8"?>
+<p:sld xmlns:a="http://schemas.openxmlformats.org/drawingml/2006/main" xmlns:r="http://schemas.openxmlformats.org/officeDocument/2006/relationships" xmlns:p="http://schemas.openxmlformats.org/presentationml/2006/main">
+  <p:cSld>
+    <p:spTree>
+      <p:nvGrpSpPr>
+        <p:cNvPr id="1" name=""/>
+        <p:cNvGrpSpPr/>
+        <p:nvPr/>
+      </p:nvGrpSpPr>
+      <p:grpSpPr>
+        <a:xfrm>
+          <a:off x="0" y="0"/>
+          <a:ext cx="0" cy="0"/>
+          <a:chOff x="0" y="0"/>
+          <a:chExt cx="0" cy="0"/>
+        </a:xfrm>
+      </p:grpSpPr>
+      <p:sp>
+        <p:nvSpPr>
           <p:cNvPr id="2" name="Title 1">
             <a:extLst>
               <a:ext uri="{FF2B5EF4-FFF2-40B4-BE49-F238E27FC236}">
@@ -4457,7 +5023,10 @@
             <a:ext cx="9931280" cy="4711159"/>
           </a:xfrm>
           <a:prstGeom prst="snip2DiagRect">
-            <a:avLst/>
+            <a:avLst>
+              <a:gd name="adj1" fmla="val 0"/>
+              <a:gd name="adj2" fmla="val 0"/>
+            </a:avLst>
           </a:prstGeom>
           <a:solidFill>
             <a:srgbClr val="FFFFFF">
@@ -4504,7 +5073,7 @@
 </p:sld>
 </file>
 
-<file path=ppt/slides/slide11.xml><?xml version="1.0" encoding="utf-8"?>
+<file path=ppt/slides/slide12.xml><?xml version="1.0" encoding="utf-8"?>
 <p:sld xmlns:a="http://schemas.openxmlformats.org/drawingml/2006/main" xmlns:r="http://schemas.openxmlformats.org/officeDocument/2006/relationships" xmlns:p="http://schemas.openxmlformats.org/presentationml/2006/main">
   <p:cSld>
     <p:spTree>
@@ -4563,7 +5132,7 @@
 </p:sld>
 </file>
 
-<file path=ppt/slides/slide12.xml><?xml version="1.0" encoding="utf-8"?>
+<file path=ppt/slides/slide13.xml><?xml version="1.0" encoding="utf-8"?>
 <p:sld xmlns:a="http://schemas.openxmlformats.org/drawingml/2006/main" xmlns:r="http://schemas.openxmlformats.org/officeDocument/2006/relationships" xmlns:p="http://schemas.openxmlformats.org/presentationml/2006/main">
   <p:cSld>
     <p:spTree>
@@ -5083,7 +5652,7 @@
 </p:sld>
 </file>
 
-<file path=ppt/slides/slide13.xml><?xml version="1.0" encoding="utf-8"?>
+<file path=ppt/slides/slide14.xml><?xml version="1.0" encoding="utf-8"?>
 <p:sld xmlns:a="http://schemas.openxmlformats.org/drawingml/2006/main" xmlns:r="http://schemas.openxmlformats.org/officeDocument/2006/relationships" xmlns:p="http://schemas.openxmlformats.org/presentationml/2006/main">
   <p:cSld>
     <p:spTree>
@@ -5664,7 +6233,7 @@
 </p:sld>
 </file>
 
-<file path=ppt/slides/slide14.xml><?xml version="1.0" encoding="utf-8"?>
+<file path=ppt/slides/slide15.xml><?xml version="1.0" encoding="utf-8"?>
 <p:sld xmlns:a="http://schemas.openxmlformats.org/drawingml/2006/main" xmlns:r="http://schemas.openxmlformats.org/officeDocument/2006/relationships" xmlns:p="http://schemas.openxmlformats.org/presentationml/2006/main">
   <p:cSld>
     <p:spTree>
@@ -10116,6 +10685,156 @@
       </p:grpSpPr>
       <p:sp>
         <p:nvSpPr>
+          <p:cNvPr id="2" name="Title 1">
+            <a:extLst>
+              <a:ext uri="{FF2B5EF4-FFF2-40B4-BE49-F238E27FC236}">
+                <a16:creationId xmlns:a16="http://schemas.microsoft.com/office/drawing/2014/main" id="{EFD8FFB3-B27C-2CE8-C940-637CEC1D75C0}"/>
+              </a:ext>
+            </a:extLst>
+          </p:cNvPr>
+          <p:cNvSpPr>
+            <a:spLocks noGrp="1"/>
+          </p:cNvSpPr>
+          <p:nvPr>
+            <p:ph type="title"/>
+          </p:nvPr>
+        </p:nvSpPr>
+        <p:spPr/>
+        <p:txBody>
+          <a:bodyPr/>
+          <a:lstStyle/>
+          <a:p>
+            <a:r>
+              <a:rPr lang="en-US" i="1" dirty="0"/>
+              <a:t>“Everything is an Asset” </a:t>
+            </a:r>
+            <a:r>
+              <a:rPr lang="en-US" dirty="0"/>
+              <a:t>: A new paradigm for data in a game engine</a:t>
+            </a:r>
+          </a:p>
+        </p:txBody>
+      </p:sp>
+      <p:sp>
+        <p:nvSpPr>
+          <p:cNvPr id="3" name="Content Placeholder 2">
+            <a:extLst>
+              <a:ext uri="{FF2B5EF4-FFF2-40B4-BE49-F238E27FC236}">
+                <a16:creationId xmlns:a16="http://schemas.microsoft.com/office/drawing/2014/main" id="{0E4B4E23-115F-96D1-3234-FF398A836032}"/>
+              </a:ext>
+            </a:extLst>
+          </p:cNvPr>
+          <p:cNvSpPr>
+            <a:spLocks noGrp="1"/>
+          </p:cNvSpPr>
+          <p:nvPr>
+            <p:ph idx="1"/>
+          </p:nvPr>
+        </p:nvSpPr>
+        <p:spPr/>
+        <p:txBody>
+          <a:bodyPr/>
+          <a:lstStyle/>
+          <a:p>
+            <a:r>
+              <a:rPr lang="en-US" dirty="0"/>
+              <a:t>“Everything is an asset”: Meshes, Transform, Tag, UUID, Material, anything and everything in the Game world is an asset</a:t>
+            </a:r>
+          </a:p>
+          <a:p>
+            <a:r>
+              <a:rPr lang="en-US" dirty="0"/>
+              <a:t>Everything in Serializable: Since everything is as Asset, storable to disk</a:t>
+            </a:r>
+          </a:p>
+          <a:p>
+            <a:r>
+              <a:rPr lang="en-US" dirty="0"/>
+              <a:t>Data-Driven is the central pillar</a:t>
+            </a:r>
+          </a:p>
+          <a:p>
+            <a:r>
+              <a:rPr lang="en-US" dirty="0"/>
+              <a:t>No ECS/</a:t>
+            </a:r>
+            <a:r>
+              <a:rPr lang="en-US" dirty="0" err="1"/>
+              <a:t>GameObjects</a:t>
+            </a:r>
+            <a:endParaRPr lang="en-US" dirty="0"/>
+          </a:p>
+          <a:p>
+            <a:r>
+              <a:rPr lang="en-US" dirty="0"/>
+              <a:t>Scene Graph stores Asset refs for parent-child relationship</a:t>
+            </a:r>
+          </a:p>
+          <a:p>
+            <a:r>
+              <a:rPr lang="en-US" dirty="0"/>
+              <a:t>Asset database stores and handles assets in </a:t>
+            </a:r>
+            <a:r>
+              <a:rPr lang="en-US" b="1" dirty="0"/>
+              <a:t>different pools</a:t>
+            </a:r>
+          </a:p>
+          <a:p>
+            <a:r>
+              <a:rPr lang="en-US" dirty="0"/>
+              <a:t>Lazy allocation and Proxy mechanism for resource translation</a:t>
+            </a:r>
+          </a:p>
+          <a:p>
+            <a:endParaRPr lang="en-US" dirty="0"/>
+          </a:p>
+          <a:p>
+            <a:endParaRPr lang="en-US" dirty="0"/>
+          </a:p>
+          <a:p>
+            <a:endParaRPr lang="en-US" dirty="0"/>
+          </a:p>
+          <a:p>
+            <a:pPr marL="0" indent="0">
+              <a:buNone/>
+            </a:pPr>
+            <a:endParaRPr lang="en-US" dirty="0"/>
+          </a:p>
+        </p:txBody>
+      </p:sp>
+    </p:spTree>
+    <p:extLst>
+      <p:ext uri="{BB962C8B-B14F-4D97-AF65-F5344CB8AC3E}">
+        <p14:creationId xmlns:p14="http://schemas.microsoft.com/office/powerpoint/2010/main" val="1301025073"/>
+      </p:ext>
+    </p:extLst>
+  </p:cSld>
+  <p:clrMapOvr>
+    <a:masterClrMapping/>
+  </p:clrMapOvr>
+</p:sld>
+</file>
+
+<file path=ppt/slides/slide8.xml><?xml version="1.0" encoding="utf-8"?>
+<p:sld xmlns:a="http://schemas.openxmlformats.org/drawingml/2006/main" xmlns:r="http://schemas.openxmlformats.org/officeDocument/2006/relationships" xmlns:p="http://schemas.openxmlformats.org/presentationml/2006/main">
+  <p:cSld>
+    <p:spTree>
+      <p:nvGrpSpPr>
+        <p:cNvPr id="1" name=""/>
+        <p:cNvGrpSpPr/>
+        <p:nvPr/>
+      </p:nvGrpSpPr>
+      <p:grpSpPr>
+        <a:xfrm>
+          <a:off x="0" y="0"/>
+          <a:ext cx="0" cy="0"/>
+          <a:chOff x="0" y="0"/>
+          <a:chExt cx="0" cy="0"/>
+        </a:xfrm>
+      </p:grpSpPr>
+      <p:sp>
+        <p:nvSpPr>
           <p:cNvPr id="58" name="Rectangle 57">
             <a:extLst>
               <a:ext uri="{FF2B5EF4-FFF2-40B4-BE49-F238E27FC236}">
@@ -10345,120 +11064,55 @@
           </a:p>
         </p:txBody>
       </p:sp>
-      <p:grpSp>
-        <p:nvGrpSpPr>
-          <p:cNvPr id="7" name="Group 6">
-            <a:extLst>
-              <a:ext uri="{FF2B5EF4-FFF2-40B4-BE49-F238E27FC236}">
-                <a16:creationId xmlns:a16="http://schemas.microsoft.com/office/drawing/2014/main" id="{2C823D52-7CF3-1716-55AC-B3678290099E}"/>
-              </a:ext>
-            </a:extLst>
-          </p:cNvPr>
-          <p:cNvGrpSpPr/>
+      <p:sp>
+        <p:nvSpPr>
+          <p:cNvPr id="6" name="Flowchart: Magnetic Disk 5">
+            <a:extLst>
+              <a:ext uri="{FF2B5EF4-FFF2-40B4-BE49-F238E27FC236}">
+                <a16:creationId xmlns:a16="http://schemas.microsoft.com/office/drawing/2014/main" id="{49382EEF-4E53-B254-12EB-8B0D635F2CA4}"/>
+              </a:ext>
+            </a:extLst>
+          </p:cNvPr>
+          <p:cNvSpPr/>
           <p:nvPr/>
-        </p:nvGrpSpPr>
-        <p:grpSpPr>
+        </p:nvSpPr>
+        <p:spPr>
           <a:xfrm>
             <a:off x="964849" y="5259377"/>
             <a:ext cx="794582" cy="1147729"/>
-            <a:chOff x="586478" y="3033286"/>
-            <a:chExt cx="794582" cy="1147729"/>
           </a:xfrm>
-        </p:grpSpPr>
-        <p:sp>
-          <p:nvSpPr>
-            <p:cNvPr id="6" name="Flowchart: Magnetic Disk 5">
-              <a:extLst>
-                <a:ext uri="{FF2B5EF4-FFF2-40B4-BE49-F238E27FC236}">
-                  <a16:creationId xmlns:a16="http://schemas.microsoft.com/office/drawing/2014/main" id="{49382EEF-4E53-B254-12EB-8B0D635F2CA4}"/>
-                </a:ext>
-              </a:extLst>
-            </p:cNvPr>
-            <p:cNvSpPr/>
-            <p:nvPr/>
-          </p:nvSpPr>
-          <p:spPr>
-            <a:xfrm>
-              <a:off x="586478" y="3033286"/>
-              <a:ext cx="794582" cy="1147729"/>
-            </a:xfrm>
-            <a:prstGeom prst="flowChartMagneticDisk">
-              <a:avLst/>
-            </a:prstGeom>
-          </p:spPr>
-          <p:style>
-            <a:lnRef idx="2">
-              <a:schemeClr val="accent4">
-                <a:shade val="15000"/>
-              </a:schemeClr>
-            </a:lnRef>
-            <a:fillRef idx="1">
-              <a:schemeClr val="accent4"/>
-            </a:fillRef>
-            <a:effectRef idx="0">
-              <a:schemeClr val="accent4"/>
-            </a:effectRef>
-            <a:fontRef idx="minor">
-              <a:schemeClr val="lt1"/>
-            </a:fontRef>
-          </p:style>
-          <p:txBody>
-            <a:bodyPr rtlCol="0" anchor="ctr"/>
-            <a:lstStyle/>
-            <a:p>
-              <a:pPr algn="ctr"/>
-              <a:endParaRPr lang="en-IN"/>
-            </a:p>
-          </p:txBody>
-        </p:sp>
-        <p:pic>
-          <p:nvPicPr>
-            <p:cNvPr id="1030" name="Picture 6" descr="Redis - Update logo [#3303487] | Drupal.org">
-              <a:extLst>
-                <a:ext uri="{FF2B5EF4-FFF2-40B4-BE49-F238E27FC236}">
-                  <a16:creationId xmlns:a16="http://schemas.microsoft.com/office/drawing/2014/main" id="{EAAEAC2D-F209-A667-E8A3-C2F374FEAB33}"/>
-                </a:ext>
-              </a:extLst>
-            </p:cNvPr>
-            <p:cNvPicPr>
-              <a:picLocks noChangeAspect="1" noChangeArrowheads="1"/>
-            </p:cNvPicPr>
-            <p:nvPr/>
-          </p:nvPicPr>
-          <p:blipFill>
-            <a:blip r:embed="rId2">
-              <a:extLst>
-                <a:ext uri="{28A0092B-C50C-407E-A947-70E740481C1C}">
-                  <a14:useLocalDpi xmlns:a14="http://schemas.microsoft.com/office/drawing/2010/main" val="0"/>
-                </a:ext>
-              </a:extLst>
-            </a:blip>
-            <a:srcRect/>
-            <a:stretch>
-              <a:fillRect/>
-            </a:stretch>
-          </p:blipFill>
-          <p:spPr bwMode="auto">
-            <a:xfrm>
-              <a:off x="586478" y="3428999"/>
-              <a:ext cx="794582" cy="752015"/>
-            </a:xfrm>
-            <a:prstGeom prst="rect">
-              <a:avLst/>
-            </a:prstGeom>
-            <a:noFill/>
-            <a:extLst>
-              <a:ext uri="{909E8E84-426E-40DD-AFC4-6F175D3DCCD1}">
-                <a14:hiddenFill xmlns:a14="http://schemas.microsoft.com/office/drawing/2010/main">
-                  <a:solidFill>
-                    <a:srgbClr val="FFFFFF"/>
-                  </a:solidFill>
-                </a14:hiddenFill>
-              </a:ext>
-            </a:extLst>
-          </p:spPr>
-        </p:pic>
-      </p:grpSp>
+          <a:prstGeom prst="flowChartMagneticDisk">
+            <a:avLst/>
+          </a:prstGeom>
+        </p:spPr>
+        <p:style>
+          <a:lnRef idx="2">
+            <a:schemeClr val="accent4">
+              <a:shade val="15000"/>
+            </a:schemeClr>
+          </a:lnRef>
+          <a:fillRef idx="1">
+            <a:schemeClr val="accent4"/>
+          </a:fillRef>
+          <a:effectRef idx="0">
+            <a:schemeClr val="accent4"/>
+          </a:effectRef>
+          <a:fontRef idx="minor">
+            <a:schemeClr val="lt1"/>
+          </a:fontRef>
+        </p:style>
+        <p:txBody>
+          <a:bodyPr rtlCol="0" anchor="ctr"/>
+          <a:lstStyle/>
+          <a:p>
+            <a:pPr algn="ctr"/>
+            <a:r>
+              <a:rPr lang="en-IN" dirty="0"/>
+              <a:t>Custom DB</a:t>
+            </a:r>
+          </a:p>
+        </p:txBody>
+      </p:sp>
       <p:sp>
         <p:nvSpPr>
           <p:cNvPr id="9" name="Rectangle 8">
@@ -11949,7 +12603,7 @@
 </p:sld>
 </file>
 
-<file path=ppt/slides/slide8.xml><?xml version="1.0" encoding="utf-8"?>
+<file path=ppt/slides/slide9.xml><?xml version="1.0" encoding="utf-8"?>
 <p:sld xmlns:a="http://schemas.openxmlformats.org/drawingml/2006/main" xmlns:r="http://schemas.openxmlformats.org/officeDocument/2006/relationships" xmlns:p="http://schemas.openxmlformats.org/presentationml/2006/main">
   <p:cSld>
     <p:spTree>
@@ -12816,570 +13470,6 @@
     <p:extLst>
       <p:ext uri="{BB962C8B-B14F-4D97-AF65-F5344CB8AC3E}">
         <p14:creationId xmlns:p14="http://schemas.microsoft.com/office/powerpoint/2010/main" val="3797168114"/>
-      </p:ext>
-    </p:extLst>
-  </p:cSld>
-  <p:clrMapOvr>
-    <a:masterClrMapping/>
-  </p:clrMapOvr>
-</p:sld>
-</file>
-
-<file path=ppt/slides/slide9.xml><?xml version="1.0" encoding="utf-8"?>
-<p:sld xmlns:a="http://schemas.openxmlformats.org/drawingml/2006/main" xmlns:r="http://schemas.openxmlformats.org/officeDocument/2006/relationships" xmlns:p="http://schemas.openxmlformats.org/presentationml/2006/main">
-  <p:cSld>
-    <p:spTree>
-      <p:nvGrpSpPr>
-        <p:cNvPr id="1" name=""/>
-        <p:cNvGrpSpPr/>
-        <p:nvPr/>
-      </p:nvGrpSpPr>
-      <p:grpSpPr>
-        <a:xfrm>
-          <a:off x="0" y="0"/>
-          <a:ext cx="0" cy="0"/>
-          <a:chOff x="0" y="0"/>
-          <a:chExt cx="0" cy="0"/>
-        </a:xfrm>
-      </p:grpSpPr>
-      <p:sp>
-        <p:nvSpPr>
-          <p:cNvPr id="12" name="TextBox 11">
-            <a:extLst>
-              <a:ext uri="{FF2B5EF4-FFF2-40B4-BE49-F238E27FC236}">
-                <a16:creationId xmlns:a16="http://schemas.microsoft.com/office/drawing/2014/main" id="{44BF80BA-927D-163B-708A-1886227160E1}"/>
-              </a:ext>
-            </a:extLst>
-          </p:cNvPr>
-          <p:cNvSpPr txBox="1"/>
-          <p:nvPr/>
-        </p:nvSpPr>
-        <p:spPr>
-          <a:xfrm>
-            <a:off x="271108" y="1057471"/>
-            <a:ext cx="10274972" cy="861774"/>
-          </a:xfrm>
-          <a:prstGeom prst="rect">
-            <a:avLst/>
-          </a:prstGeom>
-          <a:noFill/>
-        </p:spPr>
-        <p:txBody>
-          <a:bodyPr wrap="square" rtlCol="0">
-            <a:spAutoFit/>
-          </a:bodyPr>
-          <a:lstStyle/>
-          <a:p>
-            <a:r>
-              <a:rPr lang="en-US" b="1" u="sng" dirty="0">
-                <a:solidFill>
-                  <a:schemeClr val="bg1"/>
-                </a:solidFill>
-              </a:rPr>
-              <a:t>Color Grading LUTs:</a:t>
-            </a:r>
-            <a:endParaRPr lang="en-US" dirty="0">
-              <a:solidFill>
-                <a:schemeClr val="bg1"/>
-              </a:solidFill>
-              <a:latin typeface="Calibri Light" panose="020F0302020204030204" pitchFamily="34" charset="0"/>
-              <a:ea typeface="Calibri Light" panose="020F0302020204030204" pitchFamily="34" charset="0"/>
-              <a:cs typeface="Calibri Light" panose="020F0302020204030204" pitchFamily="34" charset="0"/>
-            </a:endParaRPr>
-          </a:p>
-          <a:p>
-            <a:pPr marL="285750" indent="-285750">
-              <a:buFont typeface="Arial" panose="020B0604020202020204" pitchFamily="34" charset="0"/>
-              <a:buChar char="•"/>
-            </a:pPr>
-            <a:r>
-              <a:rPr lang="en-IN" sz="1600" dirty="0">
-                <a:solidFill>
-                  <a:schemeClr val="bg1"/>
-                </a:solidFill>
-                <a:latin typeface="Calibri Light" panose="020F0302020204030204" pitchFamily="34" charset="0"/>
-                <a:ea typeface="Calibri Light" panose="020F0302020204030204" pitchFamily="34" charset="0"/>
-                <a:cs typeface="Calibri Light" panose="020F0302020204030204" pitchFamily="34" charset="0"/>
-              </a:rPr>
-              <a:t>Engine has many tonemapping functions to convert b/w HDR and SDR.</a:t>
-            </a:r>
-          </a:p>
-          <a:p>
-            <a:pPr marL="285750" indent="-285750">
-              <a:buFont typeface="Arial" panose="020B0604020202020204" pitchFamily="34" charset="0"/>
-              <a:buChar char="•"/>
-            </a:pPr>
-            <a:r>
-              <a:rPr lang="en-IN" sz="1600" dirty="0">
-                <a:solidFill>
-                  <a:schemeClr val="bg1"/>
-                </a:solidFill>
-                <a:latin typeface="Calibri Light" panose="020F0302020204030204" pitchFamily="34" charset="0"/>
-                <a:ea typeface="Calibri Light" panose="020F0302020204030204" pitchFamily="34" charset="0"/>
-                <a:cs typeface="Calibri Light" panose="020F0302020204030204" pitchFamily="34" charset="0"/>
-              </a:rPr>
-              <a:t>For </a:t>
-            </a:r>
-            <a:r>
-              <a:rPr lang="en-IN" sz="1600" b="1" dirty="0">
-                <a:solidFill>
-                  <a:schemeClr val="bg1"/>
-                </a:solidFill>
-                <a:latin typeface="Calibri Light" panose="020F0302020204030204" pitchFamily="34" charset="0"/>
-                <a:ea typeface="Calibri Light" panose="020F0302020204030204" pitchFamily="34" charset="0"/>
-                <a:cs typeface="Calibri Light" panose="020F0302020204030204" pitchFamily="34" charset="0"/>
-              </a:rPr>
-              <a:t>HDR tonemapping we need to do it based on the display max brightness and the HDR color space being used.</a:t>
-            </a:r>
-          </a:p>
-        </p:txBody>
-      </p:sp>
-      <p:sp>
-        <p:nvSpPr>
-          <p:cNvPr id="4" name="Title 1">
-            <a:extLst>
-              <a:ext uri="{FF2B5EF4-FFF2-40B4-BE49-F238E27FC236}">
-                <a16:creationId xmlns:a16="http://schemas.microsoft.com/office/drawing/2014/main" id="{07A027EA-F35A-823E-C1E2-1D869D8517D4}"/>
-              </a:ext>
-            </a:extLst>
-          </p:cNvPr>
-          <p:cNvSpPr>
-            <a:spLocks noGrp="1"/>
-          </p:cNvSpPr>
-          <p:nvPr>
-            <p:ph type="title"/>
-          </p:nvPr>
-        </p:nvSpPr>
-        <p:spPr>
-          <a:xfrm>
-            <a:off x="474306" y="198393"/>
-            <a:ext cx="11351934" cy="520418"/>
-          </a:xfrm>
-          <a:noFill/>
-        </p:spPr>
-        <p:txBody>
-          <a:bodyPr/>
-          <a:lstStyle/>
-          <a:p>
-            <a:r>
-              <a:rPr lang="en-US" dirty="0">
-                <a:gradFill flip="none" rotWithShape="1">
-                  <a:gsLst>
-                    <a:gs pos="0">
-                      <a:srgbClr val="C00000"/>
-                    </a:gs>
-                    <a:gs pos="46000">
-                      <a:schemeClr val="accent6">
-                        <a:lumMod val="95000"/>
-                        <a:lumOff val="5000"/>
-                      </a:schemeClr>
-                    </a:gs>
-                    <a:gs pos="100000">
-                      <a:srgbClr val="00B0F0"/>
-                    </a:gs>
-                  </a:gsLst>
-                  <a:path path="circle">
-                    <a:fillToRect l="100000" t="100000"/>
-                  </a:path>
-                  <a:tileRect r="-100000" b="-100000"/>
-                </a:gradFill>
-              </a:rPr>
-              <a:t>Color Space, HDR, Tone mapping and LUT color grading…</a:t>
-            </a:r>
-            <a:endParaRPr lang="en-IN" dirty="0">
-              <a:gradFill flip="none" rotWithShape="1">
-                <a:gsLst>
-                  <a:gs pos="0">
-                    <a:srgbClr val="C00000"/>
-                  </a:gs>
-                  <a:gs pos="46000">
-                    <a:schemeClr val="accent6">
-                      <a:lumMod val="95000"/>
-                      <a:lumOff val="5000"/>
-                    </a:schemeClr>
-                  </a:gs>
-                  <a:gs pos="100000">
-                    <a:srgbClr val="00B0F0"/>
-                  </a:gs>
-                </a:gsLst>
-                <a:path path="circle">
-                  <a:fillToRect l="100000" t="100000"/>
-                </a:path>
-                <a:tileRect r="-100000" b="-100000"/>
-              </a:gradFill>
-            </a:endParaRPr>
-          </a:p>
-        </p:txBody>
-      </p:sp>
-      <p:pic>
-        <p:nvPicPr>
-          <p:cNvPr id="6" name="Picture 5">
-            <a:extLst>
-              <a:ext uri="{FF2B5EF4-FFF2-40B4-BE49-F238E27FC236}">
-                <a16:creationId xmlns:a16="http://schemas.microsoft.com/office/drawing/2014/main" id="{5C2B7755-7C4A-6B4D-2294-8F322D8E3F2A}"/>
-              </a:ext>
-            </a:extLst>
-          </p:cNvPr>
-          <p:cNvPicPr>
-            <a:picLocks noChangeAspect="1"/>
-          </p:cNvPicPr>
-          <p:nvPr/>
-        </p:nvPicPr>
-        <p:blipFill>
-          <a:blip r:embed="rId2">
-            <a:extLst>
-              <a:ext uri="{28A0092B-C50C-407E-A947-70E740481C1C}">
-                <a14:useLocalDpi xmlns:a14="http://schemas.microsoft.com/office/drawing/2010/main" val="0"/>
-              </a:ext>
-            </a:extLst>
-          </a:blip>
-          <a:stretch>
-            <a:fillRect/>
-          </a:stretch>
-        </p:blipFill>
-        <p:spPr>
-          <a:xfrm>
-            <a:off x="623350" y="2156317"/>
-            <a:ext cx="3250794" cy="203175"/>
-          </a:xfrm>
-          <a:prstGeom prst="rect">
-            <a:avLst/>
-          </a:prstGeom>
-        </p:spPr>
-      </p:pic>
-      <p:sp>
-        <p:nvSpPr>
-          <p:cNvPr id="7" name="TextBox 6">
-            <a:extLst>
-              <a:ext uri="{FF2B5EF4-FFF2-40B4-BE49-F238E27FC236}">
-                <a16:creationId xmlns:a16="http://schemas.microsoft.com/office/drawing/2014/main" id="{B2673922-557B-050E-C8D6-764A650E8745}"/>
-              </a:ext>
-            </a:extLst>
-          </p:cNvPr>
-          <p:cNvSpPr txBox="1"/>
-          <p:nvPr/>
-        </p:nvSpPr>
-        <p:spPr>
-          <a:xfrm>
-            <a:off x="562389" y="2526453"/>
-            <a:ext cx="4795317" cy="461665"/>
-          </a:xfrm>
-          <a:prstGeom prst="rect">
-            <a:avLst/>
-          </a:prstGeom>
-          <a:noFill/>
-        </p:spPr>
-        <p:txBody>
-          <a:bodyPr wrap="square" rtlCol="0">
-            <a:spAutoFit/>
-          </a:bodyPr>
-          <a:lstStyle/>
-          <a:p>
-            <a:r>
-              <a:rPr lang="en-IN" sz="1200" dirty="0">
-                <a:solidFill>
-                  <a:schemeClr val="bg1"/>
-                </a:solidFill>
-                <a:latin typeface="Calibri Light" panose="020F0302020204030204" pitchFamily="34" charset="0"/>
-                <a:ea typeface="Calibri Light" panose="020F0302020204030204" pitchFamily="34" charset="0"/>
-                <a:cs typeface="Calibri Light" panose="020F0302020204030204" pitchFamily="34" charset="0"/>
-              </a:rPr>
-              <a:t>Texture.Builtin.ColorGradingNeutralLUT16</a:t>
-            </a:r>
-          </a:p>
-          <a:p>
-            <a:pPr marL="171450" indent="-171450">
-              <a:buFont typeface="Arial" panose="020B0604020202020204" pitchFamily="34" charset="0"/>
-              <a:buChar char="•"/>
-            </a:pPr>
-            <a:r>
-              <a:rPr lang="en-IN" sz="1200" dirty="0">
-                <a:solidFill>
-                  <a:schemeClr val="bg1"/>
-                </a:solidFill>
-                <a:latin typeface="Calibri Light" panose="020F0302020204030204" pitchFamily="34" charset="0"/>
-                <a:ea typeface="Calibri Light" panose="020F0302020204030204" pitchFamily="34" charset="0"/>
-                <a:cs typeface="Calibri Light" panose="020F0302020204030204" pitchFamily="34" charset="0"/>
-              </a:rPr>
-              <a:t>Neutral looking color palette, use this to create your look.</a:t>
-            </a:r>
-          </a:p>
-        </p:txBody>
-      </p:sp>
-      <p:sp>
-        <p:nvSpPr>
-          <p:cNvPr id="8" name="Rectangle 7">
-            <a:extLst>
-              <a:ext uri="{FF2B5EF4-FFF2-40B4-BE49-F238E27FC236}">
-                <a16:creationId xmlns:a16="http://schemas.microsoft.com/office/drawing/2014/main" id="{B4015D95-1FB7-54F6-6882-0B288F69C9F7}"/>
-              </a:ext>
-            </a:extLst>
-          </p:cNvPr>
-          <p:cNvSpPr/>
-          <p:nvPr/>
-        </p:nvSpPr>
-        <p:spPr>
-          <a:xfrm>
-            <a:off x="3948939" y="3595326"/>
-            <a:ext cx="4294121" cy="461665"/>
-          </a:xfrm>
-          <a:prstGeom prst="rect">
-            <a:avLst/>
-          </a:prstGeom>
-          <a:solidFill>
-            <a:srgbClr val="FF5D78"/>
-          </a:solidFill>
-          <a:ln>
-            <a:solidFill>
-              <a:srgbClr val="C00000"/>
-            </a:solidFill>
-          </a:ln>
-        </p:spPr>
-        <p:style>
-          <a:lnRef idx="2">
-            <a:schemeClr val="accent1">
-              <a:shade val="15000"/>
-            </a:schemeClr>
-          </a:lnRef>
-          <a:fillRef idx="1">
-            <a:schemeClr val="accent1"/>
-          </a:fillRef>
-          <a:effectRef idx="0">
-            <a:schemeClr val="accent1"/>
-          </a:effectRef>
-          <a:fontRef idx="minor">
-            <a:schemeClr val="lt1"/>
-          </a:fontRef>
-        </p:style>
-        <p:txBody>
-          <a:bodyPr rtlCol="0" anchor="ctr"/>
-          <a:lstStyle/>
-          <a:p>
-            <a:pPr algn="ctr"/>
-            <a:r>
-              <a:rPr lang="en-US" sz="1200" dirty="0">
-                <a:solidFill>
-                  <a:schemeClr val="tx1"/>
-                </a:solidFill>
-                <a:latin typeface="+mj-lt"/>
-                <a:ea typeface="Calibri Light" panose="020F0302020204030204" pitchFamily="34" charset="0"/>
-                <a:cs typeface="Calibri Light" panose="020F0302020204030204" pitchFamily="34" charset="0"/>
-              </a:rPr>
-              <a:t>Razix has many more presets and supports loading your own LUT, use neutral LUTs  to configure as per your needs.</a:t>
-            </a:r>
-            <a:endParaRPr lang="en-IN" sz="1200" dirty="0">
-              <a:solidFill>
-                <a:schemeClr val="tx1"/>
-              </a:solidFill>
-              <a:latin typeface="+mj-lt"/>
-              <a:ea typeface="Calibri Light" panose="020F0302020204030204" pitchFamily="34" charset="0"/>
-              <a:cs typeface="Calibri Light" panose="020F0302020204030204" pitchFamily="34" charset="0"/>
-            </a:endParaRPr>
-          </a:p>
-        </p:txBody>
-      </p:sp>
-      <p:pic>
-        <p:nvPicPr>
-          <p:cNvPr id="10" name="Picture 9">
-            <a:extLst>
-              <a:ext uri="{FF2B5EF4-FFF2-40B4-BE49-F238E27FC236}">
-                <a16:creationId xmlns:a16="http://schemas.microsoft.com/office/drawing/2014/main" id="{B61B3C0E-3127-77DB-D480-CAAE458FD02C}"/>
-              </a:ext>
-            </a:extLst>
-          </p:cNvPr>
-          <p:cNvPicPr>
-            <a:picLocks noChangeAspect="1"/>
-          </p:cNvPicPr>
-          <p:nvPr/>
-        </p:nvPicPr>
-        <p:blipFill>
-          <a:blip r:embed="rId3">
-            <a:extLst>
-              <a:ext uri="{28A0092B-C50C-407E-A947-70E740481C1C}">
-                <a14:useLocalDpi xmlns:a14="http://schemas.microsoft.com/office/drawing/2010/main" val="0"/>
-              </a:ext>
-            </a:extLst>
-          </a:blip>
-          <a:stretch>
-            <a:fillRect/>
-          </a:stretch>
-        </p:blipFill>
-        <p:spPr>
-          <a:xfrm>
-            <a:off x="6096000" y="2156317"/>
-            <a:ext cx="3291428" cy="205714"/>
-          </a:xfrm>
-          <a:prstGeom prst="rect">
-            <a:avLst/>
-          </a:prstGeom>
-        </p:spPr>
-      </p:pic>
-      <p:sp>
-        <p:nvSpPr>
-          <p:cNvPr id="11" name="TextBox 10">
-            <a:extLst>
-              <a:ext uri="{FF2B5EF4-FFF2-40B4-BE49-F238E27FC236}">
-                <a16:creationId xmlns:a16="http://schemas.microsoft.com/office/drawing/2014/main" id="{89B42B05-EE57-40BB-4A43-7EF31F3CB18E}"/>
-              </a:ext>
-            </a:extLst>
-          </p:cNvPr>
-          <p:cNvSpPr txBox="1"/>
-          <p:nvPr/>
-        </p:nvSpPr>
-        <p:spPr>
-          <a:xfrm>
-            <a:off x="5977669" y="2526452"/>
-            <a:ext cx="5848571" cy="830997"/>
-          </a:xfrm>
-          <a:prstGeom prst="rect">
-            <a:avLst/>
-          </a:prstGeom>
-          <a:noFill/>
-        </p:spPr>
-        <p:txBody>
-          <a:bodyPr wrap="square" rtlCol="0">
-            <a:spAutoFit/>
-          </a:bodyPr>
-          <a:lstStyle/>
-          <a:p>
-            <a:r>
-              <a:rPr lang="en-IN" sz="1200" dirty="0">
-                <a:solidFill>
-                  <a:schemeClr val="bg1"/>
-                </a:solidFill>
-                <a:latin typeface="Calibri Light" panose="020F0302020204030204" pitchFamily="34" charset="0"/>
-                <a:ea typeface="Calibri Light" panose="020F0302020204030204" pitchFamily="34" charset="0"/>
-                <a:cs typeface="Calibri Light" panose="020F0302020204030204" pitchFamily="34" charset="0"/>
-              </a:rPr>
-              <a:t>Texture.Builtin.ColorGradingNeutralLUT16</a:t>
-            </a:r>
-          </a:p>
-          <a:p>
-            <a:pPr marL="171450" indent="-171450">
-              <a:buFont typeface="Arial" panose="020B0604020202020204" pitchFamily="34" charset="0"/>
-              <a:buChar char="•"/>
-            </a:pPr>
-            <a:r>
-              <a:rPr lang="en-IN" sz="1200" dirty="0">
-                <a:solidFill>
-                  <a:schemeClr val="bg1"/>
-                </a:solidFill>
-                <a:latin typeface="Calibri Light" panose="020F0302020204030204" pitchFamily="34" charset="0"/>
-                <a:ea typeface="Calibri Light" panose="020F0302020204030204" pitchFamily="34" charset="0"/>
-                <a:cs typeface="Calibri Light" panose="020F0302020204030204" pitchFamily="34" charset="0"/>
-              </a:rPr>
-              <a:t>Neutral looking color palette, use this to create your look.</a:t>
-            </a:r>
-          </a:p>
-          <a:p>
-            <a:pPr marL="171450" indent="-171450">
-              <a:buFont typeface="Arial" panose="020B0604020202020204" pitchFamily="34" charset="0"/>
-              <a:buChar char="•"/>
-            </a:pPr>
-            <a:r>
-              <a:rPr lang="en-IN" sz="1200" dirty="0">
-                <a:solidFill>
-                  <a:schemeClr val="bg1"/>
-                </a:solidFill>
-                <a:latin typeface="Calibri Light" panose="020F0302020204030204" pitchFamily="34" charset="0"/>
-                <a:ea typeface="Calibri Light" panose="020F0302020204030204" pitchFamily="34" charset="0"/>
-                <a:cs typeface="Calibri Light" panose="020F0302020204030204" pitchFamily="34" charset="0"/>
-              </a:rPr>
-              <a:t>Based on unreal Engine - </a:t>
-            </a:r>
-            <a:r>
-              <a:rPr lang="en-IN" sz="1200" dirty="0">
-                <a:solidFill>
-                  <a:schemeClr val="bg1"/>
-                </a:solidFill>
-                <a:latin typeface="Calibri Light" panose="020F0302020204030204" pitchFamily="34" charset="0"/>
-                <a:ea typeface="Calibri Light" panose="020F0302020204030204" pitchFamily="34" charset="0"/>
-                <a:cs typeface="Calibri Light" panose="020F0302020204030204" pitchFamily="34" charset="0"/>
-                <a:hlinkClick r:id="rId4"/>
-              </a:rPr>
-              <a:t>https://docs.unrealengine.com/4.27/en-US/RenderingAndGraphics/PostProcessEffects/ColorGrading/</a:t>
-            </a:r>
-            <a:endParaRPr lang="en-IN" sz="1200" dirty="0">
-              <a:solidFill>
-                <a:schemeClr val="bg1"/>
-              </a:solidFill>
-              <a:latin typeface="Calibri Light" panose="020F0302020204030204" pitchFamily="34" charset="0"/>
-              <a:ea typeface="Calibri Light" panose="020F0302020204030204" pitchFamily="34" charset="0"/>
-              <a:cs typeface="Calibri Light" panose="020F0302020204030204" pitchFamily="34" charset="0"/>
-            </a:endParaRPr>
-          </a:p>
-        </p:txBody>
-      </p:sp>
-      <p:sp>
-        <p:nvSpPr>
-          <p:cNvPr id="14" name="TextBox 13">
-            <a:extLst>
-              <a:ext uri="{FF2B5EF4-FFF2-40B4-BE49-F238E27FC236}">
-                <a16:creationId xmlns:a16="http://schemas.microsoft.com/office/drawing/2014/main" id="{73B6B01A-A9C4-5135-B9A4-B9B6DDF8AAFC}"/>
-              </a:ext>
-            </a:extLst>
-          </p:cNvPr>
-          <p:cNvSpPr txBox="1"/>
-          <p:nvPr/>
-        </p:nvSpPr>
-        <p:spPr>
-          <a:xfrm>
-            <a:off x="7321974" y="534145"/>
-            <a:ext cx="6096000" cy="369332"/>
-          </a:xfrm>
-          <a:prstGeom prst="rect">
-            <a:avLst/>
-          </a:prstGeom>
-          <a:noFill/>
-        </p:spPr>
-        <p:txBody>
-          <a:bodyPr wrap="square">
-            <a:spAutoFit/>
-          </a:bodyPr>
-          <a:lstStyle/>
-          <a:p>
-            <a:r>
-              <a:rPr lang="en-IN" dirty="0">
-                <a:solidFill>
-                  <a:schemeClr val="bg1"/>
-                </a:solidFill>
-                <a:hlinkClick r:id="rId5">
-                  <a:extLst>
-                    <a:ext uri="{A12FA001-AC4F-418D-AE19-62706E023703}">
-                      <ahyp:hlinkClr xmlns:ahyp="http://schemas.microsoft.com/office/drawing/2018/hyperlinkcolor" val="tx"/>
-                    </a:ext>
-                  </a:extLst>
-                </a:hlinkClick>
-              </a:rPr>
-              <a:t>[Source]:</a:t>
-            </a:r>
-            <a:r>
-              <a:rPr lang="en-IN" dirty="0">
-                <a:solidFill>
-                  <a:srgbClr val="0563C1"/>
-                </a:solidFill>
-                <a:hlinkClick r:id="rId5">
-                  <a:extLst>
-                    <a:ext uri="{A12FA001-AC4F-418D-AE19-62706E023703}">
-                      <ahyp:hlinkClr xmlns:ahyp="http://schemas.microsoft.com/office/drawing/2018/hyperlinkcolor" val="tx"/>
-                    </a:ext>
-                  </a:extLst>
-                </a:hlinkClick>
-              </a:rPr>
-              <a:t> https://defold.com/tutorials/grading/</a:t>
-            </a:r>
-            <a:endParaRPr lang="en-IN" dirty="0">
-              <a:solidFill>
-                <a:schemeClr val="bg1"/>
-              </a:solidFill>
-            </a:endParaRPr>
-          </a:p>
-        </p:txBody>
-      </p:sp>
-    </p:spTree>
-    <p:extLst>
-      <p:ext uri="{BB962C8B-B14F-4D97-AF65-F5344CB8AC3E}">
-        <p14:creationId xmlns:p14="http://schemas.microsoft.com/office/powerpoint/2010/main" val="2919963422"/>
       </p:ext>
     </p:extLst>
   </p:cSld>

</xml_diff>

<commit_message>
Added new asset system data structures and design update in PPT
</commit_message>
<xml_diff>
--- a/Docs/Features overview.pptx
+++ b/Docs/Features overview.pptx
@@ -256,7 +256,7 @@
           <a:p>
             <a:fld id="{3F16BF55-C0A5-4A93-9892-A2EE55AC4C70}" type="datetimeFigureOut">
               <a:rPr lang="en-IN" smtClean="0"/>
-              <a:t>30/11/24</a:t>
+              <a:t>30-11-2024</a:t>
             </a:fld>
             <a:endParaRPr lang="en-IN"/>
           </a:p>
@@ -691,7 +691,7 @@
           <a:p>
             <a:fld id="{84B6F61C-9FA5-4C35-A1D3-00EE2C15A6C0}" type="datetimeFigureOut">
               <a:rPr lang="en-IN" smtClean="0"/>
-              <a:t>30/11/24</a:t>
+              <a:t>30-11-2024</a:t>
             </a:fld>
             <a:endParaRPr lang="en-IN"/>
           </a:p>
@@ -920,7 +920,7 @@
           <a:p>
             <a:fld id="{84B6F61C-9FA5-4C35-A1D3-00EE2C15A6C0}" type="datetimeFigureOut">
               <a:rPr lang="en-IN" smtClean="0"/>
-              <a:t>30/11/24</a:t>
+              <a:t>30-11-2024</a:t>
             </a:fld>
             <a:endParaRPr lang="en-IN"/>
           </a:p>
@@ -1144,7 +1144,7 @@
           <a:p>
             <a:fld id="{84B6F61C-9FA5-4C35-A1D3-00EE2C15A6C0}" type="datetimeFigureOut">
               <a:rPr lang="en-IN" smtClean="0"/>
-              <a:t>30/11/24</a:t>
+              <a:t>30-11-2024</a:t>
             </a:fld>
             <a:endParaRPr lang="en-IN"/>
           </a:p>
@@ -1414,7 +1414,7 @@
           <a:p>
             <a:fld id="{84B6F61C-9FA5-4C35-A1D3-00EE2C15A6C0}" type="datetimeFigureOut">
               <a:rPr lang="en-IN" smtClean="0"/>
-              <a:t>30/11/24</a:t>
+              <a:t>30-11-2024</a:t>
             </a:fld>
             <a:endParaRPr lang="en-IN" dirty="0"/>
           </a:p>
@@ -1801,7 +1801,7 @@
           <a:p>
             <a:fld id="{84B6F61C-9FA5-4C35-A1D3-00EE2C15A6C0}" type="datetimeFigureOut">
               <a:rPr lang="en-IN" smtClean="0"/>
-              <a:t>30/11/24</a:t>
+              <a:t>30-11-2024</a:t>
             </a:fld>
             <a:endParaRPr lang="en-IN"/>
           </a:p>
@@ -2168,7 +2168,7 @@
           <a:p>
             <a:fld id="{84B6F61C-9FA5-4C35-A1D3-00EE2C15A6C0}" type="datetimeFigureOut">
               <a:rPr lang="en-IN" smtClean="0"/>
-              <a:t>30/11/24</a:t>
+              <a:t>30-11-2024</a:t>
             </a:fld>
             <a:endParaRPr lang="en-IN"/>
           </a:p>
@@ -2597,7 +2597,7 @@
           <a:p>
             <a:fld id="{84B6F61C-9FA5-4C35-A1D3-00EE2C15A6C0}" type="datetimeFigureOut">
               <a:rPr lang="en-IN" smtClean="0"/>
-              <a:t>30/11/24</a:t>
+              <a:t>30-11-2024</a:t>
             </a:fld>
             <a:endParaRPr lang="en-IN" dirty="0"/>
           </a:p>
@@ -2761,7 +2761,7 @@
           <a:p>
             <a:fld id="{84B6F61C-9FA5-4C35-A1D3-00EE2C15A6C0}" type="datetimeFigureOut">
               <a:rPr lang="en-IN" smtClean="0"/>
-              <a:t>30/11/24</a:t>
+              <a:t>30-11-2024</a:t>
             </a:fld>
             <a:endParaRPr lang="en-IN"/>
           </a:p>
@@ -2893,7 +2893,7 @@
           <a:p>
             <a:fld id="{84B6F61C-9FA5-4C35-A1D3-00EE2C15A6C0}" type="datetimeFigureOut">
               <a:rPr lang="en-IN" smtClean="0"/>
-              <a:t>30/11/24</a:t>
+              <a:t>30-11-2024</a:t>
             </a:fld>
             <a:endParaRPr lang="en-IN"/>
           </a:p>
@@ -3225,7 +3225,7 @@
           <a:p>
             <a:fld id="{84B6F61C-9FA5-4C35-A1D3-00EE2C15A6C0}" type="datetimeFigureOut">
               <a:rPr lang="en-IN" smtClean="0"/>
-              <a:t>30/11/24</a:t>
+              <a:t>30-11-2024</a:t>
             </a:fld>
             <a:endParaRPr lang="en-IN"/>
           </a:p>
@@ -3528,7 +3528,7 @@
           <a:p>
             <a:fld id="{84B6F61C-9FA5-4C35-A1D3-00EE2C15A6C0}" type="datetimeFigureOut">
               <a:rPr lang="en-IN" smtClean="0"/>
-              <a:t>30/11/24</a:t>
+              <a:t>30-11-2024</a:t>
             </a:fld>
             <a:endParaRPr lang="en-IN"/>
           </a:p>
@@ -3780,7 +3780,7 @@
           <a:p>
             <a:fld id="{84B6F61C-9FA5-4C35-A1D3-00EE2C15A6C0}" type="datetimeFigureOut">
               <a:rPr lang="en-IN" smtClean="0"/>
-              <a:t>30/11/24</a:t>
+              <a:t>30-11-2024</a:t>
             </a:fld>
             <a:endParaRPr lang="en-IN"/>
           </a:p>
@@ -10731,20 +10731,46 @@
             <p:ph idx="1"/>
           </p:nvPr>
         </p:nvSpPr>
-        <p:spPr/>
-        <p:txBody>
-          <a:bodyPr/>
+        <p:spPr>
+          <a:xfrm>
+            <a:off x="335903" y="1040149"/>
+            <a:ext cx="11490338" cy="2388851"/>
+          </a:xfrm>
+        </p:spPr>
+        <p:txBody>
+          <a:bodyPr>
+            <a:normAutofit lnSpcReduction="10000"/>
+          </a:bodyPr>
           <a:lstStyle/>
           <a:p>
             <a:r>
+              <a:rPr lang="en-US" b="1" i="1" dirty="0">
+                <a:solidFill>
+                  <a:schemeClr val="tx1"/>
+                </a:solidFill>
+                <a:highlight>
+                  <a:srgbClr val="FFFF00"/>
+                </a:highlight>
+              </a:rPr>
+              <a:t>“Everything is an asset”</a:t>
+            </a:r>
+            <a:r>
               <a:rPr lang="en-US" dirty="0"/>
-              <a:t>“Everything is an asset”: Meshes, Transform, Tag, UUID, Material, anything and everything in the Game world is an asset</a:t>
+              <a:t>: Meshes, Transform, UUID, Material, anything and everything in the Game world is an asset</a:t>
             </a:r>
           </a:p>
           <a:p>
             <a:r>
               <a:rPr lang="en-US" dirty="0"/>
-              <a:t>Everything in Serializable: Since everything is as Asset, storable to disk</a:t>
+              <a:t>Everything in Serializable: Since everything is as Asset, storable to disk or stream able over </a:t>
+            </a:r>
+            <a:r>
+              <a:rPr lang="en-US" dirty="0" err="1"/>
+              <a:t>BluRay</a:t>
+            </a:r>
+            <a:r>
+              <a:rPr lang="en-US" dirty="0"/>
+              <a:t>/SSD/Network </a:t>
             </a:r>
           </a:p>
           <a:p>
@@ -10767,7 +10793,15 @@
           <a:p>
             <a:r>
               <a:rPr lang="en-US" dirty="0"/>
-              <a:t>Scene Graph stores Asset refs for parent-child relationship</a:t>
+              <a:t>Scene Graph stores Asset refs for parent-child and </a:t>
+            </a:r>
+            <a:r>
+              <a:rPr lang="en-US" b="1" dirty="0"/>
+              <a:t>Spatial</a:t>
+            </a:r>
+            <a:r>
+              <a:rPr lang="en-US" dirty="0"/>
+              <a:t> relationship</a:t>
             </a:r>
           </a:p>
           <a:p>
@@ -10776,7 +10810,14 @@
               <a:t>Asset database stores and handles assets in </a:t>
             </a:r>
             <a:r>
-              <a:rPr lang="en-US" b="1" dirty="0"/>
+              <a:rPr lang="en-US" b="1" dirty="0">
+                <a:solidFill>
+                  <a:schemeClr val="tx1"/>
+                </a:solidFill>
+                <a:highlight>
+                  <a:srgbClr val="FFFF00"/>
+                </a:highlight>
+              </a:rPr>
               <a:t>different pools</a:t>
             </a:r>
           </a:p>
@@ -10785,9 +10826,6 @@
               <a:rPr lang="en-US" dirty="0"/>
               <a:t>Lazy allocation and Proxy mechanism for resource translation</a:t>
             </a:r>
-          </a:p>
-          <a:p>
-            <a:endParaRPr lang="en-US" dirty="0"/>
           </a:p>
           <a:p>
             <a:endParaRPr lang="en-US" dirty="0"/>
@@ -10800,6 +10838,185 @@
               <a:buNone/>
             </a:pPr>
             <a:endParaRPr lang="en-US" dirty="0"/>
+          </a:p>
+        </p:txBody>
+      </p:sp>
+      <p:pic>
+        <p:nvPicPr>
+          <p:cNvPr id="7" name="Picture 6">
+            <a:extLst>
+              <a:ext uri="{FF2B5EF4-FFF2-40B4-BE49-F238E27FC236}">
+                <a16:creationId xmlns:a16="http://schemas.microsoft.com/office/drawing/2014/main" id="{EB733EB5-AE57-54BF-310E-6F7BBD3E3E5B}"/>
+              </a:ext>
+            </a:extLst>
+          </p:cNvPr>
+          <p:cNvPicPr>
+            <a:picLocks noChangeAspect="1"/>
+          </p:cNvPicPr>
+          <p:nvPr/>
+        </p:nvPicPr>
+        <p:blipFill>
+          <a:blip r:embed="rId2"/>
+          <a:stretch>
+            <a:fillRect/>
+          </a:stretch>
+        </p:blipFill>
+        <p:spPr>
+          <a:xfrm>
+            <a:off x="474306" y="3468666"/>
+            <a:ext cx="3487632" cy="3190941"/>
+          </a:xfrm>
+          <a:prstGeom prst="rect">
+            <a:avLst/>
+          </a:prstGeom>
+        </p:spPr>
+      </p:pic>
+      <p:sp>
+        <p:nvSpPr>
+          <p:cNvPr id="8" name="TextBox 7">
+            <a:extLst>
+              <a:ext uri="{FF2B5EF4-FFF2-40B4-BE49-F238E27FC236}">
+                <a16:creationId xmlns:a16="http://schemas.microsoft.com/office/drawing/2014/main" id="{2BC8D2F8-A4F0-EE84-FDEE-8F21FA0A7EB8}"/>
+              </a:ext>
+            </a:extLst>
+          </p:cNvPr>
+          <p:cNvSpPr txBox="1"/>
+          <p:nvPr/>
+        </p:nvSpPr>
+        <p:spPr>
+          <a:xfrm>
+            <a:off x="1376242" y="3617350"/>
+            <a:ext cx="1683759" cy="307777"/>
+          </a:xfrm>
+          <a:prstGeom prst="rect">
+            <a:avLst/>
+          </a:prstGeom>
+          <a:noFill/>
+        </p:spPr>
+        <p:txBody>
+          <a:bodyPr wrap="square" rtlCol="0">
+            <a:spAutoFit/>
+          </a:bodyPr>
+          <a:lstStyle/>
+          <a:p>
+            <a:pPr algn="ctr"/>
+            <a:r>
+              <a:rPr lang="en-US" sz="1400" i="1" dirty="0">
+                <a:highlight>
+                  <a:srgbClr val="FFFF00"/>
+                </a:highlight>
+              </a:rPr>
+              <a:t>Transform.asset file</a:t>
+            </a:r>
+            <a:endParaRPr lang="en-IN" sz="1400" i="1" dirty="0">
+              <a:highlight>
+                <a:srgbClr val="FFFF00"/>
+              </a:highlight>
+            </a:endParaRPr>
+          </a:p>
+        </p:txBody>
+      </p:sp>
+      <p:sp>
+        <p:nvSpPr>
+          <p:cNvPr id="16" name="TextBox 15">
+            <a:extLst>
+              <a:ext uri="{FF2B5EF4-FFF2-40B4-BE49-F238E27FC236}">
+                <a16:creationId xmlns:a16="http://schemas.microsoft.com/office/drawing/2014/main" id="{FBF60DB3-AB6E-39C8-F2C2-3A523CFAE985}"/>
+              </a:ext>
+            </a:extLst>
+          </p:cNvPr>
+          <p:cNvSpPr txBox="1"/>
+          <p:nvPr/>
+        </p:nvSpPr>
+        <p:spPr>
+          <a:xfrm>
+            <a:off x="3961937" y="3468666"/>
+            <a:ext cx="6075680" cy="2862322"/>
+          </a:xfrm>
+          <a:prstGeom prst="rect">
+            <a:avLst/>
+          </a:prstGeom>
+          <a:noFill/>
+        </p:spPr>
+        <p:txBody>
+          <a:bodyPr wrap="square" rtlCol="0">
+            <a:spAutoFit/>
+          </a:bodyPr>
+          <a:lstStyle/>
+          <a:p>
+            <a:pPr marL="285750" indent="-285750">
+              <a:buFont typeface="Arial" panose="020B0604020202020204" pitchFamily="34" charset="0"/>
+              <a:buChar char="•"/>
+            </a:pPr>
+            <a:r>
+              <a:rPr lang="en-US" dirty="0">
+                <a:solidFill>
+                  <a:schemeClr val="bg1"/>
+                </a:solidFill>
+              </a:rPr>
+              <a:t>Scene Graph enforces spatial parent-child hierarchical rules</a:t>
+            </a:r>
+          </a:p>
+          <a:p>
+            <a:pPr marL="285750" indent="-285750">
+              <a:buFont typeface="Arial" panose="020B0604020202020204" pitchFamily="34" charset="0"/>
+              <a:buChar char="•"/>
+            </a:pPr>
+            <a:r>
+              <a:rPr lang="en-US" dirty="0">
+                <a:solidFill>
+                  <a:schemeClr val="bg1"/>
+                </a:solidFill>
+              </a:rPr>
+              <a:t>These rules are used by Scene graph for run-time validation </a:t>
+            </a:r>
+          </a:p>
+          <a:p>
+            <a:pPr marL="285750" indent="-285750">
+              <a:buFont typeface="Arial" panose="020B0604020202020204" pitchFamily="34" charset="0"/>
+              <a:buChar char="•"/>
+            </a:pPr>
+            <a:r>
+              <a:rPr lang="en-US" dirty="0">
+                <a:solidFill>
+                  <a:schemeClr val="bg1"/>
+                </a:solidFill>
+              </a:rPr>
+              <a:t>Also used by AssetSystem for offline validation for checking broken asset files</a:t>
+            </a:r>
+          </a:p>
+          <a:p>
+            <a:pPr marL="285750" indent="-285750">
+              <a:buFont typeface="Arial" panose="020B0604020202020204" pitchFamily="34" charset="0"/>
+              <a:buChar char="•"/>
+            </a:pPr>
+            <a:r>
+              <a:rPr lang="en-US" i="1" dirty="0">
+                <a:solidFill>
+                  <a:schemeClr val="bg1"/>
+                </a:solidFill>
+              </a:rPr>
+              <a:t>Ex rules. IAssetRule, MeshTransformSpatialAssetRule (this rules makes sure we can’t have dangling mesh assets in the root of the scene graph, it must be a child of some TransformAsset and the mesh asset must reference this file)</a:t>
+            </a:r>
+          </a:p>
+          <a:p>
+            <a:pPr marL="285750" indent="-285750">
+              <a:buFont typeface="Arial" panose="020B0604020202020204" pitchFamily="34" charset="0"/>
+              <a:buChar char="•"/>
+            </a:pPr>
+            <a:r>
+              <a:rPr lang="en-US" i="1" dirty="0">
+                <a:solidFill>
+                  <a:schemeClr val="bg1"/>
+                </a:solidFill>
+              </a:rPr>
+              <a:t>Not all new asset types need C++ classes, we can have data-only assets for storing data, easier for non-programmers</a:t>
+            </a:r>
+            <a:endParaRPr lang="en-IN" i="1" dirty="0">
+              <a:solidFill>
+                <a:schemeClr val="bg1"/>
+              </a:solidFill>
+            </a:endParaRPr>
           </a:p>
         </p:txBody>
       </p:sp>

</xml_diff>

<commit_message>
[Petty FIxes] - Move internal to core - Fix Gfx Tests
</commit_message>
<xml_diff>
--- a/Docs/Features overview.pptx
+++ b/Docs/Features overview.pptx
@@ -258,7 +258,7 @@
           <a:p>
             <a:fld id="{3F16BF55-C0A5-4A93-9892-A2EE55AC4C70}" type="datetimeFigureOut">
               <a:rPr lang="en-IN" smtClean="0"/>
-              <a:t>30/11/24</a:t>
+              <a:t>22-06-2025</a:t>
             </a:fld>
             <a:endParaRPr lang="en-IN"/>
           </a:p>
@@ -693,7 +693,7 @@
           <a:p>
             <a:fld id="{84B6F61C-9FA5-4C35-A1D3-00EE2C15A6C0}" type="datetimeFigureOut">
               <a:rPr lang="en-IN" smtClean="0"/>
-              <a:t>30/11/24</a:t>
+              <a:t>22-06-2025</a:t>
             </a:fld>
             <a:endParaRPr lang="en-IN"/>
           </a:p>
@@ -922,7 +922,7 @@
           <a:p>
             <a:fld id="{84B6F61C-9FA5-4C35-A1D3-00EE2C15A6C0}" type="datetimeFigureOut">
               <a:rPr lang="en-IN" smtClean="0"/>
-              <a:t>30/11/24</a:t>
+              <a:t>22-06-2025</a:t>
             </a:fld>
             <a:endParaRPr lang="en-IN"/>
           </a:p>
@@ -1146,7 +1146,7 @@
           <a:p>
             <a:fld id="{84B6F61C-9FA5-4C35-A1D3-00EE2C15A6C0}" type="datetimeFigureOut">
               <a:rPr lang="en-IN" smtClean="0"/>
-              <a:t>30/11/24</a:t>
+              <a:t>22-06-2025</a:t>
             </a:fld>
             <a:endParaRPr lang="en-IN"/>
           </a:p>
@@ -1416,7 +1416,7 @@
           <a:p>
             <a:fld id="{84B6F61C-9FA5-4C35-A1D3-00EE2C15A6C0}" type="datetimeFigureOut">
               <a:rPr lang="en-IN" smtClean="0"/>
-              <a:t>30/11/24</a:t>
+              <a:t>22-06-2025</a:t>
             </a:fld>
             <a:endParaRPr lang="en-IN" dirty="0"/>
           </a:p>
@@ -1803,7 +1803,7 @@
           <a:p>
             <a:fld id="{84B6F61C-9FA5-4C35-A1D3-00EE2C15A6C0}" type="datetimeFigureOut">
               <a:rPr lang="en-IN" smtClean="0"/>
-              <a:t>30/11/24</a:t>
+              <a:t>22-06-2025</a:t>
             </a:fld>
             <a:endParaRPr lang="en-IN"/>
           </a:p>
@@ -2170,7 +2170,7 @@
           <a:p>
             <a:fld id="{84B6F61C-9FA5-4C35-A1D3-00EE2C15A6C0}" type="datetimeFigureOut">
               <a:rPr lang="en-IN" smtClean="0"/>
-              <a:t>30/11/24</a:t>
+              <a:t>22-06-2025</a:t>
             </a:fld>
             <a:endParaRPr lang="en-IN"/>
           </a:p>
@@ -2599,7 +2599,7 @@
           <a:p>
             <a:fld id="{84B6F61C-9FA5-4C35-A1D3-00EE2C15A6C0}" type="datetimeFigureOut">
               <a:rPr lang="en-IN" smtClean="0"/>
-              <a:t>30/11/24</a:t>
+              <a:t>22-06-2025</a:t>
             </a:fld>
             <a:endParaRPr lang="en-IN" dirty="0"/>
           </a:p>
@@ -2763,7 +2763,7 @@
           <a:p>
             <a:fld id="{84B6F61C-9FA5-4C35-A1D3-00EE2C15A6C0}" type="datetimeFigureOut">
               <a:rPr lang="en-IN" smtClean="0"/>
-              <a:t>30/11/24</a:t>
+              <a:t>22-06-2025</a:t>
             </a:fld>
             <a:endParaRPr lang="en-IN"/>
           </a:p>
@@ -2895,7 +2895,7 @@
           <a:p>
             <a:fld id="{84B6F61C-9FA5-4C35-A1D3-00EE2C15A6C0}" type="datetimeFigureOut">
               <a:rPr lang="en-IN" smtClean="0"/>
-              <a:t>30/11/24</a:t>
+              <a:t>22-06-2025</a:t>
             </a:fld>
             <a:endParaRPr lang="en-IN"/>
           </a:p>
@@ -3227,7 +3227,7 @@
           <a:p>
             <a:fld id="{84B6F61C-9FA5-4C35-A1D3-00EE2C15A6C0}" type="datetimeFigureOut">
               <a:rPr lang="en-IN" smtClean="0"/>
-              <a:t>30/11/24</a:t>
+              <a:t>22-06-2025</a:t>
             </a:fld>
             <a:endParaRPr lang="en-IN"/>
           </a:p>
@@ -3530,7 +3530,7 @@
           <a:p>
             <a:fld id="{84B6F61C-9FA5-4C35-A1D3-00EE2C15A6C0}" type="datetimeFigureOut">
               <a:rPr lang="en-IN" smtClean="0"/>
-              <a:t>30/11/24</a:t>
+              <a:t>22-06-2025</a:t>
             </a:fld>
             <a:endParaRPr lang="en-IN"/>
           </a:p>
@@ -3782,7 +3782,7 @@
           <a:p>
             <a:fld id="{84B6F61C-9FA5-4C35-A1D3-00EE2C15A6C0}" type="datetimeFigureOut">
               <a:rPr lang="en-IN" smtClean="0"/>
-              <a:t>30/11/24</a:t>
+              <a:t>22-06-2025</a:t>
             </a:fld>
             <a:endParaRPr lang="en-IN"/>
           </a:p>
@@ -9706,7 +9706,7 @@
                 <a:ea typeface="Calibri Light" panose="020F0302020204030204" pitchFamily="34" charset="0"/>
                 <a:cs typeface="Courier New" panose="02070309020205020404" pitchFamily="49" charset="0"/>
               </a:rPr>
-              <a:t>Diana::BuildDrawables(RZWorld::meshes/decals)</a:t>
+              <a:t>House::BuildDrawables(RZWorld::meshes/decals)</a:t>
             </a:r>
             <a:endParaRPr lang="en-IN" sz="800" dirty="0">
               <a:solidFill>
@@ -9818,7 +9818,7 @@
                 <a:ea typeface="Calibri Light" panose="020F0302020204030204" pitchFamily="34" charset="0"/>
                 <a:cs typeface="Courier New" panose="02070309020205020404" pitchFamily="49" charset="0"/>
               </a:rPr>
-              <a:t>Diana::BuildBatches(Drawables*) </a:t>
+              <a:t>House ::BuildBatches(Drawables*) </a:t>
             </a:r>
             <a:endParaRPr lang="en-IN" sz="800" dirty="0">
               <a:solidFill>
@@ -11438,7 +11438,7 @@
                   <a:srgbClr val="FFFF00"/>
                 </a:highlight>
               </a:rPr>
-              <a:t>Diana</a:t>
+              <a:t>House</a:t>
             </a:r>
             <a:r>
               <a:rPr lang="en-US" sz="1000" dirty="0">
@@ -11465,7 +11465,7 @@
                 <a:ea typeface="Calibri Light" panose="020F0302020204030204" pitchFamily="34" charset="0"/>
                 <a:cs typeface="Calibri Light" panose="020F0302020204030204" pitchFamily="34" charset="0"/>
               </a:rPr>
-              <a:t>Named after princess Diana.</a:t>
+              <a:t>Named after Dr. Gregory House MD.</a:t>
             </a:r>
             <a:endParaRPr lang="en-IN" sz="1000" i="1" dirty="0">
               <a:solidFill>

</xml_diff>